<commit_message>
Threads - Estados das threads.
</commit_message>
<xml_diff>
--- a/2-Java-Programmer-Modulo-II/14.Capitulo08.pptx
+++ b/2-Java-Programmer-Modulo-II/14.Capitulo08.pptx
@@ -5,7 +5,7 @@
     <p:sldMasterId id="2147483660" r:id="rId1"/>
   </p:sldMasterIdLst>
   <p:notesMasterIdLst>
-    <p:notesMasterId r:id="rId22"/>
+    <p:notesMasterId r:id="rId21"/>
   </p:notesMasterIdLst>
   <p:sldIdLst>
     <p:sldId id="256" r:id="rId2"/>
@@ -17,17 +17,16 @@
     <p:sldId id="323" r:id="rId8"/>
     <p:sldId id="300" r:id="rId9"/>
     <p:sldId id="324" r:id="rId10"/>
-    <p:sldId id="301" r:id="rId11"/>
-    <p:sldId id="302" r:id="rId12"/>
-    <p:sldId id="303" r:id="rId13"/>
-    <p:sldId id="304" r:id="rId14"/>
-    <p:sldId id="305" r:id="rId15"/>
-    <p:sldId id="306" r:id="rId16"/>
-    <p:sldId id="318" r:id="rId17"/>
-    <p:sldId id="311" r:id="rId18"/>
-    <p:sldId id="315" r:id="rId19"/>
-    <p:sldId id="316" r:id="rId20"/>
-    <p:sldId id="317" r:id="rId21"/>
+    <p:sldId id="325" r:id="rId11"/>
+    <p:sldId id="303" r:id="rId12"/>
+    <p:sldId id="304" r:id="rId13"/>
+    <p:sldId id="305" r:id="rId14"/>
+    <p:sldId id="306" r:id="rId15"/>
+    <p:sldId id="318" r:id="rId16"/>
+    <p:sldId id="311" r:id="rId17"/>
+    <p:sldId id="315" r:id="rId18"/>
+    <p:sldId id="316" r:id="rId19"/>
+    <p:sldId id="317" r:id="rId20"/>
   </p:sldIdLst>
   <p:sldSz cx="9144000" cy="6858000" type="screen4x3"/>
   <p:notesSz cx="6858000" cy="9144000"/>
@@ -268,7 +267,7 @@
               <a:pPr>
                 <a:defRPr/>
               </a:pPr>
-              <a:t>16/04/2012</a:t>
+              <a:t>17/04/2012</a:t>
             </a:fld>
             <a:endParaRPr lang="pt-BR"/>
           </a:p>
@@ -737,7 +736,7 @@
       </p:grpSpPr>
       <p:sp>
         <p:nvSpPr>
-          <p:cNvPr id="33794" name="Espaço Reservado para Imagem de Slide 1"/>
+          <p:cNvPr id="32770" name="Espaço Reservado para Imagem de Slide 1"/>
           <p:cNvSpPr>
             <a:spLocks noGrp="1" noRot="1" noChangeAspect="1" noTextEdit="1"/>
           </p:cNvSpPr>
@@ -759,7 +758,7 @@
       </p:sp>
       <p:sp>
         <p:nvSpPr>
-          <p:cNvPr id="33795" name="Espaço Reservado para Anotações 2"/>
+          <p:cNvPr id="32771" name="Espaço Reservado para Anotações 2"/>
           <p:cNvSpPr>
             <a:spLocks noGrp="1"/>
           </p:cNvSpPr>
@@ -800,7 +799,7 @@
             <a:pPr>
               <a:defRPr/>
             </a:pPr>
-            <a:fld id="{3AFE44C6-A7FF-442C-9A8A-143C1045DEBE}" type="slidenum">
+            <a:fld id="{3817D5A1-48BD-4756-BC68-BBB17E068BFA}" type="slidenum">
               <a:rPr lang="pt-BR" smtClean="0"/>
               <a:pPr>
                 <a:defRPr/>
@@ -838,7 +837,7 @@
       </p:grpSpPr>
       <p:sp>
         <p:nvSpPr>
-          <p:cNvPr id="34818" name="Espaço Reservado para Imagem de Slide 1"/>
+          <p:cNvPr id="35842" name="Espaço Reservado para Imagem de Slide 1"/>
           <p:cNvSpPr>
             <a:spLocks noGrp="1" noRot="1" noChangeAspect="1" noTextEdit="1"/>
           </p:cNvSpPr>
@@ -860,7 +859,7 @@
       </p:sp>
       <p:sp>
         <p:nvSpPr>
-          <p:cNvPr id="34819" name="Espaço Reservado para Anotações 2"/>
+          <p:cNvPr id="35843" name="Espaço Reservado para Anotações 2"/>
           <p:cNvSpPr>
             <a:spLocks noGrp="1"/>
           </p:cNvSpPr>
@@ -901,7 +900,7 @@
             <a:pPr>
               <a:defRPr/>
             </a:pPr>
-            <a:fld id="{70BAD632-B82D-488E-95EA-4A55071D784E}" type="slidenum">
+            <a:fld id="{21092793-6167-4EF9-87CE-E31DF842B0B9}" type="slidenum">
               <a:rPr lang="pt-BR" smtClean="0"/>
               <a:pPr>
                 <a:defRPr/>
@@ -939,7 +938,7 @@
       </p:grpSpPr>
       <p:sp>
         <p:nvSpPr>
-          <p:cNvPr id="35842" name="Espaço Reservado para Imagem de Slide 1"/>
+          <p:cNvPr id="36866" name="Espaço Reservado para Imagem de Slide 1"/>
           <p:cNvSpPr>
             <a:spLocks noGrp="1" noRot="1" noChangeAspect="1" noTextEdit="1"/>
           </p:cNvSpPr>
@@ -961,7 +960,7 @@
       </p:sp>
       <p:sp>
         <p:nvSpPr>
-          <p:cNvPr id="35843" name="Espaço Reservado para Anotações 2"/>
+          <p:cNvPr id="36867" name="Espaço Reservado para Anotações 2"/>
           <p:cNvSpPr>
             <a:spLocks noGrp="1"/>
           </p:cNvSpPr>
@@ -1002,7 +1001,7 @@
             <a:pPr>
               <a:defRPr/>
             </a:pPr>
-            <a:fld id="{21092793-6167-4EF9-87CE-E31DF842B0B9}" type="slidenum">
+            <a:fld id="{9C861F01-F594-4F8E-816C-7353D6F44AC2}" type="slidenum">
               <a:rPr lang="pt-BR" smtClean="0"/>
               <a:pPr>
                 <a:defRPr/>
@@ -1040,7 +1039,7 @@
       </p:grpSpPr>
       <p:sp>
         <p:nvSpPr>
-          <p:cNvPr id="36866" name="Espaço Reservado para Imagem de Slide 1"/>
+          <p:cNvPr id="37890" name="Espaço Reservado para Imagem de Slide 1"/>
           <p:cNvSpPr>
             <a:spLocks noGrp="1" noRot="1" noChangeAspect="1" noTextEdit="1"/>
           </p:cNvSpPr>
@@ -1062,7 +1061,7 @@
       </p:sp>
       <p:sp>
         <p:nvSpPr>
-          <p:cNvPr id="36867" name="Espaço Reservado para Anotações 2"/>
+          <p:cNvPr id="37891" name="Espaço Reservado para Anotações 2"/>
           <p:cNvSpPr>
             <a:spLocks noGrp="1"/>
           </p:cNvSpPr>
@@ -1103,7 +1102,7 @@
             <a:pPr>
               <a:defRPr/>
             </a:pPr>
-            <a:fld id="{9C861F01-F594-4F8E-816C-7353D6F44AC2}" type="slidenum">
+            <a:fld id="{CE299FDD-0BF1-4951-98DD-C05CFD2239CC}" type="slidenum">
               <a:rPr lang="pt-BR" smtClean="0"/>
               <a:pPr>
                 <a:defRPr/>
@@ -1141,7 +1140,7 @@
       </p:grpSpPr>
       <p:sp>
         <p:nvSpPr>
-          <p:cNvPr id="37890" name="Espaço Reservado para Imagem de Slide 1"/>
+          <p:cNvPr id="38914" name="Espaço Reservado para Imagem de Slide 1"/>
           <p:cNvSpPr>
             <a:spLocks noGrp="1" noRot="1" noChangeAspect="1" noTextEdit="1"/>
           </p:cNvSpPr>
@@ -1163,7 +1162,7 @@
       </p:sp>
       <p:sp>
         <p:nvSpPr>
-          <p:cNvPr id="37891" name="Espaço Reservado para Anotações 2"/>
+          <p:cNvPr id="38915" name="Espaço Reservado para Anotações 2"/>
           <p:cNvSpPr>
             <a:spLocks noGrp="1"/>
           </p:cNvSpPr>
@@ -1204,7 +1203,7 @@
             <a:pPr>
               <a:defRPr/>
             </a:pPr>
-            <a:fld id="{CE299FDD-0BF1-4951-98DD-C05CFD2239CC}" type="slidenum">
+            <a:fld id="{9F5A471A-2AFD-4B8A-A9A0-DB29F3D740CE}" type="slidenum">
               <a:rPr lang="pt-BR" smtClean="0"/>
               <a:pPr>
                 <a:defRPr/>
@@ -1242,29 +1241,19 @@
       </p:grpSpPr>
       <p:sp>
         <p:nvSpPr>
-          <p:cNvPr id="38914" name="Espaço Reservado para Imagem de Slide 1"/>
-          <p:cNvSpPr>
-            <a:spLocks noGrp="1" noRot="1" noChangeAspect="1" noTextEdit="1"/>
+          <p:cNvPr id="2" name="Espaço Reservado para Imagem de Slide 1"/>
+          <p:cNvSpPr>
+            <a:spLocks noGrp="1" noRot="1" noChangeAspect="1"/>
           </p:cNvSpPr>
           <p:nvPr>
             <p:ph type="sldImg"/>
           </p:nvPr>
         </p:nvSpPr>
-        <p:spPr bwMode="auto">
-          <a:noFill/>
-          <a:ln>
-            <a:solidFill>
-              <a:srgbClr val="000000"/>
-            </a:solidFill>
-            <a:miter lim="800000"/>
-            <a:headEnd/>
-            <a:tailEnd/>
-          </a:ln>
-        </p:spPr>
-      </p:sp>
-      <p:sp>
-        <p:nvSpPr>
-          <p:cNvPr id="38915" name="Espaço Reservado para Anotações 2"/>
+        <p:spPr/>
+      </p:sp>
+      <p:sp>
+        <p:nvSpPr>
+          <p:cNvPr id="3" name="Espaço Reservado para Anotações 2"/>
           <p:cNvSpPr>
             <a:spLocks noGrp="1"/>
           </p:cNvSpPr>
@@ -1272,18 +1261,14 @@
             <p:ph type="body" idx="1"/>
           </p:nvPr>
         </p:nvSpPr>
-        <p:spPr bwMode="auto">
-          <a:noFill/>
-        </p:spPr>
-        <p:txBody>
-          <a:bodyPr wrap="square" numCol="1" anchor="t" anchorCtr="0" compatLnSpc="1">
-            <a:prstTxWarp prst="textNoShape">
-              <a:avLst/>
-            </a:prstTxWarp>
+        <p:spPr/>
+        <p:txBody>
+          <a:bodyPr>
+            <a:normAutofit/>
           </a:bodyPr>
           <a:lstStyle/>
           <a:p>
-            <a:endParaRPr lang="pt-BR" smtClean="0"/>
+            <a:endParaRPr lang="pt-BR"/>
           </a:p>
         </p:txBody>
       </p:sp>
@@ -1294,7 +1279,7 @@
             <a:spLocks noGrp="1"/>
           </p:cNvSpPr>
           <p:nvPr>
-            <p:ph type="sldNum" sz="quarter" idx="5"/>
+            <p:ph type="sldNum" sz="quarter" idx="10"/>
           </p:nvPr>
         </p:nvSpPr>
         <p:spPr/>
@@ -1305,7 +1290,7 @@
             <a:pPr>
               <a:defRPr/>
             </a:pPr>
-            <a:fld id="{9F5A471A-2AFD-4B8A-A9A0-DB29F3D740CE}" type="slidenum">
+            <a:fld id="{D45731A0-D324-45D2-92B5-75F23FA6F9F4}" type="slidenum">
               <a:rPr lang="pt-BR" smtClean="0"/>
               <a:pPr>
                 <a:defRPr/>
@@ -1343,19 +1328,29 @@
       </p:grpSpPr>
       <p:sp>
         <p:nvSpPr>
-          <p:cNvPr id="2" name="Espaço Reservado para Imagem de Slide 1"/>
-          <p:cNvSpPr>
-            <a:spLocks noGrp="1" noRot="1" noChangeAspect="1"/>
+          <p:cNvPr id="44034" name="Espaço Reservado para Imagem de Slide 1"/>
+          <p:cNvSpPr>
+            <a:spLocks noGrp="1" noRot="1" noChangeAspect="1" noTextEdit="1"/>
           </p:cNvSpPr>
           <p:nvPr>
             <p:ph type="sldImg"/>
           </p:nvPr>
         </p:nvSpPr>
-        <p:spPr/>
-      </p:sp>
-      <p:sp>
-        <p:nvSpPr>
-          <p:cNvPr id="3" name="Espaço Reservado para Anotações 2"/>
+        <p:spPr bwMode="auto">
+          <a:noFill/>
+          <a:ln>
+            <a:solidFill>
+              <a:srgbClr val="000000"/>
+            </a:solidFill>
+            <a:miter lim="800000"/>
+            <a:headEnd/>
+            <a:tailEnd/>
+          </a:ln>
+        </p:spPr>
+      </p:sp>
+      <p:sp>
+        <p:nvSpPr>
+          <p:cNvPr id="44035" name="Espaço Reservado para Anotações 2"/>
           <p:cNvSpPr>
             <a:spLocks noGrp="1"/>
           </p:cNvSpPr>
@@ -1363,14 +1358,18 @@
             <p:ph type="body" idx="1"/>
           </p:nvPr>
         </p:nvSpPr>
-        <p:spPr/>
-        <p:txBody>
-          <a:bodyPr>
-            <a:normAutofit/>
+        <p:spPr bwMode="auto">
+          <a:noFill/>
+        </p:spPr>
+        <p:txBody>
+          <a:bodyPr wrap="square" numCol="1" anchor="t" anchorCtr="0" compatLnSpc="1">
+            <a:prstTxWarp prst="textNoShape">
+              <a:avLst/>
+            </a:prstTxWarp>
           </a:bodyPr>
           <a:lstStyle/>
           <a:p>
-            <a:endParaRPr lang="pt-BR"/>
+            <a:endParaRPr lang="pt-BR" smtClean="0"/>
           </a:p>
         </p:txBody>
       </p:sp>
@@ -1381,7 +1380,7 @@
             <a:spLocks noGrp="1"/>
           </p:cNvSpPr>
           <p:nvPr>
-            <p:ph type="sldNum" sz="quarter" idx="10"/>
+            <p:ph type="sldNum" sz="quarter" idx="5"/>
           </p:nvPr>
         </p:nvSpPr>
         <p:spPr/>
@@ -1392,7 +1391,7 @@
             <a:pPr>
               <a:defRPr/>
             </a:pPr>
-            <a:fld id="{D45731A0-D324-45D2-92B5-75F23FA6F9F4}" type="slidenum">
+            <a:fld id="{45A3F917-E589-43AF-86DB-C0714EEE8960}" type="slidenum">
               <a:rPr lang="pt-BR" smtClean="0"/>
               <a:pPr>
                 <a:defRPr/>
@@ -1430,7 +1429,7 @@
       </p:grpSpPr>
       <p:sp>
         <p:nvSpPr>
-          <p:cNvPr id="44034" name="Espaço Reservado para Imagem de Slide 1"/>
+          <p:cNvPr id="48130" name="Espaço Reservado para Imagem de Slide 1"/>
           <p:cNvSpPr>
             <a:spLocks noGrp="1" noRot="1" noChangeAspect="1" noTextEdit="1"/>
           </p:cNvSpPr>
@@ -1452,7 +1451,7 @@
       </p:sp>
       <p:sp>
         <p:nvSpPr>
-          <p:cNvPr id="44035" name="Espaço Reservado para Anotações 2"/>
+          <p:cNvPr id="48131" name="Espaço Reservado para Anotações 2"/>
           <p:cNvSpPr>
             <a:spLocks noGrp="1"/>
           </p:cNvSpPr>
@@ -1493,7 +1492,7 @@
             <a:pPr>
               <a:defRPr/>
             </a:pPr>
-            <a:fld id="{45A3F917-E589-43AF-86DB-C0714EEE8960}" type="slidenum">
+            <a:fld id="{48A4B3DD-DC3A-4A1F-BDF3-5FDBAE99314D}" type="slidenum">
               <a:rPr lang="pt-BR" smtClean="0"/>
               <a:pPr>
                 <a:defRPr/>
@@ -1531,7 +1530,7 @@
       </p:grpSpPr>
       <p:sp>
         <p:nvSpPr>
-          <p:cNvPr id="48130" name="Espaço Reservado para Imagem de Slide 1"/>
+          <p:cNvPr id="49154" name="Espaço Reservado para Imagem de Slide 1"/>
           <p:cNvSpPr>
             <a:spLocks noGrp="1" noRot="1" noChangeAspect="1" noTextEdit="1"/>
           </p:cNvSpPr>
@@ -1553,7 +1552,7 @@
       </p:sp>
       <p:sp>
         <p:nvSpPr>
-          <p:cNvPr id="48131" name="Espaço Reservado para Anotações 2"/>
+          <p:cNvPr id="49155" name="Espaço Reservado para Anotações 2"/>
           <p:cNvSpPr>
             <a:spLocks noGrp="1"/>
           </p:cNvSpPr>
@@ -1594,7 +1593,7 @@
             <a:pPr>
               <a:defRPr/>
             </a:pPr>
-            <a:fld id="{48A4B3DD-DC3A-4A1F-BDF3-5FDBAE99314D}" type="slidenum">
+            <a:fld id="{94627C42-8E0D-4C50-A726-3D908F1BD667}" type="slidenum">
               <a:rPr lang="pt-BR" smtClean="0"/>
               <a:pPr>
                 <a:defRPr/>
@@ -1632,7 +1631,7 @@
       </p:grpSpPr>
       <p:sp>
         <p:nvSpPr>
-          <p:cNvPr id="49154" name="Espaço Reservado para Imagem de Slide 1"/>
+          <p:cNvPr id="50178" name="Espaço Reservado para Imagem de Slide 1"/>
           <p:cNvSpPr>
             <a:spLocks noGrp="1" noRot="1" noChangeAspect="1" noTextEdit="1"/>
           </p:cNvSpPr>
@@ -1654,7 +1653,7 @@
       </p:sp>
       <p:sp>
         <p:nvSpPr>
-          <p:cNvPr id="49155" name="Espaço Reservado para Anotações 2"/>
+          <p:cNvPr id="50179" name="Espaço Reservado para Anotações 2"/>
           <p:cNvSpPr>
             <a:spLocks noGrp="1"/>
           </p:cNvSpPr>
@@ -1695,7 +1694,7 @@
             <a:pPr>
               <a:defRPr/>
             </a:pPr>
-            <a:fld id="{94627C42-8E0D-4C50-A726-3D908F1BD667}" type="slidenum">
+            <a:fld id="{D1504F8C-84CC-4741-AE25-BE957FF16396}" type="slidenum">
               <a:rPr lang="pt-BR" smtClean="0"/>
               <a:pPr>
                 <a:defRPr/>
@@ -1788,107 +1787,6 @@
                 <a:defRPr/>
               </a:pPr>
               <a:t>2</a:t>
-            </a:fld>
-            <a:endParaRPr lang="pt-BR"/>
-          </a:p>
-        </p:txBody>
-      </p:sp>
-    </p:spTree>
-  </p:cSld>
-  <p:clrMapOvr>
-    <a:masterClrMapping/>
-  </p:clrMapOvr>
-</p:notes>
-</file>
-
-<file path=ppt/notesSlides/notesSlide20.xml><?xml version="1.0" encoding="utf-8"?>
-<p:notes xmlns:a="http://schemas.openxmlformats.org/drawingml/2006/main" xmlns:r="http://schemas.openxmlformats.org/officeDocument/2006/relationships" xmlns:p="http://schemas.openxmlformats.org/presentationml/2006/main">
-  <p:cSld>
-    <p:spTree>
-      <p:nvGrpSpPr>
-        <p:cNvPr id="1" name=""/>
-        <p:cNvGrpSpPr/>
-        <p:nvPr/>
-      </p:nvGrpSpPr>
-      <p:grpSpPr>
-        <a:xfrm>
-          <a:off x="0" y="0"/>
-          <a:ext cx="0" cy="0"/>
-          <a:chOff x="0" y="0"/>
-          <a:chExt cx="0" cy="0"/>
-        </a:xfrm>
-      </p:grpSpPr>
-      <p:sp>
-        <p:nvSpPr>
-          <p:cNvPr id="50178" name="Espaço Reservado para Imagem de Slide 1"/>
-          <p:cNvSpPr>
-            <a:spLocks noGrp="1" noRot="1" noChangeAspect="1" noTextEdit="1"/>
-          </p:cNvSpPr>
-          <p:nvPr>
-            <p:ph type="sldImg"/>
-          </p:nvPr>
-        </p:nvSpPr>
-        <p:spPr bwMode="auto">
-          <a:noFill/>
-          <a:ln>
-            <a:solidFill>
-              <a:srgbClr val="000000"/>
-            </a:solidFill>
-            <a:miter lim="800000"/>
-            <a:headEnd/>
-            <a:tailEnd/>
-          </a:ln>
-        </p:spPr>
-      </p:sp>
-      <p:sp>
-        <p:nvSpPr>
-          <p:cNvPr id="50179" name="Espaço Reservado para Anotações 2"/>
-          <p:cNvSpPr>
-            <a:spLocks noGrp="1"/>
-          </p:cNvSpPr>
-          <p:nvPr>
-            <p:ph type="body" idx="1"/>
-          </p:nvPr>
-        </p:nvSpPr>
-        <p:spPr bwMode="auto">
-          <a:noFill/>
-        </p:spPr>
-        <p:txBody>
-          <a:bodyPr wrap="square" numCol="1" anchor="t" anchorCtr="0" compatLnSpc="1">
-            <a:prstTxWarp prst="textNoShape">
-              <a:avLst/>
-            </a:prstTxWarp>
-          </a:bodyPr>
-          <a:lstStyle/>
-          <a:p>
-            <a:endParaRPr lang="pt-BR" smtClean="0"/>
-          </a:p>
-        </p:txBody>
-      </p:sp>
-      <p:sp>
-        <p:nvSpPr>
-          <p:cNvPr id="4" name="Espaço Reservado para Número de Slide 3"/>
-          <p:cNvSpPr>
-            <a:spLocks noGrp="1"/>
-          </p:cNvSpPr>
-          <p:nvPr>
-            <p:ph type="sldNum" sz="quarter" idx="5"/>
-          </p:nvPr>
-        </p:nvSpPr>
-        <p:spPr/>
-        <p:txBody>
-          <a:bodyPr/>
-          <a:lstStyle/>
-          <a:p>
-            <a:pPr>
-              <a:defRPr/>
-            </a:pPr>
-            <a:fld id="{D1504F8C-84CC-4741-AE25-BE957FF16396}" type="slidenum">
-              <a:rPr lang="pt-BR" smtClean="0"/>
-              <a:pPr>
-                <a:defRPr/>
-              </a:pPr>
-              <a:t>20</a:t>
             </a:fld>
             <a:endParaRPr lang="pt-BR"/>
           </a:p>
@@ -3027,7 +2925,7 @@
               <a:pPr>
                 <a:defRPr/>
               </a:pPr>
-              <a:t>16/04/2012</a:t>
+              <a:t>17/04/2012</a:t>
             </a:fld>
             <a:endParaRPr lang="pt-BR"/>
           </a:p>
@@ -3226,7 +3124,7 @@
               <a:pPr>
                 <a:defRPr/>
               </a:pPr>
-              <a:t>16/04/2012</a:t>
+              <a:t>17/04/2012</a:t>
             </a:fld>
             <a:endParaRPr lang="pt-BR"/>
           </a:p>
@@ -3428,7 +3326,7 @@
               <a:pPr>
                 <a:defRPr/>
               </a:pPr>
-              <a:t>16/04/2012</a:t>
+              <a:t>17/04/2012</a:t>
             </a:fld>
             <a:endParaRPr lang="pt-BR"/>
           </a:p>
@@ -3624,7 +3522,7 @@
               <a:pPr>
                 <a:defRPr/>
               </a:pPr>
-              <a:t>16/04/2012</a:t>
+              <a:t>17/04/2012</a:t>
             </a:fld>
             <a:endParaRPr lang="pt-BR"/>
           </a:p>
@@ -4130,7 +4028,7 @@
               <a:pPr>
                 <a:defRPr/>
               </a:pPr>
-              <a:t>16/04/2012</a:t>
+              <a:t>17/04/2012</a:t>
             </a:fld>
             <a:endParaRPr lang="pt-BR"/>
           </a:p>
@@ -4421,7 +4319,7 @@
               <a:pPr>
                 <a:defRPr/>
               </a:pPr>
-              <a:t>16/04/2012</a:t>
+              <a:t>17/04/2012</a:t>
             </a:fld>
             <a:endParaRPr lang="pt-BR"/>
           </a:p>
@@ -4822,7 +4720,7 @@
               <a:pPr>
                 <a:defRPr/>
               </a:pPr>
-              <a:t>16/04/2012</a:t>
+              <a:t>17/04/2012</a:t>
             </a:fld>
             <a:endParaRPr lang="pt-BR"/>
           </a:p>
@@ -4971,7 +4869,7 @@
               <a:pPr>
                 <a:defRPr/>
               </a:pPr>
-              <a:t>16/04/2012</a:t>
+              <a:t>17/04/2012</a:t>
             </a:fld>
             <a:endParaRPr lang="pt-BR"/>
           </a:p>
@@ -5088,7 +4986,7 @@
               <a:pPr>
                 <a:defRPr/>
               </a:pPr>
-              <a:t>16/04/2012</a:t>
+              <a:t>17/04/2012</a:t>
             </a:fld>
             <a:endParaRPr lang="pt-BR"/>
           </a:p>
@@ -5364,7 +5262,7 @@
               <a:pPr>
                 <a:defRPr/>
               </a:pPr>
-              <a:t>16/04/2012</a:t>
+              <a:t>17/04/2012</a:t>
             </a:fld>
             <a:endParaRPr lang="pt-BR"/>
           </a:p>
@@ -5648,7 +5546,7 @@
               <a:pPr>
                 <a:defRPr/>
               </a:pPr>
-              <a:t>16/04/2012</a:t>
+              <a:t>17/04/2012</a:t>
             </a:fld>
             <a:endParaRPr lang="pt-BR"/>
           </a:p>
@@ -6126,7 +6024,7 @@
               <a:pPr>
                 <a:defRPr/>
               </a:pPr>
-              <a:t>16/04/2012</a:t>
+              <a:t>17/04/2012</a:t>
             </a:fld>
             <a:endParaRPr lang="pt-BR"/>
           </a:p>
@@ -6781,7 +6679,7 @@
       </p:grpSpPr>
       <p:sp>
         <p:nvSpPr>
-          <p:cNvPr id="11266" name="Título 1"/>
+          <p:cNvPr id="10242" name="Título 1"/>
           <p:cNvSpPr>
             <a:spLocks noGrp="1"/>
           </p:cNvSpPr>
@@ -6789,7 +6687,12 @@
             <p:ph type="title"/>
           </p:nvPr>
         </p:nvSpPr>
-        <p:spPr/>
+        <p:spPr>
+          <a:xfrm>
+            <a:off x="457200" y="274638"/>
+            <a:ext cx="7643192" cy="1143000"/>
+          </a:xfrm>
+        </p:spPr>
         <p:txBody>
           <a:bodyPr/>
           <a:lstStyle/>
@@ -6797,30 +6700,14 @@
             <a:pPr eaLnBrk="1" hangingPunct="1"/>
             <a:r>
               <a:rPr lang="pt-BR" dirty="0" smtClean="0"/>
-              <a:t>A classe </a:t>
-            </a:r>
-            <a:r>
-              <a:rPr lang="pt-BR" dirty="0" err="1" smtClean="0"/>
-              <a:t>java</a:t>
-            </a:r>
-            <a:r>
-              <a:rPr lang="pt-BR" dirty="0" smtClean="0"/>
-              <a:t>.</a:t>
-            </a:r>
-            <a:r>
-              <a:rPr lang="pt-BR" dirty="0" err="1" smtClean="0"/>
-              <a:t>lang</a:t>
-            </a:r>
-            <a:r>
-              <a:rPr lang="pt-BR" dirty="0" smtClean="0"/>
-              <a:t>.Thread</a:t>
-            </a:r>
-          </a:p>
-        </p:txBody>
-      </p:sp>
-      <p:sp>
-        <p:nvSpPr>
-          <p:cNvPr id="11267" name="Espaço Reservado para Conteúdo 2"/>
+              <a:t>Criando e executando threads</a:t>
+            </a:r>
+          </a:p>
+        </p:txBody>
+      </p:sp>
+      <p:sp>
+        <p:nvSpPr>
+          <p:cNvPr id="10243" name="Espaço Reservado para Conteúdo 2"/>
           <p:cNvSpPr>
             <a:spLocks noGrp="1"/>
           </p:cNvSpPr>
@@ -6828,12 +6715,506 @@
             <p:ph idx="1"/>
           </p:nvPr>
         </p:nvSpPr>
-        <p:spPr/>
+        <p:spPr>
+          <a:xfrm>
+            <a:off x="467544" y="1600200"/>
+            <a:ext cx="7200800" cy="4525963"/>
+          </a:xfrm>
+        </p:spPr>
         <p:txBody>
           <a:bodyPr/>
           <a:lstStyle/>
           <a:p>
-            <a:endParaRPr lang="pt-BR" smtClean="0"/>
+            <a:pPr>
+              <a:spcBef>
+                <a:spcPts val="3000"/>
+              </a:spcBef>
+              <a:tabLst>
+                <a:tab pos="539750" algn="l"/>
+                <a:tab pos="984250" algn="l"/>
+              </a:tabLst>
+            </a:pPr>
+            <a:r>
+              <a:rPr lang="pt-BR" sz="2400" u="sng" dirty="0" smtClean="0"/>
+              <a:t>Forma </a:t>
+            </a:r>
+            <a:r>
+              <a:rPr lang="pt-BR" sz="2400" u="sng" dirty="0" smtClean="0"/>
+              <a:t>2</a:t>
+            </a:r>
+            <a:endParaRPr lang="pt-BR" sz="2400" u="sng" dirty="0" smtClean="0"/>
+          </a:p>
+          <a:p>
+            <a:pPr marL="0" indent="0">
+              <a:spcBef>
+                <a:spcPts val="0"/>
+              </a:spcBef>
+              <a:buNone/>
+              <a:tabLst>
+                <a:tab pos="539750" algn="l"/>
+                <a:tab pos="984250" algn="l"/>
+              </a:tabLst>
+            </a:pPr>
+            <a:endParaRPr lang="pt-BR" sz="2000" dirty="0" smtClean="0"/>
+          </a:p>
+          <a:p>
+            <a:pPr marL="900113" indent="0">
+              <a:lnSpc>
+                <a:spcPct val="90000"/>
+              </a:lnSpc>
+              <a:spcBef>
+                <a:spcPts val="0"/>
+              </a:spcBef>
+              <a:buNone/>
+              <a:tabLst>
+                <a:tab pos="1344613" algn="l"/>
+                <a:tab pos="1787525" algn="l"/>
+              </a:tabLst>
+            </a:pPr>
+            <a:r>
+              <a:rPr lang="pt-BR" sz="2000" dirty="0" err="1" smtClean="0"/>
+              <a:t>public</a:t>
+            </a:r>
+            <a:r>
+              <a:rPr lang="pt-BR" sz="2000" dirty="0" smtClean="0"/>
+              <a:t> </a:t>
+            </a:r>
+            <a:r>
+              <a:rPr lang="pt-BR" sz="2000" dirty="0" err="1" smtClean="0"/>
+              <a:t>class</a:t>
+            </a:r>
+            <a:r>
+              <a:rPr lang="pt-BR" sz="2000" dirty="0" smtClean="0"/>
+              <a:t> </a:t>
+            </a:r>
+            <a:r>
+              <a:rPr lang="pt-BR" sz="2000" dirty="0" err="1" smtClean="0">
+                <a:solidFill>
+                  <a:srgbClr val="FFC000"/>
+                </a:solidFill>
+              </a:rPr>
+              <a:t>MinhaThread</a:t>
+            </a:r>
+            <a:r>
+              <a:rPr lang="pt-BR" sz="2000" dirty="0" smtClean="0"/>
+              <a:t> </a:t>
+            </a:r>
+            <a:r>
+              <a:rPr lang="pt-BR" sz="2000" dirty="0" err="1" smtClean="0"/>
+              <a:t>implements</a:t>
+            </a:r>
+            <a:r>
+              <a:rPr lang="pt-BR" sz="2000" dirty="0" smtClean="0"/>
+              <a:t> </a:t>
+            </a:r>
+            <a:r>
+              <a:rPr lang="pt-BR" sz="2000" dirty="0" err="1" smtClean="0">
+                <a:solidFill>
+                  <a:srgbClr val="FFC000"/>
+                </a:solidFill>
+              </a:rPr>
+              <a:t>Runnable</a:t>
+            </a:r>
+            <a:r>
+              <a:rPr lang="pt-BR" sz="2000" dirty="0" smtClean="0"/>
+              <a:t> </a:t>
+            </a:r>
+            <a:r>
+              <a:rPr lang="pt-BR" sz="2000" dirty="0" smtClean="0"/>
+              <a:t>{</a:t>
+            </a:r>
+          </a:p>
+          <a:p>
+            <a:pPr marL="900113" indent="0">
+              <a:lnSpc>
+                <a:spcPct val="90000"/>
+              </a:lnSpc>
+              <a:spcBef>
+                <a:spcPts val="0"/>
+              </a:spcBef>
+              <a:buNone/>
+              <a:tabLst>
+                <a:tab pos="1344613" algn="l"/>
+                <a:tab pos="1787525" algn="l"/>
+              </a:tabLst>
+            </a:pPr>
+            <a:r>
+              <a:rPr lang="pt-BR" sz="2000" dirty="0" smtClean="0"/>
+              <a:t>	</a:t>
+            </a:r>
+            <a:r>
+              <a:rPr lang="pt-BR" sz="2000" dirty="0" err="1" smtClean="0"/>
+              <a:t>public</a:t>
+            </a:r>
+            <a:r>
+              <a:rPr lang="pt-BR" sz="2000" dirty="0" smtClean="0"/>
+              <a:t> </a:t>
+            </a:r>
+            <a:r>
+              <a:rPr lang="pt-BR" sz="2000" dirty="0" err="1" smtClean="0"/>
+              <a:t>void</a:t>
+            </a:r>
+            <a:r>
+              <a:rPr lang="pt-BR" sz="2000" dirty="0" smtClean="0"/>
+              <a:t> </a:t>
+            </a:r>
+            <a:r>
+              <a:rPr lang="pt-BR" sz="2000" dirty="0" err="1" smtClean="0">
+                <a:solidFill>
+                  <a:srgbClr val="FFC000"/>
+                </a:solidFill>
+              </a:rPr>
+              <a:t>run</a:t>
+            </a:r>
+            <a:r>
+              <a:rPr lang="pt-BR" sz="2000" dirty="0" smtClean="0"/>
+              <a:t>() {</a:t>
+            </a:r>
+          </a:p>
+          <a:p>
+            <a:pPr marL="900113" indent="0">
+              <a:lnSpc>
+                <a:spcPct val="90000"/>
+              </a:lnSpc>
+              <a:spcBef>
+                <a:spcPts val="0"/>
+              </a:spcBef>
+              <a:buNone/>
+              <a:tabLst>
+                <a:tab pos="1344613" algn="l"/>
+                <a:tab pos="1787525" algn="l"/>
+              </a:tabLst>
+            </a:pPr>
+            <a:r>
+              <a:rPr lang="pt-BR" sz="2000" dirty="0" smtClean="0"/>
+              <a:t>		...</a:t>
+            </a:r>
+          </a:p>
+          <a:p>
+            <a:pPr marL="900113" indent="0">
+              <a:lnSpc>
+                <a:spcPct val="90000"/>
+              </a:lnSpc>
+              <a:spcBef>
+                <a:spcPts val="0"/>
+              </a:spcBef>
+              <a:buNone/>
+              <a:tabLst>
+                <a:tab pos="1344613" algn="l"/>
+                <a:tab pos="1787525" algn="l"/>
+              </a:tabLst>
+            </a:pPr>
+            <a:r>
+              <a:rPr lang="pt-BR" sz="2000" dirty="0" smtClean="0"/>
+              <a:t>		...</a:t>
+            </a:r>
+          </a:p>
+          <a:p>
+            <a:pPr marL="900113" indent="0">
+              <a:lnSpc>
+                <a:spcPct val="90000"/>
+              </a:lnSpc>
+              <a:spcBef>
+                <a:spcPts val="0"/>
+              </a:spcBef>
+              <a:buNone/>
+              <a:tabLst>
+                <a:tab pos="1344613" algn="l"/>
+                <a:tab pos="1787525" algn="l"/>
+              </a:tabLst>
+            </a:pPr>
+            <a:r>
+              <a:rPr lang="pt-BR" sz="2000" dirty="0" smtClean="0"/>
+              <a:t>	}</a:t>
+            </a:r>
+          </a:p>
+          <a:p>
+            <a:pPr marL="900113" indent="0">
+              <a:lnSpc>
+                <a:spcPct val="90000"/>
+              </a:lnSpc>
+              <a:spcBef>
+                <a:spcPts val="0"/>
+              </a:spcBef>
+              <a:buNone/>
+              <a:tabLst>
+                <a:tab pos="1344613" algn="l"/>
+                <a:tab pos="1787525" algn="l"/>
+              </a:tabLst>
+            </a:pPr>
+            <a:r>
+              <a:rPr lang="pt-BR" sz="2000" dirty="0" smtClean="0"/>
+              <a:t>}</a:t>
+            </a:r>
+          </a:p>
+          <a:p>
+            <a:pPr marL="900113" indent="0">
+              <a:lnSpc>
+                <a:spcPct val="90000"/>
+              </a:lnSpc>
+              <a:spcBef>
+                <a:spcPts val="0"/>
+              </a:spcBef>
+              <a:buNone/>
+              <a:tabLst>
+                <a:tab pos="1344613" algn="l"/>
+                <a:tab pos="1787525" algn="l"/>
+              </a:tabLst>
+            </a:pPr>
+            <a:endParaRPr lang="pt-BR" sz="2000" dirty="0" smtClean="0"/>
+          </a:p>
+          <a:p>
+            <a:pPr marL="900113" indent="0">
+              <a:lnSpc>
+                <a:spcPct val="90000"/>
+              </a:lnSpc>
+              <a:spcBef>
+                <a:spcPts val="0"/>
+              </a:spcBef>
+              <a:buNone/>
+              <a:tabLst>
+                <a:tab pos="1344613" algn="l"/>
+                <a:tab pos="1787525" algn="l"/>
+              </a:tabLst>
+            </a:pPr>
+            <a:r>
+              <a:rPr lang="pt-BR" sz="2000" dirty="0" err="1" smtClean="0"/>
+              <a:t>public</a:t>
+            </a:r>
+            <a:r>
+              <a:rPr lang="pt-BR" sz="2000" dirty="0" smtClean="0"/>
+              <a:t> </a:t>
+            </a:r>
+            <a:r>
+              <a:rPr lang="pt-BR" sz="2000" dirty="0" err="1" smtClean="0"/>
+              <a:t>class</a:t>
+            </a:r>
+            <a:r>
+              <a:rPr lang="pt-BR" sz="2000" dirty="0" smtClean="0"/>
+              <a:t> Principal {</a:t>
+            </a:r>
+          </a:p>
+          <a:p>
+            <a:pPr marL="900113" indent="0">
+              <a:lnSpc>
+                <a:spcPct val="90000"/>
+              </a:lnSpc>
+              <a:spcBef>
+                <a:spcPts val="0"/>
+              </a:spcBef>
+              <a:buNone/>
+              <a:tabLst>
+                <a:tab pos="1344613" algn="l"/>
+                <a:tab pos="1787525" algn="l"/>
+              </a:tabLst>
+            </a:pPr>
+            <a:r>
+              <a:rPr lang="pt-BR" sz="2000" dirty="0" smtClean="0"/>
+              <a:t>	</a:t>
+            </a:r>
+            <a:r>
+              <a:rPr lang="pt-BR" sz="2000" dirty="0" err="1" smtClean="0"/>
+              <a:t>public</a:t>
+            </a:r>
+            <a:r>
+              <a:rPr lang="pt-BR" sz="2000" dirty="0" smtClean="0"/>
+              <a:t> </a:t>
+            </a:r>
+            <a:r>
+              <a:rPr lang="pt-BR" sz="2000" dirty="0" err="1" smtClean="0"/>
+              <a:t>static</a:t>
+            </a:r>
+            <a:r>
+              <a:rPr lang="pt-BR" sz="2000" dirty="0" smtClean="0"/>
+              <a:t> </a:t>
+            </a:r>
+            <a:r>
+              <a:rPr lang="pt-BR" sz="2000" dirty="0" err="1" smtClean="0"/>
+              <a:t>void</a:t>
+            </a:r>
+            <a:r>
+              <a:rPr lang="pt-BR" sz="2000" dirty="0" smtClean="0"/>
+              <a:t> </a:t>
+            </a:r>
+            <a:r>
+              <a:rPr lang="pt-BR" sz="2000" dirty="0" err="1" smtClean="0">
+                <a:solidFill>
+                  <a:srgbClr val="FFC000"/>
+                </a:solidFill>
+              </a:rPr>
+              <a:t>main</a:t>
+            </a:r>
+            <a:r>
+              <a:rPr lang="pt-BR" sz="2000" dirty="0" smtClean="0"/>
+              <a:t>(String[] </a:t>
+            </a:r>
+            <a:r>
+              <a:rPr lang="pt-BR" sz="2000" dirty="0" err="1" smtClean="0"/>
+              <a:t>args</a:t>
+            </a:r>
+            <a:r>
+              <a:rPr lang="pt-BR" sz="2000" dirty="0" smtClean="0"/>
+              <a:t>) {</a:t>
+            </a:r>
+          </a:p>
+          <a:p>
+            <a:pPr marL="900113" indent="0">
+              <a:lnSpc>
+                <a:spcPct val="90000"/>
+              </a:lnSpc>
+              <a:spcBef>
+                <a:spcPts val="0"/>
+              </a:spcBef>
+              <a:buNone/>
+              <a:tabLst>
+                <a:tab pos="1344613" algn="l"/>
+                <a:tab pos="1787525" algn="l"/>
+              </a:tabLst>
+            </a:pPr>
+            <a:r>
+              <a:rPr lang="pt-BR" sz="2000" dirty="0" smtClean="0"/>
+              <a:t>		Thread t = </a:t>
+            </a:r>
+            <a:r>
+              <a:rPr lang="pt-BR" sz="2000" dirty="0" err="1" smtClean="0"/>
+              <a:t>new</a:t>
+            </a:r>
+            <a:r>
+              <a:rPr lang="pt-BR" sz="2000" dirty="0" smtClean="0"/>
+              <a:t> Thread(</a:t>
+            </a:r>
+            <a:r>
+              <a:rPr lang="pt-BR" sz="2000" dirty="0" err="1" smtClean="0"/>
+              <a:t>new</a:t>
+            </a:r>
+            <a:r>
+              <a:rPr lang="pt-BR" sz="2000" dirty="0" smtClean="0"/>
+              <a:t> </a:t>
+            </a:r>
+            <a:r>
+              <a:rPr lang="pt-BR" sz="2000" dirty="0" err="1" smtClean="0">
+                <a:solidFill>
+                  <a:srgbClr val="FFC000"/>
+                </a:solidFill>
+              </a:rPr>
+              <a:t>MinhaThread</a:t>
+            </a:r>
+            <a:r>
+              <a:rPr lang="pt-BR" sz="2000" dirty="0" smtClean="0"/>
+              <a:t>());</a:t>
+            </a:r>
+            <a:endParaRPr lang="pt-BR" sz="2000" dirty="0" smtClean="0"/>
+          </a:p>
+          <a:p>
+            <a:pPr marL="900113" indent="0">
+              <a:lnSpc>
+                <a:spcPct val="90000"/>
+              </a:lnSpc>
+              <a:spcBef>
+                <a:spcPts val="0"/>
+              </a:spcBef>
+              <a:buNone/>
+              <a:tabLst>
+                <a:tab pos="1344613" algn="l"/>
+                <a:tab pos="1787525" algn="l"/>
+              </a:tabLst>
+            </a:pPr>
+            <a:r>
+              <a:rPr lang="pt-BR" sz="2000" dirty="0" smtClean="0"/>
+              <a:t>		</a:t>
+            </a:r>
+            <a:r>
+              <a:rPr lang="pt-BR" sz="2000" dirty="0" err="1" smtClean="0"/>
+              <a:t>t.</a:t>
+            </a:r>
+            <a:r>
+              <a:rPr lang="pt-BR" sz="2000" dirty="0" err="1" smtClean="0">
+                <a:solidFill>
+                  <a:srgbClr val="FFC000"/>
+                </a:solidFill>
+              </a:rPr>
+              <a:t>start</a:t>
+            </a:r>
+            <a:r>
+              <a:rPr lang="pt-BR" sz="2000" dirty="0" smtClean="0"/>
+              <a:t>();</a:t>
+            </a:r>
+          </a:p>
+          <a:p>
+            <a:pPr marL="900113" indent="0">
+              <a:lnSpc>
+                <a:spcPct val="90000"/>
+              </a:lnSpc>
+              <a:spcBef>
+                <a:spcPts val="0"/>
+              </a:spcBef>
+              <a:buNone/>
+              <a:tabLst>
+                <a:tab pos="1344613" algn="l"/>
+                <a:tab pos="1787525" algn="l"/>
+              </a:tabLst>
+            </a:pPr>
+            <a:r>
+              <a:rPr lang="pt-BR" sz="2000" dirty="0" smtClean="0"/>
+              <a:t>		...</a:t>
+            </a:r>
+          </a:p>
+          <a:p>
+            <a:pPr marL="900113" indent="0">
+              <a:lnSpc>
+                <a:spcPct val="90000"/>
+              </a:lnSpc>
+              <a:spcBef>
+                <a:spcPts val="0"/>
+              </a:spcBef>
+              <a:buNone/>
+              <a:tabLst>
+                <a:tab pos="1344613" algn="l"/>
+                <a:tab pos="1787525" algn="l"/>
+              </a:tabLst>
+            </a:pPr>
+            <a:r>
+              <a:rPr lang="pt-BR" sz="2000" dirty="0" smtClean="0"/>
+              <a:t>		...</a:t>
+            </a:r>
+          </a:p>
+          <a:p>
+            <a:pPr marL="900113" indent="0">
+              <a:lnSpc>
+                <a:spcPct val="90000"/>
+              </a:lnSpc>
+              <a:spcBef>
+                <a:spcPts val="0"/>
+              </a:spcBef>
+              <a:buNone/>
+              <a:tabLst>
+                <a:tab pos="1344613" algn="l"/>
+                <a:tab pos="1787525" algn="l"/>
+              </a:tabLst>
+            </a:pPr>
+            <a:r>
+              <a:rPr lang="pt-BR" sz="2000" dirty="0" smtClean="0"/>
+              <a:t>	}</a:t>
+            </a:r>
+          </a:p>
+          <a:p>
+            <a:pPr marL="900113" indent="0">
+              <a:lnSpc>
+                <a:spcPct val="90000"/>
+              </a:lnSpc>
+              <a:spcBef>
+                <a:spcPts val="0"/>
+              </a:spcBef>
+              <a:buNone/>
+              <a:tabLst>
+                <a:tab pos="1344613" algn="l"/>
+                <a:tab pos="1787525" algn="l"/>
+              </a:tabLst>
+            </a:pPr>
+            <a:r>
+              <a:rPr lang="pt-BR" sz="2000" dirty="0" smtClean="0"/>
+              <a:t>}</a:t>
+            </a:r>
           </a:p>
         </p:txBody>
       </p:sp>
@@ -6900,7 +7281,7 @@
       </p:grpSpPr>
       <p:sp>
         <p:nvSpPr>
-          <p:cNvPr id="12290" name="Título 1"/>
+          <p:cNvPr id="13314" name="Título 1"/>
           <p:cNvSpPr>
             <a:spLocks noGrp="1"/>
           </p:cNvSpPr>
@@ -6916,35 +7297,14 @@
             <a:pPr eaLnBrk="1" hangingPunct="1"/>
             <a:r>
               <a:rPr lang="pt-BR" dirty="0" smtClean="0"/>
-              <a:t>A interface </a:t>
-            </a:r>
-            <a:r>
-              <a:rPr lang="pt-BR" dirty="0" err="1" smtClean="0"/>
-              <a:t>java</a:t>
-            </a:r>
-            <a:r>
-              <a:rPr lang="pt-BR" dirty="0" smtClean="0"/>
-              <a:t>.</a:t>
-            </a:r>
-            <a:r>
-              <a:rPr lang="pt-BR" dirty="0" err="1" smtClean="0"/>
-              <a:t>lang</a:t>
-            </a:r>
-            <a:r>
-              <a:rPr lang="pt-BR" dirty="0" smtClean="0"/>
-              <a:t>.</a:t>
-            </a:r>
-            <a:r>
-              <a:rPr lang="pt-BR" dirty="0" err="1" smtClean="0"/>
-              <a:t>Runnable</a:t>
-            </a:r>
-            <a:endParaRPr lang="pt-BR" dirty="0" smtClean="0"/>
-          </a:p>
-        </p:txBody>
-      </p:sp>
-      <p:sp>
-        <p:nvSpPr>
-          <p:cNvPr id="12291" name="Espaço Reservado para Conteúdo 2"/>
+              <a:t>Construtores</a:t>
+            </a:r>
+          </a:p>
+        </p:txBody>
+      </p:sp>
+      <p:sp>
+        <p:nvSpPr>
+          <p:cNvPr id="13315" name="Espaço Reservado para Conteúdo 2"/>
           <p:cNvSpPr>
             <a:spLocks noGrp="1"/>
           </p:cNvSpPr>
@@ -6957,7 +7317,7 @@
           <a:bodyPr/>
           <a:lstStyle/>
           <a:p>
-            <a:endParaRPr lang="pt-BR" smtClean="0"/>
+            <a:endParaRPr lang="pt-BR" dirty="0" smtClean="0"/>
           </a:p>
         </p:txBody>
       </p:sp>
@@ -7024,7 +7384,7 @@
       </p:grpSpPr>
       <p:sp>
         <p:nvSpPr>
-          <p:cNvPr id="13314" name="Título 1"/>
+          <p:cNvPr id="14338" name="Título 1"/>
           <p:cNvSpPr>
             <a:spLocks noGrp="1"/>
           </p:cNvSpPr>
@@ -7040,14 +7400,14 @@
             <a:pPr eaLnBrk="1" hangingPunct="1"/>
             <a:r>
               <a:rPr lang="pt-BR" dirty="0" smtClean="0"/>
-              <a:t>Construtores</a:t>
-            </a:r>
-          </a:p>
-        </p:txBody>
-      </p:sp>
-      <p:sp>
-        <p:nvSpPr>
-          <p:cNvPr id="13315" name="Espaço Reservado para Conteúdo 2"/>
+              <a:t>Estados da thread</a:t>
+            </a:r>
+          </a:p>
+        </p:txBody>
+      </p:sp>
+      <p:sp>
+        <p:nvSpPr>
+          <p:cNvPr id="14339" name="Espaço Reservado para Conteúdo 2"/>
           <p:cNvSpPr>
             <a:spLocks noGrp="1"/>
           </p:cNvSpPr>
@@ -7060,7 +7420,41 @@
           <a:bodyPr/>
           <a:lstStyle/>
           <a:p>
-            <a:endParaRPr lang="pt-BR" smtClean="0"/>
+            <a:r>
+              <a:rPr lang="pt-BR" dirty="0" smtClean="0"/>
+              <a:t>Executando</a:t>
+            </a:r>
+          </a:p>
+          <a:p>
+            <a:r>
+              <a:rPr lang="pt-BR" dirty="0" smtClean="0"/>
+              <a:t>Pronta para ser executada</a:t>
+            </a:r>
+          </a:p>
+          <a:p>
+            <a:r>
+              <a:rPr lang="pt-BR" dirty="0" smtClean="0"/>
+              <a:t>Suspensa</a:t>
+            </a:r>
+          </a:p>
+          <a:p>
+            <a:r>
+              <a:rPr lang="pt-BR" dirty="0" smtClean="0"/>
+              <a:t>Dormindo</a:t>
+            </a:r>
+          </a:p>
+          <a:p>
+            <a:r>
+              <a:rPr lang="pt-BR" dirty="0" smtClean="0"/>
+              <a:t>Bloqueada</a:t>
+            </a:r>
+          </a:p>
+          <a:p>
+            <a:r>
+              <a:rPr lang="pt-BR" smtClean="0"/>
+              <a:t>Morta</a:t>
+            </a:r>
+            <a:endParaRPr lang="pt-BR" dirty="0" smtClean="0"/>
           </a:p>
         </p:txBody>
       </p:sp>
@@ -7127,7 +7521,7 @@
       </p:grpSpPr>
       <p:sp>
         <p:nvSpPr>
-          <p:cNvPr id="14338" name="Título 1"/>
+          <p:cNvPr id="15362" name="Título 1"/>
           <p:cNvSpPr>
             <a:spLocks noGrp="1"/>
           </p:cNvSpPr>
@@ -7143,14 +7537,23 @@
             <a:pPr eaLnBrk="1" hangingPunct="1"/>
             <a:r>
               <a:rPr lang="pt-BR" dirty="0" smtClean="0"/>
-              <a:t>Estados da thread</a:t>
-            </a:r>
-          </a:p>
-        </p:txBody>
-      </p:sp>
-      <p:sp>
-        <p:nvSpPr>
-          <p:cNvPr id="14339" name="Espaço Reservado para Conteúdo 2"/>
+              <a:t>O</a:t>
+            </a:r>
+            <a:r>
+              <a:rPr lang="pt-BR" baseline="0" dirty="0" smtClean="0"/>
+              <a:t> </a:t>
+            </a:r>
+            <a:r>
+              <a:rPr lang="pt-BR" dirty="0" err="1" smtClean="0"/>
+              <a:t>Scheduler</a:t>
+            </a:r>
+            <a:endParaRPr lang="pt-BR" dirty="0" smtClean="0"/>
+          </a:p>
+        </p:txBody>
+      </p:sp>
+      <p:sp>
+        <p:nvSpPr>
+          <p:cNvPr id="15363" name="Espaço Reservado para Conteúdo 2"/>
           <p:cNvSpPr>
             <a:spLocks noGrp="1"/>
           </p:cNvSpPr>
@@ -7201,13 +7604,6 @@
   <p:clrMapOvr>
     <a:masterClrMapping/>
   </p:clrMapOvr>
-  <p:timing>
-    <p:tnLst>
-      <p:par>
-        <p:cTn id="1" dur="indefinite" restart="never" nodeType="tmRoot"/>
-      </p:par>
-    </p:tnLst>
-  </p:timing>
 </p:sld>
 </file>
 
@@ -7230,7 +7626,7 @@
       </p:grpSpPr>
       <p:sp>
         <p:nvSpPr>
-          <p:cNvPr id="15362" name="Título 1"/>
+          <p:cNvPr id="16386" name="Título 1"/>
           <p:cNvSpPr>
             <a:spLocks noGrp="1"/>
           </p:cNvSpPr>
@@ -7246,23 +7642,14 @@
             <a:pPr eaLnBrk="1" hangingPunct="1"/>
             <a:r>
               <a:rPr lang="pt-BR" dirty="0" smtClean="0"/>
-              <a:t>O</a:t>
-            </a:r>
-            <a:r>
-              <a:rPr lang="pt-BR" baseline="0" dirty="0" smtClean="0"/>
-              <a:t> </a:t>
-            </a:r>
-            <a:r>
-              <a:rPr lang="pt-BR" dirty="0" err="1" smtClean="0"/>
-              <a:t>Scheduler</a:t>
-            </a:r>
-            <a:endParaRPr lang="pt-BR" dirty="0" smtClean="0"/>
-          </a:p>
-        </p:txBody>
-      </p:sp>
-      <p:sp>
-        <p:nvSpPr>
-          <p:cNvPr id="15363" name="Espaço Reservado para Conteúdo 2"/>
+              <a:t>Prioridades das threads</a:t>
+            </a:r>
+          </a:p>
+        </p:txBody>
+      </p:sp>
+      <p:sp>
+        <p:nvSpPr>
+          <p:cNvPr id="16387" name="Espaço Reservado para Conteúdo 2"/>
           <p:cNvSpPr>
             <a:spLocks noGrp="1"/>
           </p:cNvSpPr>
@@ -7335,7 +7722,7 @@
       </p:grpSpPr>
       <p:sp>
         <p:nvSpPr>
-          <p:cNvPr id="16386" name="Título 1"/>
+          <p:cNvPr id="2" name="Título 1"/>
           <p:cNvSpPr>
             <a:spLocks noGrp="1"/>
           </p:cNvSpPr>
@@ -7348,17 +7735,21 @@
           <a:bodyPr/>
           <a:lstStyle/>
           <a:p>
-            <a:pPr eaLnBrk="1" hangingPunct="1"/>
             <a:r>
               <a:rPr lang="pt-BR" dirty="0" smtClean="0"/>
-              <a:t>Prioridades das threads</a:t>
-            </a:r>
-          </a:p>
-        </p:txBody>
-      </p:sp>
-      <p:sp>
-        <p:nvSpPr>
-          <p:cNvPr id="16387" name="Espaço Reservado para Conteúdo 2"/>
+              <a:t>Estados</a:t>
+            </a:r>
+            <a:r>
+              <a:rPr lang="pt-BR" baseline="0" dirty="0" smtClean="0"/>
+              <a:t> de uma thread</a:t>
+            </a:r>
+            <a:endParaRPr lang="pt-BR" dirty="0"/>
+          </a:p>
+        </p:txBody>
+      </p:sp>
+      <p:sp>
+        <p:nvSpPr>
+          <p:cNvPr id="3" name="Espaço Reservado para Conteúdo 2"/>
           <p:cNvSpPr>
             <a:spLocks noGrp="1"/>
           </p:cNvSpPr>
@@ -7371,7 +7762,7 @@
           <a:bodyPr/>
           <a:lstStyle/>
           <a:p>
-            <a:endParaRPr lang="pt-BR" smtClean="0"/>
+            <a:endParaRPr lang="pt-BR"/>
           </a:p>
         </p:txBody>
       </p:sp>
@@ -7431,7 +7822,7 @@
       </p:grpSpPr>
       <p:sp>
         <p:nvSpPr>
-          <p:cNvPr id="2" name="Título 1"/>
+          <p:cNvPr id="21506" name="Título 1"/>
           <p:cNvSpPr>
             <a:spLocks noGrp="1"/>
           </p:cNvSpPr>
@@ -7444,21 +7835,17 @@
           <a:bodyPr/>
           <a:lstStyle/>
           <a:p>
+            <a:pPr eaLnBrk="1" hangingPunct="1"/>
             <a:r>
               <a:rPr lang="pt-BR" dirty="0" smtClean="0"/>
-              <a:t>Estados</a:t>
-            </a:r>
-            <a:r>
-              <a:rPr lang="pt-BR" baseline="0" dirty="0" smtClean="0"/>
-              <a:t> de uma thread</a:t>
-            </a:r>
-            <a:endParaRPr lang="pt-BR" dirty="0"/>
-          </a:p>
-        </p:txBody>
-      </p:sp>
-      <p:sp>
-        <p:nvSpPr>
-          <p:cNvPr id="3" name="Espaço Reservado para Conteúdo 2"/>
+              <a:t>Sincronização</a:t>
+            </a:r>
+          </a:p>
+        </p:txBody>
+      </p:sp>
+      <p:sp>
+        <p:nvSpPr>
+          <p:cNvPr id="21507" name="Espaço Reservado para Conteúdo 2"/>
           <p:cNvSpPr>
             <a:spLocks noGrp="1"/>
           </p:cNvSpPr>
@@ -7471,7 +7858,7 @@
           <a:bodyPr/>
           <a:lstStyle/>
           <a:p>
-            <a:endParaRPr lang="pt-BR"/>
+            <a:endParaRPr lang="pt-BR" smtClean="0"/>
           </a:p>
         </p:txBody>
       </p:sp>
@@ -7531,7 +7918,7 @@
       </p:grpSpPr>
       <p:sp>
         <p:nvSpPr>
-          <p:cNvPr id="21506" name="Título 1"/>
+          <p:cNvPr id="25602" name="Título 1"/>
           <p:cNvSpPr>
             <a:spLocks noGrp="1"/>
           </p:cNvSpPr>
@@ -7547,14 +7934,14 @@
             <a:pPr eaLnBrk="1" hangingPunct="1"/>
             <a:r>
               <a:rPr lang="pt-BR" dirty="0" smtClean="0"/>
-              <a:t>Sincronização</a:t>
-            </a:r>
-          </a:p>
-        </p:txBody>
-      </p:sp>
-      <p:sp>
-        <p:nvSpPr>
-          <p:cNvPr id="21507" name="Espaço Reservado para Conteúdo 2"/>
+              <a:t>Bloqueios</a:t>
+            </a:r>
+          </a:p>
+        </p:txBody>
+      </p:sp>
+      <p:sp>
+        <p:nvSpPr>
+          <p:cNvPr id="25603" name="Espaço Reservado para Conteúdo 2"/>
           <p:cNvSpPr>
             <a:spLocks noGrp="1"/>
           </p:cNvSpPr>
@@ -7627,7 +8014,7 @@
       </p:grpSpPr>
       <p:sp>
         <p:nvSpPr>
-          <p:cNvPr id="25602" name="Título 1"/>
+          <p:cNvPr id="26626" name="Título 1"/>
           <p:cNvSpPr>
             <a:spLocks noGrp="1"/>
           </p:cNvSpPr>
@@ -7642,15 +8029,16 @@
           <a:p>
             <a:pPr eaLnBrk="1" hangingPunct="1"/>
             <a:r>
-              <a:rPr lang="pt-BR" dirty="0" smtClean="0"/>
-              <a:t>Bloqueios</a:t>
-            </a:r>
-          </a:p>
-        </p:txBody>
-      </p:sp>
-      <p:sp>
-        <p:nvSpPr>
-          <p:cNvPr id="25603" name="Espaço Reservado para Conteúdo 2"/>
+              <a:rPr lang="pt-BR" dirty="0" err="1" smtClean="0"/>
+              <a:t>Deadlock</a:t>
+            </a:r>
+            <a:endParaRPr lang="pt-BR" dirty="0" smtClean="0"/>
+          </a:p>
+        </p:txBody>
+      </p:sp>
+      <p:sp>
+        <p:nvSpPr>
+          <p:cNvPr id="26627" name="Espaço Reservado para Conteúdo 2"/>
           <p:cNvSpPr>
             <a:spLocks noGrp="1"/>
           </p:cNvSpPr>
@@ -7723,7 +8111,7 @@
       </p:grpSpPr>
       <p:sp>
         <p:nvSpPr>
-          <p:cNvPr id="26626" name="Título 1"/>
+          <p:cNvPr id="27650" name="Título 1"/>
           <p:cNvSpPr>
             <a:spLocks noGrp="1"/>
           </p:cNvSpPr>
@@ -7738,16 +8126,15 @@
           <a:p>
             <a:pPr eaLnBrk="1" hangingPunct="1"/>
             <a:r>
-              <a:rPr lang="pt-BR" dirty="0" err="1" smtClean="0"/>
-              <a:t>Deadlock</a:t>
-            </a:r>
-            <a:endParaRPr lang="pt-BR" dirty="0" smtClean="0"/>
-          </a:p>
-        </p:txBody>
-      </p:sp>
-      <p:sp>
-        <p:nvSpPr>
-          <p:cNvPr id="26627" name="Espaço Reservado para Conteúdo 2"/>
+              <a:rPr lang="pt-BR" dirty="0" smtClean="0"/>
+              <a:t>Interação entre threads</a:t>
+            </a:r>
+          </a:p>
+        </p:txBody>
+      </p:sp>
+      <p:sp>
+        <p:nvSpPr>
+          <p:cNvPr id="27651" name="Espaço Reservado para Conteúdo 2"/>
           <p:cNvSpPr>
             <a:spLocks noGrp="1"/>
           </p:cNvSpPr>
@@ -8023,102 +8410,6 @@
       </p:par>
     </p:tnLst>
   </p:timing>
-</p:sld>
-</file>
-
-<file path=ppt/slides/slide20.xml><?xml version="1.0" encoding="utf-8"?>
-<p:sld xmlns:a="http://schemas.openxmlformats.org/drawingml/2006/main" xmlns:r="http://schemas.openxmlformats.org/officeDocument/2006/relationships" xmlns:p="http://schemas.openxmlformats.org/presentationml/2006/main">
-  <p:cSld>
-    <p:spTree>
-      <p:nvGrpSpPr>
-        <p:cNvPr id="1" name=""/>
-        <p:cNvGrpSpPr/>
-        <p:nvPr/>
-      </p:nvGrpSpPr>
-      <p:grpSpPr>
-        <a:xfrm>
-          <a:off x="0" y="0"/>
-          <a:ext cx="0" cy="0"/>
-          <a:chOff x="0" y="0"/>
-          <a:chExt cx="0" cy="0"/>
-        </a:xfrm>
-      </p:grpSpPr>
-      <p:sp>
-        <p:nvSpPr>
-          <p:cNvPr id="27650" name="Título 1"/>
-          <p:cNvSpPr>
-            <a:spLocks noGrp="1"/>
-          </p:cNvSpPr>
-          <p:nvPr>
-            <p:ph type="title"/>
-          </p:nvPr>
-        </p:nvSpPr>
-        <p:spPr/>
-        <p:txBody>
-          <a:bodyPr/>
-          <a:lstStyle/>
-          <a:p>
-            <a:pPr eaLnBrk="1" hangingPunct="1"/>
-            <a:r>
-              <a:rPr lang="pt-BR" dirty="0" smtClean="0"/>
-              <a:t>Interação entre threads</a:t>
-            </a:r>
-          </a:p>
-        </p:txBody>
-      </p:sp>
-      <p:sp>
-        <p:nvSpPr>
-          <p:cNvPr id="27651" name="Espaço Reservado para Conteúdo 2"/>
-          <p:cNvSpPr>
-            <a:spLocks noGrp="1"/>
-          </p:cNvSpPr>
-          <p:nvPr>
-            <p:ph idx="1"/>
-          </p:nvPr>
-        </p:nvSpPr>
-        <p:spPr/>
-        <p:txBody>
-          <a:bodyPr/>
-          <a:lstStyle/>
-          <a:p>
-            <a:endParaRPr lang="pt-BR" smtClean="0"/>
-          </a:p>
-        </p:txBody>
-      </p:sp>
-      <p:sp>
-        <p:nvSpPr>
-          <p:cNvPr id="4" name="Espaço Reservado para Número de Slide 3"/>
-          <p:cNvSpPr>
-            <a:spLocks noGrp="1"/>
-          </p:cNvSpPr>
-          <p:nvPr>
-            <p:ph type="sldNum" sz="quarter" idx="12"/>
-          </p:nvPr>
-        </p:nvSpPr>
-        <p:spPr/>
-        <p:txBody>
-          <a:bodyPr/>
-          <a:lstStyle/>
-          <a:p>
-            <a:pPr>
-              <a:defRPr/>
-            </a:pPr>
-            <a:fld id="{A3E49AD4-F76A-4E25-A0A5-9CD64D5A0A0D}" type="slidenum">
-              <a:rPr lang="pt-BR" smtClean="0"/>
-              <a:pPr>
-                <a:defRPr/>
-              </a:pPr>
-              <a:t>20</a:t>
-            </a:fld>
-            <a:endParaRPr lang="pt-BR"/>
-          </a:p>
-        </p:txBody>
-      </p:sp>
-    </p:spTree>
-  </p:cSld>
-  <p:clrMapOvr>
-    <a:masterClrMapping/>
-  </p:clrMapOvr>
 </p:sld>
 </file>
 
@@ -11478,11 +11769,7 @@
             </a:pPr>
             <a:r>
               <a:rPr lang="pt-BR" sz="2400" dirty="0" smtClean="0"/>
-              <a:t>Uma </a:t>
-            </a:r>
-            <a:r>
-              <a:rPr lang="pt-BR" sz="2400" dirty="0" smtClean="0"/>
-              <a:t>das formas mais simples de criar e executar uma nova thread é através da classe </a:t>
+              <a:t>Uma das formas mais simples de criar e executar uma nova thread é através da classe </a:t>
             </a:r>
             <a:r>
               <a:rPr lang="pt-BR" sz="2400" b="1" i="1" dirty="0" err="1" smtClean="0">
@@ -12305,15 +12592,7 @@
             </a:pPr>
             <a:r>
               <a:rPr lang="pt-BR" sz="2400" dirty="0" smtClean="0"/>
-              <a:t>Uma outra forma de </a:t>
-            </a:r>
-            <a:r>
-              <a:rPr lang="pt-BR" sz="2400" dirty="0" smtClean="0"/>
-              <a:t>criar e executar uma nova thread é através da </a:t>
-            </a:r>
-            <a:r>
-              <a:rPr lang="pt-BR" sz="2400" dirty="0" smtClean="0"/>
-              <a:t>interface </a:t>
+              <a:t>Uma outra forma de criar e executar uma nova thread é através da interface </a:t>
             </a:r>
             <a:r>
               <a:rPr lang="pt-BR" sz="2400" b="1" i="1" dirty="0" err="1" smtClean="0">
@@ -12359,7 +12638,6 @@
               <a:rPr lang="pt-BR" sz="2400" dirty="0" smtClean="0"/>
               <a:t>:</a:t>
             </a:r>
-            <a:endParaRPr lang="pt-BR" sz="2400" dirty="0" smtClean="0"/>
           </a:p>
           <a:p>
             <a:pPr marL="854075" lvl="1" indent="-514350">
@@ -12371,11 +12649,7 @@
             </a:pPr>
             <a:r>
               <a:rPr lang="pt-BR" sz="2000" dirty="0" smtClean="0"/>
-              <a:t>Crie uma nova classe </a:t>
-            </a:r>
-            <a:r>
-              <a:rPr lang="pt-BR" sz="2000" dirty="0" smtClean="0"/>
-              <a:t>que implementa a interface </a:t>
+              <a:t>Crie uma nova classe que implementa a interface </a:t>
             </a:r>
             <a:r>
               <a:rPr lang="pt-BR" sz="2000" b="1" i="1" dirty="0" err="1" smtClean="0"/>
@@ -12399,19 +12673,11 @@
             </a:r>
             <a:r>
               <a:rPr lang="pt-BR" sz="2000" dirty="0" smtClean="0"/>
-              <a:t> </a:t>
+              <a:t> e </a:t>
             </a:r>
             <a:r>
               <a:rPr lang="pt-BR" sz="2000" dirty="0" smtClean="0"/>
-              <a:t>e </a:t>
-            </a:r>
-            <a:r>
-              <a:rPr lang="pt-BR" sz="2000" dirty="0" err="1" smtClean="0"/>
-              <a:t>implement</a:t>
-            </a:r>
-            <a:r>
-              <a:rPr lang="pt-BR" sz="2000" dirty="0" smtClean="0"/>
-              <a:t> </a:t>
+              <a:t>implemente </a:t>
             </a:r>
             <a:r>
               <a:rPr lang="pt-BR" sz="2000" dirty="0" smtClean="0"/>
@@ -12449,19 +12715,51 @@
             </a:pPr>
             <a:r>
               <a:rPr lang="pt-BR" sz="2000" dirty="0" smtClean="0"/>
-              <a:t>A partir de sua aplicação principal crie uma </a:t>
+              <a:t>A partir de sua aplicação principal crie uma instância da classe </a:t>
+            </a:r>
+            <a:r>
+              <a:rPr lang="pt-BR" sz="2000" dirty="0" err="1" smtClean="0"/>
+              <a:t>java</a:t>
             </a:r>
             <a:r>
               <a:rPr lang="pt-BR" sz="2000" dirty="0" smtClean="0"/>
-              <a:t>instância da classe Thread passando uma instância de sua classe ao </a:t>
-            </a:r>
-            <a:r>
-              <a:rPr lang="pt-BR" sz="2000" smtClean="0"/>
-              <a:t>método construtor desta </a:t>
+              <a:t>.</a:t>
+            </a:r>
+            <a:r>
+              <a:rPr lang="pt-BR" sz="2000" dirty="0" err="1" smtClean="0"/>
+              <a:t>lang</a:t>
             </a:r>
             <a:r>
               <a:rPr lang="pt-BR" sz="2000" dirty="0" smtClean="0"/>
-              <a:t>classe thread e execute o seu método </a:t>
+              <a:t>.Thread </a:t>
+            </a:r>
+            <a:r>
+              <a:rPr lang="pt-BR" sz="2000" dirty="0" smtClean="0"/>
+              <a:t>passando </a:t>
+            </a:r>
+            <a:r>
+              <a:rPr lang="pt-BR" sz="2000" dirty="0" smtClean="0"/>
+              <a:t>em seu método construtor uma </a:t>
+            </a:r>
+            <a:r>
+              <a:rPr lang="pt-BR" sz="2000" dirty="0" smtClean="0"/>
+              <a:t>instância de sua </a:t>
+            </a:r>
+            <a:r>
+              <a:rPr lang="pt-BR" sz="2000" dirty="0" smtClean="0"/>
+              <a:t>classe de sua </a:t>
+            </a:r>
+            <a:r>
+              <a:rPr lang="pt-BR" sz="2000" dirty="0" smtClean="0"/>
+              <a:t>classe thread </a:t>
+            </a:r>
+            <a:r>
+              <a:rPr lang="pt-BR" sz="2000" dirty="0" smtClean="0"/>
+              <a:t>e então </a:t>
+            </a:r>
+            <a:r>
+              <a:rPr lang="pt-BR" sz="2000" dirty="0" smtClean="0"/>
+              <a:t>execute o seu método </a:t>
             </a:r>
             <a:r>
               <a:rPr lang="pt-BR" sz="2000" b="1" i="1" dirty="0" smtClean="0">
@@ -12469,8 +12767,29 @@
                   <a:srgbClr val="FFC000"/>
                 </a:solidFill>
               </a:rPr>
-              <a:t>start()</a:t>
-            </a:r>
+              <a:t>start</a:t>
+            </a:r>
+            <a:r>
+              <a:rPr lang="pt-BR" sz="2000" b="1" i="1" dirty="0" smtClean="0">
+                <a:solidFill>
+                  <a:srgbClr val="FFC000"/>
+                </a:solidFill>
+              </a:rPr>
+              <a:t>()</a:t>
+            </a:r>
+            <a:r>
+              <a:rPr lang="pt-BR" sz="2000" dirty="0" smtClean="0"/>
+              <a:t> </a:t>
+            </a:r>
+            <a:r>
+              <a:rPr lang="pt-BR" sz="2000" dirty="0" smtClean="0"/>
+              <a:t>da thread</a:t>
+            </a:r>
+            <a:endParaRPr lang="pt-BR" sz="2000" b="1" i="1" dirty="0" smtClean="0">
+              <a:solidFill>
+                <a:srgbClr val="FFC000"/>
+              </a:solidFill>
+            </a:endParaRPr>
           </a:p>
         </p:txBody>
       </p:sp>

</xml_diff>

<commit_message>
Capítulo 8: Estados da thread.
</commit_message>
<xml_diff>
--- a/2-Java-Programmer-Modulo-II/14.Capitulo08.pptx
+++ b/2-Java-Programmer-Modulo-II/14.Capitulo08.pptx
@@ -274,7 +274,7 @@
               <a:pPr>
                 <a:defRPr/>
               </a:pPr>
-              <a:t>18/04/2012</a:t>
+              <a:t>19/04/2012</a:t>
             </a:fld>
             <a:endParaRPr lang="pt-BR"/>
           </a:p>
@@ -3639,7 +3639,7 @@
               <a:pPr>
                 <a:defRPr/>
               </a:pPr>
-              <a:t>18/04/2012</a:t>
+              <a:t>19/04/2012</a:t>
             </a:fld>
             <a:endParaRPr lang="pt-BR"/>
           </a:p>
@@ -3838,7 +3838,7 @@
               <a:pPr>
                 <a:defRPr/>
               </a:pPr>
-              <a:t>18/04/2012</a:t>
+              <a:t>19/04/2012</a:t>
             </a:fld>
             <a:endParaRPr lang="pt-BR"/>
           </a:p>
@@ -4040,7 +4040,7 @@
               <a:pPr>
                 <a:defRPr/>
               </a:pPr>
-              <a:t>18/04/2012</a:t>
+              <a:t>19/04/2012</a:t>
             </a:fld>
             <a:endParaRPr lang="pt-BR"/>
           </a:p>
@@ -4236,7 +4236,7 @@
               <a:pPr>
                 <a:defRPr/>
               </a:pPr>
-              <a:t>18/04/2012</a:t>
+              <a:t>19/04/2012</a:t>
             </a:fld>
             <a:endParaRPr lang="pt-BR"/>
           </a:p>
@@ -4742,7 +4742,7 @@
               <a:pPr>
                 <a:defRPr/>
               </a:pPr>
-              <a:t>18/04/2012</a:t>
+              <a:t>19/04/2012</a:t>
             </a:fld>
             <a:endParaRPr lang="pt-BR"/>
           </a:p>
@@ -5033,7 +5033,7 @@
               <a:pPr>
                 <a:defRPr/>
               </a:pPr>
-              <a:t>18/04/2012</a:t>
+              <a:t>19/04/2012</a:t>
             </a:fld>
             <a:endParaRPr lang="pt-BR"/>
           </a:p>
@@ -5434,7 +5434,7 @@
               <a:pPr>
                 <a:defRPr/>
               </a:pPr>
-              <a:t>18/04/2012</a:t>
+              <a:t>19/04/2012</a:t>
             </a:fld>
             <a:endParaRPr lang="pt-BR"/>
           </a:p>
@@ -5583,7 +5583,7 @@
               <a:pPr>
                 <a:defRPr/>
               </a:pPr>
-              <a:t>18/04/2012</a:t>
+              <a:t>19/04/2012</a:t>
             </a:fld>
             <a:endParaRPr lang="pt-BR"/>
           </a:p>
@@ -5700,7 +5700,7 @@
               <a:pPr>
                 <a:defRPr/>
               </a:pPr>
-              <a:t>18/04/2012</a:t>
+              <a:t>19/04/2012</a:t>
             </a:fld>
             <a:endParaRPr lang="pt-BR"/>
           </a:p>
@@ -5976,7 +5976,7 @@
               <a:pPr>
                 <a:defRPr/>
               </a:pPr>
-              <a:t>18/04/2012</a:t>
+              <a:t>19/04/2012</a:t>
             </a:fld>
             <a:endParaRPr lang="pt-BR"/>
           </a:p>
@@ -6260,7 +6260,7 @@
               <a:pPr>
                 <a:defRPr/>
               </a:pPr>
-              <a:t>18/04/2012</a:t>
+              <a:t>19/04/2012</a:t>
             </a:fld>
             <a:endParaRPr lang="pt-BR"/>
           </a:p>
@@ -6738,7 +6738,7 @@
               <a:pPr>
                 <a:defRPr/>
               </a:pPr>
-              <a:t>18/04/2012</a:t>
+              <a:t>19/04/2012</a:t>
             </a:fld>
             <a:endParaRPr lang="pt-BR"/>
           </a:p>
@@ -8239,11 +8239,7 @@
             <a:pPr algn="ctr"/>
             <a:r>
               <a:rPr lang="pt-BR" sz="1600" dirty="0" smtClean="0"/>
-              <a:t>s</a:t>
-            </a:r>
-            <a:r>
-              <a:rPr lang="pt-BR" sz="1600" dirty="0" smtClean="0"/>
-              <a:t>er executada</a:t>
+              <a:t>ser executada</a:t>
             </a:r>
             <a:endParaRPr lang="pt-BR" sz="1600" dirty="0"/>
           </a:p>
@@ -8295,7 +8291,6 @@
               <a:rPr lang="pt-BR" sz="1600" dirty="0" smtClean="0"/>
               <a:t>Dormindo</a:t>
             </a:r>
-            <a:endParaRPr lang="pt-BR" sz="1600" dirty="0" smtClean="0"/>
           </a:p>
         </p:txBody>
       </p:sp>
@@ -8395,7 +8390,6 @@
               <a:rPr lang="pt-BR" sz="1600" dirty="0" smtClean="0"/>
               <a:t>Suspensa</a:t>
             </a:r>
-            <a:endParaRPr lang="pt-BR" sz="1600" dirty="0" smtClean="0"/>
           </a:p>
         </p:txBody>
       </p:sp>
@@ -8939,8 +8933,8 @@
         </p:nvSpPr>
         <p:spPr>
           <a:xfrm>
-            <a:off x="2627784" y="4509120"/>
-            <a:ext cx="5904656" cy="1728192"/>
+            <a:off x="4211960" y="1556792"/>
+            <a:ext cx="4320480" cy="4680520"/>
           </a:xfrm>
         </p:spPr>
         <p:txBody>
@@ -8956,9 +8950,42 @@
             <a:pPr marL="442913" lvl="1" indent="0">
               <a:buNone/>
             </a:pPr>
+            <a:endParaRPr lang="pt-BR" sz="2000" dirty="0" smtClean="0"/>
+          </a:p>
+          <a:p>
+            <a:pPr marL="442913" lvl="1" indent="0">
+              <a:buNone/>
+            </a:pPr>
             <a:r>
               <a:rPr lang="pt-BR" sz="2000" dirty="0" smtClean="0"/>
-              <a:t>Uma thread fica pronta para ser executada tão logo seu método start() é executado. Lá ela fica aguardando até que o JVM tenha oportunidade de executá-la</a:t>
+              <a:t>Uma thread fica pronta para ser executada tão logo seu método </a:t>
+            </a:r>
+            <a:r>
+              <a:rPr lang="pt-BR" sz="2000" dirty="0" smtClean="0">
+                <a:solidFill>
+                  <a:srgbClr val="FFC000"/>
+                </a:solidFill>
+              </a:rPr>
+              <a:t>start()</a:t>
+            </a:r>
+            <a:r>
+              <a:rPr lang="pt-BR" sz="2000" dirty="0" smtClean="0"/>
+              <a:t> seja chamado.</a:t>
+            </a:r>
+          </a:p>
+          <a:p>
+            <a:pPr marL="442913" lvl="1" indent="0">
+              <a:buNone/>
+            </a:pPr>
+            <a:endParaRPr lang="pt-BR" sz="2000" dirty="0" smtClean="0"/>
+          </a:p>
+          <a:p>
+            <a:pPr marL="442913" lvl="1" indent="0">
+              <a:buNone/>
+            </a:pPr>
+            <a:r>
+              <a:rPr lang="pt-BR" sz="2000" dirty="0" smtClean="0"/>
+              <a:t>Lá ela ficará aguardando até que o JVM tenha oportunidade de executá-la</a:t>
             </a:r>
             <a:endParaRPr lang="pt-BR" sz="2000" dirty="0"/>
           </a:p>
@@ -9096,11 +9123,7 @@
             <a:pPr algn="ctr"/>
             <a:r>
               <a:rPr lang="pt-BR" sz="1600" dirty="0" smtClean="0"/>
-              <a:t>s</a:t>
-            </a:r>
-            <a:r>
-              <a:rPr lang="pt-BR" sz="1600" dirty="0" smtClean="0"/>
-              <a:t>er executada</a:t>
+              <a:t>ser executada</a:t>
             </a:r>
             <a:endParaRPr lang="pt-BR" sz="1600" dirty="0"/>
           </a:p>
@@ -9109,12 +9132,15 @@
       <p:cxnSp>
         <p:nvCxnSpPr>
           <p:cNvPr id="15" name="Conector de seta reta 14"/>
-          <p:cNvCxnSpPr/>
+          <p:cNvCxnSpPr>
+            <a:stCxn id="6" idx="2"/>
+            <a:endCxn id="5" idx="0"/>
+          </p:cNvCxnSpPr>
           <p:nvPr/>
         </p:nvCxnSpPr>
         <p:spPr>
           <a:xfrm>
-            <a:off x="1259632" y="2852936"/>
+            <a:off x="1511660" y="2852936"/>
             <a:ext cx="0" cy="792088"/>
           </a:xfrm>
           <a:prstGeom prst="straightConnector1">
@@ -9233,7 +9259,7 @@
         <p:spPr>
           <a:xfrm>
             <a:off x="1547664" y="1700808"/>
-            <a:ext cx="864096" cy="360040"/>
+            <a:ext cx="1008112" cy="360040"/>
           </a:xfrm>
           <a:prstGeom prst="rect">
             <a:avLst/>
@@ -9265,12 +9291,20 @@
           <a:p>
             <a:pPr algn="ctr"/>
             <a:r>
+              <a:rPr lang="pt-BR" dirty="0" err="1" smtClean="0">
+                <a:solidFill>
+                  <a:srgbClr val="FFC000"/>
+                </a:solidFill>
+              </a:rPr>
+              <a:t>t.start</a:t>
+            </a:r>
+            <a:r>
               <a:rPr lang="pt-BR" dirty="0" smtClean="0">
                 <a:solidFill>
                   <a:srgbClr val="FFC000"/>
                 </a:solidFill>
               </a:rPr>
-              <a:t>start()</a:t>
+              <a:t>()</a:t>
             </a:r>
             <a:endParaRPr lang="pt-BR" dirty="0">
               <a:solidFill>
@@ -9347,8 +9381,8 @@
         </p:nvSpPr>
         <p:spPr>
           <a:xfrm>
-            <a:off x="2627784" y="4509120"/>
-            <a:ext cx="5904656" cy="1728192"/>
+            <a:off x="4211960" y="1556792"/>
+            <a:ext cx="4320480" cy="4680520"/>
           </a:xfrm>
         </p:spPr>
         <p:txBody>
@@ -9364,15 +9398,55 @@
             <a:pPr marL="442913" lvl="1" indent="0">
               <a:buNone/>
             </a:pPr>
+            <a:endParaRPr lang="pt-BR" sz="2000" dirty="0" smtClean="0"/>
+          </a:p>
+          <a:p>
+            <a:pPr marL="442913" lvl="1" indent="0">
+              <a:buNone/>
+            </a:pPr>
             <a:r>
               <a:rPr lang="pt-BR" sz="2000" dirty="0" smtClean="0"/>
-              <a:t>Durante a sua execução, uma thread pode deixar de ser executada, cedendo </a:t>
-            </a:r>
-            <a:r>
-              <a:rPr lang="pt-BR" sz="2000" smtClean="0"/>
-              <a:t>sua vez para </a:t>
-            </a:r>
+              <a:t>Durante a sua execução, uma thread pode ser </a:t>
+            </a:r>
+            <a:r>
+              <a:rPr lang="pt-BR" sz="2000" dirty="0" err="1" smtClean="0"/>
+              <a:t>momentanea-mente</a:t>
+            </a:r>
+            <a:r>
+              <a:rPr lang="pt-BR" sz="2000" dirty="0" smtClean="0"/>
+              <a:t> pausada cedendo sua vez para outras threads.</a:t>
+            </a:r>
+          </a:p>
+          <a:p>
+            <a:pPr marL="442913" lvl="1" indent="0">
+              <a:buNone/>
+            </a:pPr>
             <a:endParaRPr lang="pt-BR" sz="2000" dirty="0" smtClean="0"/>
+          </a:p>
+          <a:p>
+            <a:pPr marL="442913" lvl="1" indent="0">
+              <a:buNone/>
+            </a:pPr>
+            <a:r>
+              <a:rPr lang="pt-BR" sz="2000" dirty="0" smtClean="0"/>
+              <a:t>Esta pausa pode ser realizada por decisão do JVM ou por solicitação da própria thread que pode “ceder” sua vez através do método estático </a:t>
+            </a:r>
+            <a:r>
+              <a:rPr lang="pt-BR" sz="2000" dirty="0" err="1" smtClean="0">
+                <a:solidFill>
+                  <a:srgbClr val="FFC000"/>
+                </a:solidFill>
+              </a:rPr>
+              <a:t>yeld</a:t>
+            </a:r>
+            <a:r>
+              <a:rPr lang="pt-BR" sz="2000" dirty="0" smtClean="0">
+                <a:solidFill>
+                  <a:srgbClr val="FFC000"/>
+                </a:solidFill>
+              </a:rPr>
+              <a:t>()</a:t>
+            </a:r>
           </a:p>
         </p:txBody>
       </p:sp>
@@ -9508,107 +9582,24 @@
             <a:pPr algn="ctr"/>
             <a:r>
               <a:rPr lang="pt-BR" sz="1600" dirty="0" smtClean="0"/>
-              <a:t>s</a:t>
-            </a:r>
-            <a:r>
-              <a:rPr lang="pt-BR" sz="1600" dirty="0" smtClean="0"/>
-              <a:t>er executada</a:t>
+              <a:t>ser executada</a:t>
             </a:r>
             <a:endParaRPr lang="pt-BR" sz="1600" dirty="0"/>
-          </a:p>
-        </p:txBody>
-      </p:sp>
-      <p:cxnSp>
-        <p:nvCxnSpPr>
-          <p:cNvPr id="53" name="Conector de seta reta 52"/>
-          <p:cNvCxnSpPr/>
-          <p:nvPr/>
-        </p:nvCxnSpPr>
-        <p:spPr>
-          <a:xfrm>
-            <a:off x="1511300" y="1671960"/>
-            <a:ext cx="0" cy="460896"/>
-          </a:xfrm>
-          <a:prstGeom prst="straightConnector1">
-            <a:avLst/>
-          </a:prstGeom>
-          <a:ln w="38100">
-            <a:solidFill>
-              <a:schemeClr val="tx1"/>
-            </a:solidFill>
-            <a:tailEnd type="arrow"/>
-          </a:ln>
-        </p:spPr>
-        <p:style>
-          <a:lnRef idx="1">
-            <a:schemeClr val="accent1"/>
-          </a:lnRef>
-          <a:fillRef idx="0">
-            <a:schemeClr val="accent1"/>
-          </a:fillRef>
-          <a:effectRef idx="0">
-            <a:schemeClr val="accent1"/>
-          </a:effectRef>
-          <a:fontRef idx="minor">
-            <a:schemeClr val="tx1"/>
-          </a:fontRef>
-        </p:style>
-      </p:cxnSp>
-      <p:sp>
-        <p:nvSpPr>
-          <p:cNvPr id="55" name="Elipse 54"/>
-          <p:cNvSpPr/>
-          <p:nvPr/>
-        </p:nvSpPr>
-        <p:spPr>
-          <a:xfrm>
-            <a:off x="1403648" y="1556792"/>
-            <a:ext cx="216024" cy="216024"/>
-          </a:xfrm>
-          <a:prstGeom prst="ellipse">
-            <a:avLst/>
-          </a:prstGeom>
-          <a:solidFill>
-            <a:schemeClr val="tx1"/>
-          </a:solidFill>
-          <a:ln>
-            <a:noFill/>
-          </a:ln>
-        </p:spPr>
-        <p:style>
-          <a:lnRef idx="2">
-            <a:schemeClr val="accent1">
-              <a:shade val="50000"/>
-            </a:schemeClr>
-          </a:lnRef>
-          <a:fillRef idx="1">
-            <a:schemeClr val="accent1"/>
-          </a:fillRef>
-          <a:effectRef idx="0">
-            <a:schemeClr val="accent1"/>
-          </a:effectRef>
-          <a:fontRef idx="minor">
-            <a:schemeClr val="lt1"/>
-          </a:fontRef>
-        </p:style>
-        <p:txBody>
-          <a:bodyPr rtlCol="0" anchor="ctr"/>
-          <a:lstStyle/>
-          <a:p>
-            <a:pPr algn="ctr"/>
-            <a:endParaRPr lang="pt-BR"/>
           </a:p>
         </p:txBody>
       </p:sp>
       <p:cxnSp>
         <p:nvCxnSpPr>
           <p:cNvPr id="57" name="Conector de seta reta 56"/>
-          <p:cNvCxnSpPr/>
+          <p:cNvCxnSpPr>
+            <a:stCxn id="5" idx="0"/>
+            <a:endCxn id="6" idx="2"/>
+          </p:cNvCxnSpPr>
           <p:nvPr/>
         </p:nvCxnSpPr>
         <p:spPr>
           <a:xfrm flipV="1">
-            <a:off x="1763688" y="2852936"/>
+            <a:off x="1511660" y="2852936"/>
             <a:ext cx="0" cy="792088"/>
           </a:xfrm>
           <a:prstGeom prst="straightConnector1">
@@ -9644,8 +9635,8 @@
         </p:nvSpPr>
         <p:spPr>
           <a:xfrm>
-            <a:off x="1763688" y="3068960"/>
-            <a:ext cx="864096" cy="360040"/>
+            <a:off x="1547664" y="3068960"/>
+            <a:ext cx="1584176" cy="360040"/>
           </a:xfrm>
           <a:prstGeom prst="rect">
             <a:avLst/>
@@ -9676,6 +9667,14 @@
           <a:lstStyle/>
           <a:p>
             <a:pPr algn="ctr"/>
+            <a:r>
+              <a:rPr lang="pt-BR" dirty="0" smtClean="0">
+                <a:solidFill>
+                  <a:srgbClr val="FFC000"/>
+                </a:solidFill>
+              </a:rPr>
+              <a:t>Thread.</a:t>
+            </a:r>
             <a:r>
               <a:rPr lang="pt-BR" dirty="0" err="1" smtClean="0">
                 <a:solidFill>
@@ -9767,8 +9766,8 @@
         </p:nvSpPr>
         <p:spPr>
           <a:xfrm>
-            <a:off x="2627784" y="4509120"/>
-            <a:ext cx="5904656" cy="1728192"/>
+            <a:off x="2699792" y="1556792"/>
+            <a:ext cx="5976664" cy="4680520"/>
           </a:xfrm>
         </p:spPr>
         <p:txBody>
@@ -9776,14 +9775,78 @@
           <a:lstStyle/>
           <a:p>
             <a:r>
-              <a:rPr lang="pt-BR" sz="2400" dirty="0" smtClean="0"/>
+              <a:rPr lang="pt-BR" sz="2400" u="sng" dirty="0" smtClean="0"/>
               <a:t>Morta</a:t>
             </a:r>
           </a:p>
           <a:p>
-            <a:pPr lvl="1">
+            <a:pPr marL="442913" lvl="1" indent="0">
               <a:buNone/>
             </a:pPr>
+            <a:endParaRPr lang="pt-BR" sz="2000" dirty="0" smtClean="0"/>
+          </a:p>
+          <a:p>
+            <a:pPr marL="442913" lvl="1" indent="0">
+              <a:buNone/>
+            </a:pPr>
+            <a:r>
+              <a:rPr lang="pt-BR" sz="2000" dirty="0" smtClean="0"/>
+              <a:t>Uma thread é considerada morta quando o seu processamento já foi executado pelo JVM.</a:t>
+            </a:r>
+          </a:p>
+          <a:p>
+            <a:pPr marL="442913" lvl="1" indent="0">
+              <a:buNone/>
+            </a:pPr>
+            <a:endParaRPr lang="pt-BR" sz="2000" dirty="0" smtClean="0"/>
+          </a:p>
+          <a:p>
+            <a:pPr marL="442913" lvl="1" indent="0">
+              <a:buNone/>
+            </a:pPr>
+            <a:r>
+              <a:rPr lang="pt-BR" sz="2000" dirty="0" smtClean="0"/>
+              <a:t>Instâncias de threads mortas não podem ser reexecutadas. Caso seja necessário uma nova execução, crie uma nova instância da thread</a:t>
+            </a:r>
+            <a:r>
+              <a:rPr lang="pt-BR" sz="2000" dirty="0" smtClean="0"/>
+              <a:t>.</a:t>
+            </a:r>
+          </a:p>
+          <a:p>
+            <a:pPr marL="442913" lvl="1" indent="0">
+              <a:buNone/>
+            </a:pPr>
+            <a:endParaRPr lang="pt-BR" sz="2000" dirty="0" smtClean="0"/>
+          </a:p>
+          <a:p>
+            <a:pPr marL="442913" lvl="1" indent="0">
+              <a:buNone/>
+            </a:pPr>
+            <a:r>
+              <a:rPr lang="pt-BR" sz="2000" dirty="0" smtClean="0"/>
+              <a:t>Embora não seja recomendado, uma thread pode ser abruptamente morta através do método </a:t>
+            </a:r>
+            <a:r>
+              <a:rPr lang="pt-BR" sz="2000" dirty="0" err="1" smtClean="0">
+                <a:solidFill>
+                  <a:srgbClr val="FFC000"/>
+                </a:solidFill>
+              </a:rPr>
+              <a:t>stop</a:t>
+            </a:r>
+            <a:r>
+              <a:rPr lang="pt-BR" sz="2000" dirty="0" smtClean="0">
+                <a:solidFill>
+                  <a:srgbClr val="FFC000"/>
+                </a:solidFill>
+              </a:rPr>
+              <a:t>()</a:t>
+            </a:r>
+            <a:r>
+              <a:rPr lang="pt-BR" sz="2000" dirty="0" smtClean="0"/>
+              <a:t> que foi depreciado desde a versão 1.2</a:t>
+            </a:r>
             <a:endParaRPr lang="pt-BR" sz="2000" dirty="0"/>
           </a:p>
         </p:txBody>
@@ -9967,7 +10030,7 @@
         <p:spPr>
           <a:xfrm>
             <a:off x="1547664" y="4437112"/>
-            <a:ext cx="864096" cy="360040"/>
+            <a:ext cx="936104" cy="360040"/>
           </a:xfrm>
           <a:prstGeom prst="rect">
             <a:avLst/>
@@ -10004,7 +10067,7 @@
                   <a:srgbClr val="FFC000"/>
                 </a:solidFill>
               </a:rPr>
-              <a:t>stop</a:t>
+              <a:t>t.stop</a:t>
             </a:r>
             <a:r>
               <a:rPr lang="pt-BR" dirty="0" smtClean="0">
@@ -10089,8 +10152,8 @@
         </p:nvSpPr>
         <p:spPr>
           <a:xfrm>
-            <a:off x="2627784" y="4509120"/>
-            <a:ext cx="5904656" cy="1728192"/>
+            <a:off x="4211960" y="1556792"/>
+            <a:ext cx="4320480" cy="4680520"/>
           </a:xfrm>
         </p:spPr>
         <p:txBody>
@@ -10098,14 +10161,67 @@
           <a:lstStyle/>
           <a:p>
             <a:r>
-              <a:rPr lang="pt-BR" sz="2400" dirty="0" smtClean="0"/>
+              <a:rPr lang="pt-BR" sz="2400" u="sng" dirty="0" smtClean="0"/>
               <a:t>Dormindo</a:t>
             </a:r>
           </a:p>
           <a:p>
-            <a:pPr lvl="1">
+            <a:pPr marL="442913" lvl="1" indent="0">
               <a:buNone/>
             </a:pPr>
+            <a:endParaRPr lang="pt-BR" sz="2000" dirty="0" smtClean="0"/>
+          </a:p>
+          <a:p>
+            <a:pPr marL="442913" lvl="1" indent="0">
+              <a:buNone/>
+            </a:pPr>
+            <a:r>
+              <a:rPr lang="pt-BR" sz="2000" dirty="0" smtClean="0"/>
+              <a:t>Uma </a:t>
+            </a:r>
+            <a:r>
+              <a:rPr lang="pt-BR" sz="2000" dirty="0" smtClean="0"/>
+              <a:t>thread pode ser colocada para “dormir</a:t>
+            </a:r>
+            <a:r>
+              <a:rPr lang="pt-BR" sz="2000" dirty="0" smtClean="0"/>
+              <a:t>” através do método estático </a:t>
+            </a:r>
+            <a:r>
+              <a:rPr lang="pt-BR" sz="2000" dirty="0" err="1" smtClean="0">
+                <a:solidFill>
+                  <a:srgbClr val="FFC000"/>
+                </a:solidFill>
+              </a:rPr>
+              <a:t>sleep</a:t>
+            </a:r>
+            <a:r>
+              <a:rPr lang="pt-BR" sz="2000" dirty="0" smtClean="0">
+                <a:solidFill>
+                  <a:srgbClr val="FFC000"/>
+                </a:solidFill>
+              </a:rPr>
+              <a:t>()</a:t>
+            </a:r>
+            <a:r>
+              <a:rPr lang="pt-BR" sz="2000" dirty="0" smtClean="0"/>
+              <a:t> que faz com que a thread atual fique inativa durante o tempo solicitado.</a:t>
+            </a:r>
+          </a:p>
+          <a:p>
+            <a:pPr marL="442913" lvl="1" indent="0">
+              <a:buNone/>
+            </a:pPr>
+            <a:endParaRPr lang="pt-BR" sz="2000" dirty="0" smtClean="0"/>
+          </a:p>
+          <a:p>
+            <a:pPr marL="442913" lvl="1" indent="0">
+              <a:buNone/>
+            </a:pPr>
+            <a:r>
+              <a:rPr lang="pt-BR" sz="2000" dirty="0" smtClean="0"/>
+              <a:t>Após o tempo (especificado em milissegundos), a thread atual volta ao estado “Pronta para ser executada” aguardando sua nova oportunidade de execução.</a:t>
+            </a:r>
             <a:endParaRPr lang="pt-BR" sz="2000" dirty="0"/>
           </a:p>
         </p:txBody>
@@ -10240,11 +10356,7 @@
             <a:pPr algn="ctr"/>
             <a:r>
               <a:rPr lang="pt-BR" sz="1600" dirty="0" smtClean="0"/>
-              <a:t>s</a:t>
-            </a:r>
-            <a:r>
-              <a:rPr lang="pt-BR" sz="1600" dirty="0" smtClean="0"/>
-              <a:t>er executada</a:t>
+              <a:t>ser executada</a:t>
             </a:r>
             <a:endParaRPr lang="pt-BR" sz="1600" dirty="0"/>
           </a:p>
@@ -10386,8 +10498,8 @@
         </p:nvSpPr>
         <p:spPr>
           <a:xfrm>
-            <a:off x="3635896" y="3429000"/>
-            <a:ext cx="1440160" cy="360040"/>
+            <a:off x="2267744" y="3933056"/>
+            <a:ext cx="2232248" cy="360040"/>
           </a:xfrm>
           <a:prstGeom prst="rect">
             <a:avLst/>
@@ -10418,6 +10530,14 @@
           <a:lstStyle/>
           <a:p>
             <a:pPr algn="ctr"/>
+            <a:r>
+              <a:rPr lang="pt-BR" dirty="0" smtClean="0">
+                <a:solidFill>
+                  <a:srgbClr val="FFC000"/>
+                </a:solidFill>
+              </a:rPr>
+              <a:t>Thread.</a:t>
+            </a:r>
             <a:r>
               <a:rPr lang="pt-BR" dirty="0" err="1" smtClean="0">
                 <a:solidFill>
@@ -10520,13 +10640,13 @@
             <a:spLocks noGrp="1"/>
           </p:cNvSpPr>
           <p:nvPr>
-            <p:ph idx="1"/>
+            <p:ph sz="half" idx="1"/>
           </p:nvPr>
         </p:nvSpPr>
         <p:spPr>
           <a:xfrm>
-            <a:off x="2627784" y="4509120"/>
-            <a:ext cx="5904656" cy="1728192"/>
+            <a:off x="4211960" y="1556792"/>
+            <a:ext cx="4305672" cy="4525963"/>
           </a:xfrm>
         </p:spPr>
         <p:txBody>
@@ -10534,15 +10654,116 @@
           <a:lstStyle/>
           <a:p>
             <a:r>
-              <a:rPr lang="pt-BR" sz="2400" dirty="0" smtClean="0"/>
+              <a:rPr lang="pt-BR" sz="2400" u="sng" dirty="0" smtClean="0"/>
               <a:t>Suspensa</a:t>
             </a:r>
           </a:p>
           <a:p>
-            <a:pPr lvl="1">
+            <a:pPr marL="442913" lvl="1" indent="0">
               <a:buNone/>
             </a:pPr>
+            <a:endParaRPr lang="pt-BR" sz="2000" dirty="0" smtClean="0"/>
+          </a:p>
+          <a:p>
+            <a:pPr marL="442913" lvl="1" indent="0">
+              <a:buNone/>
+            </a:pPr>
+            <a:r>
+              <a:rPr lang="pt-BR" sz="2000" dirty="0" smtClean="0"/>
+              <a:t>Uma thread pode ser suspensa por tempo indeterminado através do método </a:t>
+            </a:r>
+            <a:r>
+              <a:rPr lang="pt-BR" sz="2000" dirty="0" err="1" smtClean="0">
+                <a:solidFill>
+                  <a:srgbClr val="FFC000"/>
+                </a:solidFill>
+              </a:rPr>
+              <a:t>suspend</a:t>
+            </a:r>
+            <a:r>
+              <a:rPr lang="pt-BR" sz="2000" dirty="0" smtClean="0">
+                <a:solidFill>
+                  <a:srgbClr val="FFC000"/>
+                </a:solidFill>
+              </a:rPr>
+              <a:t>()</a:t>
+            </a:r>
+            <a:r>
+              <a:rPr lang="pt-BR" sz="2000" dirty="0" smtClean="0"/>
+              <a:t>.</a:t>
+            </a:r>
+          </a:p>
+          <a:p>
+            <a:pPr marL="442913" lvl="1" indent="0">
+              <a:buNone/>
+            </a:pPr>
+            <a:endParaRPr lang="pt-BR" sz="2000" dirty="0" smtClean="0"/>
+          </a:p>
+          <a:p>
+            <a:pPr marL="442913" lvl="1" indent="0">
+              <a:buNone/>
+            </a:pPr>
+            <a:r>
+              <a:rPr lang="pt-BR" sz="2000" dirty="0" smtClean="0"/>
+              <a:t>Ao entrar no estado “suspenso” a thread pode ser trazida de volta ao seu ciclo normal pelo método </a:t>
+            </a:r>
+            <a:r>
+              <a:rPr lang="pt-BR" sz="2000" dirty="0" smtClean="0">
+                <a:solidFill>
+                  <a:srgbClr val="FFC000"/>
+                </a:solidFill>
+              </a:rPr>
+              <a:t>resume()</a:t>
+            </a:r>
+            <a:r>
+              <a:rPr lang="pt-BR" sz="2000" dirty="0" smtClean="0"/>
+              <a:t>.</a:t>
+            </a:r>
             <a:endParaRPr lang="pt-BR" sz="2000" dirty="0"/>
+          </a:p>
+        </p:txBody>
+      </p:sp>
+      <p:sp>
+        <p:nvSpPr>
+          <p:cNvPr id="23" name="Espaço Reservado para Conteúdo 22"/>
+          <p:cNvSpPr>
+            <a:spLocks noGrp="1"/>
+          </p:cNvSpPr>
+          <p:nvPr>
+            <p:ph sz="half" idx="2"/>
+          </p:nvPr>
+        </p:nvSpPr>
+        <p:spPr>
+          <a:xfrm>
+            <a:off x="611560" y="5301208"/>
+            <a:ext cx="7920880" cy="792088"/>
+          </a:xfrm>
+          <a:ln w="38100">
+            <a:solidFill>
+              <a:srgbClr val="FF0000"/>
+            </a:solidFill>
+          </a:ln>
+        </p:spPr>
+        <p:txBody>
+          <a:bodyPr/>
+          <a:lstStyle/>
+          <a:p>
+            <a:pPr marL="179388" indent="0">
+              <a:buNone/>
+            </a:pPr>
+            <a:r>
+              <a:rPr lang="pt-BR" sz="2000" dirty="0" smtClean="0"/>
+              <a:t>O estado “suspenso” e os métodos </a:t>
+            </a:r>
+            <a:r>
+              <a:rPr lang="pt-BR" sz="2000" dirty="0" err="1" smtClean="0"/>
+              <a:t>suspend</a:t>
+            </a:r>
+            <a:r>
+              <a:rPr lang="pt-BR" sz="2000" dirty="0" smtClean="0"/>
+              <a:t>() e resume() foram depreciados desde a versão 1.2 do Java.</a:t>
+            </a:r>
+            <a:endParaRPr lang="pt-BR" sz="2000" dirty="0" smtClean="0"/>
           </a:p>
         </p:txBody>
       </p:sp>
@@ -10676,11 +10897,7 @@
             <a:pPr algn="ctr"/>
             <a:r>
               <a:rPr lang="pt-BR" sz="1600" dirty="0" smtClean="0"/>
-              <a:t>s</a:t>
-            </a:r>
-            <a:r>
-              <a:rPr lang="pt-BR" sz="1600" dirty="0" smtClean="0"/>
-              <a:t>er executada</a:t>
+              <a:t>ser executada</a:t>
             </a:r>
             <a:endParaRPr lang="pt-BR" sz="1600" dirty="0"/>
           </a:p>
@@ -10694,7 +10911,7 @@
         </p:nvSpPr>
         <p:spPr>
           <a:xfrm>
-            <a:off x="4932040" y="2996952"/>
+            <a:off x="2843808" y="2996952"/>
             <a:ext cx="1512168" cy="432048"/>
           </a:xfrm>
           <a:prstGeom prst="rect">
@@ -10742,7 +10959,6 @@
         <p:nvCxnSpPr>
           <p:cNvPr id="18" name="Forma 17"/>
           <p:cNvCxnSpPr>
-            <a:stCxn id="5" idx="3"/>
             <a:endCxn id="9" idx="2"/>
           </p:cNvCxnSpPr>
           <p:nvPr/>
@@ -10750,7 +10966,7 @@
         <p:spPr>
           <a:xfrm flipV="1">
             <a:off x="2267744" y="3429000"/>
-            <a:ext cx="3420380" cy="576064"/>
+            <a:ext cx="1332148" cy="432048"/>
           </a:xfrm>
           <a:prstGeom prst="bentConnector2">
             <a:avLst/>
@@ -10782,14 +10998,13 @@
           <p:cNvPr id="28" name="Forma 27"/>
           <p:cNvCxnSpPr>
             <a:stCxn id="9" idx="0"/>
-            <a:endCxn id="6" idx="3"/>
           </p:cNvCxnSpPr>
           <p:nvPr/>
         </p:nvCxnSpPr>
         <p:spPr>
           <a:xfrm rot="16200000" flipV="1">
-            <a:off x="3725906" y="1034734"/>
-            <a:ext cx="504056" cy="3420380"/>
+            <a:off x="2753798" y="2150858"/>
+            <a:ext cx="360040" cy="1332148"/>
           </a:xfrm>
           <a:prstGeom prst="bentConnector2">
             <a:avLst/>
@@ -10824,8 +11039,8 @@
         </p:nvSpPr>
         <p:spPr>
           <a:xfrm>
-            <a:off x="5724128" y="2636912"/>
-            <a:ext cx="1152128" cy="360040"/>
+            <a:off x="2555776" y="2204864"/>
+            <a:ext cx="1368152" cy="360040"/>
           </a:xfrm>
           <a:prstGeom prst="rect">
             <a:avLst/>
@@ -10857,12 +11072,20 @@
           <a:p>
             <a:pPr algn="ctr"/>
             <a:r>
+              <a:rPr lang="pt-BR" dirty="0" err="1" smtClean="0">
+                <a:solidFill>
+                  <a:srgbClr val="FFC000"/>
+                </a:solidFill>
+              </a:rPr>
+              <a:t>t.resume</a:t>
+            </a:r>
+            <a:r>
               <a:rPr lang="pt-BR" dirty="0" smtClean="0">
                 <a:solidFill>
                   <a:srgbClr val="FFC000"/>
                 </a:solidFill>
               </a:rPr>
-              <a:t>resume()</a:t>
+              <a:t>()</a:t>
             </a:r>
             <a:endParaRPr lang="pt-BR" dirty="0">
               <a:solidFill>
@@ -10880,8 +11103,8 @@
         </p:nvSpPr>
         <p:spPr>
           <a:xfrm>
-            <a:off x="5724128" y="3429000"/>
-            <a:ext cx="1296144" cy="360040"/>
+            <a:off x="2555776" y="3933056"/>
+            <a:ext cx="1368152" cy="360040"/>
           </a:xfrm>
           <a:prstGeom prst="rect">
             <a:avLst/>
@@ -10918,7 +11141,7 @@
                   <a:srgbClr val="FFC000"/>
                 </a:solidFill>
               </a:rPr>
-              <a:t>suspend</a:t>
+              <a:t>t.suspend</a:t>
             </a:r>
             <a:r>
               <a:rPr lang="pt-BR" dirty="0" smtClean="0">
@@ -11003,8 +11226,8 @@
         </p:nvSpPr>
         <p:spPr>
           <a:xfrm>
-            <a:off x="2627784" y="4509120"/>
-            <a:ext cx="5904656" cy="1728192"/>
+            <a:off x="4211960" y="1556792"/>
+            <a:ext cx="4320480" cy="4680520"/>
           </a:xfrm>
         </p:spPr>
         <p:txBody>
@@ -11012,14 +11235,24 @@
           <a:lstStyle/>
           <a:p>
             <a:r>
-              <a:rPr lang="pt-BR" sz="2400" dirty="0" smtClean="0"/>
+              <a:rPr lang="pt-BR" sz="2400" u="sng" dirty="0" smtClean="0"/>
               <a:t>Bloqueada</a:t>
             </a:r>
           </a:p>
           <a:p>
-            <a:pPr lvl="1">
+            <a:pPr marL="442913" lvl="1" indent="0">
               <a:buNone/>
             </a:pPr>
+            <a:endParaRPr lang="pt-BR" sz="2000" dirty="0" smtClean="0"/>
+          </a:p>
+          <a:p>
+            <a:pPr marL="442913" lvl="1" indent="0">
+              <a:buNone/>
+            </a:pPr>
+            <a:r>
+              <a:rPr lang="pt-BR" sz="2000" dirty="0" smtClean="0"/>
+              <a:t>XXX</a:t>
+            </a:r>
             <a:endParaRPr lang="pt-BR" sz="2000" dirty="0"/>
           </a:p>
         </p:txBody>
@@ -11154,11 +11387,7 @@
             <a:pPr algn="ctr"/>
             <a:r>
               <a:rPr lang="pt-BR" sz="1600" dirty="0" smtClean="0"/>
-              <a:t>s</a:t>
-            </a:r>
-            <a:r>
-              <a:rPr lang="pt-BR" sz="1600" dirty="0" smtClean="0"/>
-              <a:t>er executada</a:t>
+              <a:t>ser executada</a:t>
             </a:r>
             <a:endParaRPr lang="pt-BR" sz="1600" dirty="0"/>
           </a:p>
@@ -11172,7 +11401,7 @@
         </p:nvSpPr>
         <p:spPr>
           <a:xfrm>
-            <a:off x="7020272" y="2996952"/>
+            <a:off x="2843808" y="2996952"/>
             <a:ext cx="1512168" cy="432048"/>
           </a:xfrm>
           <a:prstGeom prst="rect">
@@ -11227,7 +11456,7 @@
         <p:spPr>
           <a:xfrm flipV="1">
             <a:off x="2267744" y="3429000"/>
-            <a:ext cx="5508612" cy="720080"/>
+            <a:ext cx="1332148" cy="432048"/>
           </a:xfrm>
           <a:prstGeom prst="bentConnector2">
             <a:avLst/>
@@ -11264,8 +11493,8 @@
         </p:nvCxnSpPr>
         <p:spPr>
           <a:xfrm rot="16200000" flipV="1">
-            <a:off x="4698014" y="-81390"/>
-            <a:ext cx="648072" cy="5508612"/>
+            <a:off x="2753798" y="2150858"/>
+            <a:ext cx="360040" cy="1332148"/>
           </a:xfrm>
           <a:prstGeom prst="bentConnector2">
             <a:avLst/>
@@ -11300,8 +11529,8 @@
         </p:nvSpPr>
         <p:spPr>
           <a:xfrm>
-            <a:off x="7812360" y="2636912"/>
-            <a:ext cx="936104" cy="360040"/>
+            <a:off x="2555776" y="2204864"/>
+            <a:ext cx="1296144" cy="360040"/>
           </a:xfrm>
           <a:prstGeom prst="rect">
             <a:avLst/>
@@ -11338,6 +11567,30 @@
                   <a:srgbClr val="FFC000"/>
                 </a:solidFill>
               </a:rPr>
+              <a:t>o</a:t>
+            </a:r>
+            <a:r>
+              <a:rPr lang="pt-BR" dirty="0" err="1" smtClean="0">
+                <a:solidFill>
+                  <a:srgbClr val="FFC000"/>
+                </a:solidFill>
+              </a:rPr>
+              <a:t>bj</a:t>
+            </a:r>
+            <a:r>
+              <a:rPr lang="pt-BR" dirty="0" smtClean="0">
+                <a:solidFill>
+                  <a:srgbClr val="FFC000"/>
+                </a:solidFill>
+              </a:rPr>
+              <a:t>.</a:t>
+            </a:r>
+            <a:r>
+              <a:rPr lang="pt-BR" dirty="0" err="1" smtClean="0">
+                <a:solidFill>
+                  <a:srgbClr val="FFC000"/>
+                </a:solidFill>
+              </a:rPr>
               <a:t>notify</a:t>
             </a:r>
             <a:r>
@@ -11364,8 +11617,8 @@
         </p:nvSpPr>
         <p:spPr>
           <a:xfrm>
-            <a:off x="7740352" y="3429000"/>
-            <a:ext cx="936104" cy="360040"/>
+            <a:off x="2555776" y="3933056"/>
+            <a:ext cx="1296144" cy="360040"/>
           </a:xfrm>
           <a:prstGeom prst="rect">
             <a:avLst/>
@@ -11396,6 +11649,22 @@
           <a:lstStyle/>
           <a:p>
             <a:pPr algn="ctr"/>
+            <a:r>
+              <a:rPr lang="pt-BR" dirty="0" err="1" smtClean="0">
+                <a:solidFill>
+                  <a:srgbClr val="FFC000"/>
+                </a:solidFill>
+              </a:rPr>
+              <a:t>obj</a:t>
+            </a:r>
+            <a:r>
+              <a:rPr lang="pt-BR" dirty="0" smtClean="0">
+                <a:solidFill>
+                  <a:srgbClr val="FFC000"/>
+                </a:solidFill>
+              </a:rPr>
+              <a:t>.</a:t>
+            </a:r>
             <a:r>
               <a:rPr lang="pt-BR" dirty="0" err="1" smtClean="0">
                 <a:solidFill>
@@ -11605,11 +11874,7 @@
             <a:pPr algn="ctr"/>
             <a:r>
               <a:rPr lang="pt-BR" sz="1600" dirty="0" smtClean="0"/>
-              <a:t>s</a:t>
-            </a:r>
-            <a:r>
-              <a:rPr lang="pt-BR" sz="1600" dirty="0" smtClean="0"/>
-              <a:t>er executada</a:t>
+              <a:t>ser executada</a:t>
             </a:r>
             <a:endParaRPr lang="pt-BR" sz="1600" dirty="0"/>
           </a:p>
@@ -11661,7 +11926,6 @@
               <a:rPr lang="pt-BR" sz="1600" dirty="0" smtClean="0"/>
               <a:t>Dormindo</a:t>
             </a:r>
-            <a:endParaRPr lang="pt-BR" sz="1600" dirty="0" smtClean="0"/>
           </a:p>
         </p:txBody>
       </p:sp>
@@ -11761,7 +12025,6 @@
               <a:rPr lang="pt-BR" sz="1600" dirty="0" smtClean="0"/>
               <a:t>Suspensa</a:t>
             </a:r>
-            <a:endParaRPr lang="pt-BR" sz="1600" dirty="0" smtClean="0"/>
           </a:p>
         </p:txBody>
       </p:sp>
@@ -14675,7 +14938,7 @@
               </a:spcBef>
             </a:pPr>
             <a:r>
-              <a:rPr lang="pt-BR" dirty="0" smtClean="0"/>
+              <a:rPr lang="pt-BR" sz="2800" dirty="0" smtClean="0"/>
               <a:t>Através do uso de múltiplas threads podemos realizar o processamento simultâneo de partes diferentes de sua aplicação.</a:t>
             </a:r>
           </a:p>
@@ -14686,30 +14949,30 @@
               </a:spcBef>
             </a:pPr>
             <a:r>
-              <a:rPr lang="pt-BR" dirty="0" smtClean="0"/>
+              <a:rPr lang="pt-BR" sz="2800" dirty="0" smtClean="0"/>
               <a:t>O desenvolvimento de aplicações que possuem múltiplas threads é chamada </a:t>
             </a:r>
             <a:r>
-              <a:rPr lang="pt-BR" b="1" i="1" dirty="0" smtClean="0"/>
+              <a:rPr lang="pt-BR" sz="2800" b="1" i="1" dirty="0" smtClean="0"/>
               <a:t>programação </a:t>
             </a:r>
             <a:r>
-              <a:rPr lang="pt-BR" b="1" i="1" dirty="0" err="1" smtClean="0"/>
+              <a:rPr lang="pt-BR" sz="2800" b="1" i="1" dirty="0" err="1" smtClean="0"/>
               <a:t>multithreaded</a:t>
             </a:r>
             <a:r>
-              <a:rPr lang="pt-BR" dirty="0" smtClean="0"/>
+              <a:rPr lang="pt-BR" sz="2800" dirty="0" smtClean="0"/>
               <a:t> ou </a:t>
             </a:r>
             <a:r>
-              <a:rPr lang="pt-BR" b="1" i="1" dirty="0" smtClean="0"/>
+              <a:rPr lang="pt-BR" sz="2800" b="1" i="1" dirty="0" smtClean="0"/>
               <a:t>programação concorrente</a:t>
             </a:r>
             <a:r>
-              <a:rPr lang="pt-BR" dirty="0" smtClean="0"/>
+              <a:rPr lang="pt-BR" sz="2800" dirty="0" smtClean="0"/>
               <a:t>.</a:t>
             </a:r>
-            <a:endParaRPr lang="pt-BR" b="1" i="1" dirty="0" smtClean="0"/>
+            <a:endParaRPr lang="pt-BR" sz="2800" b="1" i="1" dirty="0" smtClean="0"/>
           </a:p>
           <a:p>
             <a:pPr>
@@ -14717,7 +14980,7 @@
                 <a:spcPts val="3000"/>
               </a:spcBef>
             </a:pPr>
-            <a:endParaRPr lang="pt-BR" dirty="0" smtClean="0"/>
+            <a:endParaRPr lang="pt-BR" sz="2800" dirty="0" smtClean="0"/>
           </a:p>
         </p:txBody>
       </p:sp>

</xml_diff>

<commit_message>
Threads: Refinamento do slide animado sobre sincronização.
</commit_message>
<xml_diff>
--- a/2-Java-Programmer-Modulo-II/14.Capitulo08.pptx
+++ b/2-Java-Programmer-Modulo-II/14.Capitulo08.pptx
@@ -280,7 +280,7 @@
               <a:pPr>
                 <a:defRPr/>
               </a:pPr>
-              <a:t>22/04/2012</a:t>
+              <a:t>23/04/2012</a:t>
             </a:fld>
             <a:endParaRPr lang="pt-BR"/>
           </a:p>
@@ -468,7 +468,7 @@
               <a:pPr>
                 <a:defRPr/>
               </a:pPr>
-              <a:t>‹nº›</a:t>
+              <a:t>‹#›</a:t>
             </a:fld>
             <a:endParaRPr lang="pt-BR"/>
           </a:p>
@@ -4167,7 +4167,7 @@
               <a:pPr>
                 <a:defRPr/>
               </a:pPr>
-              <a:t>22/04/2012</a:t>
+              <a:t>23/04/2012</a:t>
             </a:fld>
             <a:endParaRPr lang="pt-BR"/>
           </a:p>
@@ -4226,7 +4226,7 @@
               <a:pPr>
                 <a:defRPr/>
               </a:pPr>
-              <a:t>‹nº›</a:t>
+              <a:t>‹#›</a:t>
             </a:fld>
             <a:endParaRPr lang="pt-BR"/>
           </a:p>
@@ -4366,7 +4366,7 @@
               <a:pPr>
                 <a:defRPr/>
               </a:pPr>
-              <a:t>22/04/2012</a:t>
+              <a:t>23/04/2012</a:t>
             </a:fld>
             <a:endParaRPr lang="pt-BR"/>
           </a:p>
@@ -4425,7 +4425,7 @@
               <a:pPr>
                 <a:defRPr/>
               </a:pPr>
-              <a:t>‹nº›</a:t>
+              <a:t>‹#›</a:t>
             </a:fld>
             <a:endParaRPr lang="pt-BR"/>
           </a:p>
@@ -4568,7 +4568,7 @@
               <a:pPr>
                 <a:defRPr/>
               </a:pPr>
-              <a:t>22/04/2012</a:t>
+              <a:t>23/04/2012</a:t>
             </a:fld>
             <a:endParaRPr lang="pt-BR"/>
           </a:p>
@@ -4627,7 +4627,7 @@
               <a:pPr>
                 <a:defRPr/>
               </a:pPr>
-              <a:t>‹nº›</a:t>
+              <a:t>‹#›</a:t>
             </a:fld>
             <a:endParaRPr lang="pt-BR"/>
           </a:p>
@@ -4764,7 +4764,7 @@
               <a:pPr>
                 <a:defRPr/>
               </a:pPr>
-              <a:t>22/04/2012</a:t>
+              <a:t>23/04/2012</a:t>
             </a:fld>
             <a:endParaRPr lang="pt-BR"/>
           </a:p>
@@ -4823,7 +4823,7 @@
               <a:pPr>
                 <a:defRPr/>
               </a:pPr>
-              <a:t>‹nº›</a:t>
+              <a:t>‹#›</a:t>
             </a:fld>
             <a:endParaRPr lang="pt-BR"/>
           </a:p>
@@ -5270,7 +5270,7 @@
               <a:pPr>
                 <a:defRPr/>
               </a:pPr>
-              <a:t>22/04/2012</a:t>
+              <a:t>23/04/2012</a:t>
             </a:fld>
             <a:endParaRPr lang="pt-BR"/>
           </a:p>
@@ -5329,7 +5329,7 @@
               <a:pPr>
                 <a:defRPr/>
               </a:pPr>
-              <a:t>‹nº›</a:t>
+              <a:t>‹#›</a:t>
             </a:fld>
             <a:endParaRPr lang="pt-BR"/>
           </a:p>
@@ -5561,7 +5561,7 @@
               <a:pPr>
                 <a:defRPr/>
               </a:pPr>
-              <a:t>22/04/2012</a:t>
+              <a:t>23/04/2012</a:t>
             </a:fld>
             <a:endParaRPr lang="pt-BR"/>
           </a:p>
@@ -5620,7 +5620,7 @@
               <a:pPr>
                 <a:defRPr/>
               </a:pPr>
-              <a:t>‹nº›</a:t>
+              <a:t>‹#›</a:t>
             </a:fld>
             <a:endParaRPr lang="pt-BR"/>
           </a:p>
@@ -5962,7 +5962,7 @@
               <a:pPr>
                 <a:defRPr/>
               </a:pPr>
-              <a:t>22/04/2012</a:t>
+              <a:t>23/04/2012</a:t>
             </a:fld>
             <a:endParaRPr lang="pt-BR"/>
           </a:p>
@@ -6021,7 +6021,7 @@
               <a:pPr>
                 <a:defRPr/>
               </a:pPr>
-              <a:t>‹nº›</a:t>
+              <a:t>‹#›</a:t>
             </a:fld>
             <a:endParaRPr lang="pt-BR"/>
           </a:p>
@@ -6111,7 +6111,7 @@
               <a:pPr>
                 <a:defRPr/>
               </a:pPr>
-              <a:t>22/04/2012</a:t>
+              <a:t>23/04/2012</a:t>
             </a:fld>
             <a:endParaRPr lang="pt-BR"/>
           </a:p>
@@ -6170,7 +6170,7 @@
               <a:pPr>
                 <a:defRPr/>
               </a:pPr>
-              <a:t>‹nº›</a:t>
+              <a:t>‹#›</a:t>
             </a:fld>
             <a:endParaRPr lang="pt-BR"/>
           </a:p>
@@ -6228,7 +6228,7 @@
               <a:pPr>
                 <a:defRPr/>
               </a:pPr>
-              <a:t>22/04/2012</a:t>
+              <a:t>23/04/2012</a:t>
             </a:fld>
             <a:endParaRPr lang="pt-BR"/>
           </a:p>
@@ -6287,7 +6287,7 @@
               <a:pPr>
                 <a:defRPr/>
               </a:pPr>
-              <a:t>‹nº›</a:t>
+              <a:t>‹#›</a:t>
             </a:fld>
             <a:endParaRPr lang="pt-BR"/>
           </a:p>
@@ -6504,7 +6504,7 @@
               <a:pPr>
                 <a:defRPr/>
               </a:pPr>
-              <a:t>22/04/2012</a:t>
+              <a:t>23/04/2012</a:t>
             </a:fld>
             <a:endParaRPr lang="pt-BR"/>
           </a:p>
@@ -6568,7 +6568,7 @@
               <a:pPr>
                 <a:defRPr/>
               </a:pPr>
-              <a:t>‹nº›</a:t>
+              <a:t>‹#›</a:t>
             </a:fld>
             <a:endParaRPr lang="pt-BR"/>
           </a:p>
@@ -6788,7 +6788,7 @@
               <a:pPr>
                 <a:defRPr/>
               </a:pPr>
-              <a:t>22/04/2012</a:t>
+              <a:t>23/04/2012</a:t>
             </a:fld>
             <a:endParaRPr lang="pt-BR"/>
           </a:p>
@@ -6847,7 +6847,7 @@
               <a:pPr>
                 <a:defRPr/>
               </a:pPr>
-              <a:t>‹nº›</a:t>
+              <a:t>‹#›</a:t>
             </a:fld>
             <a:endParaRPr lang="pt-BR"/>
           </a:p>
@@ -7266,7 +7266,7 @@
               <a:pPr>
                 <a:defRPr/>
               </a:pPr>
-              <a:t>22/04/2012</a:t>
+              <a:t>23/04/2012</a:t>
             </a:fld>
             <a:endParaRPr lang="pt-BR"/>
           </a:p>
@@ -7369,7 +7369,7 @@
               <a:pPr>
                 <a:defRPr/>
               </a:pPr>
-              <a:t>‹nº›</a:t>
+              <a:t>‹#›</a:t>
             </a:fld>
             <a:endParaRPr lang="pt-BR"/>
           </a:p>
@@ -14077,11 +14077,7 @@
             </a:r>
             <a:r>
               <a:rPr lang="pt-BR" sz="2400" dirty="0" smtClean="0"/>
-              <a:t> </a:t>
-            </a:r>
-            <a:r>
-              <a:rPr lang="pt-BR" sz="2400" dirty="0" smtClean="0"/>
-              <a:t>{</a:t>
+              <a:t> {</a:t>
             </a:r>
           </a:p>
           <a:p>
@@ -20139,11 +20135,7 @@
             </a:r>
             <a:r>
               <a:rPr lang="pt-BR" sz="2400" dirty="0" smtClean="0"/>
-              <a:t> </a:t>
-            </a:r>
-            <a:r>
-              <a:rPr lang="pt-BR" sz="2400" dirty="0" smtClean="0"/>
-              <a:t>{</a:t>
+              <a:t> {</a:t>
             </a:r>
           </a:p>
           <a:p>
@@ -22747,328 +22739,6 @@
           </p:style>
         </p:cxnSp>
       </p:grpSp>
-      <p:grpSp>
-        <p:nvGrpSpPr>
-          <p:cNvPr id="120" name="Grupo 119"/>
-          <p:cNvGrpSpPr/>
-          <p:nvPr/>
-        </p:nvGrpSpPr>
-        <p:grpSpPr>
-          <a:xfrm>
-            <a:off x="2843808" y="2348880"/>
-            <a:ext cx="216024" cy="216024"/>
-            <a:chOff x="3851920" y="1556792"/>
-            <a:chExt cx="1008112" cy="1008112"/>
-          </a:xfrm>
-          <a:solidFill>
-            <a:schemeClr val="accent1"/>
-          </a:solidFill>
-        </p:grpSpPr>
-        <p:sp>
-          <p:nvSpPr>
-            <p:cNvPr id="121" name="Retângulo 120"/>
-            <p:cNvSpPr/>
-            <p:nvPr/>
-          </p:nvSpPr>
-          <p:spPr>
-            <a:xfrm>
-              <a:off x="3851920" y="1556792"/>
-              <a:ext cx="1008112" cy="1008112"/>
-            </a:xfrm>
-            <a:prstGeom prst="rect">
-              <a:avLst/>
-            </a:prstGeom>
-            <a:grpFill/>
-            <a:ln w="28575">
-              <a:solidFill>
-                <a:schemeClr val="tx1"/>
-              </a:solidFill>
-            </a:ln>
-          </p:spPr>
-          <p:style>
-            <a:lnRef idx="2">
-              <a:schemeClr val="accent1">
-                <a:shade val="50000"/>
-              </a:schemeClr>
-            </a:lnRef>
-            <a:fillRef idx="1">
-              <a:schemeClr val="accent1"/>
-            </a:fillRef>
-            <a:effectRef idx="0">
-              <a:schemeClr val="accent1"/>
-            </a:effectRef>
-            <a:fontRef idx="minor">
-              <a:schemeClr val="lt1"/>
-            </a:fontRef>
-          </p:style>
-          <p:txBody>
-            <a:bodyPr rtlCol="0" anchor="ctr"/>
-            <a:lstStyle/>
-            <a:p>
-              <a:pPr algn="ctr"/>
-              <a:endParaRPr lang="pt-BR"/>
-            </a:p>
-          </p:txBody>
-        </p:sp>
-        <p:cxnSp>
-          <p:nvCxnSpPr>
-            <p:cNvPr id="122" name="Conector reto 121"/>
-            <p:cNvCxnSpPr/>
-            <p:nvPr/>
-          </p:nvCxnSpPr>
-          <p:spPr>
-            <a:xfrm>
-              <a:off x="4067944" y="1772816"/>
-              <a:ext cx="576064" cy="576064"/>
-            </a:xfrm>
-            <a:prstGeom prst="line">
-              <a:avLst/>
-            </a:prstGeom>
-            <a:grpFill/>
-            <a:ln w="28575">
-              <a:solidFill>
-                <a:schemeClr val="tx1"/>
-              </a:solidFill>
-            </a:ln>
-          </p:spPr>
-          <p:style>
-            <a:lnRef idx="1">
-              <a:schemeClr val="accent1"/>
-            </a:lnRef>
-            <a:fillRef idx="0">
-              <a:schemeClr val="accent1"/>
-            </a:fillRef>
-            <a:effectRef idx="0">
-              <a:schemeClr val="accent1"/>
-            </a:effectRef>
-            <a:fontRef idx="minor">
-              <a:schemeClr val="tx1"/>
-            </a:fontRef>
-          </p:style>
-        </p:cxnSp>
-        <p:cxnSp>
-          <p:nvCxnSpPr>
-            <p:cNvPr id="123" name="Conector reto 122"/>
-            <p:cNvCxnSpPr/>
-            <p:nvPr/>
-          </p:nvCxnSpPr>
-          <p:spPr>
-            <a:xfrm flipV="1">
-              <a:off x="4067944" y="1772816"/>
-              <a:ext cx="576064" cy="576064"/>
-            </a:xfrm>
-            <a:prstGeom prst="line">
-              <a:avLst/>
-            </a:prstGeom>
-            <a:grpFill/>
-            <a:ln w="28575">
-              <a:solidFill>
-                <a:schemeClr val="tx1"/>
-              </a:solidFill>
-            </a:ln>
-          </p:spPr>
-          <p:style>
-            <a:lnRef idx="1">
-              <a:schemeClr val="accent1"/>
-            </a:lnRef>
-            <a:fillRef idx="0">
-              <a:schemeClr val="accent1"/>
-            </a:fillRef>
-            <a:effectRef idx="0">
-              <a:schemeClr val="accent1"/>
-            </a:effectRef>
-            <a:fontRef idx="minor">
-              <a:schemeClr val="tx1"/>
-            </a:fontRef>
-          </p:style>
-        </p:cxnSp>
-      </p:grpSp>
-      <p:sp>
-        <p:nvSpPr>
-          <p:cNvPr id="70" name="Símbolo de 'Não' 69"/>
-          <p:cNvSpPr/>
-          <p:nvPr/>
-        </p:nvSpPr>
-        <p:spPr>
-          <a:xfrm>
-            <a:off x="8388424" y="2276872"/>
-            <a:ext cx="360040" cy="360040"/>
-          </a:xfrm>
-          <a:prstGeom prst="noSmoking">
-            <a:avLst/>
-          </a:prstGeom>
-          <a:solidFill>
-            <a:srgbClr val="FF0000"/>
-          </a:solidFill>
-          <a:ln>
-            <a:noFill/>
-          </a:ln>
-        </p:spPr>
-        <p:style>
-          <a:lnRef idx="2">
-            <a:schemeClr val="accent1">
-              <a:shade val="50000"/>
-            </a:schemeClr>
-          </a:lnRef>
-          <a:fillRef idx="1">
-            <a:schemeClr val="accent1"/>
-          </a:fillRef>
-          <a:effectRef idx="0">
-            <a:schemeClr val="accent1"/>
-          </a:effectRef>
-          <a:fontRef idx="minor">
-            <a:schemeClr val="lt1"/>
-          </a:fontRef>
-        </p:style>
-        <p:txBody>
-          <a:bodyPr rtlCol="0" anchor="ctr"/>
-          <a:lstStyle/>
-          <a:p>
-            <a:pPr algn="ctr"/>
-            <a:endParaRPr lang="pt-BR">
-              <a:solidFill>
-                <a:schemeClr val="tx1"/>
-              </a:solidFill>
-            </a:endParaRPr>
-          </a:p>
-        </p:txBody>
-      </p:sp>
-      <p:grpSp>
-        <p:nvGrpSpPr>
-          <p:cNvPr id="76" name="Grupo 75"/>
-          <p:cNvGrpSpPr/>
-          <p:nvPr/>
-        </p:nvGrpSpPr>
-        <p:grpSpPr>
-          <a:xfrm>
-            <a:off x="8460432" y="2348880"/>
-            <a:ext cx="216024" cy="216024"/>
-            <a:chOff x="3851920" y="1556792"/>
-            <a:chExt cx="1008112" cy="1008112"/>
-          </a:xfrm>
-          <a:solidFill>
-            <a:schemeClr val="accent1"/>
-          </a:solidFill>
-        </p:grpSpPr>
-        <p:sp>
-          <p:nvSpPr>
-            <p:cNvPr id="78" name="Retângulo 77"/>
-            <p:cNvSpPr/>
-            <p:nvPr/>
-          </p:nvSpPr>
-          <p:spPr>
-            <a:xfrm>
-              <a:off x="3851920" y="1556792"/>
-              <a:ext cx="1008112" cy="1008112"/>
-            </a:xfrm>
-            <a:prstGeom prst="rect">
-              <a:avLst/>
-            </a:prstGeom>
-            <a:grpFill/>
-            <a:ln w="28575">
-              <a:solidFill>
-                <a:schemeClr val="tx1"/>
-              </a:solidFill>
-            </a:ln>
-          </p:spPr>
-          <p:style>
-            <a:lnRef idx="2">
-              <a:schemeClr val="accent1">
-                <a:shade val="50000"/>
-              </a:schemeClr>
-            </a:lnRef>
-            <a:fillRef idx="1">
-              <a:schemeClr val="accent1"/>
-            </a:fillRef>
-            <a:effectRef idx="0">
-              <a:schemeClr val="accent1"/>
-            </a:effectRef>
-            <a:fontRef idx="minor">
-              <a:schemeClr val="lt1"/>
-            </a:fontRef>
-          </p:style>
-          <p:txBody>
-            <a:bodyPr rtlCol="0" anchor="ctr"/>
-            <a:lstStyle/>
-            <a:p>
-              <a:pPr algn="ctr"/>
-              <a:endParaRPr lang="pt-BR"/>
-            </a:p>
-          </p:txBody>
-        </p:sp>
-        <p:cxnSp>
-          <p:nvCxnSpPr>
-            <p:cNvPr id="81" name="Conector reto 80"/>
-            <p:cNvCxnSpPr/>
-            <p:nvPr/>
-          </p:nvCxnSpPr>
-          <p:spPr>
-            <a:xfrm>
-              <a:off x="4067944" y="1772816"/>
-              <a:ext cx="576064" cy="576064"/>
-            </a:xfrm>
-            <a:prstGeom prst="line">
-              <a:avLst/>
-            </a:prstGeom>
-            <a:grpFill/>
-            <a:ln w="28575">
-              <a:solidFill>
-                <a:schemeClr val="tx1"/>
-              </a:solidFill>
-            </a:ln>
-          </p:spPr>
-          <p:style>
-            <a:lnRef idx="1">
-              <a:schemeClr val="accent1"/>
-            </a:lnRef>
-            <a:fillRef idx="0">
-              <a:schemeClr val="accent1"/>
-            </a:fillRef>
-            <a:effectRef idx="0">
-              <a:schemeClr val="accent1"/>
-            </a:effectRef>
-            <a:fontRef idx="minor">
-              <a:schemeClr val="tx1"/>
-            </a:fontRef>
-          </p:style>
-        </p:cxnSp>
-        <p:cxnSp>
-          <p:nvCxnSpPr>
-            <p:cNvPr id="82" name="Conector reto 81"/>
-            <p:cNvCxnSpPr/>
-            <p:nvPr/>
-          </p:nvCxnSpPr>
-          <p:spPr>
-            <a:xfrm flipV="1">
-              <a:off x="4067944" y="1772816"/>
-              <a:ext cx="576064" cy="576064"/>
-            </a:xfrm>
-            <a:prstGeom prst="line">
-              <a:avLst/>
-            </a:prstGeom>
-            <a:grpFill/>
-            <a:ln w="28575">
-              <a:solidFill>
-                <a:schemeClr val="tx1"/>
-              </a:solidFill>
-            </a:ln>
-          </p:spPr>
-          <p:style>
-            <a:lnRef idx="1">
-              <a:schemeClr val="accent1"/>
-            </a:lnRef>
-            <a:fillRef idx="0">
-              <a:schemeClr val="accent1"/>
-            </a:fillRef>
-            <a:effectRef idx="0">
-              <a:schemeClr val="accent1"/>
-            </a:effectRef>
-            <a:fontRef idx="minor">
-              <a:schemeClr val="tx1"/>
-            </a:fontRef>
-          </p:style>
-        </p:cxnSp>
-      </p:grpSp>
       <p:sp>
         <p:nvSpPr>
           <p:cNvPr id="83" name="Retângulo 82"/>
@@ -23120,25 +22790,1772 @@
       </p:sp>
       <p:sp>
         <p:nvSpPr>
-          <p:cNvPr id="95" name="Retângulo 94"/>
+          <p:cNvPr id="96" name="Lock"/>
+          <p:cNvSpPr>
+            <a:spLocks noEditPoints="1" noChangeArrowheads="1"/>
+          </p:cNvSpPr>
+          <p:nvPr/>
+        </p:nvSpPr>
+        <p:spPr bwMode="auto">
+          <a:xfrm>
+            <a:off x="4143372" y="4572008"/>
+            <a:ext cx="214314" cy="285752"/>
+          </a:xfrm>
+          <a:custGeom>
+            <a:avLst/>
+            <a:gdLst>
+              <a:gd name="T0" fmla="*/ 10800 w 21600"/>
+              <a:gd name="T1" fmla="*/ 0 h 21600"/>
+              <a:gd name="T2" fmla="*/ 21600 w 21600"/>
+              <a:gd name="T3" fmla="*/ 9606 h 21600"/>
+              <a:gd name="T4" fmla="*/ 10800 w 21600"/>
+              <a:gd name="T5" fmla="*/ 21600 h 21600"/>
+              <a:gd name="T6" fmla="*/ 0 w 21600"/>
+              <a:gd name="T7" fmla="*/ 9606 h 21600"/>
+              <a:gd name="T8" fmla="*/ 744 w 21600"/>
+              <a:gd name="T9" fmla="*/ 9904 h 21600"/>
+              <a:gd name="T10" fmla="*/ 21134 w 21600"/>
+              <a:gd name="T11" fmla="*/ 15335 h 21600"/>
+            </a:gdLst>
+            <a:ahLst/>
+            <a:cxnLst>
+              <a:cxn ang="0">
+                <a:pos x="T0" y="T1"/>
+              </a:cxn>
+              <a:cxn ang="0">
+                <a:pos x="T2" y="T3"/>
+              </a:cxn>
+              <a:cxn ang="0">
+                <a:pos x="T4" y="T5"/>
+              </a:cxn>
+              <a:cxn ang="0">
+                <a:pos x="T6" y="T7"/>
+              </a:cxn>
+            </a:cxnLst>
+            <a:rect l="T8" t="T9" r="T10" b="T11"/>
+            <a:pathLst>
+              <a:path w="21600" h="21600" extrusionOk="0">
+                <a:moveTo>
+                  <a:pt x="93" y="9606"/>
+                </a:moveTo>
+                <a:lnTo>
+                  <a:pt x="2048" y="9606"/>
+                </a:lnTo>
+                <a:lnTo>
+                  <a:pt x="2048" y="4713"/>
+                </a:lnTo>
+                <a:lnTo>
+                  <a:pt x="2420" y="3818"/>
+                </a:lnTo>
+                <a:lnTo>
+                  <a:pt x="2979" y="3028"/>
+                </a:lnTo>
+                <a:lnTo>
+                  <a:pt x="3537" y="2446"/>
+                </a:lnTo>
+                <a:lnTo>
+                  <a:pt x="3956" y="1998"/>
+                </a:lnTo>
+                <a:lnTo>
+                  <a:pt x="4492" y="1581"/>
+                </a:lnTo>
+                <a:lnTo>
+                  <a:pt x="5143" y="1238"/>
+                </a:lnTo>
+                <a:lnTo>
+                  <a:pt x="5912" y="880"/>
+                </a:lnTo>
+                <a:lnTo>
+                  <a:pt x="6587" y="641"/>
+                </a:lnTo>
+                <a:lnTo>
+                  <a:pt x="7518" y="372"/>
+                </a:lnTo>
+                <a:lnTo>
+                  <a:pt x="8425" y="208"/>
+                </a:lnTo>
+                <a:lnTo>
+                  <a:pt x="9496" y="59"/>
+                </a:lnTo>
+                <a:lnTo>
+                  <a:pt x="10637" y="14"/>
+                </a:lnTo>
+                <a:lnTo>
+                  <a:pt x="11614" y="59"/>
+                </a:lnTo>
+                <a:lnTo>
+                  <a:pt x="12382" y="119"/>
+                </a:lnTo>
+                <a:lnTo>
+                  <a:pt x="13034" y="253"/>
+                </a:lnTo>
+                <a:lnTo>
+                  <a:pt x="13779" y="417"/>
+                </a:lnTo>
+                <a:lnTo>
+                  <a:pt x="14500" y="611"/>
+                </a:lnTo>
+                <a:lnTo>
+                  <a:pt x="14733" y="686"/>
+                </a:lnTo>
+                <a:lnTo>
+                  <a:pt x="14989" y="790"/>
+                </a:lnTo>
+                <a:lnTo>
+                  <a:pt x="15175" y="865"/>
+                </a:lnTo>
+                <a:lnTo>
+                  <a:pt x="15385" y="954"/>
+                </a:lnTo>
+                <a:lnTo>
+                  <a:pt x="15431" y="969"/>
+                </a:lnTo>
+                <a:lnTo>
+                  <a:pt x="15594" y="1059"/>
+                </a:lnTo>
+                <a:lnTo>
+                  <a:pt x="15757" y="1148"/>
+                </a:lnTo>
+                <a:lnTo>
+                  <a:pt x="15920" y="1267"/>
+                </a:lnTo>
+                <a:lnTo>
+                  <a:pt x="16106" y="1372"/>
+                </a:lnTo>
+                <a:lnTo>
+                  <a:pt x="16665" y="1730"/>
+                </a:lnTo>
+                <a:lnTo>
+                  <a:pt x="17014" y="1998"/>
+                </a:lnTo>
+                <a:lnTo>
+                  <a:pt x="17480" y="2356"/>
+                </a:lnTo>
+                <a:lnTo>
+                  <a:pt x="17852" y="2804"/>
+                </a:lnTo>
+                <a:lnTo>
+                  <a:pt x="18178" y="3192"/>
+                </a:lnTo>
+                <a:lnTo>
+                  <a:pt x="18527" y="3639"/>
+                </a:lnTo>
+                <a:lnTo>
+                  <a:pt x="18806" y="4132"/>
+                </a:lnTo>
+                <a:lnTo>
+                  <a:pt x="19086" y="4713"/>
+                </a:lnTo>
+                <a:lnTo>
+                  <a:pt x="19272" y="5191"/>
+                </a:lnTo>
+                <a:lnTo>
+                  <a:pt x="19295" y="9606"/>
+                </a:lnTo>
+                <a:lnTo>
+                  <a:pt x="21600" y="9606"/>
+                </a:lnTo>
+                <a:lnTo>
+                  <a:pt x="21600" y="16289"/>
+                </a:lnTo>
+                <a:lnTo>
+                  <a:pt x="21413" y="17184"/>
+                </a:lnTo>
+                <a:lnTo>
+                  <a:pt x="21041" y="17900"/>
+                </a:lnTo>
+                <a:lnTo>
+                  <a:pt x="20668" y="18377"/>
+                </a:lnTo>
+                <a:lnTo>
+                  <a:pt x="20343" y="18855"/>
+                </a:lnTo>
+                <a:lnTo>
+                  <a:pt x="19924" y="19332"/>
+                </a:lnTo>
+                <a:lnTo>
+                  <a:pt x="19388" y="19809"/>
+                </a:lnTo>
+                <a:lnTo>
+                  <a:pt x="18806" y="20242"/>
+                </a:lnTo>
+                <a:lnTo>
+                  <a:pt x="18062" y="20585"/>
+                </a:lnTo>
+                <a:lnTo>
+                  <a:pt x="17270" y="20883"/>
+                </a:lnTo>
+                <a:lnTo>
+                  <a:pt x="16525" y="21182"/>
+                </a:lnTo>
+                <a:lnTo>
+                  <a:pt x="15548" y="21420"/>
+                </a:lnTo>
+                <a:lnTo>
+                  <a:pt x="14803" y="21540"/>
+                </a:lnTo>
+                <a:lnTo>
+                  <a:pt x="13662" y="21674"/>
+                </a:lnTo>
+                <a:lnTo>
+                  <a:pt x="8379" y="21659"/>
+                </a:lnTo>
+                <a:lnTo>
+                  <a:pt x="7168" y="21540"/>
+                </a:lnTo>
+                <a:lnTo>
+                  <a:pt x="6098" y="21331"/>
+                </a:lnTo>
+                <a:lnTo>
+                  <a:pt x="5050" y="21092"/>
+                </a:lnTo>
+                <a:lnTo>
+                  <a:pt x="4003" y="20764"/>
+                </a:lnTo>
+                <a:lnTo>
+                  <a:pt x="3258" y="20391"/>
+                </a:lnTo>
+                <a:lnTo>
+                  <a:pt x="2769" y="20123"/>
+                </a:lnTo>
+                <a:lnTo>
+                  <a:pt x="2281" y="19720"/>
+                </a:lnTo>
+                <a:lnTo>
+                  <a:pt x="1862" y="19407"/>
+                </a:lnTo>
+                <a:lnTo>
+                  <a:pt x="1489" y="19079"/>
+                </a:lnTo>
+                <a:lnTo>
+                  <a:pt x="1070" y="18676"/>
+                </a:lnTo>
+                <a:lnTo>
+                  <a:pt x="744" y="18258"/>
+                </a:lnTo>
+                <a:lnTo>
+                  <a:pt x="325" y="17661"/>
+                </a:lnTo>
+                <a:lnTo>
+                  <a:pt x="162" y="17035"/>
+                </a:lnTo>
+                <a:lnTo>
+                  <a:pt x="93" y="16468"/>
+                </a:lnTo>
+                <a:lnTo>
+                  <a:pt x="93" y="9606"/>
+                </a:lnTo>
+                <a:close/>
+                <a:moveTo>
+                  <a:pt x="6098" y="9591"/>
+                </a:moveTo>
+                <a:lnTo>
+                  <a:pt x="6098" y="5220"/>
+                </a:lnTo>
+                <a:lnTo>
+                  <a:pt x="6191" y="4907"/>
+                </a:lnTo>
+                <a:lnTo>
+                  <a:pt x="6307" y="4639"/>
+                </a:lnTo>
+                <a:lnTo>
+                  <a:pt x="6517" y="4370"/>
+                </a:lnTo>
+                <a:lnTo>
+                  <a:pt x="6680" y="4087"/>
+                </a:lnTo>
+                <a:lnTo>
+                  <a:pt x="6889" y="3878"/>
+                </a:lnTo>
+                <a:lnTo>
+                  <a:pt x="7308" y="3520"/>
+                </a:lnTo>
+                <a:lnTo>
+                  <a:pt x="7843" y="3281"/>
+                </a:lnTo>
+                <a:lnTo>
+                  <a:pt x="8402" y="3013"/>
+                </a:lnTo>
+                <a:lnTo>
+                  <a:pt x="9031" y="2834"/>
+                </a:lnTo>
+                <a:lnTo>
+                  <a:pt x="9659" y="2700"/>
+                </a:lnTo>
+                <a:lnTo>
+                  <a:pt x="10497" y="2625"/>
+                </a:lnTo>
+                <a:lnTo>
+                  <a:pt x="11125" y="2655"/>
+                </a:lnTo>
+                <a:lnTo>
+                  <a:pt x="11987" y="2789"/>
+                </a:lnTo>
+                <a:lnTo>
+                  <a:pt x="12522" y="2893"/>
+                </a:lnTo>
+                <a:lnTo>
+                  <a:pt x="13011" y="3028"/>
+                </a:lnTo>
+                <a:lnTo>
+                  <a:pt x="13290" y="3192"/>
+                </a:lnTo>
+                <a:lnTo>
+                  <a:pt x="13709" y="3371"/>
+                </a:lnTo>
+                <a:lnTo>
+                  <a:pt x="13872" y="3505"/>
+                </a:lnTo>
+                <a:lnTo>
+                  <a:pt x="14058" y="3639"/>
+                </a:lnTo>
+                <a:lnTo>
+                  <a:pt x="14291" y="3788"/>
+                </a:lnTo>
+                <a:lnTo>
+                  <a:pt x="14431" y="3953"/>
+                </a:lnTo>
+                <a:lnTo>
+                  <a:pt x="14617" y="4102"/>
+                </a:lnTo>
+                <a:lnTo>
+                  <a:pt x="14826" y="4311"/>
+                </a:lnTo>
+                <a:lnTo>
+                  <a:pt x="14919" y="4534"/>
+                </a:lnTo>
+                <a:lnTo>
+                  <a:pt x="15036" y="4773"/>
+                </a:lnTo>
+                <a:lnTo>
+                  <a:pt x="15175" y="5027"/>
+                </a:lnTo>
+                <a:lnTo>
+                  <a:pt x="15245" y="5220"/>
+                </a:lnTo>
+                <a:lnTo>
+                  <a:pt x="15245" y="9591"/>
+                </a:lnTo>
+                <a:lnTo>
+                  <a:pt x="6098" y="9591"/>
+                </a:lnTo>
+                <a:close/>
+              </a:path>
+              <a:path w="21600" h="21600" extrusionOk="0">
+                <a:moveTo>
+                  <a:pt x="93" y="9606"/>
+                </a:moveTo>
+                <a:lnTo>
+                  <a:pt x="21600" y="9606"/>
+                </a:lnTo>
+                <a:close/>
+              </a:path>
+              <a:path w="21600" h="21600" extrusionOk="0">
+                <a:moveTo>
+                  <a:pt x="11684" y="17109"/>
+                </a:moveTo>
+                <a:lnTo>
+                  <a:pt x="12266" y="19317"/>
+                </a:lnTo>
+                <a:lnTo>
+                  <a:pt x="9659" y="19317"/>
+                </a:lnTo>
+                <a:lnTo>
+                  <a:pt x="10287" y="17124"/>
+                </a:lnTo>
+                <a:lnTo>
+                  <a:pt x="10008" y="16975"/>
+                </a:lnTo>
+                <a:lnTo>
+                  <a:pt x="9799" y="16722"/>
+                </a:lnTo>
+                <a:lnTo>
+                  <a:pt x="9752" y="16408"/>
+                </a:lnTo>
+                <a:lnTo>
+                  <a:pt x="9822" y="16170"/>
+                </a:lnTo>
+                <a:lnTo>
+                  <a:pt x="10008" y="16006"/>
+                </a:lnTo>
+                <a:lnTo>
+                  <a:pt x="10148" y="15871"/>
+                </a:lnTo>
+                <a:lnTo>
+                  <a:pt x="10381" y="15782"/>
+                </a:lnTo>
+                <a:lnTo>
+                  <a:pt x="10660" y="15692"/>
+                </a:lnTo>
+                <a:lnTo>
+                  <a:pt x="11009" y="15677"/>
+                </a:lnTo>
+                <a:lnTo>
+                  <a:pt x="11288" y="15722"/>
+                </a:lnTo>
+                <a:lnTo>
+                  <a:pt x="11614" y="15782"/>
+                </a:lnTo>
+                <a:lnTo>
+                  <a:pt x="11893" y="15946"/>
+                </a:lnTo>
+                <a:lnTo>
+                  <a:pt x="12033" y="16080"/>
+                </a:lnTo>
+                <a:lnTo>
+                  <a:pt x="12173" y="16229"/>
+                </a:lnTo>
+                <a:lnTo>
+                  <a:pt x="12196" y="16408"/>
+                </a:lnTo>
+                <a:lnTo>
+                  <a:pt x="12103" y="16722"/>
+                </a:lnTo>
+                <a:lnTo>
+                  <a:pt x="11987" y="16856"/>
+                </a:lnTo>
+                <a:lnTo>
+                  <a:pt x="11847" y="16975"/>
+                </a:lnTo>
+                <a:lnTo>
+                  <a:pt x="11684" y="17109"/>
+                </a:lnTo>
+              </a:path>
+            </a:pathLst>
+          </a:custGeom>
+          <a:solidFill>
+            <a:schemeClr val="accent1"/>
+          </a:solidFill>
+          <a:ln w="19050">
+            <a:solidFill>
+              <a:schemeClr val="tx1"/>
+            </a:solidFill>
+            <a:miter lim="800000"/>
+            <a:headEnd/>
+            <a:tailEnd/>
+          </a:ln>
+        </p:spPr>
+        <p:txBody>
+          <a:bodyPr vert="horz" wrap="square" lIns="91440" tIns="45720" rIns="91440" bIns="45720" numCol="1" anchor="t" anchorCtr="0" compatLnSpc="1">
+            <a:prstTxWarp prst="textNoShape">
+              <a:avLst/>
+            </a:prstTxWarp>
+          </a:bodyPr>
+          <a:lstStyle>
+            <a:defPPr>
+              <a:defRPr lang="pt-BR"/>
+            </a:defPPr>
+            <a:lvl1pPr algn="l" rtl="0" fontAlgn="base">
+              <a:spcBef>
+                <a:spcPct val="0"/>
+              </a:spcBef>
+              <a:spcAft>
+                <a:spcPct val="0"/>
+              </a:spcAft>
+              <a:defRPr kern="1200">
+                <a:solidFill>
+                  <a:schemeClr val="tx1"/>
+                </a:solidFill>
+                <a:latin typeface="Arial" charset="0"/>
+                <a:ea typeface="+mn-ea"/>
+                <a:cs typeface="Arial" charset="0"/>
+              </a:defRPr>
+            </a:lvl1pPr>
+            <a:lvl2pPr marL="457200" algn="l" rtl="0" fontAlgn="base">
+              <a:spcBef>
+                <a:spcPct val="0"/>
+              </a:spcBef>
+              <a:spcAft>
+                <a:spcPct val="0"/>
+              </a:spcAft>
+              <a:defRPr kern="1200">
+                <a:solidFill>
+                  <a:schemeClr val="tx1"/>
+                </a:solidFill>
+                <a:latin typeface="Arial" charset="0"/>
+                <a:ea typeface="+mn-ea"/>
+                <a:cs typeface="Arial" charset="0"/>
+              </a:defRPr>
+            </a:lvl2pPr>
+            <a:lvl3pPr marL="914400" algn="l" rtl="0" fontAlgn="base">
+              <a:spcBef>
+                <a:spcPct val="0"/>
+              </a:spcBef>
+              <a:spcAft>
+                <a:spcPct val="0"/>
+              </a:spcAft>
+              <a:defRPr kern="1200">
+                <a:solidFill>
+                  <a:schemeClr val="tx1"/>
+                </a:solidFill>
+                <a:latin typeface="Arial" charset="0"/>
+                <a:ea typeface="+mn-ea"/>
+                <a:cs typeface="Arial" charset="0"/>
+              </a:defRPr>
+            </a:lvl3pPr>
+            <a:lvl4pPr marL="1371600" algn="l" rtl="0" fontAlgn="base">
+              <a:spcBef>
+                <a:spcPct val="0"/>
+              </a:spcBef>
+              <a:spcAft>
+                <a:spcPct val="0"/>
+              </a:spcAft>
+              <a:defRPr kern="1200">
+                <a:solidFill>
+                  <a:schemeClr val="tx1"/>
+                </a:solidFill>
+                <a:latin typeface="Arial" charset="0"/>
+                <a:ea typeface="+mn-ea"/>
+                <a:cs typeface="Arial" charset="0"/>
+              </a:defRPr>
+            </a:lvl4pPr>
+            <a:lvl5pPr marL="1828800" algn="l" rtl="0" fontAlgn="base">
+              <a:spcBef>
+                <a:spcPct val="0"/>
+              </a:spcBef>
+              <a:spcAft>
+                <a:spcPct val="0"/>
+              </a:spcAft>
+              <a:defRPr kern="1200">
+                <a:solidFill>
+                  <a:schemeClr val="tx1"/>
+                </a:solidFill>
+                <a:latin typeface="Arial" charset="0"/>
+                <a:ea typeface="+mn-ea"/>
+                <a:cs typeface="Arial" charset="0"/>
+              </a:defRPr>
+            </a:lvl5pPr>
+            <a:lvl6pPr marL="2286000" algn="l" defTabSz="914400" rtl="0" eaLnBrk="1" latinLnBrk="0" hangingPunct="1">
+              <a:defRPr kern="1200">
+                <a:solidFill>
+                  <a:schemeClr val="tx1"/>
+                </a:solidFill>
+                <a:latin typeface="Arial" charset="0"/>
+                <a:ea typeface="+mn-ea"/>
+                <a:cs typeface="Arial" charset="0"/>
+              </a:defRPr>
+            </a:lvl6pPr>
+            <a:lvl7pPr marL="2743200" algn="l" defTabSz="914400" rtl="0" eaLnBrk="1" latinLnBrk="0" hangingPunct="1">
+              <a:defRPr kern="1200">
+                <a:solidFill>
+                  <a:schemeClr val="tx1"/>
+                </a:solidFill>
+                <a:latin typeface="Arial" charset="0"/>
+                <a:ea typeface="+mn-ea"/>
+                <a:cs typeface="Arial" charset="0"/>
+              </a:defRPr>
+            </a:lvl7pPr>
+            <a:lvl8pPr marL="3200400" algn="l" defTabSz="914400" rtl="0" eaLnBrk="1" latinLnBrk="0" hangingPunct="1">
+              <a:defRPr kern="1200">
+                <a:solidFill>
+                  <a:schemeClr val="tx1"/>
+                </a:solidFill>
+                <a:latin typeface="Arial" charset="0"/>
+                <a:ea typeface="+mn-ea"/>
+                <a:cs typeface="Arial" charset="0"/>
+              </a:defRPr>
+            </a:lvl8pPr>
+            <a:lvl9pPr marL="3657600" algn="l" defTabSz="914400" rtl="0" eaLnBrk="1" latinLnBrk="0" hangingPunct="1">
+              <a:defRPr kern="1200">
+                <a:solidFill>
+                  <a:schemeClr val="tx1"/>
+                </a:solidFill>
+                <a:latin typeface="Arial" charset="0"/>
+                <a:ea typeface="+mn-ea"/>
+                <a:cs typeface="Arial" charset="0"/>
+              </a:defRPr>
+            </a:lvl9pPr>
+          </a:lstStyle>
+          <a:p>
+            <a:endParaRPr lang="pt-BR"/>
+          </a:p>
+        </p:txBody>
+      </p:sp>
+      <p:sp>
+        <p:nvSpPr>
+          <p:cNvPr id="101" name="Lock"/>
+          <p:cNvSpPr>
+            <a:spLocks noEditPoints="1" noChangeArrowheads="1"/>
+          </p:cNvSpPr>
+          <p:nvPr/>
+        </p:nvSpPr>
+        <p:spPr bwMode="auto">
+          <a:xfrm>
+            <a:off x="2857488" y="2285992"/>
+            <a:ext cx="214314" cy="285752"/>
+          </a:xfrm>
+          <a:custGeom>
+            <a:avLst/>
+            <a:gdLst>
+              <a:gd name="T0" fmla="*/ 10800 w 21600"/>
+              <a:gd name="T1" fmla="*/ 0 h 21600"/>
+              <a:gd name="T2" fmla="*/ 21600 w 21600"/>
+              <a:gd name="T3" fmla="*/ 9606 h 21600"/>
+              <a:gd name="T4" fmla="*/ 10800 w 21600"/>
+              <a:gd name="T5" fmla="*/ 21600 h 21600"/>
+              <a:gd name="T6" fmla="*/ 0 w 21600"/>
+              <a:gd name="T7" fmla="*/ 9606 h 21600"/>
+              <a:gd name="T8" fmla="*/ 744 w 21600"/>
+              <a:gd name="T9" fmla="*/ 9904 h 21600"/>
+              <a:gd name="T10" fmla="*/ 21134 w 21600"/>
+              <a:gd name="T11" fmla="*/ 15335 h 21600"/>
+            </a:gdLst>
+            <a:ahLst/>
+            <a:cxnLst>
+              <a:cxn ang="0">
+                <a:pos x="T0" y="T1"/>
+              </a:cxn>
+              <a:cxn ang="0">
+                <a:pos x="T2" y="T3"/>
+              </a:cxn>
+              <a:cxn ang="0">
+                <a:pos x="T4" y="T5"/>
+              </a:cxn>
+              <a:cxn ang="0">
+                <a:pos x="T6" y="T7"/>
+              </a:cxn>
+            </a:cxnLst>
+            <a:rect l="T8" t="T9" r="T10" b="T11"/>
+            <a:pathLst>
+              <a:path w="21600" h="21600" extrusionOk="0">
+                <a:moveTo>
+                  <a:pt x="93" y="9606"/>
+                </a:moveTo>
+                <a:lnTo>
+                  <a:pt x="2048" y="9606"/>
+                </a:lnTo>
+                <a:lnTo>
+                  <a:pt x="2048" y="4713"/>
+                </a:lnTo>
+                <a:lnTo>
+                  <a:pt x="2420" y="3818"/>
+                </a:lnTo>
+                <a:lnTo>
+                  <a:pt x="2979" y="3028"/>
+                </a:lnTo>
+                <a:lnTo>
+                  <a:pt x="3537" y="2446"/>
+                </a:lnTo>
+                <a:lnTo>
+                  <a:pt x="3956" y="1998"/>
+                </a:lnTo>
+                <a:lnTo>
+                  <a:pt x="4492" y="1581"/>
+                </a:lnTo>
+                <a:lnTo>
+                  <a:pt x="5143" y="1238"/>
+                </a:lnTo>
+                <a:lnTo>
+                  <a:pt x="5912" y="880"/>
+                </a:lnTo>
+                <a:lnTo>
+                  <a:pt x="6587" y="641"/>
+                </a:lnTo>
+                <a:lnTo>
+                  <a:pt x="7518" y="372"/>
+                </a:lnTo>
+                <a:lnTo>
+                  <a:pt x="8425" y="208"/>
+                </a:lnTo>
+                <a:lnTo>
+                  <a:pt x="9496" y="59"/>
+                </a:lnTo>
+                <a:lnTo>
+                  <a:pt x="10637" y="14"/>
+                </a:lnTo>
+                <a:lnTo>
+                  <a:pt x="11614" y="59"/>
+                </a:lnTo>
+                <a:lnTo>
+                  <a:pt x="12382" y="119"/>
+                </a:lnTo>
+                <a:lnTo>
+                  <a:pt x="13034" y="253"/>
+                </a:lnTo>
+                <a:lnTo>
+                  <a:pt x="13779" y="417"/>
+                </a:lnTo>
+                <a:lnTo>
+                  <a:pt x="14500" y="611"/>
+                </a:lnTo>
+                <a:lnTo>
+                  <a:pt x="14733" y="686"/>
+                </a:lnTo>
+                <a:lnTo>
+                  <a:pt x="14989" y="790"/>
+                </a:lnTo>
+                <a:lnTo>
+                  <a:pt x="15175" y="865"/>
+                </a:lnTo>
+                <a:lnTo>
+                  <a:pt x="15385" y="954"/>
+                </a:lnTo>
+                <a:lnTo>
+                  <a:pt x="15431" y="969"/>
+                </a:lnTo>
+                <a:lnTo>
+                  <a:pt x="15594" y="1059"/>
+                </a:lnTo>
+                <a:lnTo>
+                  <a:pt x="15757" y="1148"/>
+                </a:lnTo>
+                <a:lnTo>
+                  <a:pt x="15920" y="1267"/>
+                </a:lnTo>
+                <a:lnTo>
+                  <a:pt x="16106" y="1372"/>
+                </a:lnTo>
+                <a:lnTo>
+                  <a:pt x="16665" y="1730"/>
+                </a:lnTo>
+                <a:lnTo>
+                  <a:pt x="17014" y="1998"/>
+                </a:lnTo>
+                <a:lnTo>
+                  <a:pt x="17480" y="2356"/>
+                </a:lnTo>
+                <a:lnTo>
+                  <a:pt x="17852" y="2804"/>
+                </a:lnTo>
+                <a:lnTo>
+                  <a:pt x="18178" y="3192"/>
+                </a:lnTo>
+                <a:lnTo>
+                  <a:pt x="18527" y="3639"/>
+                </a:lnTo>
+                <a:lnTo>
+                  <a:pt x="18806" y="4132"/>
+                </a:lnTo>
+                <a:lnTo>
+                  <a:pt x="19086" y="4713"/>
+                </a:lnTo>
+                <a:lnTo>
+                  <a:pt x="19272" y="5191"/>
+                </a:lnTo>
+                <a:lnTo>
+                  <a:pt x="19295" y="9606"/>
+                </a:lnTo>
+                <a:lnTo>
+                  <a:pt x="21600" y="9606"/>
+                </a:lnTo>
+                <a:lnTo>
+                  <a:pt x="21600" y="16289"/>
+                </a:lnTo>
+                <a:lnTo>
+                  <a:pt x="21413" y="17184"/>
+                </a:lnTo>
+                <a:lnTo>
+                  <a:pt x="21041" y="17900"/>
+                </a:lnTo>
+                <a:lnTo>
+                  <a:pt x="20668" y="18377"/>
+                </a:lnTo>
+                <a:lnTo>
+                  <a:pt x="20343" y="18855"/>
+                </a:lnTo>
+                <a:lnTo>
+                  <a:pt x="19924" y="19332"/>
+                </a:lnTo>
+                <a:lnTo>
+                  <a:pt x="19388" y="19809"/>
+                </a:lnTo>
+                <a:lnTo>
+                  <a:pt x="18806" y="20242"/>
+                </a:lnTo>
+                <a:lnTo>
+                  <a:pt x="18062" y="20585"/>
+                </a:lnTo>
+                <a:lnTo>
+                  <a:pt x="17270" y="20883"/>
+                </a:lnTo>
+                <a:lnTo>
+                  <a:pt x="16525" y="21182"/>
+                </a:lnTo>
+                <a:lnTo>
+                  <a:pt x="15548" y="21420"/>
+                </a:lnTo>
+                <a:lnTo>
+                  <a:pt x="14803" y="21540"/>
+                </a:lnTo>
+                <a:lnTo>
+                  <a:pt x="13662" y="21674"/>
+                </a:lnTo>
+                <a:lnTo>
+                  <a:pt x="8379" y="21659"/>
+                </a:lnTo>
+                <a:lnTo>
+                  <a:pt x="7168" y="21540"/>
+                </a:lnTo>
+                <a:lnTo>
+                  <a:pt x="6098" y="21331"/>
+                </a:lnTo>
+                <a:lnTo>
+                  <a:pt x="5050" y="21092"/>
+                </a:lnTo>
+                <a:lnTo>
+                  <a:pt x="4003" y="20764"/>
+                </a:lnTo>
+                <a:lnTo>
+                  <a:pt x="3258" y="20391"/>
+                </a:lnTo>
+                <a:lnTo>
+                  <a:pt x="2769" y="20123"/>
+                </a:lnTo>
+                <a:lnTo>
+                  <a:pt x="2281" y="19720"/>
+                </a:lnTo>
+                <a:lnTo>
+                  <a:pt x="1862" y="19407"/>
+                </a:lnTo>
+                <a:lnTo>
+                  <a:pt x="1489" y="19079"/>
+                </a:lnTo>
+                <a:lnTo>
+                  <a:pt x="1070" y="18676"/>
+                </a:lnTo>
+                <a:lnTo>
+                  <a:pt x="744" y="18258"/>
+                </a:lnTo>
+                <a:lnTo>
+                  <a:pt x="325" y="17661"/>
+                </a:lnTo>
+                <a:lnTo>
+                  <a:pt x="162" y="17035"/>
+                </a:lnTo>
+                <a:lnTo>
+                  <a:pt x="93" y="16468"/>
+                </a:lnTo>
+                <a:lnTo>
+                  <a:pt x="93" y="9606"/>
+                </a:lnTo>
+                <a:close/>
+                <a:moveTo>
+                  <a:pt x="6098" y="9591"/>
+                </a:moveTo>
+                <a:lnTo>
+                  <a:pt x="6098" y="5220"/>
+                </a:lnTo>
+                <a:lnTo>
+                  <a:pt x="6191" y="4907"/>
+                </a:lnTo>
+                <a:lnTo>
+                  <a:pt x="6307" y="4639"/>
+                </a:lnTo>
+                <a:lnTo>
+                  <a:pt x="6517" y="4370"/>
+                </a:lnTo>
+                <a:lnTo>
+                  <a:pt x="6680" y="4087"/>
+                </a:lnTo>
+                <a:lnTo>
+                  <a:pt x="6889" y="3878"/>
+                </a:lnTo>
+                <a:lnTo>
+                  <a:pt x="7308" y="3520"/>
+                </a:lnTo>
+                <a:lnTo>
+                  <a:pt x="7843" y="3281"/>
+                </a:lnTo>
+                <a:lnTo>
+                  <a:pt x="8402" y="3013"/>
+                </a:lnTo>
+                <a:lnTo>
+                  <a:pt x="9031" y="2834"/>
+                </a:lnTo>
+                <a:lnTo>
+                  <a:pt x="9659" y="2700"/>
+                </a:lnTo>
+                <a:lnTo>
+                  <a:pt x="10497" y="2625"/>
+                </a:lnTo>
+                <a:lnTo>
+                  <a:pt x="11125" y="2655"/>
+                </a:lnTo>
+                <a:lnTo>
+                  <a:pt x="11987" y="2789"/>
+                </a:lnTo>
+                <a:lnTo>
+                  <a:pt x="12522" y="2893"/>
+                </a:lnTo>
+                <a:lnTo>
+                  <a:pt x="13011" y="3028"/>
+                </a:lnTo>
+                <a:lnTo>
+                  <a:pt x="13290" y="3192"/>
+                </a:lnTo>
+                <a:lnTo>
+                  <a:pt x="13709" y="3371"/>
+                </a:lnTo>
+                <a:lnTo>
+                  <a:pt x="13872" y="3505"/>
+                </a:lnTo>
+                <a:lnTo>
+                  <a:pt x="14058" y="3639"/>
+                </a:lnTo>
+                <a:lnTo>
+                  <a:pt x="14291" y="3788"/>
+                </a:lnTo>
+                <a:lnTo>
+                  <a:pt x="14431" y="3953"/>
+                </a:lnTo>
+                <a:lnTo>
+                  <a:pt x="14617" y="4102"/>
+                </a:lnTo>
+                <a:lnTo>
+                  <a:pt x="14826" y="4311"/>
+                </a:lnTo>
+                <a:lnTo>
+                  <a:pt x="14919" y="4534"/>
+                </a:lnTo>
+                <a:lnTo>
+                  <a:pt x="15036" y="4773"/>
+                </a:lnTo>
+                <a:lnTo>
+                  <a:pt x="15175" y="5027"/>
+                </a:lnTo>
+                <a:lnTo>
+                  <a:pt x="15245" y="5220"/>
+                </a:lnTo>
+                <a:lnTo>
+                  <a:pt x="15245" y="9591"/>
+                </a:lnTo>
+                <a:lnTo>
+                  <a:pt x="6098" y="9591"/>
+                </a:lnTo>
+                <a:close/>
+              </a:path>
+              <a:path w="21600" h="21600" extrusionOk="0">
+                <a:moveTo>
+                  <a:pt x="93" y="9606"/>
+                </a:moveTo>
+                <a:lnTo>
+                  <a:pt x="21600" y="9606"/>
+                </a:lnTo>
+                <a:close/>
+              </a:path>
+              <a:path w="21600" h="21600" extrusionOk="0">
+                <a:moveTo>
+                  <a:pt x="11684" y="17109"/>
+                </a:moveTo>
+                <a:lnTo>
+                  <a:pt x="12266" y="19317"/>
+                </a:lnTo>
+                <a:lnTo>
+                  <a:pt x="9659" y="19317"/>
+                </a:lnTo>
+                <a:lnTo>
+                  <a:pt x="10287" y="17124"/>
+                </a:lnTo>
+                <a:lnTo>
+                  <a:pt x="10008" y="16975"/>
+                </a:lnTo>
+                <a:lnTo>
+                  <a:pt x="9799" y="16722"/>
+                </a:lnTo>
+                <a:lnTo>
+                  <a:pt x="9752" y="16408"/>
+                </a:lnTo>
+                <a:lnTo>
+                  <a:pt x="9822" y="16170"/>
+                </a:lnTo>
+                <a:lnTo>
+                  <a:pt x="10008" y="16006"/>
+                </a:lnTo>
+                <a:lnTo>
+                  <a:pt x="10148" y="15871"/>
+                </a:lnTo>
+                <a:lnTo>
+                  <a:pt x="10381" y="15782"/>
+                </a:lnTo>
+                <a:lnTo>
+                  <a:pt x="10660" y="15692"/>
+                </a:lnTo>
+                <a:lnTo>
+                  <a:pt x="11009" y="15677"/>
+                </a:lnTo>
+                <a:lnTo>
+                  <a:pt x="11288" y="15722"/>
+                </a:lnTo>
+                <a:lnTo>
+                  <a:pt x="11614" y="15782"/>
+                </a:lnTo>
+                <a:lnTo>
+                  <a:pt x="11893" y="15946"/>
+                </a:lnTo>
+                <a:lnTo>
+                  <a:pt x="12033" y="16080"/>
+                </a:lnTo>
+                <a:lnTo>
+                  <a:pt x="12173" y="16229"/>
+                </a:lnTo>
+                <a:lnTo>
+                  <a:pt x="12196" y="16408"/>
+                </a:lnTo>
+                <a:lnTo>
+                  <a:pt x="12103" y="16722"/>
+                </a:lnTo>
+                <a:lnTo>
+                  <a:pt x="11987" y="16856"/>
+                </a:lnTo>
+                <a:lnTo>
+                  <a:pt x="11847" y="16975"/>
+                </a:lnTo>
+                <a:lnTo>
+                  <a:pt x="11684" y="17109"/>
+                </a:lnTo>
+              </a:path>
+            </a:pathLst>
+          </a:custGeom>
+          <a:solidFill>
+            <a:schemeClr val="accent1"/>
+          </a:solidFill>
+          <a:ln w="19050">
+            <a:solidFill>
+              <a:schemeClr val="tx1"/>
+            </a:solidFill>
+            <a:miter lim="800000"/>
+            <a:headEnd/>
+            <a:tailEnd/>
+          </a:ln>
+        </p:spPr>
+        <p:txBody>
+          <a:bodyPr vert="horz" wrap="square" lIns="91440" tIns="45720" rIns="91440" bIns="45720" numCol="1" anchor="t" anchorCtr="0" compatLnSpc="1">
+            <a:prstTxWarp prst="textNoShape">
+              <a:avLst/>
+            </a:prstTxWarp>
+          </a:bodyPr>
+          <a:lstStyle>
+            <a:defPPr>
+              <a:defRPr lang="pt-BR"/>
+            </a:defPPr>
+            <a:lvl1pPr algn="l" rtl="0" fontAlgn="base">
+              <a:spcBef>
+                <a:spcPct val="0"/>
+              </a:spcBef>
+              <a:spcAft>
+                <a:spcPct val="0"/>
+              </a:spcAft>
+              <a:defRPr kern="1200">
+                <a:solidFill>
+                  <a:schemeClr val="tx1"/>
+                </a:solidFill>
+                <a:latin typeface="Arial" charset="0"/>
+                <a:ea typeface="+mn-ea"/>
+                <a:cs typeface="Arial" charset="0"/>
+              </a:defRPr>
+            </a:lvl1pPr>
+            <a:lvl2pPr marL="457200" algn="l" rtl="0" fontAlgn="base">
+              <a:spcBef>
+                <a:spcPct val="0"/>
+              </a:spcBef>
+              <a:spcAft>
+                <a:spcPct val="0"/>
+              </a:spcAft>
+              <a:defRPr kern="1200">
+                <a:solidFill>
+                  <a:schemeClr val="tx1"/>
+                </a:solidFill>
+                <a:latin typeface="Arial" charset="0"/>
+                <a:ea typeface="+mn-ea"/>
+                <a:cs typeface="Arial" charset="0"/>
+              </a:defRPr>
+            </a:lvl2pPr>
+            <a:lvl3pPr marL="914400" algn="l" rtl="0" fontAlgn="base">
+              <a:spcBef>
+                <a:spcPct val="0"/>
+              </a:spcBef>
+              <a:spcAft>
+                <a:spcPct val="0"/>
+              </a:spcAft>
+              <a:defRPr kern="1200">
+                <a:solidFill>
+                  <a:schemeClr val="tx1"/>
+                </a:solidFill>
+                <a:latin typeface="Arial" charset="0"/>
+                <a:ea typeface="+mn-ea"/>
+                <a:cs typeface="Arial" charset="0"/>
+              </a:defRPr>
+            </a:lvl3pPr>
+            <a:lvl4pPr marL="1371600" algn="l" rtl="0" fontAlgn="base">
+              <a:spcBef>
+                <a:spcPct val="0"/>
+              </a:spcBef>
+              <a:spcAft>
+                <a:spcPct val="0"/>
+              </a:spcAft>
+              <a:defRPr kern="1200">
+                <a:solidFill>
+                  <a:schemeClr val="tx1"/>
+                </a:solidFill>
+                <a:latin typeface="Arial" charset="0"/>
+                <a:ea typeface="+mn-ea"/>
+                <a:cs typeface="Arial" charset="0"/>
+              </a:defRPr>
+            </a:lvl4pPr>
+            <a:lvl5pPr marL="1828800" algn="l" rtl="0" fontAlgn="base">
+              <a:spcBef>
+                <a:spcPct val="0"/>
+              </a:spcBef>
+              <a:spcAft>
+                <a:spcPct val="0"/>
+              </a:spcAft>
+              <a:defRPr kern="1200">
+                <a:solidFill>
+                  <a:schemeClr val="tx1"/>
+                </a:solidFill>
+                <a:latin typeface="Arial" charset="0"/>
+                <a:ea typeface="+mn-ea"/>
+                <a:cs typeface="Arial" charset="0"/>
+              </a:defRPr>
+            </a:lvl5pPr>
+            <a:lvl6pPr marL="2286000" algn="l" defTabSz="914400" rtl="0" eaLnBrk="1" latinLnBrk="0" hangingPunct="1">
+              <a:defRPr kern="1200">
+                <a:solidFill>
+                  <a:schemeClr val="tx1"/>
+                </a:solidFill>
+                <a:latin typeface="Arial" charset="0"/>
+                <a:ea typeface="+mn-ea"/>
+                <a:cs typeface="Arial" charset="0"/>
+              </a:defRPr>
+            </a:lvl6pPr>
+            <a:lvl7pPr marL="2743200" algn="l" defTabSz="914400" rtl="0" eaLnBrk="1" latinLnBrk="0" hangingPunct="1">
+              <a:defRPr kern="1200">
+                <a:solidFill>
+                  <a:schemeClr val="tx1"/>
+                </a:solidFill>
+                <a:latin typeface="Arial" charset="0"/>
+                <a:ea typeface="+mn-ea"/>
+                <a:cs typeface="Arial" charset="0"/>
+              </a:defRPr>
+            </a:lvl7pPr>
+            <a:lvl8pPr marL="3200400" algn="l" defTabSz="914400" rtl="0" eaLnBrk="1" latinLnBrk="0" hangingPunct="1">
+              <a:defRPr kern="1200">
+                <a:solidFill>
+                  <a:schemeClr val="tx1"/>
+                </a:solidFill>
+                <a:latin typeface="Arial" charset="0"/>
+                <a:ea typeface="+mn-ea"/>
+                <a:cs typeface="Arial" charset="0"/>
+              </a:defRPr>
+            </a:lvl8pPr>
+            <a:lvl9pPr marL="3657600" algn="l" defTabSz="914400" rtl="0" eaLnBrk="1" latinLnBrk="0" hangingPunct="1">
+              <a:defRPr kern="1200">
+                <a:solidFill>
+                  <a:schemeClr val="tx1"/>
+                </a:solidFill>
+                <a:latin typeface="Arial" charset="0"/>
+                <a:ea typeface="+mn-ea"/>
+                <a:cs typeface="Arial" charset="0"/>
+              </a:defRPr>
+            </a:lvl9pPr>
+          </a:lstStyle>
+          <a:p>
+            <a:endParaRPr lang="pt-BR"/>
+          </a:p>
+        </p:txBody>
+      </p:sp>
+      <p:sp>
+        <p:nvSpPr>
+          <p:cNvPr id="104" name="Lock"/>
+          <p:cNvSpPr>
+            <a:spLocks noEditPoints="1" noChangeArrowheads="1"/>
+          </p:cNvSpPr>
+          <p:nvPr/>
+        </p:nvSpPr>
+        <p:spPr bwMode="auto">
+          <a:xfrm>
+            <a:off x="8501090" y="2285992"/>
+            <a:ext cx="214314" cy="285752"/>
+          </a:xfrm>
+          <a:custGeom>
+            <a:avLst/>
+            <a:gdLst>
+              <a:gd name="T0" fmla="*/ 10800 w 21600"/>
+              <a:gd name="T1" fmla="*/ 0 h 21600"/>
+              <a:gd name="T2" fmla="*/ 21600 w 21600"/>
+              <a:gd name="T3" fmla="*/ 9606 h 21600"/>
+              <a:gd name="T4" fmla="*/ 10800 w 21600"/>
+              <a:gd name="T5" fmla="*/ 21600 h 21600"/>
+              <a:gd name="T6" fmla="*/ 0 w 21600"/>
+              <a:gd name="T7" fmla="*/ 9606 h 21600"/>
+              <a:gd name="T8" fmla="*/ 744 w 21600"/>
+              <a:gd name="T9" fmla="*/ 9904 h 21600"/>
+              <a:gd name="T10" fmla="*/ 21134 w 21600"/>
+              <a:gd name="T11" fmla="*/ 15335 h 21600"/>
+            </a:gdLst>
+            <a:ahLst/>
+            <a:cxnLst>
+              <a:cxn ang="0">
+                <a:pos x="T0" y="T1"/>
+              </a:cxn>
+              <a:cxn ang="0">
+                <a:pos x="T2" y="T3"/>
+              </a:cxn>
+              <a:cxn ang="0">
+                <a:pos x="T4" y="T5"/>
+              </a:cxn>
+              <a:cxn ang="0">
+                <a:pos x="T6" y="T7"/>
+              </a:cxn>
+            </a:cxnLst>
+            <a:rect l="T8" t="T9" r="T10" b="T11"/>
+            <a:pathLst>
+              <a:path w="21600" h="21600" extrusionOk="0">
+                <a:moveTo>
+                  <a:pt x="93" y="9606"/>
+                </a:moveTo>
+                <a:lnTo>
+                  <a:pt x="2048" y="9606"/>
+                </a:lnTo>
+                <a:lnTo>
+                  <a:pt x="2048" y="4713"/>
+                </a:lnTo>
+                <a:lnTo>
+                  <a:pt x="2420" y="3818"/>
+                </a:lnTo>
+                <a:lnTo>
+                  <a:pt x="2979" y="3028"/>
+                </a:lnTo>
+                <a:lnTo>
+                  <a:pt x="3537" y="2446"/>
+                </a:lnTo>
+                <a:lnTo>
+                  <a:pt x="3956" y="1998"/>
+                </a:lnTo>
+                <a:lnTo>
+                  <a:pt x="4492" y="1581"/>
+                </a:lnTo>
+                <a:lnTo>
+                  <a:pt x="5143" y="1238"/>
+                </a:lnTo>
+                <a:lnTo>
+                  <a:pt x="5912" y="880"/>
+                </a:lnTo>
+                <a:lnTo>
+                  <a:pt x="6587" y="641"/>
+                </a:lnTo>
+                <a:lnTo>
+                  <a:pt x="7518" y="372"/>
+                </a:lnTo>
+                <a:lnTo>
+                  <a:pt x="8425" y="208"/>
+                </a:lnTo>
+                <a:lnTo>
+                  <a:pt x="9496" y="59"/>
+                </a:lnTo>
+                <a:lnTo>
+                  <a:pt x="10637" y="14"/>
+                </a:lnTo>
+                <a:lnTo>
+                  <a:pt x="11614" y="59"/>
+                </a:lnTo>
+                <a:lnTo>
+                  <a:pt x="12382" y="119"/>
+                </a:lnTo>
+                <a:lnTo>
+                  <a:pt x="13034" y="253"/>
+                </a:lnTo>
+                <a:lnTo>
+                  <a:pt x="13779" y="417"/>
+                </a:lnTo>
+                <a:lnTo>
+                  <a:pt x="14500" y="611"/>
+                </a:lnTo>
+                <a:lnTo>
+                  <a:pt x="14733" y="686"/>
+                </a:lnTo>
+                <a:lnTo>
+                  <a:pt x="14989" y="790"/>
+                </a:lnTo>
+                <a:lnTo>
+                  <a:pt x="15175" y="865"/>
+                </a:lnTo>
+                <a:lnTo>
+                  <a:pt x="15385" y="954"/>
+                </a:lnTo>
+                <a:lnTo>
+                  <a:pt x="15431" y="969"/>
+                </a:lnTo>
+                <a:lnTo>
+                  <a:pt x="15594" y="1059"/>
+                </a:lnTo>
+                <a:lnTo>
+                  <a:pt x="15757" y="1148"/>
+                </a:lnTo>
+                <a:lnTo>
+                  <a:pt x="15920" y="1267"/>
+                </a:lnTo>
+                <a:lnTo>
+                  <a:pt x="16106" y="1372"/>
+                </a:lnTo>
+                <a:lnTo>
+                  <a:pt x="16665" y="1730"/>
+                </a:lnTo>
+                <a:lnTo>
+                  <a:pt x="17014" y="1998"/>
+                </a:lnTo>
+                <a:lnTo>
+                  <a:pt x="17480" y="2356"/>
+                </a:lnTo>
+                <a:lnTo>
+                  <a:pt x="17852" y="2804"/>
+                </a:lnTo>
+                <a:lnTo>
+                  <a:pt x="18178" y="3192"/>
+                </a:lnTo>
+                <a:lnTo>
+                  <a:pt x="18527" y="3639"/>
+                </a:lnTo>
+                <a:lnTo>
+                  <a:pt x="18806" y="4132"/>
+                </a:lnTo>
+                <a:lnTo>
+                  <a:pt x="19086" y="4713"/>
+                </a:lnTo>
+                <a:lnTo>
+                  <a:pt x="19272" y="5191"/>
+                </a:lnTo>
+                <a:lnTo>
+                  <a:pt x="19295" y="9606"/>
+                </a:lnTo>
+                <a:lnTo>
+                  <a:pt x="21600" y="9606"/>
+                </a:lnTo>
+                <a:lnTo>
+                  <a:pt x="21600" y="16289"/>
+                </a:lnTo>
+                <a:lnTo>
+                  <a:pt x="21413" y="17184"/>
+                </a:lnTo>
+                <a:lnTo>
+                  <a:pt x="21041" y="17900"/>
+                </a:lnTo>
+                <a:lnTo>
+                  <a:pt x="20668" y="18377"/>
+                </a:lnTo>
+                <a:lnTo>
+                  <a:pt x="20343" y="18855"/>
+                </a:lnTo>
+                <a:lnTo>
+                  <a:pt x="19924" y="19332"/>
+                </a:lnTo>
+                <a:lnTo>
+                  <a:pt x="19388" y="19809"/>
+                </a:lnTo>
+                <a:lnTo>
+                  <a:pt x="18806" y="20242"/>
+                </a:lnTo>
+                <a:lnTo>
+                  <a:pt x="18062" y="20585"/>
+                </a:lnTo>
+                <a:lnTo>
+                  <a:pt x="17270" y="20883"/>
+                </a:lnTo>
+                <a:lnTo>
+                  <a:pt x="16525" y="21182"/>
+                </a:lnTo>
+                <a:lnTo>
+                  <a:pt x="15548" y="21420"/>
+                </a:lnTo>
+                <a:lnTo>
+                  <a:pt x="14803" y="21540"/>
+                </a:lnTo>
+                <a:lnTo>
+                  <a:pt x="13662" y="21674"/>
+                </a:lnTo>
+                <a:lnTo>
+                  <a:pt x="8379" y="21659"/>
+                </a:lnTo>
+                <a:lnTo>
+                  <a:pt x="7168" y="21540"/>
+                </a:lnTo>
+                <a:lnTo>
+                  <a:pt x="6098" y="21331"/>
+                </a:lnTo>
+                <a:lnTo>
+                  <a:pt x="5050" y="21092"/>
+                </a:lnTo>
+                <a:lnTo>
+                  <a:pt x="4003" y="20764"/>
+                </a:lnTo>
+                <a:lnTo>
+                  <a:pt x="3258" y="20391"/>
+                </a:lnTo>
+                <a:lnTo>
+                  <a:pt x="2769" y="20123"/>
+                </a:lnTo>
+                <a:lnTo>
+                  <a:pt x="2281" y="19720"/>
+                </a:lnTo>
+                <a:lnTo>
+                  <a:pt x="1862" y="19407"/>
+                </a:lnTo>
+                <a:lnTo>
+                  <a:pt x="1489" y="19079"/>
+                </a:lnTo>
+                <a:lnTo>
+                  <a:pt x="1070" y="18676"/>
+                </a:lnTo>
+                <a:lnTo>
+                  <a:pt x="744" y="18258"/>
+                </a:lnTo>
+                <a:lnTo>
+                  <a:pt x="325" y="17661"/>
+                </a:lnTo>
+                <a:lnTo>
+                  <a:pt x="162" y="17035"/>
+                </a:lnTo>
+                <a:lnTo>
+                  <a:pt x="93" y="16468"/>
+                </a:lnTo>
+                <a:lnTo>
+                  <a:pt x="93" y="9606"/>
+                </a:lnTo>
+                <a:close/>
+                <a:moveTo>
+                  <a:pt x="6098" y="9591"/>
+                </a:moveTo>
+                <a:lnTo>
+                  <a:pt x="6098" y="5220"/>
+                </a:lnTo>
+                <a:lnTo>
+                  <a:pt x="6191" y="4907"/>
+                </a:lnTo>
+                <a:lnTo>
+                  <a:pt x="6307" y="4639"/>
+                </a:lnTo>
+                <a:lnTo>
+                  <a:pt x="6517" y="4370"/>
+                </a:lnTo>
+                <a:lnTo>
+                  <a:pt x="6680" y="4087"/>
+                </a:lnTo>
+                <a:lnTo>
+                  <a:pt x="6889" y="3878"/>
+                </a:lnTo>
+                <a:lnTo>
+                  <a:pt x="7308" y="3520"/>
+                </a:lnTo>
+                <a:lnTo>
+                  <a:pt x="7843" y="3281"/>
+                </a:lnTo>
+                <a:lnTo>
+                  <a:pt x="8402" y="3013"/>
+                </a:lnTo>
+                <a:lnTo>
+                  <a:pt x="9031" y="2834"/>
+                </a:lnTo>
+                <a:lnTo>
+                  <a:pt x="9659" y="2700"/>
+                </a:lnTo>
+                <a:lnTo>
+                  <a:pt x="10497" y="2625"/>
+                </a:lnTo>
+                <a:lnTo>
+                  <a:pt x="11125" y="2655"/>
+                </a:lnTo>
+                <a:lnTo>
+                  <a:pt x="11987" y="2789"/>
+                </a:lnTo>
+                <a:lnTo>
+                  <a:pt x="12522" y="2893"/>
+                </a:lnTo>
+                <a:lnTo>
+                  <a:pt x="13011" y="3028"/>
+                </a:lnTo>
+                <a:lnTo>
+                  <a:pt x="13290" y="3192"/>
+                </a:lnTo>
+                <a:lnTo>
+                  <a:pt x="13709" y="3371"/>
+                </a:lnTo>
+                <a:lnTo>
+                  <a:pt x="13872" y="3505"/>
+                </a:lnTo>
+                <a:lnTo>
+                  <a:pt x="14058" y="3639"/>
+                </a:lnTo>
+                <a:lnTo>
+                  <a:pt x="14291" y="3788"/>
+                </a:lnTo>
+                <a:lnTo>
+                  <a:pt x="14431" y="3953"/>
+                </a:lnTo>
+                <a:lnTo>
+                  <a:pt x="14617" y="4102"/>
+                </a:lnTo>
+                <a:lnTo>
+                  <a:pt x="14826" y="4311"/>
+                </a:lnTo>
+                <a:lnTo>
+                  <a:pt x="14919" y="4534"/>
+                </a:lnTo>
+                <a:lnTo>
+                  <a:pt x="15036" y="4773"/>
+                </a:lnTo>
+                <a:lnTo>
+                  <a:pt x="15175" y="5027"/>
+                </a:lnTo>
+                <a:lnTo>
+                  <a:pt x="15245" y="5220"/>
+                </a:lnTo>
+                <a:lnTo>
+                  <a:pt x="15245" y="9591"/>
+                </a:lnTo>
+                <a:lnTo>
+                  <a:pt x="6098" y="9591"/>
+                </a:lnTo>
+                <a:close/>
+              </a:path>
+              <a:path w="21600" h="21600" extrusionOk="0">
+                <a:moveTo>
+                  <a:pt x="93" y="9606"/>
+                </a:moveTo>
+                <a:lnTo>
+                  <a:pt x="21600" y="9606"/>
+                </a:lnTo>
+                <a:close/>
+              </a:path>
+              <a:path w="21600" h="21600" extrusionOk="0">
+                <a:moveTo>
+                  <a:pt x="11684" y="17109"/>
+                </a:moveTo>
+                <a:lnTo>
+                  <a:pt x="12266" y="19317"/>
+                </a:lnTo>
+                <a:lnTo>
+                  <a:pt x="9659" y="19317"/>
+                </a:lnTo>
+                <a:lnTo>
+                  <a:pt x="10287" y="17124"/>
+                </a:lnTo>
+                <a:lnTo>
+                  <a:pt x="10008" y="16975"/>
+                </a:lnTo>
+                <a:lnTo>
+                  <a:pt x="9799" y="16722"/>
+                </a:lnTo>
+                <a:lnTo>
+                  <a:pt x="9752" y="16408"/>
+                </a:lnTo>
+                <a:lnTo>
+                  <a:pt x="9822" y="16170"/>
+                </a:lnTo>
+                <a:lnTo>
+                  <a:pt x="10008" y="16006"/>
+                </a:lnTo>
+                <a:lnTo>
+                  <a:pt x="10148" y="15871"/>
+                </a:lnTo>
+                <a:lnTo>
+                  <a:pt x="10381" y="15782"/>
+                </a:lnTo>
+                <a:lnTo>
+                  <a:pt x="10660" y="15692"/>
+                </a:lnTo>
+                <a:lnTo>
+                  <a:pt x="11009" y="15677"/>
+                </a:lnTo>
+                <a:lnTo>
+                  <a:pt x="11288" y="15722"/>
+                </a:lnTo>
+                <a:lnTo>
+                  <a:pt x="11614" y="15782"/>
+                </a:lnTo>
+                <a:lnTo>
+                  <a:pt x="11893" y="15946"/>
+                </a:lnTo>
+                <a:lnTo>
+                  <a:pt x="12033" y="16080"/>
+                </a:lnTo>
+                <a:lnTo>
+                  <a:pt x="12173" y="16229"/>
+                </a:lnTo>
+                <a:lnTo>
+                  <a:pt x="12196" y="16408"/>
+                </a:lnTo>
+                <a:lnTo>
+                  <a:pt x="12103" y="16722"/>
+                </a:lnTo>
+                <a:lnTo>
+                  <a:pt x="11987" y="16856"/>
+                </a:lnTo>
+                <a:lnTo>
+                  <a:pt x="11847" y="16975"/>
+                </a:lnTo>
+                <a:lnTo>
+                  <a:pt x="11684" y="17109"/>
+                </a:lnTo>
+              </a:path>
+            </a:pathLst>
+          </a:custGeom>
+          <a:solidFill>
+            <a:schemeClr val="accent1"/>
+          </a:solidFill>
+          <a:ln w="19050">
+            <a:solidFill>
+              <a:schemeClr val="tx1"/>
+            </a:solidFill>
+            <a:miter lim="800000"/>
+            <a:headEnd/>
+            <a:tailEnd/>
+          </a:ln>
+        </p:spPr>
+        <p:txBody>
+          <a:bodyPr vert="horz" wrap="square" lIns="91440" tIns="45720" rIns="91440" bIns="45720" numCol="1" anchor="t" anchorCtr="0" compatLnSpc="1">
+            <a:prstTxWarp prst="textNoShape">
+              <a:avLst/>
+            </a:prstTxWarp>
+          </a:bodyPr>
+          <a:lstStyle>
+            <a:defPPr>
+              <a:defRPr lang="pt-BR"/>
+            </a:defPPr>
+            <a:lvl1pPr algn="l" rtl="0" fontAlgn="base">
+              <a:spcBef>
+                <a:spcPct val="0"/>
+              </a:spcBef>
+              <a:spcAft>
+                <a:spcPct val="0"/>
+              </a:spcAft>
+              <a:defRPr kern="1200">
+                <a:solidFill>
+                  <a:schemeClr val="tx1"/>
+                </a:solidFill>
+                <a:latin typeface="Arial" charset="0"/>
+                <a:ea typeface="+mn-ea"/>
+                <a:cs typeface="Arial" charset="0"/>
+              </a:defRPr>
+            </a:lvl1pPr>
+            <a:lvl2pPr marL="457200" algn="l" rtl="0" fontAlgn="base">
+              <a:spcBef>
+                <a:spcPct val="0"/>
+              </a:spcBef>
+              <a:spcAft>
+                <a:spcPct val="0"/>
+              </a:spcAft>
+              <a:defRPr kern="1200">
+                <a:solidFill>
+                  <a:schemeClr val="tx1"/>
+                </a:solidFill>
+                <a:latin typeface="Arial" charset="0"/>
+                <a:ea typeface="+mn-ea"/>
+                <a:cs typeface="Arial" charset="0"/>
+              </a:defRPr>
+            </a:lvl2pPr>
+            <a:lvl3pPr marL="914400" algn="l" rtl="0" fontAlgn="base">
+              <a:spcBef>
+                <a:spcPct val="0"/>
+              </a:spcBef>
+              <a:spcAft>
+                <a:spcPct val="0"/>
+              </a:spcAft>
+              <a:defRPr kern="1200">
+                <a:solidFill>
+                  <a:schemeClr val="tx1"/>
+                </a:solidFill>
+                <a:latin typeface="Arial" charset="0"/>
+                <a:ea typeface="+mn-ea"/>
+                <a:cs typeface="Arial" charset="0"/>
+              </a:defRPr>
+            </a:lvl3pPr>
+            <a:lvl4pPr marL="1371600" algn="l" rtl="0" fontAlgn="base">
+              <a:spcBef>
+                <a:spcPct val="0"/>
+              </a:spcBef>
+              <a:spcAft>
+                <a:spcPct val="0"/>
+              </a:spcAft>
+              <a:defRPr kern="1200">
+                <a:solidFill>
+                  <a:schemeClr val="tx1"/>
+                </a:solidFill>
+                <a:latin typeface="Arial" charset="0"/>
+                <a:ea typeface="+mn-ea"/>
+                <a:cs typeface="Arial" charset="0"/>
+              </a:defRPr>
+            </a:lvl4pPr>
+            <a:lvl5pPr marL="1828800" algn="l" rtl="0" fontAlgn="base">
+              <a:spcBef>
+                <a:spcPct val="0"/>
+              </a:spcBef>
+              <a:spcAft>
+                <a:spcPct val="0"/>
+              </a:spcAft>
+              <a:defRPr kern="1200">
+                <a:solidFill>
+                  <a:schemeClr val="tx1"/>
+                </a:solidFill>
+                <a:latin typeface="Arial" charset="0"/>
+                <a:ea typeface="+mn-ea"/>
+                <a:cs typeface="Arial" charset="0"/>
+              </a:defRPr>
+            </a:lvl5pPr>
+            <a:lvl6pPr marL="2286000" algn="l" defTabSz="914400" rtl="0" eaLnBrk="1" latinLnBrk="0" hangingPunct="1">
+              <a:defRPr kern="1200">
+                <a:solidFill>
+                  <a:schemeClr val="tx1"/>
+                </a:solidFill>
+                <a:latin typeface="Arial" charset="0"/>
+                <a:ea typeface="+mn-ea"/>
+                <a:cs typeface="Arial" charset="0"/>
+              </a:defRPr>
+            </a:lvl6pPr>
+            <a:lvl7pPr marL="2743200" algn="l" defTabSz="914400" rtl="0" eaLnBrk="1" latinLnBrk="0" hangingPunct="1">
+              <a:defRPr kern="1200">
+                <a:solidFill>
+                  <a:schemeClr val="tx1"/>
+                </a:solidFill>
+                <a:latin typeface="Arial" charset="0"/>
+                <a:ea typeface="+mn-ea"/>
+                <a:cs typeface="Arial" charset="0"/>
+              </a:defRPr>
+            </a:lvl7pPr>
+            <a:lvl8pPr marL="3200400" algn="l" defTabSz="914400" rtl="0" eaLnBrk="1" latinLnBrk="0" hangingPunct="1">
+              <a:defRPr kern="1200">
+                <a:solidFill>
+                  <a:schemeClr val="tx1"/>
+                </a:solidFill>
+                <a:latin typeface="Arial" charset="0"/>
+                <a:ea typeface="+mn-ea"/>
+                <a:cs typeface="Arial" charset="0"/>
+              </a:defRPr>
+            </a:lvl8pPr>
+            <a:lvl9pPr marL="3657600" algn="l" defTabSz="914400" rtl="0" eaLnBrk="1" latinLnBrk="0" hangingPunct="1">
+              <a:defRPr kern="1200">
+                <a:solidFill>
+                  <a:schemeClr val="tx1"/>
+                </a:solidFill>
+                <a:latin typeface="Arial" charset="0"/>
+                <a:ea typeface="+mn-ea"/>
+                <a:cs typeface="Arial" charset="0"/>
+              </a:defRPr>
+            </a:lvl9pPr>
+          </a:lstStyle>
+          <a:p>
+            <a:endParaRPr lang="pt-BR"/>
+          </a:p>
+        </p:txBody>
+      </p:sp>
+      <p:sp>
+        <p:nvSpPr>
+          <p:cNvPr id="70" name="Símbolo de 'Não' 69"/>
           <p:cNvSpPr/>
           <p:nvPr/>
         </p:nvSpPr>
         <p:spPr>
           <a:xfrm>
-            <a:off x="4211960" y="4653136"/>
-            <a:ext cx="144016" cy="144016"/>
+            <a:off x="8388424" y="2285992"/>
+            <a:ext cx="360040" cy="360040"/>
           </a:xfrm>
-          <a:prstGeom prst="rect">
+          <a:prstGeom prst="noSmoking">
             <a:avLst/>
           </a:prstGeom>
           <a:solidFill>
-            <a:schemeClr val="accent1"/>
+            <a:srgbClr val="FF0000"/>
           </a:solidFill>
-          <a:ln w="28575">
-            <a:solidFill>
-              <a:schemeClr val="tx1"/>
-            </a:solidFill>
+          <a:ln>
+            <a:noFill/>
           </a:ln>
         </p:spPr>
         <p:style>
@@ -23162,146 +24579,14 @@
           <a:lstStyle/>
           <a:p>
             <a:pPr algn="ctr"/>
-            <a:endParaRPr lang="pt-BR"/>
-          </a:p>
-        </p:txBody>
-      </p:sp>
-      <p:grpSp>
-        <p:nvGrpSpPr>
-          <p:cNvPr id="116" name="Grupo 115"/>
-          <p:cNvGrpSpPr/>
-          <p:nvPr/>
-        </p:nvGrpSpPr>
-        <p:grpSpPr>
-          <a:xfrm>
-            <a:off x="4211960" y="4653136"/>
-            <a:ext cx="144016" cy="144016"/>
-            <a:chOff x="3851920" y="1556792"/>
-            <a:chExt cx="1008112" cy="1008112"/>
-          </a:xfrm>
-          <a:solidFill>
-            <a:schemeClr val="accent1"/>
-          </a:solidFill>
-        </p:grpSpPr>
-        <p:sp>
-          <p:nvSpPr>
-            <p:cNvPr id="117" name="Retângulo 116"/>
-            <p:cNvSpPr/>
-            <p:nvPr/>
-          </p:nvSpPr>
-          <p:spPr>
-            <a:xfrm>
-              <a:off x="3851920" y="1556792"/>
-              <a:ext cx="1008112" cy="1008112"/>
-            </a:xfrm>
-            <a:prstGeom prst="rect">
-              <a:avLst/>
-            </a:prstGeom>
-            <a:grpFill/>
-            <a:ln w="28575">
+            <a:endParaRPr lang="pt-BR">
               <a:solidFill>
                 <a:schemeClr val="tx1"/>
               </a:solidFill>
-            </a:ln>
-          </p:spPr>
-          <p:style>
-            <a:lnRef idx="2">
-              <a:schemeClr val="accent1">
-                <a:shade val="50000"/>
-              </a:schemeClr>
-            </a:lnRef>
-            <a:fillRef idx="1">
-              <a:schemeClr val="accent1"/>
-            </a:fillRef>
-            <a:effectRef idx="0">
-              <a:schemeClr val="accent1"/>
-            </a:effectRef>
-            <a:fontRef idx="minor">
-              <a:schemeClr val="lt1"/>
-            </a:fontRef>
-          </p:style>
-          <p:txBody>
-            <a:bodyPr rtlCol="0" anchor="ctr"/>
-            <a:lstStyle/>
-            <a:p>
-              <a:pPr algn="ctr"/>
-              <a:endParaRPr lang="pt-BR"/>
-            </a:p>
-          </p:txBody>
-        </p:sp>
-        <p:cxnSp>
-          <p:nvCxnSpPr>
-            <p:cNvPr id="118" name="Conector reto 117"/>
-            <p:cNvCxnSpPr/>
-            <p:nvPr/>
-          </p:nvCxnSpPr>
-          <p:spPr>
-            <a:xfrm>
-              <a:off x="4067944" y="1772816"/>
-              <a:ext cx="576064" cy="576064"/>
-            </a:xfrm>
-            <a:prstGeom prst="line">
-              <a:avLst/>
-            </a:prstGeom>
-            <a:grpFill/>
-            <a:ln w="28575">
-              <a:solidFill>
-                <a:schemeClr val="tx1"/>
-              </a:solidFill>
-            </a:ln>
-          </p:spPr>
-          <p:style>
-            <a:lnRef idx="1">
-              <a:schemeClr val="accent1"/>
-            </a:lnRef>
-            <a:fillRef idx="0">
-              <a:schemeClr val="accent1"/>
-            </a:fillRef>
-            <a:effectRef idx="0">
-              <a:schemeClr val="accent1"/>
-            </a:effectRef>
-            <a:fontRef idx="minor">
-              <a:schemeClr val="tx1"/>
-            </a:fontRef>
-          </p:style>
-        </p:cxnSp>
-        <p:cxnSp>
-          <p:nvCxnSpPr>
-            <p:cNvPr id="119" name="Conector reto 118"/>
-            <p:cNvCxnSpPr/>
-            <p:nvPr/>
-          </p:nvCxnSpPr>
-          <p:spPr>
-            <a:xfrm flipV="1">
-              <a:off x="4067944" y="1772816"/>
-              <a:ext cx="576064" cy="576064"/>
-            </a:xfrm>
-            <a:prstGeom prst="line">
-              <a:avLst/>
-            </a:prstGeom>
-            <a:grpFill/>
-            <a:ln w="28575">
-              <a:solidFill>
-                <a:schemeClr val="tx1"/>
-              </a:solidFill>
-            </a:ln>
-          </p:spPr>
-          <p:style>
-            <a:lnRef idx="1">
-              <a:schemeClr val="accent1"/>
-            </a:lnRef>
-            <a:fillRef idx="0">
-              <a:schemeClr val="accent1"/>
-            </a:fillRef>
-            <a:effectRef idx="0">
-              <a:schemeClr val="accent1"/>
-            </a:effectRef>
-            <a:fontRef idx="minor">
-              <a:schemeClr val="tx1"/>
-            </a:fontRef>
-          </p:style>
-        </p:cxnSp>
-      </p:grpSp>
+            </a:endParaRPr>
+          </a:p>
+        </p:txBody>
+      </p:sp>
     </p:spTree>
   </p:cSld>
   <p:clrMapOvr>
@@ -24173,7 +25458,7 @@
                                           </p:stCondLst>
                                         </p:cTn>
                                         <p:tgtEl>
-                                          <p:spTgt spid="95"/>
+                                          <p:spTgt spid="96"/>
                                         </p:tgtEl>
                                         <p:attrNameLst>
                                           <p:attrName>style.visibility</p:attrName>
@@ -24187,46 +25472,28 @@
                                       <p:cBhvr>
                                         <p:cTn id="79" dur="500"/>
                                         <p:tgtEl>
-                                          <p:spTgt spid="95"/>
+                                          <p:spTgt spid="96"/>
                                         </p:tgtEl>
                                       </p:cBhvr>
                                     </p:animEffect>
                                   </p:childTnLst>
                                 </p:cTn>
                               </p:par>
-                            </p:childTnLst>
-                          </p:cTn>
-                        </p:par>
-                      </p:childTnLst>
-                    </p:cTn>
-                  </p:par>
-                  <p:par>
-                    <p:cTn id="80" fill="hold">
-                      <p:stCondLst>
-                        <p:cond delay="indefinite"/>
-                      </p:stCondLst>
-                      <p:childTnLst>
-                        <p:par>
-                          <p:cTn id="81" fill="hold">
-                            <p:stCondLst>
-                              <p:cond delay="0"/>
-                            </p:stCondLst>
-                            <p:childTnLst>
                               <p:par>
-                                <p:cTn id="82" presetID="3" presetClass="entr" presetSubtype="10" fill="hold" nodeType="clickEffect">
+                                <p:cTn id="80" presetID="3" presetClass="entr" presetSubtype="10" fill="hold" grpId="0" nodeType="withEffect">
                                   <p:stCondLst>
                                     <p:cond delay="0"/>
                                   </p:stCondLst>
                                   <p:childTnLst>
                                     <p:set>
                                       <p:cBhvr>
-                                        <p:cTn id="83" dur="1" fill="hold">
+                                        <p:cTn id="81" dur="1" fill="hold">
                                           <p:stCondLst>
                                             <p:cond delay="0"/>
                                           </p:stCondLst>
                                         </p:cTn>
                                         <p:tgtEl>
-                                          <p:spTgt spid="116"/>
+                                          <p:spTgt spid="101"/>
                                         </p:tgtEl>
                                         <p:attrNameLst>
                                           <p:attrName>style.visibility</p:attrName>
@@ -24238,9 +25505,9 @@
                                     </p:set>
                                     <p:animEffect transition="in" filter="blinds(horizontal)">
                                       <p:cBhvr>
-                                        <p:cTn id="84" dur="500"/>
+                                        <p:cTn id="82" dur="500"/>
                                         <p:tgtEl>
-                                          <p:spTgt spid="116"/>
+                                          <p:spTgt spid="101"/>
                                         </p:tgtEl>
                                       </p:cBhvr>
                                     </p:animEffect>
@@ -24248,49 +25515,14 @@
                                 </p:cTn>
                               </p:par>
                               <p:par>
-                                <p:cTn id="85" presetID="3" presetClass="entr" presetSubtype="10" fill="hold" nodeType="withEffect">
+                                <p:cTn id="83" presetID="2" presetClass="entr" presetSubtype="8" fill="hold" nodeType="withEffect">
                                   <p:stCondLst>
                                     <p:cond delay="0"/>
                                   </p:stCondLst>
                                   <p:childTnLst>
                                     <p:set>
                                       <p:cBhvr>
-                                        <p:cTn id="86" dur="1" fill="hold">
-                                          <p:stCondLst>
-                                            <p:cond delay="0"/>
-                                          </p:stCondLst>
-                                        </p:cTn>
-                                        <p:tgtEl>
-                                          <p:spTgt spid="120"/>
-                                        </p:tgtEl>
-                                        <p:attrNameLst>
-                                          <p:attrName>style.visibility</p:attrName>
-                                        </p:attrNameLst>
-                                      </p:cBhvr>
-                                      <p:to>
-                                        <p:strVal val="visible"/>
-                                      </p:to>
-                                    </p:set>
-                                    <p:animEffect transition="in" filter="blinds(horizontal)">
-                                      <p:cBhvr>
-                                        <p:cTn id="87" dur="500"/>
-                                        <p:tgtEl>
-                                          <p:spTgt spid="120"/>
-                                        </p:tgtEl>
-                                      </p:cBhvr>
-                                    </p:animEffect>
-                                  </p:childTnLst>
-                                </p:cTn>
-                              </p:par>
-                              <p:par>
-                                <p:cTn id="88" presetID="2" presetClass="entr" presetSubtype="8" fill="hold" nodeType="withEffect">
-                                  <p:stCondLst>
-                                    <p:cond delay="0"/>
-                                  </p:stCondLst>
-                                  <p:childTnLst>
-                                    <p:set>
-                                      <p:cBhvr>
-                                        <p:cTn id="89" dur="1" fill="hold">
+                                        <p:cTn id="84" dur="1" fill="hold">
                                           <p:stCondLst>
                                             <p:cond delay="0"/>
                                           </p:stCondLst>
@@ -24312,7 +25544,7 @@
                                     </p:set>
                                     <p:anim calcmode="lin" valueType="num">
                                       <p:cBhvr additive="base">
-                                        <p:cTn id="90" dur="500" fill="hold"/>
+                                        <p:cTn id="85" dur="500" fill="hold"/>
                                         <p:tgtEl>
                                           <p:spTgt spid="73">
                                             <p:txEl>
@@ -24339,7 +25571,7 @@
                                     </p:anim>
                                     <p:anim calcmode="lin" valueType="num">
                                       <p:cBhvr additive="base">
-                                        <p:cTn id="91" dur="500" fill="hold"/>
+                                        <p:cTn id="86" dur="500" fill="hold"/>
                                         <p:tgtEl>
                                           <p:spTgt spid="73">
                                             <p:txEl>
@@ -24374,26 +25606,26 @@
                     </p:cTn>
                   </p:par>
                   <p:par>
-                    <p:cTn id="92" fill="hold">
+                    <p:cTn id="87" fill="hold">
                       <p:stCondLst>
                         <p:cond delay="indefinite"/>
                       </p:stCondLst>
                       <p:childTnLst>
                         <p:par>
-                          <p:cTn id="93" fill="hold">
+                          <p:cTn id="88" fill="hold">
                             <p:stCondLst>
                               <p:cond delay="0"/>
                             </p:stCondLst>
                             <p:childTnLst>
                               <p:par>
-                                <p:cTn id="94" presetID="3" presetClass="entr" presetSubtype="10" fill="hold" grpId="0" nodeType="clickEffect">
+                                <p:cTn id="89" presetID="3" presetClass="entr" presetSubtype="10" fill="hold" grpId="0" nodeType="clickEffect">
                                   <p:stCondLst>
                                     <p:cond delay="0"/>
                                   </p:stCondLst>
                                   <p:childTnLst>
                                     <p:set>
                                       <p:cBhvr>
-                                        <p:cTn id="95" dur="1" fill="hold">
+                                        <p:cTn id="90" dur="1" fill="hold">
                                           <p:stCondLst>
                                             <p:cond delay="0"/>
                                           </p:stCondLst>
@@ -24411,7 +25643,7 @@
                                     </p:set>
                                     <p:animEffect transition="in" filter="blinds(horizontal)">
                                       <p:cBhvr>
-                                        <p:cTn id="96" dur="500"/>
+                                        <p:cTn id="91" dur="500"/>
                                         <p:tgtEl>
                                           <p:spTgt spid="70"/>
                                         </p:tgtEl>
@@ -24427,26 +25659,26 @@
                     </p:cTn>
                   </p:par>
                   <p:par>
-                    <p:cTn id="97" fill="hold">
+                    <p:cTn id="92" fill="hold">
                       <p:stCondLst>
                         <p:cond delay="indefinite"/>
                       </p:stCondLst>
                       <p:childTnLst>
                         <p:par>
-                          <p:cTn id="98" fill="hold">
+                          <p:cTn id="93" fill="hold">
                             <p:stCondLst>
                               <p:cond delay="0"/>
                             </p:stCondLst>
                             <p:childTnLst>
                               <p:par>
-                                <p:cTn id="99" presetID="2" presetClass="entr" presetSubtype="8" fill="hold" nodeType="clickEffect">
+                                <p:cTn id="94" presetID="2" presetClass="entr" presetSubtype="8" fill="hold" nodeType="clickEffect">
                                   <p:stCondLst>
                                     <p:cond delay="0"/>
                                   </p:stCondLst>
                                   <p:childTnLst>
                                     <p:set>
                                       <p:cBhvr>
-                                        <p:cTn id="100" dur="1" fill="hold">
+                                        <p:cTn id="95" dur="1" fill="hold">
                                           <p:stCondLst>
                                             <p:cond delay="0"/>
                                           </p:stCondLst>
@@ -24468,7 +25700,7 @@
                                     </p:set>
                                     <p:anim calcmode="lin" valueType="num">
                                       <p:cBhvr additive="base">
-                                        <p:cTn id="101" dur="500" fill="hold"/>
+                                        <p:cTn id="96" dur="500" fill="hold"/>
                                         <p:tgtEl>
                                           <p:spTgt spid="73">
                                             <p:txEl>
@@ -24495,7 +25727,7 @@
                                     </p:anim>
                                     <p:anim calcmode="lin" valueType="num">
                                       <p:cBhvr additive="base">
-                                        <p:cTn id="102" dur="500" fill="hold"/>
+                                        <p:cTn id="97" dur="500" fill="hold"/>
                                         <p:tgtEl>
                                           <p:spTgt spid="73">
                                             <p:txEl>
@@ -24530,26 +25762,26 @@
                     </p:cTn>
                   </p:par>
                   <p:par>
-                    <p:cTn id="103" fill="hold">
+                    <p:cTn id="98" fill="hold">
                       <p:stCondLst>
                         <p:cond delay="indefinite"/>
                       </p:stCondLst>
                       <p:childTnLst>
                         <p:par>
-                          <p:cTn id="104" fill="hold">
+                          <p:cTn id="99" fill="hold">
                             <p:stCondLst>
                               <p:cond delay="0"/>
                             </p:stCondLst>
                             <p:childTnLst>
                               <p:par>
-                                <p:cTn id="105" presetID="2" presetClass="entr" presetSubtype="8" fill="hold" nodeType="clickEffect">
+                                <p:cTn id="100" presetID="2" presetClass="entr" presetSubtype="8" fill="hold" nodeType="clickEffect">
                                   <p:stCondLst>
                                     <p:cond delay="0"/>
                                   </p:stCondLst>
                                   <p:childTnLst>
                                     <p:set>
                                       <p:cBhvr>
-                                        <p:cTn id="106" dur="1" fill="hold">
+                                        <p:cTn id="101" dur="1" fill="hold">
                                           <p:stCondLst>
                                             <p:cond delay="0"/>
                                           </p:stCondLst>
@@ -24571,7 +25803,7 @@
                                     </p:set>
                                     <p:anim calcmode="lin" valueType="num">
                                       <p:cBhvr additive="base">
-                                        <p:cTn id="107" dur="500" fill="hold"/>
+                                        <p:cTn id="102" dur="500" fill="hold"/>
                                         <p:tgtEl>
                                           <p:spTgt spid="73">
                                             <p:txEl>
@@ -24598,7 +25830,7 @@
                                     </p:anim>
                                     <p:anim calcmode="lin" valueType="num">
                                       <p:cBhvr additive="base">
-                                        <p:cTn id="108" dur="500" fill="hold"/>
+                                        <p:cTn id="103" dur="500" fill="hold"/>
                                         <p:tgtEl>
                                           <p:spTgt spid="73">
                                             <p:txEl>
@@ -24627,14 +25859,14 @@
                                 </p:cTn>
                               </p:par>
                               <p:par>
-                                <p:cTn id="109" presetID="3" presetClass="entr" presetSubtype="10" fill="hold" grpId="0" nodeType="withEffect">
+                                <p:cTn id="104" presetID="3" presetClass="entr" presetSubtype="10" fill="hold" grpId="0" nodeType="withEffect">
                                   <p:stCondLst>
                                     <p:cond delay="0"/>
                                   </p:stCondLst>
                                   <p:childTnLst>
                                     <p:set>
                                       <p:cBhvr>
-                                        <p:cTn id="110" dur="1" fill="hold">
+                                        <p:cTn id="105" dur="1" fill="hold">
                                           <p:stCondLst>
                                             <p:cond delay="0"/>
                                           </p:stCondLst>
@@ -24652,7 +25884,7 @@
                                     </p:set>
                                     <p:animEffect transition="in" filter="blinds(horizontal)">
                                       <p:cBhvr>
-                                        <p:cTn id="111" dur="500"/>
+                                        <p:cTn id="106" dur="500"/>
                                         <p:tgtEl>
                                           <p:spTgt spid="42"/>
                                         </p:tgtEl>
@@ -24668,26 +25900,26 @@
                     </p:cTn>
                   </p:par>
                   <p:par>
-                    <p:cTn id="112" fill="hold">
+                    <p:cTn id="107" fill="hold">
                       <p:stCondLst>
                         <p:cond delay="indefinite"/>
                       </p:stCondLst>
                       <p:childTnLst>
                         <p:par>
-                          <p:cTn id="113" fill="hold">
+                          <p:cTn id="108" fill="hold">
                             <p:stCondLst>
                               <p:cond delay="0"/>
                             </p:stCondLst>
                             <p:childTnLst>
                               <p:par>
-                                <p:cTn id="114" presetID="2" presetClass="entr" presetSubtype="8" fill="hold" nodeType="clickEffect">
+                                <p:cTn id="109" presetID="2" presetClass="entr" presetSubtype="8" fill="hold" nodeType="clickEffect">
                                   <p:stCondLst>
                                     <p:cond delay="0"/>
                                   </p:stCondLst>
                                   <p:childTnLst>
                                     <p:set>
                                       <p:cBhvr>
-                                        <p:cTn id="115" dur="1" fill="hold">
+                                        <p:cTn id="110" dur="1" fill="hold">
                                           <p:stCondLst>
                                             <p:cond delay="0"/>
                                           </p:stCondLst>
@@ -24709,7 +25941,7 @@
                                     </p:set>
                                     <p:anim calcmode="lin" valueType="num">
                                       <p:cBhvr additive="base">
-                                        <p:cTn id="116" dur="500" fill="hold"/>
+                                        <p:cTn id="111" dur="500" fill="hold"/>
                                         <p:tgtEl>
                                           <p:spTgt spid="73">
                                             <p:txEl>
@@ -24736,7 +25968,7 @@
                                     </p:anim>
                                     <p:anim calcmode="lin" valueType="num">
                                       <p:cBhvr additive="base">
-                                        <p:cTn id="117" dur="500" fill="hold"/>
+                                        <p:cTn id="112" dur="500" fill="hold"/>
                                         <p:tgtEl>
                                           <p:spTgt spid="73">
                                             <p:txEl>
@@ -24771,40 +26003,40 @@
                     </p:cTn>
                   </p:par>
                   <p:par>
-                    <p:cTn id="118" fill="hold">
+                    <p:cTn id="113" fill="hold">
                       <p:stCondLst>
                         <p:cond delay="indefinite"/>
                       </p:stCondLst>
                       <p:childTnLst>
                         <p:par>
-                          <p:cTn id="119" fill="hold">
+                          <p:cTn id="114" fill="hold">
                             <p:stCondLst>
                               <p:cond delay="0"/>
                             </p:stCondLst>
                             <p:childTnLst>
                               <p:par>
-                                <p:cTn id="120" presetID="3" presetClass="exit" presetSubtype="10" fill="hold" nodeType="clickEffect">
+                                <p:cTn id="115" presetID="3" presetClass="exit" presetSubtype="10" fill="hold" grpId="1" nodeType="clickEffect">
                                   <p:stCondLst>
                                     <p:cond delay="0"/>
                                   </p:stCondLst>
                                   <p:childTnLst>
                                     <p:animEffect transition="out" filter="blinds(horizontal)">
                                       <p:cBhvr>
-                                        <p:cTn id="121" dur="500"/>
+                                        <p:cTn id="116" dur="500"/>
                                         <p:tgtEl>
-                                          <p:spTgt spid="116"/>
+                                          <p:spTgt spid="96"/>
                                         </p:tgtEl>
                                       </p:cBhvr>
                                     </p:animEffect>
                                     <p:set>
                                       <p:cBhvr>
-                                        <p:cTn id="122" dur="1" fill="hold">
+                                        <p:cTn id="117" dur="1" fill="hold">
                                           <p:stCondLst>
                                             <p:cond delay="499"/>
                                           </p:stCondLst>
                                         </p:cTn>
                                         <p:tgtEl>
-                                          <p:spTgt spid="116"/>
+                                          <p:spTgt spid="96"/>
                                         </p:tgtEl>
                                         <p:attrNameLst>
                                           <p:attrName>style.visibility</p:attrName>
@@ -24818,28 +26050,28 @@
                                 </p:cTn>
                               </p:par>
                               <p:par>
-                                <p:cTn id="123" presetID="3" presetClass="exit" presetSubtype="10" fill="hold" nodeType="withEffect">
+                                <p:cTn id="118" presetID="3" presetClass="exit" presetSubtype="10" fill="hold" grpId="1" nodeType="withEffect">
                                   <p:stCondLst>
                                     <p:cond delay="0"/>
                                   </p:stCondLst>
                                   <p:childTnLst>
                                     <p:animEffect transition="out" filter="blinds(horizontal)">
                                       <p:cBhvr>
-                                        <p:cTn id="124" dur="500"/>
+                                        <p:cTn id="119" dur="500"/>
                                         <p:tgtEl>
-                                          <p:spTgt spid="120"/>
+                                          <p:spTgt spid="101"/>
                                         </p:tgtEl>
                                       </p:cBhvr>
                                     </p:animEffect>
                                     <p:set>
                                       <p:cBhvr>
-                                        <p:cTn id="125" dur="1" fill="hold">
+                                        <p:cTn id="120" dur="1" fill="hold">
                                           <p:stCondLst>
                                             <p:cond delay="499"/>
                                           </p:stCondLst>
                                         </p:cTn>
                                         <p:tgtEl>
-                                          <p:spTgt spid="120"/>
+                                          <p:spTgt spid="101"/>
                                         </p:tgtEl>
                                         <p:attrNameLst>
                                           <p:attrName>style.visibility</p:attrName>
@@ -24859,26 +26091,26 @@
                     </p:cTn>
                   </p:par>
                   <p:par>
-                    <p:cTn id="126" fill="hold">
+                    <p:cTn id="121" fill="hold">
                       <p:stCondLst>
                         <p:cond delay="indefinite"/>
                       </p:stCondLst>
                       <p:childTnLst>
                         <p:par>
-                          <p:cTn id="127" fill="hold">
+                          <p:cTn id="122" fill="hold">
                             <p:stCondLst>
                               <p:cond delay="0"/>
                             </p:stCondLst>
                             <p:childTnLst>
                               <p:par>
-                                <p:cTn id="128" presetID="2" presetClass="entr" presetSubtype="2" fill="hold" nodeType="clickEffect">
+                                <p:cTn id="123" presetID="2" presetClass="entr" presetSubtype="2" fill="hold" nodeType="clickEffect">
                                   <p:stCondLst>
                                     <p:cond delay="0"/>
                                   </p:stCondLst>
                                   <p:childTnLst>
                                     <p:set>
                                       <p:cBhvr>
-                                        <p:cTn id="129" dur="1" fill="hold">
+                                        <p:cTn id="124" dur="1" fill="hold">
                                           <p:stCondLst>
                                             <p:cond delay="0"/>
                                           </p:stCondLst>
@@ -24900,7 +26132,7 @@
                                     </p:set>
                                     <p:anim calcmode="lin" valueType="num">
                                       <p:cBhvr additive="base">
-                                        <p:cTn id="130" dur="500" fill="hold"/>
+                                        <p:cTn id="125" dur="500" fill="hold"/>
                                         <p:tgtEl>
                                           <p:spTgt spid="75">
                                             <p:txEl>
@@ -24927,7 +26159,7 @@
                                     </p:anim>
                                     <p:anim calcmode="lin" valueType="num">
                                       <p:cBhvr additive="base">
-                                        <p:cTn id="131" dur="500" fill="hold"/>
+                                        <p:cTn id="126" dur="500" fill="hold"/>
                                         <p:tgtEl>
                                           <p:spTgt spid="75">
                                             <p:txEl>
@@ -24956,20 +26188,20 @@
                                 </p:cTn>
                               </p:par>
                               <p:par>
-                                <p:cTn id="132" presetID="3" presetClass="entr" presetSubtype="10" fill="hold" nodeType="withEffect">
+                                <p:cTn id="127" presetID="3" presetClass="entr" presetSubtype="10" fill="hold" grpId="0" nodeType="withEffect">
                                   <p:stCondLst>
                                     <p:cond delay="0"/>
                                   </p:stCondLst>
                                   <p:childTnLst>
                                     <p:set>
                                       <p:cBhvr>
-                                        <p:cTn id="133" dur="1" fill="hold">
+                                        <p:cTn id="128" dur="1" fill="hold">
                                           <p:stCondLst>
                                             <p:cond delay="0"/>
                                           </p:stCondLst>
                                         </p:cTn>
                                         <p:tgtEl>
-                                          <p:spTgt spid="76"/>
+                                          <p:spTgt spid="104"/>
                                         </p:tgtEl>
                                         <p:attrNameLst>
                                           <p:attrName>style.visibility</p:attrName>
@@ -24981,9 +26213,9 @@
                                     </p:set>
                                     <p:animEffect transition="in" filter="blinds(horizontal)">
                                       <p:cBhvr>
-                                        <p:cTn id="134" dur="500"/>
+                                        <p:cTn id="129" dur="500"/>
                                         <p:tgtEl>
-                                          <p:spTgt spid="76"/>
+                                          <p:spTgt spid="104"/>
                                         </p:tgtEl>
                                       </p:cBhvr>
                                     </p:animEffect>
@@ -24991,14 +26223,14 @@
                                 </p:cTn>
                               </p:par>
                               <p:par>
-                                <p:cTn id="135" presetID="3" presetClass="exit" presetSubtype="10" fill="hold" grpId="1" nodeType="withEffect">
+                                <p:cTn id="130" presetID="3" presetClass="exit" presetSubtype="10" fill="hold" grpId="1" nodeType="withEffect">
                                   <p:stCondLst>
                                     <p:cond delay="0"/>
                                   </p:stCondLst>
                                   <p:childTnLst>
                                     <p:animEffect transition="out" filter="blinds(horizontal)">
                                       <p:cBhvr>
-                                        <p:cTn id="136" dur="500"/>
+                                        <p:cTn id="131" dur="500"/>
                                         <p:tgtEl>
                                           <p:spTgt spid="70"/>
                                         </p:tgtEl>
@@ -25006,7 +26238,7 @@
                                     </p:animEffect>
                                     <p:set>
                                       <p:cBhvr>
-                                        <p:cTn id="137" dur="1" fill="hold">
+                                        <p:cTn id="132" dur="1" fill="hold">
                                           <p:stCondLst>
                                             <p:cond delay="499"/>
                                           </p:stCondLst>
@@ -25026,20 +26258,20 @@
                                 </p:cTn>
                               </p:par>
                               <p:par>
-                                <p:cTn id="138" presetID="3" presetClass="entr" presetSubtype="10" fill="hold" nodeType="withEffect">
+                                <p:cTn id="133" presetID="3" presetClass="entr" presetSubtype="10" fill="hold" grpId="2" nodeType="withEffect">
                                   <p:stCondLst>
                                     <p:cond delay="0"/>
                                   </p:stCondLst>
                                   <p:childTnLst>
                                     <p:set>
                                       <p:cBhvr>
-                                        <p:cTn id="139" dur="1" fill="hold">
+                                        <p:cTn id="134" dur="1" fill="hold">
                                           <p:stCondLst>
                                             <p:cond delay="0"/>
                                           </p:stCondLst>
                                         </p:cTn>
                                         <p:tgtEl>
-                                          <p:spTgt spid="116"/>
+                                          <p:spTgt spid="96"/>
                                         </p:tgtEl>
                                         <p:attrNameLst>
                                           <p:attrName>style.visibility</p:attrName>
@@ -25051,9 +26283,9 @@
                                     </p:set>
                                     <p:animEffect transition="in" filter="blinds(horizontal)">
                                       <p:cBhvr>
-                                        <p:cTn id="140" dur="500"/>
+                                        <p:cTn id="135" dur="500"/>
                                         <p:tgtEl>
-                                          <p:spTgt spid="116"/>
+                                          <p:spTgt spid="96"/>
                                         </p:tgtEl>
                                       </p:cBhvr>
                                     </p:animEffect>
@@ -25067,26 +26299,26 @@
                     </p:cTn>
                   </p:par>
                   <p:par>
-                    <p:cTn id="141" fill="hold">
+                    <p:cTn id="136" fill="hold">
                       <p:stCondLst>
                         <p:cond delay="indefinite"/>
                       </p:stCondLst>
                       <p:childTnLst>
                         <p:par>
-                          <p:cTn id="142" fill="hold">
+                          <p:cTn id="137" fill="hold">
                             <p:stCondLst>
                               <p:cond delay="0"/>
                             </p:stCondLst>
                             <p:childTnLst>
                               <p:par>
-                                <p:cTn id="143" presetID="2" presetClass="entr" presetSubtype="2" fill="hold" nodeType="clickEffect">
+                                <p:cTn id="138" presetID="2" presetClass="entr" presetSubtype="2" fill="hold" nodeType="clickEffect">
                                   <p:stCondLst>
                                     <p:cond delay="0"/>
                                   </p:stCondLst>
                                   <p:childTnLst>
                                     <p:set>
                                       <p:cBhvr>
-                                        <p:cTn id="144" dur="1" fill="hold">
+                                        <p:cTn id="139" dur="1" fill="hold">
                                           <p:stCondLst>
                                             <p:cond delay="0"/>
                                           </p:stCondLst>
@@ -25108,7 +26340,7 @@
                                     </p:set>
                                     <p:anim calcmode="lin" valueType="num">
                                       <p:cBhvr additive="base">
-                                        <p:cTn id="145" dur="500" fill="hold"/>
+                                        <p:cTn id="140" dur="500" fill="hold"/>
                                         <p:tgtEl>
                                           <p:spTgt spid="75">
                                             <p:txEl>
@@ -25135,7 +26367,7 @@
                                     </p:anim>
                                     <p:anim calcmode="lin" valueType="num">
                                       <p:cBhvr additive="base">
-                                        <p:cTn id="146" dur="500" fill="hold"/>
+                                        <p:cTn id="141" dur="500" fill="hold"/>
                                         <p:tgtEl>
                                           <p:spTgt spid="75">
                                             <p:txEl>
@@ -25170,26 +26402,26 @@
                     </p:cTn>
                   </p:par>
                   <p:par>
-                    <p:cTn id="147" fill="hold">
+                    <p:cTn id="142" fill="hold">
                       <p:stCondLst>
                         <p:cond delay="indefinite"/>
                       </p:stCondLst>
                       <p:childTnLst>
                         <p:par>
-                          <p:cTn id="148" fill="hold">
+                          <p:cTn id="143" fill="hold">
                             <p:stCondLst>
                               <p:cond delay="0"/>
                             </p:stCondLst>
                             <p:childTnLst>
                               <p:par>
-                                <p:cTn id="149" presetID="2" presetClass="entr" presetSubtype="2" fill="hold" nodeType="clickEffect">
+                                <p:cTn id="144" presetID="2" presetClass="entr" presetSubtype="2" fill="hold" nodeType="clickEffect">
                                   <p:stCondLst>
                                     <p:cond delay="0"/>
                                   </p:stCondLst>
                                   <p:childTnLst>
                                     <p:set>
                                       <p:cBhvr>
-                                        <p:cTn id="150" dur="1" fill="hold">
+                                        <p:cTn id="145" dur="1" fill="hold">
                                           <p:stCondLst>
                                             <p:cond delay="0"/>
                                           </p:stCondLst>
@@ -25211,7 +26443,7 @@
                                     </p:set>
                                     <p:anim calcmode="lin" valueType="num">
                                       <p:cBhvr additive="base">
-                                        <p:cTn id="151" dur="500" fill="hold"/>
+                                        <p:cTn id="146" dur="500" fill="hold"/>
                                         <p:tgtEl>
                                           <p:spTgt spid="75">
                                             <p:txEl>
@@ -25238,7 +26470,7 @@
                                     </p:anim>
                                     <p:anim calcmode="lin" valueType="num">
                                       <p:cBhvr additive="base">
-                                        <p:cTn id="152" dur="500" fill="hold"/>
+                                        <p:cTn id="147" dur="500" fill="hold"/>
                                         <p:tgtEl>
                                           <p:spTgt spid="75">
                                             <p:txEl>
@@ -25267,14 +26499,14 @@
                                 </p:cTn>
                               </p:par>
                               <p:par>
-                                <p:cTn id="153" presetID="3" presetClass="entr" presetSubtype="10" fill="hold" grpId="0" nodeType="withEffect">
+                                <p:cTn id="148" presetID="3" presetClass="entr" presetSubtype="10" fill="hold" grpId="0" nodeType="withEffect">
                                   <p:stCondLst>
                                     <p:cond delay="0"/>
                                   </p:stCondLst>
                                   <p:childTnLst>
                                     <p:set>
                                       <p:cBhvr>
-                                        <p:cTn id="154" dur="1" fill="hold">
+                                        <p:cTn id="149" dur="1" fill="hold">
                                           <p:stCondLst>
                                             <p:cond delay="0"/>
                                           </p:stCondLst>
@@ -25292,7 +26524,7 @@
                                     </p:set>
                                     <p:animEffect transition="in" filter="blinds(horizontal)">
                                       <p:cBhvr>
-                                        <p:cTn id="155" dur="500"/>
+                                        <p:cTn id="150" dur="500"/>
                                         <p:tgtEl>
                                           <p:spTgt spid="83"/>
                                         </p:tgtEl>
@@ -25308,26 +26540,26 @@
                     </p:cTn>
                   </p:par>
                   <p:par>
-                    <p:cTn id="156" fill="hold">
+                    <p:cTn id="151" fill="hold">
                       <p:stCondLst>
                         <p:cond delay="indefinite"/>
                       </p:stCondLst>
                       <p:childTnLst>
                         <p:par>
-                          <p:cTn id="157" fill="hold">
+                          <p:cTn id="152" fill="hold">
                             <p:stCondLst>
                               <p:cond delay="0"/>
                             </p:stCondLst>
                             <p:childTnLst>
                               <p:par>
-                                <p:cTn id="158" presetID="2" presetClass="entr" presetSubtype="2" fill="hold" nodeType="clickEffect">
+                                <p:cTn id="153" presetID="2" presetClass="entr" presetSubtype="2" fill="hold" nodeType="clickEffect">
                                   <p:stCondLst>
                                     <p:cond delay="0"/>
                                   </p:stCondLst>
                                   <p:childTnLst>
                                     <p:set>
                                       <p:cBhvr>
-                                        <p:cTn id="159" dur="1" fill="hold">
+                                        <p:cTn id="154" dur="1" fill="hold">
                                           <p:stCondLst>
                                             <p:cond delay="0"/>
                                           </p:stCondLst>
@@ -25349,7 +26581,7 @@
                                     </p:set>
                                     <p:anim calcmode="lin" valueType="num">
                                       <p:cBhvr additive="base">
-                                        <p:cTn id="160" dur="500" fill="hold"/>
+                                        <p:cTn id="155" dur="500" fill="hold"/>
                                         <p:tgtEl>
                                           <p:spTgt spid="75">
                                             <p:txEl>
@@ -25376,7 +26608,7 @@
                                     </p:anim>
                                     <p:anim calcmode="lin" valueType="num">
                                       <p:cBhvr additive="base">
-                                        <p:cTn id="161" dur="500" fill="hold"/>
+                                        <p:cTn id="156" dur="500" fill="hold"/>
                                         <p:tgtEl>
                                           <p:spTgt spid="75">
                                             <p:txEl>
@@ -25404,47 +26636,29 @@
                                   </p:childTnLst>
                                 </p:cTn>
                               </p:par>
-                            </p:childTnLst>
-                          </p:cTn>
-                        </p:par>
-                      </p:childTnLst>
-                    </p:cTn>
-                  </p:par>
-                  <p:par>
-                    <p:cTn id="162" fill="hold">
-                      <p:stCondLst>
-                        <p:cond delay="indefinite"/>
-                      </p:stCondLst>
-                      <p:childTnLst>
-                        <p:par>
-                          <p:cTn id="163" fill="hold">
-                            <p:stCondLst>
-                              <p:cond delay="0"/>
-                            </p:stCondLst>
-                            <p:childTnLst>
                               <p:par>
-                                <p:cTn id="164" presetID="3" presetClass="exit" presetSubtype="10" fill="hold" nodeType="clickEffect">
+                                <p:cTn id="157" presetID="3" presetClass="exit" presetSubtype="10" fill="hold" grpId="3" nodeType="withEffect">
                                   <p:stCondLst>
                                     <p:cond delay="0"/>
                                   </p:stCondLst>
                                   <p:childTnLst>
                                     <p:animEffect transition="out" filter="blinds(horizontal)">
                                       <p:cBhvr>
-                                        <p:cTn id="165" dur="500"/>
+                                        <p:cTn id="158" dur="500"/>
                                         <p:tgtEl>
-                                          <p:spTgt spid="76"/>
+                                          <p:spTgt spid="96"/>
                                         </p:tgtEl>
                                       </p:cBhvr>
                                     </p:animEffect>
                                     <p:set>
                                       <p:cBhvr>
-                                        <p:cTn id="166" dur="1" fill="hold">
+                                        <p:cTn id="159" dur="1" fill="hold">
                                           <p:stCondLst>
                                             <p:cond delay="499"/>
                                           </p:stCondLst>
                                         </p:cTn>
                                         <p:tgtEl>
-                                          <p:spTgt spid="76"/>
+                                          <p:spTgt spid="96"/>
                                         </p:tgtEl>
                                         <p:attrNameLst>
                                           <p:attrName>style.visibility</p:attrName>
@@ -25458,28 +26672,28 @@
                                 </p:cTn>
                               </p:par>
                               <p:par>
-                                <p:cTn id="167" presetID="3" presetClass="exit" presetSubtype="10" fill="hold" nodeType="withEffect">
+                                <p:cTn id="160" presetID="3" presetClass="exit" presetSubtype="10" fill="hold" grpId="1" nodeType="withEffect">
                                   <p:stCondLst>
                                     <p:cond delay="0"/>
                                   </p:stCondLst>
                                   <p:childTnLst>
                                     <p:animEffect transition="out" filter="blinds(horizontal)">
                                       <p:cBhvr>
-                                        <p:cTn id="168" dur="500"/>
+                                        <p:cTn id="161" dur="500"/>
                                         <p:tgtEl>
-                                          <p:spTgt spid="116"/>
+                                          <p:spTgt spid="104"/>
                                         </p:tgtEl>
                                       </p:cBhvr>
                                     </p:animEffect>
                                     <p:set>
                                       <p:cBhvr>
-                                        <p:cTn id="169" dur="1" fill="hold">
+                                        <p:cTn id="162" dur="1" fill="hold">
                                           <p:stCondLst>
                                             <p:cond delay="499"/>
                                           </p:stCondLst>
                                         </p:cTn>
                                         <p:tgtEl>
-                                          <p:spTgt spid="116"/>
+                                          <p:spTgt spid="104"/>
                                         </p:tgtEl>
                                         <p:attrNameLst>
                                           <p:attrName>style.visibility</p:attrName>
@@ -25531,10 +26745,17 @@
       <p:bldP spid="99" grpId="0"/>
       <p:bldP spid="100" grpId="0"/>
       <p:bldP spid="42" grpId="0" animBg="1"/>
+      <p:bldP spid="83" grpId="0" animBg="1"/>
+      <p:bldP spid="96" grpId="0" animBg="1"/>
+      <p:bldP spid="96" grpId="1" animBg="1"/>
+      <p:bldP spid="96" grpId="2" animBg="1"/>
+      <p:bldP spid="96" grpId="3" animBg="1"/>
+      <p:bldP spid="101" grpId="0" animBg="1"/>
+      <p:bldP spid="101" grpId="1" animBg="1"/>
+      <p:bldP spid="104" grpId="0" animBg="1"/>
+      <p:bldP spid="104" grpId="1" animBg="1"/>
       <p:bldP spid="70" grpId="0" animBg="1"/>
       <p:bldP spid="70" grpId="1" animBg="1"/>
-      <p:bldP spid="83" grpId="0" animBg="1"/>
-      <p:bldP spid="95" grpId="0" animBg="1"/>
     </p:bldLst>
   </p:timing>
 </p:sld>

</xml_diff>

<commit_message>
Capítulo 8: Sincronização de bloco.
</commit_message>
<xml_diff>
--- a/2-Java-Programmer-Modulo-II/14.Capitulo08.pptx
+++ b/2-Java-Programmer-Modulo-II/14.Capitulo08.pptx
@@ -5,7 +5,7 @@
     <p:sldMasterId id="2147483660" r:id="rId1"/>
   </p:sldMasterIdLst>
   <p:notesMasterIdLst>
-    <p:notesMasterId r:id="rId34"/>
+    <p:notesMasterId r:id="rId36"/>
   </p:notesMasterIdLst>
   <p:sldIdLst>
     <p:sldId id="256" r:id="rId2"/>
@@ -38,8 +38,10 @@
     <p:sldId id="344" r:id="rId29"/>
     <p:sldId id="345" r:id="rId30"/>
     <p:sldId id="315" r:id="rId31"/>
-    <p:sldId id="316" r:id="rId32"/>
-    <p:sldId id="317" r:id="rId33"/>
+    <p:sldId id="346" r:id="rId32"/>
+    <p:sldId id="347" r:id="rId33"/>
+    <p:sldId id="316" r:id="rId34"/>
+    <p:sldId id="317" r:id="rId35"/>
   </p:sldIdLst>
   <p:sldSz cx="9144000" cy="6858000" type="screen4x3"/>
   <p:notesSz cx="6858000" cy="9144000"/>
@@ -468,7 +470,7 @@
               <a:pPr>
                 <a:defRPr/>
               </a:pPr>
-              <a:t>‹#›</a:t>
+              <a:t>‹nº›</a:t>
             </a:fld>
             <a:endParaRPr lang="pt-BR"/>
           </a:p>
@@ -2960,7 +2962,7 @@
       </p:grpSpPr>
       <p:sp>
         <p:nvSpPr>
-          <p:cNvPr id="49154" name="Espaço Reservado para Imagem de Slide 1"/>
+          <p:cNvPr id="48130" name="Espaço Reservado para Imagem de Slide 1"/>
           <p:cNvSpPr>
             <a:spLocks noGrp="1" noRot="1" noChangeAspect="1" noTextEdit="1"/>
           </p:cNvSpPr>
@@ -2982,7 +2984,7 @@
       </p:sp>
       <p:sp>
         <p:nvSpPr>
-          <p:cNvPr id="49155" name="Espaço Reservado para Anotações 2"/>
+          <p:cNvPr id="48131" name="Espaço Reservado para Anotações 2"/>
           <p:cNvSpPr>
             <a:spLocks noGrp="1"/>
           </p:cNvSpPr>
@@ -3023,7 +3025,7 @@
             <a:pPr>
               <a:defRPr/>
             </a:pPr>
-            <a:fld id="{94627C42-8E0D-4C50-A726-3D908F1BD667}" type="slidenum">
+            <a:fld id="{48A4B3DD-DC3A-4A1F-BDF3-5FDBAE99314D}" type="slidenum">
               <a:rPr lang="pt-BR" smtClean="0"/>
               <a:pPr>
                 <a:defRPr/>
@@ -3061,7 +3063,7 @@
       </p:grpSpPr>
       <p:sp>
         <p:nvSpPr>
-          <p:cNvPr id="50178" name="Espaço Reservado para Imagem de Slide 1"/>
+          <p:cNvPr id="48130" name="Espaço Reservado para Imagem de Slide 1"/>
           <p:cNvSpPr>
             <a:spLocks noGrp="1" noRot="1" noChangeAspect="1" noTextEdit="1"/>
           </p:cNvSpPr>
@@ -3083,7 +3085,7 @@
       </p:sp>
       <p:sp>
         <p:nvSpPr>
-          <p:cNvPr id="50179" name="Espaço Reservado para Anotações 2"/>
+          <p:cNvPr id="48131" name="Espaço Reservado para Anotações 2"/>
           <p:cNvSpPr>
             <a:spLocks noGrp="1"/>
           </p:cNvSpPr>
@@ -3124,12 +3126,214 @@
             <a:pPr>
               <a:defRPr/>
             </a:pPr>
+            <a:fld id="{48A4B3DD-DC3A-4A1F-BDF3-5FDBAE99314D}" type="slidenum">
+              <a:rPr lang="pt-BR" smtClean="0"/>
+              <a:pPr>
+                <a:defRPr/>
+              </a:pPr>
+              <a:t>32</a:t>
+            </a:fld>
+            <a:endParaRPr lang="pt-BR"/>
+          </a:p>
+        </p:txBody>
+      </p:sp>
+    </p:spTree>
+  </p:cSld>
+  <p:clrMapOvr>
+    <a:masterClrMapping/>
+  </p:clrMapOvr>
+</p:notes>
+</file>
+
+<file path=ppt/notesSlides/notesSlide33.xml><?xml version="1.0" encoding="utf-8"?>
+<p:notes xmlns:a="http://schemas.openxmlformats.org/drawingml/2006/main" xmlns:r="http://schemas.openxmlformats.org/officeDocument/2006/relationships" xmlns:p="http://schemas.openxmlformats.org/presentationml/2006/main">
+  <p:cSld>
+    <p:spTree>
+      <p:nvGrpSpPr>
+        <p:cNvPr id="1" name=""/>
+        <p:cNvGrpSpPr/>
+        <p:nvPr/>
+      </p:nvGrpSpPr>
+      <p:grpSpPr>
+        <a:xfrm>
+          <a:off x="0" y="0"/>
+          <a:ext cx="0" cy="0"/>
+          <a:chOff x="0" y="0"/>
+          <a:chExt cx="0" cy="0"/>
+        </a:xfrm>
+      </p:grpSpPr>
+      <p:sp>
+        <p:nvSpPr>
+          <p:cNvPr id="49154" name="Espaço Reservado para Imagem de Slide 1"/>
+          <p:cNvSpPr>
+            <a:spLocks noGrp="1" noRot="1" noChangeAspect="1" noTextEdit="1"/>
+          </p:cNvSpPr>
+          <p:nvPr>
+            <p:ph type="sldImg"/>
+          </p:nvPr>
+        </p:nvSpPr>
+        <p:spPr bwMode="auto">
+          <a:noFill/>
+          <a:ln>
+            <a:solidFill>
+              <a:srgbClr val="000000"/>
+            </a:solidFill>
+            <a:miter lim="800000"/>
+            <a:headEnd/>
+            <a:tailEnd/>
+          </a:ln>
+        </p:spPr>
+      </p:sp>
+      <p:sp>
+        <p:nvSpPr>
+          <p:cNvPr id="49155" name="Espaço Reservado para Anotações 2"/>
+          <p:cNvSpPr>
+            <a:spLocks noGrp="1"/>
+          </p:cNvSpPr>
+          <p:nvPr>
+            <p:ph type="body" idx="1"/>
+          </p:nvPr>
+        </p:nvSpPr>
+        <p:spPr bwMode="auto">
+          <a:noFill/>
+        </p:spPr>
+        <p:txBody>
+          <a:bodyPr wrap="square" numCol="1" anchor="t" anchorCtr="0" compatLnSpc="1">
+            <a:prstTxWarp prst="textNoShape">
+              <a:avLst/>
+            </a:prstTxWarp>
+          </a:bodyPr>
+          <a:lstStyle/>
+          <a:p>
+            <a:endParaRPr lang="pt-BR" smtClean="0"/>
+          </a:p>
+        </p:txBody>
+      </p:sp>
+      <p:sp>
+        <p:nvSpPr>
+          <p:cNvPr id="4" name="Espaço Reservado para Número de Slide 3"/>
+          <p:cNvSpPr>
+            <a:spLocks noGrp="1"/>
+          </p:cNvSpPr>
+          <p:nvPr>
+            <p:ph type="sldNum" sz="quarter" idx="5"/>
+          </p:nvPr>
+        </p:nvSpPr>
+        <p:spPr/>
+        <p:txBody>
+          <a:bodyPr/>
+          <a:lstStyle/>
+          <a:p>
+            <a:pPr>
+              <a:defRPr/>
+            </a:pPr>
+            <a:fld id="{94627C42-8E0D-4C50-A726-3D908F1BD667}" type="slidenum">
+              <a:rPr lang="pt-BR" smtClean="0"/>
+              <a:pPr>
+                <a:defRPr/>
+              </a:pPr>
+              <a:t>33</a:t>
+            </a:fld>
+            <a:endParaRPr lang="pt-BR"/>
+          </a:p>
+        </p:txBody>
+      </p:sp>
+    </p:spTree>
+  </p:cSld>
+  <p:clrMapOvr>
+    <a:masterClrMapping/>
+  </p:clrMapOvr>
+</p:notes>
+</file>
+
+<file path=ppt/notesSlides/notesSlide34.xml><?xml version="1.0" encoding="utf-8"?>
+<p:notes xmlns:a="http://schemas.openxmlformats.org/drawingml/2006/main" xmlns:r="http://schemas.openxmlformats.org/officeDocument/2006/relationships" xmlns:p="http://schemas.openxmlformats.org/presentationml/2006/main">
+  <p:cSld>
+    <p:spTree>
+      <p:nvGrpSpPr>
+        <p:cNvPr id="1" name=""/>
+        <p:cNvGrpSpPr/>
+        <p:nvPr/>
+      </p:nvGrpSpPr>
+      <p:grpSpPr>
+        <a:xfrm>
+          <a:off x="0" y="0"/>
+          <a:ext cx="0" cy="0"/>
+          <a:chOff x="0" y="0"/>
+          <a:chExt cx="0" cy="0"/>
+        </a:xfrm>
+      </p:grpSpPr>
+      <p:sp>
+        <p:nvSpPr>
+          <p:cNvPr id="50178" name="Espaço Reservado para Imagem de Slide 1"/>
+          <p:cNvSpPr>
+            <a:spLocks noGrp="1" noRot="1" noChangeAspect="1" noTextEdit="1"/>
+          </p:cNvSpPr>
+          <p:nvPr>
+            <p:ph type="sldImg"/>
+          </p:nvPr>
+        </p:nvSpPr>
+        <p:spPr bwMode="auto">
+          <a:noFill/>
+          <a:ln>
+            <a:solidFill>
+              <a:srgbClr val="000000"/>
+            </a:solidFill>
+            <a:miter lim="800000"/>
+            <a:headEnd/>
+            <a:tailEnd/>
+          </a:ln>
+        </p:spPr>
+      </p:sp>
+      <p:sp>
+        <p:nvSpPr>
+          <p:cNvPr id="50179" name="Espaço Reservado para Anotações 2"/>
+          <p:cNvSpPr>
+            <a:spLocks noGrp="1"/>
+          </p:cNvSpPr>
+          <p:nvPr>
+            <p:ph type="body" idx="1"/>
+          </p:nvPr>
+        </p:nvSpPr>
+        <p:spPr bwMode="auto">
+          <a:noFill/>
+        </p:spPr>
+        <p:txBody>
+          <a:bodyPr wrap="square" numCol="1" anchor="t" anchorCtr="0" compatLnSpc="1">
+            <a:prstTxWarp prst="textNoShape">
+              <a:avLst/>
+            </a:prstTxWarp>
+          </a:bodyPr>
+          <a:lstStyle/>
+          <a:p>
+            <a:endParaRPr lang="pt-BR" smtClean="0"/>
+          </a:p>
+        </p:txBody>
+      </p:sp>
+      <p:sp>
+        <p:nvSpPr>
+          <p:cNvPr id="4" name="Espaço Reservado para Número de Slide 3"/>
+          <p:cNvSpPr>
+            <a:spLocks noGrp="1"/>
+          </p:cNvSpPr>
+          <p:nvPr>
+            <p:ph type="sldNum" sz="quarter" idx="5"/>
+          </p:nvPr>
+        </p:nvSpPr>
+        <p:spPr/>
+        <p:txBody>
+          <a:bodyPr/>
+          <a:lstStyle/>
+          <a:p>
+            <a:pPr>
+              <a:defRPr/>
+            </a:pPr>
             <a:fld id="{D1504F8C-84CC-4741-AE25-BE957FF16396}" type="slidenum">
               <a:rPr lang="pt-BR" smtClean="0"/>
               <a:pPr>
                 <a:defRPr/>
               </a:pPr>
-              <a:t>32</a:t>
+              <a:t>34</a:t>
             </a:fld>
             <a:endParaRPr lang="pt-BR"/>
           </a:p>
@@ -4226,7 +4430,7 @@
               <a:pPr>
                 <a:defRPr/>
               </a:pPr>
-              <a:t>‹#›</a:t>
+              <a:t>‹nº›</a:t>
             </a:fld>
             <a:endParaRPr lang="pt-BR"/>
           </a:p>
@@ -4425,7 +4629,7 @@
               <a:pPr>
                 <a:defRPr/>
               </a:pPr>
-              <a:t>‹#›</a:t>
+              <a:t>‹nº›</a:t>
             </a:fld>
             <a:endParaRPr lang="pt-BR"/>
           </a:p>
@@ -4627,7 +4831,7 @@
               <a:pPr>
                 <a:defRPr/>
               </a:pPr>
-              <a:t>‹#›</a:t>
+              <a:t>‹nº›</a:t>
             </a:fld>
             <a:endParaRPr lang="pt-BR"/>
           </a:p>
@@ -4823,7 +5027,7 @@
               <a:pPr>
                 <a:defRPr/>
               </a:pPr>
-              <a:t>‹#›</a:t>
+              <a:t>‹nº›</a:t>
             </a:fld>
             <a:endParaRPr lang="pt-BR"/>
           </a:p>
@@ -5329,7 +5533,7 @@
               <a:pPr>
                 <a:defRPr/>
               </a:pPr>
-              <a:t>‹#›</a:t>
+              <a:t>‹nº›</a:t>
             </a:fld>
             <a:endParaRPr lang="pt-BR"/>
           </a:p>
@@ -5620,7 +5824,7 @@
               <a:pPr>
                 <a:defRPr/>
               </a:pPr>
-              <a:t>‹#›</a:t>
+              <a:t>‹nº›</a:t>
             </a:fld>
             <a:endParaRPr lang="pt-BR"/>
           </a:p>
@@ -6021,7 +6225,7 @@
               <a:pPr>
                 <a:defRPr/>
               </a:pPr>
-              <a:t>‹#›</a:t>
+              <a:t>‹nº›</a:t>
             </a:fld>
             <a:endParaRPr lang="pt-BR"/>
           </a:p>
@@ -6170,7 +6374,7 @@
               <a:pPr>
                 <a:defRPr/>
               </a:pPr>
-              <a:t>‹#›</a:t>
+              <a:t>‹nº›</a:t>
             </a:fld>
             <a:endParaRPr lang="pt-BR"/>
           </a:p>
@@ -6287,7 +6491,7 @@
               <a:pPr>
                 <a:defRPr/>
               </a:pPr>
-              <a:t>‹#›</a:t>
+              <a:t>‹nº›</a:t>
             </a:fld>
             <a:endParaRPr lang="pt-BR"/>
           </a:p>
@@ -6568,7 +6772,7 @@
               <a:pPr>
                 <a:defRPr/>
               </a:pPr>
-              <a:t>‹#›</a:t>
+              <a:t>‹nº›</a:t>
             </a:fld>
             <a:endParaRPr lang="pt-BR"/>
           </a:p>
@@ -6847,7 +7051,7 @@
               <a:pPr>
                 <a:defRPr/>
               </a:pPr>
-              <a:t>‹#›</a:t>
+              <a:t>‹nº›</a:t>
             </a:fld>
             <a:endParaRPr lang="pt-BR"/>
           </a:p>
@@ -7369,7 +7573,7 @@
               <a:pPr>
                 <a:defRPr/>
               </a:pPr>
-              <a:t>‹#›</a:t>
+              <a:t>‹nº›</a:t>
             </a:fld>
             <a:endParaRPr lang="pt-BR"/>
           </a:p>
@@ -26935,7 +27139,7 @@
         <p:spPr>
           <a:xfrm>
             <a:off x="457200" y="274638"/>
-            <a:ext cx="8147248" cy="1143000"/>
+            <a:ext cx="8075240" cy="1143000"/>
           </a:xfrm>
         </p:spPr>
         <p:txBody>
@@ -26957,20 +27161,436 @@
       </p:sp>
       <p:sp>
         <p:nvSpPr>
-          <p:cNvPr id="25603" name="Espaço Reservado para Conteúdo 2"/>
+          <p:cNvPr id="5" name="Espaço Reservado para Conteúdo 4"/>
           <p:cNvSpPr>
             <a:spLocks noGrp="1"/>
           </p:cNvSpPr>
           <p:nvPr>
-            <p:ph idx="1"/>
+            <p:ph sz="half" idx="1"/>
           </p:nvPr>
         </p:nvSpPr>
-        <p:spPr/>
+        <p:spPr>
+          <a:xfrm>
+            <a:off x="755576" y="1600201"/>
+            <a:ext cx="7499176" cy="964704"/>
+          </a:xfrm>
+        </p:spPr>
         <p:txBody>
           <a:bodyPr/>
           <a:lstStyle/>
           <a:p>
-            <a:endParaRPr lang="pt-BR" smtClean="0"/>
+            <a:r>
+              <a:rPr lang="pt-BR" dirty="0" smtClean="0"/>
+              <a:t>A sincronização geralmente é utilizada em diversos métodos da mesma classe:</a:t>
+            </a:r>
+            <a:endParaRPr lang="pt-BR" dirty="0"/>
+          </a:p>
+        </p:txBody>
+      </p:sp>
+      <p:sp>
+        <p:nvSpPr>
+          <p:cNvPr id="6" name="Espaço Reservado para Conteúdo 5"/>
+          <p:cNvSpPr>
+            <a:spLocks noGrp="1"/>
+          </p:cNvSpPr>
+          <p:nvPr>
+            <p:ph sz="half" idx="2"/>
+          </p:nvPr>
+        </p:nvSpPr>
+        <p:spPr>
+          <a:xfrm>
+            <a:off x="1403648" y="2708920"/>
+            <a:ext cx="6233120" cy="3672408"/>
+          </a:xfrm>
+          <a:ln>
+            <a:noFill/>
+          </a:ln>
+        </p:spPr>
+        <p:txBody>
+          <a:bodyPr/>
+          <a:lstStyle/>
+          <a:p>
+            <a:pPr marL="0" indent="0">
+              <a:spcBef>
+                <a:spcPts val="0"/>
+              </a:spcBef>
+              <a:buNone/>
+              <a:tabLst>
+                <a:tab pos="539750" algn="l"/>
+                <a:tab pos="984250" algn="l"/>
+              </a:tabLst>
+            </a:pPr>
+            <a:r>
+              <a:rPr lang="pt-BR" sz="2000" dirty="0" err="1" smtClean="0"/>
+              <a:t>public</a:t>
+            </a:r>
+            <a:r>
+              <a:rPr lang="pt-BR" sz="2000" dirty="0" smtClean="0"/>
+              <a:t> </a:t>
+            </a:r>
+            <a:r>
+              <a:rPr lang="pt-BR" sz="2000" dirty="0" err="1" smtClean="0"/>
+              <a:t>class</a:t>
+            </a:r>
+            <a:r>
+              <a:rPr lang="pt-BR" sz="2000" dirty="0" smtClean="0"/>
+              <a:t> </a:t>
+            </a:r>
+            <a:r>
+              <a:rPr lang="pt-BR" sz="2000" dirty="0" err="1" smtClean="0"/>
+              <a:t>Vector</a:t>
+            </a:r>
+            <a:r>
+              <a:rPr lang="pt-BR" sz="2000" dirty="0" smtClean="0"/>
+              <a:t> {</a:t>
+            </a:r>
+          </a:p>
+          <a:p>
+            <a:pPr marL="0" indent="0">
+              <a:spcBef>
+                <a:spcPts val="0"/>
+              </a:spcBef>
+              <a:buNone/>
+              <a:tabLst>
+                <a:tab pos="539750" algn="l"/>
+                <a:tab pos="984250" algn="l"/>
+              </a:tabLst>
+            </a:pPr>
+            <a:r>
+              <a:rPr lang="pt-BR" sz="2000" dirty="0" smtClean="0"/>
+              <a:t>	</a:t>
+            </a:r>
+            <a:r>
+              <a:rPr lang="pt-BR" sz="2000" dirty="0" err="1" smtClean="0"/>
+              <a:t>public</a:t>
+            </a:r>
+            <a:r>
+              <a:rPr lang="pt-BR" sz="2000" dirty="0" smtClean="0"/>
+              <a:t> </a:t>
+            </a:r>
+            <a:r>
+              <a:rPr lang="pt-BR" sz="2000" b="1" dirty="0" err="1" smtClean="0">
+                <a:solidFill>
+                  <a:srgbClr val="FFC000"/>
+                </a:solidFill>
+              </a:rPr>
+              <a:t>synchronized</a:t>
+            </a:r>
+            <a:r>
+              <a:rPr lang="pt-BR" sz="2000" dirty="0" smtClean="0"/>
+              <a:t> </a:t>
+            </a:r>
+            <a:r>
+              <a:rPr lang="pt-BR" sz="2000" dirty="0" err="1" smtClean="0"/>
+              <a:t>boolean</a:t>
+            </a:r>
+            <a:r>
+              <a:rPr lang="pt-BR" sz="2000" dirty="0" smtClean="0"/>
+              <a:t> </a:t>
+            </a:r>
+            <a:r>
+              <a:rPr lang="pt-BR" sz="2000" dirty="0" err="1" smtClean="0"/>
+              <a:t>add</a:t>
+            </a:r>
+            <a:r>
+              <a:rPr lang="pt-BR" sz="2000" dirty="0" smtClean="0"/>
+              <a:t>(</a:t>
+            </a:r>
+            <a:r>
+              <a:rPr lang="pt-BR" sz="2000" dirty="0" err="1" smtClean="0"/>
+              <a:t>Object</a:t>
+            </a:r>
+            <a:r>
+              <a:rPr lang="pt-BR" sz="2000" dirty="0" smtClean="0"/>
+              <a:t> e) {</a:t>
+            </a:r>
+          </a:p>
+          <a:p>
+            <a:pPr marL="0" indent="0">
+              <a:spcBef>
+                <a:spcPts val="0"/>
+              </a:spcBef>
+              <a:buNone/>
+              <a:tabLst>
+                <a:tab pos="539750" algn="l"/>
+                <a:tab pos="984250" algn="l"/>
+              </a:tabLst>
+            </a:pPr>
+            <a:r>
+              <a:rPr lang="pt-BR" sz="2000" dirty="0" smtClean="0"/>
+              <a:t>		</a:t>
+            </a:r>
+            <a:r>
+              <a:rPr lang="pt-BR" sz="2000" dirty="0" smtClean="0"/>
+              <a:t>...</a:t>
+            </a:r>
+            <a:endParaRPr lang="pt-BR" sz="2000" dirty="0" smtClean="0"/>
+          </a:p>
+          <a:p>
+            <a:pPr marL="0" indent="0">
+              <a:spcBef>
+                <a:spcPts val="0"/>
+              </a:spcBef>
+              <a:buNone/>
+              <a:tabLst>
+                <a:tab pos="539750" algn="l"/>
+                <a:tab pos="984250" algn="l"/>
+              </a:tabLst>
+            </a:pPr>
+            <a:r>
+              <a:rPr lang="pt-BR" sz="2000" dirty="0" smtClean="0"/>
+              <a:t>	</a:t>
+            </a:r>
+            <a:r>
+              <a:rPr lang="pt-BR" sz="2000" dirty="0" smtClean="0"/>
+              <a:t>}</a:t>
+            </a:r>
+            <a:endParaRPr lang="pt-BR" sz="2000" dirty="0" smtClean="0"/>
+          </a:p>
+          <a:p>
+            <a:pPr marL="0" indent="0">
+              <a:spcBef>
+                <a:spcPts val="0"/>
+              </a:spcBef>
+              <a:buNone/>
+              <a:tabLst>
+                <a:tab pos="539750" algn="l"/>
+                <a:tab pos="984250" algn="l"/>
+              </a:tabLst>
+            </a:pPr>
+            <a:r>
+              <a:rPr lang="pt-BR" sz="2000" dirty="0" smtClean="0"/>
+              <a:t>	</a:t>
+            </a:r>
+            <a:r>
+              <a:rPr lang="pt-BR" sz="2000" dirty="0" err="1" smtClean="0"/>
+              <a:t>public</a:t>
+            </a:r>
+            <a:r>
+              <a:rPr lang="pt-BR" sz="2000" dirty="0" smtClean="0"/>
+              <a:t> </a:t>
+            </a:r>
+            <a:r>
+              <a:rPr lang="pt-BR" sz="2000" b="1" dirty="0" err="1" smtClean="0">
+                <a:solidFill>
+                  <a:srgbClr val="FFC000"/>
+                </a:solidFill>
+              </a:rPr>
+              <a:t>synchronized</a:t>
+            </a:r>
+            <a:r>
+              <a:rPr lang="pt-BR" sz="2000" dirty="0" smtClean="0"/>
+              <a:t> </a:t>
+            </a:r>
+            <a:r>
+              <a:rPr lang="pt-BR" sz="2000" dirty="0" err="1" smtClean="0"/>
+              <a:t>Object</a:t>
+            </a:r>
+            <a:r>
+              <a:rPr lang="pt-BR" sz="2000" dirty="0" smtClean="0"/>
+              <a:t> remove(</a:t>
+            </a:r>
+            <a:r>
+              <a:rPr lang="pt-BR" sz="2000" dirty="0" err="1" smtClean="0"/>
+              <a:t>int</a:t>
+            </a:r>
+            <a:r>
+              <a:rPr lang="pt-BR" sz="2000" dirty="0" smtClean="0"/>
+              <a:t> </a:t>
+            </a:r>
+            <a:r>
+              <a:rPr lang="pt-BR" sz="2000" dirty="0" err="1" smtClean="0"/>
+              <a:t>index</a:t>
+            </a:r>
+            <a:r>
+              <a:rPr lang="pt-BR" sz="2000" dirty="0" smtClean="0"/>
+              <a:t>) {</a:t>
+            </a:r>
+          </a:p>
+          <a:p>
+            <a:pPr marL="0" indent="0">
+              <a:spcBef>
+                <a:spcPts val="0"/>
+              </a:spcBef>
+              <a:buNone/>
+              <a:tabLst>
+                <a:tab pos="539750" algn="l"/>
+                <a:tab pos="984250" algn="l"/>
+              </a:tabLst>
+            </a:pPr>
+            <a:r>
+              <a:rPr lang="pt-BR" sz="2000" dirty="0" smtClean="0"/>
+              <a:t>		</a:t>
+            </a:r>
+            <a:r>
+              <a:rPr lang="pt-BR" sz="2000" dirty="0" smtClean="0"/>
+              <a:t>...</a:t>
+            </a:r>
+            <a:endParaRPr lang="pt-BR" sz="2000" dirty="0" smtClean="0"/>
+          </a:p>
+          <a:p>
+            <a:pPr marL="0" indent="0">
+              <a:spcBef>
+                <a:spcPts val="0"/>
+              </a:spcBef>
+              <a:buNone/>
+              <a:tabLst>
+                <a:tab pos="539750" algn="l"/>
+                <a:tab pos="984250" algn="l"/>
+              </a:tabLst>
+            </a:pPr>
+            <a:r>
+              <a:rPr lang="pt-BR" sz="2000" dirty="0" smtClean="0"/>
+              <a:t>	</a:t>
+            </a:r>
+            <a:r>
+              <a:rPr lang="pt-BR" sz="2000" dirty="0" smtClean="0"/>
+              <a:t>}</a:t>
+            </a:r>
+            <a:endParaRPr lang="pt-BR" sz="2000" dirty="0" smtClean="0"/>
+          </a:p>
+          <a:p>
+            <a:pPr marL="0" indent="0">
+              <a:spcBef>
+                <a:spcPts val="0"/>
+              </a:spcBef>
+              <a:buNone/>
+              <a:tabLst>
+                <a:tab pos="539750" algn="l"/>
+                <a:tab pos="984250" algn="l"/>
+              </a:tabLst>
+            </a:pPr>
+            <a:r>
+              <a:rPr lang="pt-BR" sz="2000" dirty="0" smtClean="0"/>
+              <a:t>	</a:t>
+            </a:r>
+            <a:r>
+              <a:rPr lang="pt-BR" sz="2000" dirty="0" err="1" smtClean="0"/>
+              <a:t>public</a:t>
+            </a:r>
+            <a:r>
+              <a:rPr lang="pt-BR" sz="2000" dirty="0" smtClean="0"/>
+              <a:t> </a:t>
+            </a:r>
+            <a:r>
+              <a:rPr lang="pt-BR" sz="2000" b="1" dirty="0" err="1" smtClean="0">
+                <a:solidFill>
+                  <a:srgbClr val="FFC000"/>
+                </a:solidFill>
+              </a:rPr>
+              <a:t>synchronized</a:t>
+            </a:r>
+            <a:r>
+              <a:rPr lang="pt-BR" sz="2000" dirty="0" smtClean="0"/>
+              <a:t> </a:t>
+            </a:r>
+            <a:r>
+              <a:rPr lang="pt-BR" sz="2000" dirty="0" err="1" smtClean="0"/>
+              <a:t>Object</a:t>
+            </a:r>
+            <a:r>
+              <a:rPr lang="pt-BR" sz="2000" dirty="0" smtClean="0"/>
+              <a:t> </a:t>
+            </a:r>
+            <a:r>
+              <a:rPr lang="pt-BR" sz="2000" dirty="0" err="1" smtClean="0"/>
+              <a:t>get</a:t>
+            </a:r>
+            <a:r>
+              <a:rPr lang="pt-BR" sz="2000" dirty="0" smtClean="0"/>
+              <a:t>(</a:t>
+            </a:r>
+            <a:r>
+              <a:rPr lang="pt-BR" sz="2000" dirty="0" err="1" smtClean="0"/>
+              <a:t>int</a:t>
+            </a:r>
+            <a:r>
+              <a:rPr lang="pt-BR" sz="2000" dirty="0" smtClean="0"/>
+              <a:t> </a:t>
+            </a:r>
+            <a:r>
+              <a:rPr lang="pt-BR" sz="2000" dirty="0" err="1" smtClean="0"/>
+              <a:t>index</a:t>
+            </a:r>
+            <a:r>
+              <a:rPr lang="pt-BR" sz="2000" dirty="0" smtClean="0"/>
+              <a:t>) {</a:t>
+            </a:r>
+          </a:p>
+          <a:p>
+            <a:pPr marL="0" indent="0">
+              <a:spcBef>
+                <a:spcPts val="0"/>
+              </a:spcBef>
+              <a:buNone/>
+              <a:tabLst>
+                <a:tab pos="539750" algn="l"/>
+                <a:tab pos="984250" algn="l"/>
+              </a:tabLst>
+            </a:pPr>
+            <a:r>
+              <a:rPr lang="pt-BR" sz="2000" dirty="0" smtClean="0"/>
+              <a:t>		</a:t>
+            </a:r>
+            <a:r>
+              <a:rPr lang="pt-BR" sz="2000" dirty="0" smtClean="0"/>
+              <a:t>...</a:t>
+            </a:r>
+            <a:endParaRPr lang="pt-BR" sz="2000" dirty="0" smtClean="0"/>
+          </a:p>
+          <a:p>
+            <a:pPr marL="0" indent="0">
+              <a:spcBef>
+                <a:spcPts val="0"/>
+              </a:spcBef>
+              <a:buNone/>
+              <a:tabLst>
+                <a:tab pos="539750" algn="l"/>
+                <a:tab pos="984250" algn="l"/>
+              </a:tabLst>
+            </a:pPr>
+            <a:r>
+              <a:rPr lang="pt-BR" sz="2000" dirty="0" smtClean="0"/>
+              <a:t>	</a:t>
+            </a:r>
+            <a:r>
+              <a:rPr lang="pt-BR" sz="2000" dirty="0" smtClean="0"/>
+              <a:t>}</a:t>
+            </a:r>
+          </a:p>
+          <a:p>
+            <a:pPr marL="0" indent="0">
+              <a:spcBef>
+                <a:spcPts val="0"/>
+              </a:spcBef>
+              <a:buNone/>
+              <a:tabLst>
+                <a:tab pos="539750" algn="l"/>
+                <a:tab pos="984250" algn="l"/>
+              </a:tabLst>
+            </a:pPr>
+            <a:r>
+              <a:rPr lang="pt-BR" sz="2000" dirty="0" smtClean="0"/>
+              <a:t>	...</a:t>
+            </a:r>
+            <a:endParaRPr lang="pt-BR" sz="2000" dirty="0" smtClean="0"/>
+          </a:p>
+          <a:p>
+            <a:pPr marL="0" indent="0">
+              <a:spcBef>
+                <a:spcPts val="0"/>
+              </a:spcBef>
+              <a:buNone/>
+              <a:tabLst>
+                <a:tab pos="539750" algn="l"/>
+                <a:tab pos="984250" algn="l"/>
+              </a:tabLst>
+            </a:pPr>
+            <a:r>
+              <a:rPr lang="pt-BR" sz="2000" dirty="0" smtClean="0"/>
+              <a:t>}</a:t>
+            </a:r>
+            <a:endParaRPr lang="pt-BR" sz="2000" dirty="0" smtClean="0"/>
           </a:p>
         </p:txBody>
       </p:sp>
@@ -27037,7 +27657,7 @@
       </p:grpSpPr>
       <p:sp>
         <p:nvSpPr>
-          <p:cNvPr id="26626" name="Título 1"/>
+          <p:cNvPr id="25602" name="Título 1"/>
           <p:cNvSpPr>
             <a:spLocks noGrp="1"/>
           </p:cNvSpPr>
@@ -27045,15 +27665,28 @@
             <p:ph type="title"/>
           </p:nvPr>
         </p:nvSpPr>
-        <p:spPr/>
+        <p:spPr>
+          <a:xfrm>
+            <a:off x="457200" y="274638"/>
+            <a:ext cx="8075240" cy="1143000"/>
+          </a:xfrm>
+        </p:spPr>
         <p:txBody>
           <a:bodyPr/>
           <a:lstStyle/>
           <a:p>
             <a:pPr eaLnBrk="1" hangingPunct="1"/>
             <a:r>
-              <a:rPr lang="pt-BR" dirty="0" err="1" smtClean="0"/>
-              <a:t>Deadlock</a:t>
+              <a:rPr lang="pt-BR" dirty="0" smtClean="0"/>
+              <a:t>Sincronização – </a:t>
+            </a:r>
+            <a:r>
+              <a:rPr lang="pt-BR" sz="3600" dirty="0" smtClean="0"/>
+              <a:t>Bloqueio de </a:t>
+            </a:r>
+            <a:r>
+              <a:rPr lang="pt-BR" sz="3600" dirty="0" smtClean="0"/>
+              <a:t>trecho</a:t>
             </a:r>
             <a:endParaRPr lang="pt-BR" dirty="0" smtClean="0"/>
           </a:p>
@@ -27061,20 +27694,348 @@
       </p:sp>
       <p:sp>
         <p:nvSpPr>
-          <p:cNvPr id="26627" name="Espaço Reservado para Conteúdo 2"/>
+          <p:cNvPr id="5" name="Espaço Reservado para Conteúdo 4"/>
           <p:cNvSpPr>
             <a:spLocks noGrp="1"/>
           </p:cNvSpPr>
           <p:nvPr>
-            <p:ph idx="1"/>
+            <p:ph sz="half" idx="1"/>
           </p:nvPr>
         </p:nvSpPr>
-        <p:spPr/>
+        <p:spPr>
+          <a:xfrm>
+            <a:off x="755576" y="1600201"/>
+            <a:ext cx="7499176" cy="964704"/>
+          </a:xfrm>
+        </p:spPr>
         <p:txBody>
           <a:bodyPr/>
           <a:lstStyle/>
           <a:p>
-            <a:endParaRPr lang="pt-BR" smtClean="0"/>
+            <a:r>
+              <a:rPr lang="pt-BR" dirty="0" smtClean="0"/>
+              <a:t>Podemos também realizar a sincronização de apenas um trecho do código.</a:t>
+            </a:r>
+            <a:endParaRPr lang="pt-BR" dirty="0"/>
+          </a:p>
+        </p:txBody>
+      </p:sp>
+      <p:sp>
+        <p:nvSpPr>
+          <p:cNvPr id="6" name="Espaço Reservado para Conteúdo 5"/>
+          <p:cNvSpPr>
+            <a:spLocks noGrp="1"/>
+          </p:cNvSpPr>
+          <p:nvPr>
+            <p:ph sz="half" idx="2"/>
+          </p:nvPr>
+        </p:nvSpPr>
+        <p:spPr>
+          <a:xfrm>
+            <a:off x="2164160" y="2708920"/>
+            <a:ext cx="4712096" cy="3672408"/>
+          </a:xfrm>
+          <a:ln>
+            <a:noFill/>
+          </a:ln>
+        </p:spPr>
+        <p:txBody>
+          <a:bodyPr/>
+          <a:lstStyle/>
+          <a:p>
+            <a:pPr marL="0" indent="0">
+              <a:spcBef>
+                <a:spcPts val="0"/>
+              </a:spcBef>
+              <a:buNone/>
+              <a:tabLst>
+                <a:tab pos="539750" algn="l"/>
+                <a:tab pos="984250" algn="l"/>
+                <a:tab pos="1441450" algn="l"/>
+              </a:tabLst>
+            </a:pPr>
+            <a:r>
+              <a:rPr lang="pt-BR" sz="2000" dirty="0" err="1" smtClean="0"/>
+              <a:t>public</a:t>
+            </a:r>
+            <a:r>
+              <a:rPr lang="pt-BR" sz="2000" dirty="0" smtClean="0"/>
+              <a:t> </a:t>
+            </a:r>
+            <a:r>
+              <a:rPr lang="pt-BR" sz="2000" dirty="0" err="1" smtClean="0"/>
+              <a:t>class</a:t>
+            </a:r>
+            <a:r>
+              <a:rPr lang="pt-BR" sz="2000" dirty="0" smtClean="0"/>
+              <a:t> </a:t>
+            </a:r>
+            <a:r>
+              <a:rPr lang="pt-BR" sz="2000" dirty="0" err="1" smtClean="0"/>
+              <a:t>ContadorAcessos</a:t>
+            </a:r>
+            <a:r>
+              <a:rPr lang="pt-BR" sz="2000" dirty="0" smtClean="0"/>
+              <a:t> </a:t>
+            </a:r>
+            <a:r>
+              <a:rPr lang="pt-BR" sz="2000" dirty="0" smtClean="0"/>
+              <a:t>{</a:t>
+            </a:r>
+          </a:p>
+          <a:p>
+            <a:pPr marL="0" indent="0">
+              <a:spcBef>
+                <a:spcPts val="0"/>
+              </a:spcBef>
+              <a:buNone/>
+              <a:tabLst>
+                <a:tab pos="539750" algn="l"/>
+                <a:tab pos="984250" algn="l"/>
+                <a:tab pos="1441450" algn="l"/>
+              </a:tabLst>
+            </a:pPr>
+            <a:r>
+              <a:rPr lang="pt-BR" sz="2000" dirty="0" smtClean="0"/>
+              <a:t>	...</a:t>
+            </a:r>
+          </a:p>
+          <a:p>
+            <a:pPr marL="0" indent="0">
+              <a:spcBef>
+                <a:spcPts val="0"/>
+              </a:spcBef>
+              <a:buNone/>
+              <a:tabLst>
+                <a:tab pos="539750" algn="l"/>
+                <a:tab pos="984250" algn="l"/>
+                <a:tab pos="1441450" algn="l"/>
+              </a:tabLst>
+            </a:pPr>
+            <a:r>
+              <a:rPr lang="pt-BR" sz="2000" dirty="0" smtClean="0"/>
+              <a:t>	</a:t>
+            </a:r>
+            <a:r>
+              <a:rPr lang="pt-BR" sz="2000" dirty="0" err="1" smtClean="0"/>
+              <a:t>public</a:t>
+            </a:r>
+            <a:r>
+              <a:rPr lang="pt-BR" sz="2000" dirty="0" smtClean="0"/>
+              <a:t> </a:t>
+            </a:r>
+            <a:r>
+              <a:rPr lang="pt-BR" sz="2000" dirty="0" err="1" smtClean="0"/>
+              <a:t>int</a:t>
+            </a:r>
+            <a:r>
+              <a:rPr lang="pt-BR" sz="2000" dirty="0" smtClean="0"/>
+              <a:t> </a:t>
+            </a:r>
+            <a:r>
+              <a:rPr lang="pt-BR" sz="2000" dirty="0" err="1" smtClean="0"/>
+              <a:t>contarAcessos</a:t>
+            </a:r>
+            <a:r>
+              <a:rPr lang="pt-BR" sz="2000" dirty="0" smtClean="0"/>
+              <a:t>() </a:t>
+            </a:r>
+            <a:r>
+              <a:rPr lang="pt-BR" sz="2000" dirty="0" smtClean="0"/>
+              <a:t>{</a:t>
+            </a:r>
+          </a:p>
+          <a:p>
+            <a:pPr marL="0" indent="0">
+              <a:spcBef>
+                <a:spcPts val="0"/>
+              </a:spcBef>
+              <a:buNone/>
+              <a:tabLst>
+                <a:tab pos="539750" algn="l"/>
+                <a:tab pos="984250" algn="l"/>
+                <a:tab pos="1441450" algn="l"/>
+              </a:tabLst>
+            </a:pPr>
+            <a:r>
+              <a:rPr lang="pt-BR" sz="2000" dirty="0" smtClean="0"/>
+              <a:t>		...</a:t>
+            </a:r>
+          </a:p>
+          <a:p>
+            <a:pPr marL="0" indent="0">
+              <a:spcBef>
+                <a:spcPts val="0"/>
+              </a:spcBef>
+              <a:buNone/>
+              <a:tabLst>
+                <a:tab pos="539750" algn="l"/>
+                <a:tab pos="984250" algn="l"/>
+                <a:tab pos="1441450" algn="l"/>
+              </a:tabLst>
+            </a:pPr>
+            <a:r>
+              <a:rPr lang="pt-BR" sz="2000" dirty="0" smtClean="0"/>
+              <a:t>		</a:t>
+            </a:r>
+            <a:r>
+              <a:rPr lang="pt-BR" sz="2000" dirty="0" smtClean="0"/>
+              <a:t>...</a:t>
+            </a:r>
+          </a:p>
+          <a:p>
+            <a:pPr marL="0" indent="0">
+              <a:spcBef>
+                <a:spcPts val="0"/>
+              </a:spcBef>
+              <a:buNone/>
+              <a:tabLst>
+                <a:tab pos="539750" algn="l"/>
+                <a:tab pos="984250" algn="l"/>
+                <a:tab pos="1441450" algn="l"/>
+              </a:tabLst>
+            </a:pPr>
+            <a:r>
+              <a:rPr lang="pt-BR" sz="2000" dirty="0" smtClean="0"/>
+              <a:t>	</a:t>
+            </a:r>
+            <a:r>
+              <a:rPr lang="pt-BR" sz="2000" dirty="0" smtClean="0"/>
+              <a:t>	</a:t>
+            </a:r>
+            <a:r>
+              <a:rPr lang="pt-BR" sz="2000" b="1" dirty="0" err="1" smtClean="0">
+                <a:solidFill>
+                  <a:srgbClr val="FFC000"/>
+                </a:solidFill>
+              </a:rPr>
+              <a:t>synchronized</a:t>
+            </a:r>
+            <a:r>
+              <a:rPr lang="pt-BR" sz="2000" dirty="0" smtClean="0"/>
+              <a:t>(</a:t>
+            </a:r>
+            <a:r>
+              <a:rPr lang="pt-BR" sz="2000" dirty="0" err="1" smtClean="0"/>
+              <a:t>obj</a:t>
+            </a:r>
+            <a:r>
+              <a:rPr lang="pt-BR" sz="2000" dirty="0" smtClean="0"/>
+              <a:t>) {</a:t>
+            </a:r>
+          </a:p>
+          <a:p>
+            <a:pPr marL="0" indent="0">
+              <a:spcBef>
+                <a:spcPts val="0"/>
+              </a:spcBef>
+              <a:buNone/>
+              <a:tabLst>
+                <a:tab pos="539750" algn="l"/>
+                <a:tab pos="984250" algn="l"/>
+                <a:tab pos="1441450" algn="l"/>
+              </a:tabLst>
+            </a:pPr>
+            <a:r>
+              <a:rPr lang="pt-BR" sz="2000" dirty="0" smtClean="0"/>
+              <a:t>	</a:t>
+            </a:r>
+            <a:r>
+              <a:rPr lang="pt-BR" sz="2000" dirty="0" smtClean="0"/>
+              <a:t>		...</a:t>
+            </a:r>
+          </a:p>
+          <a:p>
+            <a:pPr marL="0" indent="0">
+              <a:spcBef>
+                <a:spcPts val="0"/>
+              </a:spcBef>
+              <a:buNone/>
+              <a:tabLst>
+                <a:tab pos="539750" algn="l"/>
+                <a:tab pos="984250" algn="l"/>
+                <a:tab pos="1441450" algn="l"/>
+              </a:tabLst>
+            </a:pPr>
+            <a:r>
+              <a:rPr lang="pt-BR" sz="2000" dirty="0" smtClean="0"/>
+              <a:t>		}</a:t>
+            </a:r>
+          </a:p>
+          <a:p>
+            <a:pPr marL="0" indent="0">
+              <a:spcBef>
+                <a:spcPts val="0"/>
+              </a:spcBef>
+              <a:buNone/>
+              <a:tabLst>
+                <a:tab pos="539750" algn="l"/>
+                <a:tab pos="984250" algn="l"/>
+                <a:tab pos="1441450" algn="l"/>
+              </a:tabLst>
+            </a:pPr>
+            <a:r>
+              <a:rPr lang="pt-BR" sz="2000" dirty="0" smtClean="0"/>
+              <a:t>		...</a:t>
+            </a:r>
+          </a:p>
+          <a:p>
+            <a:pPr marL="0" indent="0">
+              <a:spcBef>
+                <a:spcPts val="0"/>
+              </a:spcBef>
+              <a:buNone/>
+              <a:tabLst>
+                <a:tab pos="539750" algn="l"/>
+                <a:tab pos="984250" algn="l"/>
+                <a:tab pos="1441450" algn="l"/>
+              </a:tabLst>
+            </a:pPr>
+            <a:r>
+              <a:rPr lang="pt-BR" sz="2000" dirty="0" smtClean="0"/>
+              <a:t>	</a:t>
+            </a:r>
+            <a:r>
+              <a:rPr lang="pt-BR" sz="2000" dirty="0" smtClean="0"/>
+              <a:t>}</a:t>
+            </a:r>
+            <a:endParaRPr lang="pt-BR" sz="2000" dirty="0" smtClean="0"/>
+          </a:p>
+          <a:p>
+            <a:pPr marL="0" indent="0">
+              <a:spcBef>
+                <a:spcPts val="0"/>
+              </a:spcBef>
+              <a:buNone/>
+              <a:tabLst>
+                <a:tab pos="539750" algn="l"/>
+                <a:tab pos="984250" algn="l"/>
+                <a:tab pos="1441450" algn="l"/>
+              </a:tabLst>
+            </a:pPr>
+            <a:r>
+              <a:rPr lang="pt-BR" sz="2000" dirty="0" smtClean="0"/>
+              <a:t>	...</a:t>
+            </a:r>
+            <a:endParaRPr lang="pt-BR" sz="2000" dirty="0" smtClean="0"/>
+          </a:p>
+          <a:p>
+            <a:pPr marL="0" indent="0">
+              <a:spcBef>
+                <a:spcPts val="0"/>
+              </a:spcBef>
+              <a:buNone/>
+              <a:tabLst>
+                <a:tab pos="539750" algn="l"/>
+                <a:tab pos="984250" algn="l"/>
+                <a:tab pos="1441450" algn="l"/>
+              </a:tabLst>
+            </a:pPr>
+            <a:r>
+              <a:rPr lang="pt-BR" sz="2000" dirty="0" smtClean="0"/>
+              <a:t>}</a:t>
+            </a:r>
+            <a:endParaRPr lang="pt-BR" sz="2000" dirty="0" smtClean="0"/>
           </a:p>
         </p:txBody>
       </p:sp>
@@ -27141,7 +28102,7 @@
       </p:grpSpPr>
       <p:sp>
         <p:nvSpPr>
-          <p:cNvPr id="27650" name="Título 1"/>
+          <p:cNvPr id="25602" name="Título 1"/>
           <p:cNvSpPr>
             <a:spLocks noGrp="1"/>
           </p:cNvSpPr>
@@ -27149,7 +28110,12 @@
             <p:ph type="title"/>
           </p:nvPr>
         </p:nvSpPr>
-        <p:spPr/>
+        <p:spPr>
+          <a:xfrm>
+            <a:off x="457200" y="274638"/>
+            <a:ext cx="8075240" cy="1143000"/>
+          </a:xfrm>
+        </p:spPr>
         <p:txBody>
           <a:bodyPr/>
           <a:lstStyle/>
@@ -27157,27 +28123,315 @@
             <a:pPr eaLnBrk="1" hangingPunct="1"/>
             <a:r>
               <a:rPr lang="pt-BR" dirty="0" smtClean="0"/>
-              <a:t>Interação entre threads</a:t>
-            </a:r>
+              <a:t>Sincronização – </a:t>
+            </a:r>
+            <a:r>
+              <a:rPr lang="pt-BR" sz="3600" dirty="0" smtClean="0"/>
+              <a:t>Bloqueio de </a:t>
+            </a:r>
+            <a:r>
+              <a:rPr lang="pt-BR" sz="3600" dirty="0" smtClean="0"/>
+              <a:t>trecho</a:t>
+            </a:r>
+            <a:endParaRPr lang="pt-BR" dirty="0" smtClean="0"/>
           </a:p>
         </p:txBody>
       </p:sp>
       <p:sp>
         <p:nvSpPr>
-          <p:cNvPr id="27651" name="Espaço Reservado para Conteúdo 2"/>
+          <p:cNvPr id="5" name="Espaço Reservado para Conteúdo 4"/>
           <p:cNvSpPr>
             <a:spLocks noGrp="1"/>
           </p:cNvSpPr>
           <p:nvPr>
-            <p:ph idx="1"/>
+            <p:ph sz="half" idx="1"/>
           </p:nvPr>
         </p:nvSpPr>
-        <p:spPr/>
+        <p:spPr>
+          <a:xfrm>
+            <a:off x="1486000" y="1600200"/>
+            <a:ext cx="6038328" cy="2332855"/>
+          </a:xfrm>
+        </p:spPr>
         <p:txBody>
           <a:bodyPr/>
           <a:lstStyle/>
           <a:p>
-            <a:endParaRPr lang="pt-BR" smtClean="0"/>
+            <a:pPr marL="0" indent="0">
+              <a:spcBef>
+                <a:spcPts val="0"/>
+              </a:spcBef>
+              <a:buNone/>
+              <a:tabLst>
+                <a:tab pos="539750" algn="l"/>
+                <a:tab pos="984250" algn="l"/>
+                <a:tab pos="1441450" algn="l"/>
+              </a:tabLst>
+            </a:pPr>
+            <a:r>
+              <a:rPr lang="pt-BR" sz="2400" dirty="0" err="1" smtClean="0"/>
+              <a:t>public</a:t>
+            </a:r>
+            <a:r>
+              <a:rPr lang="pt-BR" sz="2400" dirty="0" smtClean="0"/>
+              <a:t> </a:t>
+            </a:r>
+            <a:r>
+              <a:rPr lang="pt-BR" sz="2400" b="1" dirty="0" err="1" smtClean="0">
+                <a:solidFill>
+                  <a:srgbClr val="FFC000"/>
+                </a:solidFill>
+              </a:rPr>
+              <a:t>synchronized</a:t>
+            </a:r>
+            <a:r>
+              <a:rPr lang="pt-BR" sz="2400" dirty="0" smtClean="0"/>
+              <a:t> </a:t>
+            </a:r>
+            <a:r>
+              <a:rPr lang="pt-BR" sz="2400" dirty="0" err="1" smtClean="0"/>
+              <a:t>void</a:t>
+            </a:r>
+            <a:r>
+              <a:rPr lang="pt-BR" sz="2400" dirty="0" smtClean="0"/>
+              <a:t> </a:t>
+            </a:r>
+            <a:r>
+              <a:rPr lang="pt-BR" sz="2400" dirty="0" err="1" smtClean="0"/>
+              <a:t>algumMetodo</a:t>
+            </a:r>
+            <a:r>
+              <a:rPr lang="pt-BR" sz="2400" dirty="0" smtClean="0"/>
+              <a:t>() {</a:t>
+            </a:r>
+          </a:p>
+          <a:p>
+            <a:pPr marL="0" indent="0">
+              <a:spcBef>
+                <a:spcPts val="0"/>
+              </a:spcBef>
+              <a:buNone/>
+              <a:tabLst>
+                <a:tab pos="539750" algn="l"/>
+                <a:tab pos="984250" algn="l"/>
+                <a:tab pos="1441450" algn="l"/>
+              </a:tabLst>
+            </a:pPr>
+            <a:r>
+              <a:rPr lang="pt-BR" sz="2400" dirty="0" smtClean="0"/>
+              <a:t>	...</a:t>
+            </a:r>
+          </a:p>
+          <a:p>
+            <a:pPr marL="0" indent="0">
+              <a:spcBef>
+                <a:spcPts val="0"/>
+              </a:spcBef>
+              <a:buNone/>
+              <a:tabLst>
+                <a:tab pos="539750" algn="l"/>
+                <a:tab pos="984250" algn="l"/>
+                <a:tab pos="1441450" algn="l"/>
+              </a:tabLst>
+            </a:pPr>
+            <a:r>
+              <a:rPr lang="pt-BR" sz="2400" dirty="0" smtClean="0"/>
+              <a:t>	...</a:t>
+            </a:r>
+          </a:p>
+          <a:p>
+            <a:pPr marL="0" indent="0">
+              <a:spcBef>
+                <a:spcPts val="0"/>
+              </a:spcBef>
+              <a:buNone/>
+              <a:tabLst>
+                <a:tab pos="539750" algn="l"/>
+                <a:tab pos="984250" algn="l"/>
+                <a:tab pos="1441450" algn="l"/>
+              </a:tabLst>
+            </a:pPr>
+            <a:r>
+              <a:rPr lang="pt-BR" sz="2400" dirty="0" smtClean="0"/>
+              <a:t>}</a:t>
+            </a:r>
+            <a:endParaRPr lang="pt-BR" sz="2400" dirty="0" smtClean="0"/>
+          </a:p>
+        </p:txBody>
+      </p:sp>
+      <p:sp>
+        <p:nvSpPr>
+          <p:cNvPr id="6" name="Espaço Reservado para Conteúdo 5"/>
+          <p:cNvSpPr>
+            <a:spLocks noGrp="1"/>
+          </p:cNvSpPr>
+          <p:nvPr>
+            <p:ph sz="half" idx="2"/>
+          </p:nvPr>
+        </p:nvSpPr>
+        <p:spPr>
+          <a:xfrm>
+            <a:off x="1552581" y="4005064"/>
+            <a:ext cx="5935254" cy="2376264"/>
+          </a:xfrm>
+          <a:ln>
+            <a:noFill/>
+          </a:ln>
+        </p:spPr>
+        <p:txBody>
+          <a:bodyPr/>
+          <a:lstStyle/>
+          <a:p>
+            <a:pPr marL="0" indent="0">
+              <a:spcBef>
+                <a:spcPts val="0"/>
+              </a:spcBef>
+              <a:buNone/>
+              <a:tabLst>
+                <a:tab pos="539750" algn="l"/>
+                <a:tab pos="984250" algn="l"/>
+                <a:tab pos="1441450" algn="l"/>
+              </a:tabLst>
+            </a:pPr>
+            <a:r>
+              <a:rPr lang="pt-BR" sz="2400" dirty="0" err="1" smtClean="0"/>
+              <a:t>public</a:t>
+            </a:r>
+            <a:r>
+              <a:rPr lang="pt-BR" sz="2400" dirty="0" smtClean="0"/>
+              <a:t> </a:t>
+            </a:r>
+            <a:r>
+              <a:rPr lang="pt-BR" sz="2400" dirty="0" err="1" smtClean="0"/>
+              <a:t>void</a:t>
+            </a:r>
+            <a:r>
+              <a:rPr lang="pt-BR" sz="2400" dirty="0" smtClean="0"/>
+              <a:t> </a:t>
+            </a:r>
+            <a:r>
+              <a:rPr lang="pt-BR" sz="2400" dirty="0" err="1" smtClean="0"/>
+              <a:t>algumMetodo</a:t>
+            </a:r>
+            <a:r>
+              <a:rPr lang="pt-BR" sz="2400" dirty="0" smtClean="0"/>
+              <a:t>() </a:t>
+            </a:r>
+            <a:r>
+              <a:rPr lang="pt-BR" sz="2400" dirty="0" smtClean="0"/>
+              <a:t>{</a:t>
+            </a:r>
+          </a:p>
+          <a:p>
+            <a:pPr marL="0" indent="0">
+              <a:spcBef>
+                <a:spcPts val="0"/>
+              </a:spcBef>
+              <a:buNone/>
+              <a:tabLst>
+                <a:tab pos="539750" algn="l"/>
+                <a:tab pos="984250" algn="l"/>
+                <a:tab pos="1441450" algn="l"/>
+              </a:tabLst>
+            </a:pPr>
+            <a:r>
+              <a:rPr lang="pt-BR" sz="2400" dirty="0" smtClean="0"/>
+              <a:t>	</a:t>
+            </a:r>
+            <a:r>
+              <a:rPr lang="pt-BR" sz="2400" b="1" dirty="0" err="1" smtClean="0">
+                <a:solidFill>
+                  <a:srgbClr val="FFC000"/>
+                </a:solidFill>
+              </a:rPr>
+              <a:t>synchronized</a:t>
+            </a:r>
+            <a:r>
+              <a:rPr lang="pt-BR" sz="2400" dirty="0" smtClean="0"/>
+              <a:t>(</a:t>
+            </a:r>
+            <a:r>
+              <a:rPr lang="pt-BR" sz="2400" b="1" dirty="0" err="1" smtClean="0"/>
+              <a:t>this</a:t>
+            </a:r>
+            <a:r>
+              <a:rPr lang="pt-BR" sz="2400" dirty="0" smtClean="0"/>
+              <a:t>) {</a:t>
+            </a:r>
+          </a:p>
+          <a:p>
+            <a:pPr marL="0" indent="0">
+              <a:spcBef>
+                <a:spcPts val="0"/>
+              </a:spcBef>
+              <a:buNone/>
+              <a:tabLst>
+                <a:tab pos="539750" algn="l"/>
+                <a:tab pos="984250" algn="l"/>
+                <a:tab pos="1441450" algn="l"/>
+              </a:tabLst>
+            </a:pPr>
+            <a:r>
+              <a:rPr lang="pt-BR" sz="2400" dirty="0" smtClean="0"/>
+              <a:t>		...</a:t>
+            </a:r>
+          </a:p>
+          <a:p>
+            <a:pPr marL="0" indent="0">
+              <a:spcBef>
+                <a:spcPts val="0"/>
+              </a:spcBef>
+              <a:buNone/>
+              <a:tabLst>
+                <a:tab pos="539750" algn="l"/>
+                <a:tab pos="984250" algn="l"/>
+                <a:tab pos="1441450" algn="l"/>
+              </a:tabLst>
+            </a:pPr>
+            <a:r>
+              <a:rPr lang="pt-BR" sz="2400" dirty="0" smtClean="0"/>
+              <a:t>		...</a:t>
+            </a:r>
+          </a:p>
+          <a:p>
+            <a:pPr marL="0" indent="0">
+              <a:spcBef>
+                <a:spcPts val="0"/>
+              </a:spcBef>
+              <a:buNone/>
+              <a:tabLst>
+                <a:tab pos="539750" algn="l"/>
+                <a:tab pos="984250" algn="l"/>
+                <a:tab pos="1441450" algn="l"/>
+              </a:tabLst>
+            </a:pPr>
+            <a:r>
+              <a:rPr lang="pt-BR" sz="2400" dirty="0" smtClean="0"/>
+              <a:t>	</a:t>
+            </a:r>
+            <a:r>
+              <a:rPr lang="pt-BR" sz="2400" dirty="0" smtClean="0"/>
+              <a:t>}</a:t>
+            </a:r>
+            <a:endParaRPr lang="pt-BR" sz="2400" dirty="0" smtClean="0"/>
+          </a:p>
+          <a:p>
+            <a:pPr marL="0" indent="0">
+              <a:spcBef>
+                <a:spcPts val="0"/>
+              </a:spcBef>
+              <a:buNone/>
+              <a:tabLst>
+                <a:tab pos="539750" algn="l"/>
+                <a:tab pos="984250" algn="l"/>
+                <a:tab pos="1441450" algn="l"/>
+              </a:tabLst>
+            </a:pPr>
+            <a:r>
+              <a:rPr lang="pt-BR" sz="2400" dirty="0" smtClean="0"/>
+              <a:t>}</a:t>
+            </a:r>
+            <a:endParaRPr lang="pt-BR" sz="2400" dirty="0" smtClean="0"/>
           </a:p>
         </p:txBody>
       </p:sp>
@@ -27205,6 +28459,248 @@
                 <a:defRPr/>
               </a:pPr>
               <a:t>32</a:t>
+            </a:fld>
+            <a:endParaRPr lang="pt-BR"/>
+          </a:p>
+        </p:txBody>
+      </p:sp>
+      <p:sp>
+        <p:nvSpPr>
+          <p:cNvPr id="9" name="CaixaDeTexto 8"/>
+          <p:cNvSpPr txBox="1"/>
+          <p:nvPr/>
+        </p:nvSpPr>
+        <p:spPr>
+          <a:xfrm>
+            <a:off x="3203848" y="3429000"/>
+            <a:ext cx="2287806" cy="369332"/>
+          </a:xfrm>
+          <a:prstGeom prst="rect">
+            <a:avLst/>
+          </a:prstGeom>
+          <a:noFill/>
+          <a:ln>
+            <a:solidFill>
+              <a:schemeClr val="tx1"/>
+            </a:solidFill>
+          </a:ln>
+        </p:spPr>
+        <p:txBody>
+          <a:bodyPr wrap="none" rtlCol="0">
+            <a:spAutoFit/>
+          </a:bodyPr>
+          <a:lstStyle/>
+          <a:p>
+            <a:r>
+              <a:rPr lang="pt-BR" dirty="0" smtClean="0"/>
+              <a:t>... é o mesmo que ...</a:t>
+            </a:r>
+            <a:endParaRPr lang="pt-BR" dirty="0"/>
+          </a:p>
+        </p:txBody>
+      </p:sp>
+    </p:spTree>
+  </p:cSld>
+  <p:clrMapOvr>
+    <a:masterClrMapping/>
+  </p:clrMapOvr>
+  <p:timing>
+    <p:tnLst>
+      <p:par>
+        <p:cTn id="1" dur="indefinite" restart="never" nodeType="tmRoot"/>
+      </p:par>
+    </p:tnLst>
+  </p:timing>
+</p:sld>
+</file>
+
+<file path=ppt/slides/slide33.xml><?xml version="1.0" encoding="utf-8"?>
+<p:sld xmlns:a="http://schemas.openxmlformats.org/drawingml/2006/main" xmlns:r="http://schemas.openxmlformats.org/officeDocument/2006/relationships" xmlns:p="http://schemas.openxmlformats.org/presentationml/2006/main">
+  <p:cSld>
+    <p:spTree>
+      <p:nvGrpSpPr>
+        <p:cNvPr id="1" name=""/>
+        <p:cNvGrpSpPr/>
+        <p:nvPr/>
+      </p:nvGrpSpPr>
+      <p:grpSpPr>
+        <a:xfrm>
+          <a:off x="0" y="0"/>
+          <a:ext cx="0" cy="0"/>
+          <a:chOff x="0" y="0"/>
+          <a:chExt cx="0" cy="0"/>
+        </a:xfrm>
+      </p:grpSpPr>
+      <p:sp>
+        <p:nvSpPr>
+          <p:cNvPr id="26626" name="Título 1"/>
+          <p:cNvSpPr>
+            <a:spLocks noGrp="1"/>
+          </p:cNvSpPr>
+          <p:nvPr>
+            <p:ph type="title"/>
+          </p:nvPr>
+        </p:nvSpPr>
+        <p:spPr/>
+        <p:txBody>
+          <a:bodyPr/>
+          <a:lstStyle/>
+          <a:p>
+            <a:pPr eaLnBrk="1" hangingPunct="1"/>
+            <a:r>
+              <a:rPr lang="pt-BR" dirty="0" err="1" smtClean="0"/>
+              <a:t>Deadlock</a:t>
+            </a:r>
+            <a:endParaRPr lang="pt-BR" dirty="0" smtClean="0"/>
+          </a:p>
+        </p:txBody>
+      </p:sp>
+      <p:sp>
+        <p:nvSpPr>
+          <p:cNvPr id="26627" name="Espaço Reservado para Conteúdo 2"/>
+          <p:cNvSpPr>
+            <a:spLocks noGrp="1"/>
+          </p:cNvSpPr>
+          <p:nvPr>
+            <p:ph idx="1"/>
+          </p:nvPr>
+        </p:nvSpPr>
+        <p:spPr/>
+        <p:txBody>
+          <a:bodyPr/>
+          <a:lstStyle/>
+          <a:p>
+            <a:endParaRPr lang="pt-BR" smtClean="0"/>
+          </a:p>
+        </p:txBody>
+      </p:sp>
+      <p:sp>
+        <p:nvSpPr>
+          <p:cNvPr id="4" name="Espaço Reservado para Número de Slide 3"/>
+          <p:cNvSpPr>
+            <a:spLocks noGrp="1"/>
+          </p:cNvSpPr>
+          <p:nvPr>
+            <p:ph type="sldNum" sz="quarter" idx="12"/>
+          </p:nvPr>
+        </p:nvSpPr>
+        <p:spPr/>
+        <p:txBody>
+          <a:bodyPr/>
+          <a:lstStyle/>
+          <a:p>
+            <a:pPr>
+              <a:defRPr/>
+            </a:pPr>
+            <a:fld id="{A3E49AD4-F76A-4E25-A0A5-9CD64D5A0A0D}" type="slidenum">
+              <a:rPr lang="pt-BR" smtClean="0"/>
+              <a:pPr>
+                <a:defRPr/>
+              </a:pPr>
+              <a:t>33</a:t>
+            </a:fld>
+            <a:endParaRPr lang="pt-BR"/>
+          </a:p>
+        </p:txBody>
+      </p:sp>
+    </p:spTree>
+  </p:cSld>
+  <p:clrMapOvr>
+    <a:masterClrMapping/>
+  </p:clrMapOvr>
+  <p:timing>
+    <p:tnLst>
+      <p:par>
+        <p:cTn id="1" dur="indefinite" restart="never" nodeType="tmRoot"/>
+      </p:par>
+    </p:tnLst>
+  </p:timing>
+</p:sld>
+</file>
+
+<file path=ppt/slides/slide34.xml><?xml version="1.0" encoding="utf-8"?>
+<p:sld xmlns:a="http://schemas.openxmlformats.org/drawingml/2006/main" xmlns:r="http://schemas.openxmlformats.org/officeDocument/2006/relationships" xmlns:p="http://schemas.openxmlformats.org/presentationml/2006/main">
+  <p:cSld>
+    <p:spTree>
+      <p:nvGrpSpPr>
+        <p:cNvPr id="1" name=""/>
+        <p:cNvGrpSpPr/>
+        <p:nvPr/>
+      </p:nvGrpSpPr>
+      <p:grpSpPr>
+        <a:xfrm>
+          <a:off x="0" y="0"/>
+          <a:ext cx="0" cy="0"/>
+          <a:chOff x="0" y="0"/>
+          <a:chExt cx="0" cy="0"/>
+        </a:xfrm>
+      </p:grpSpPr>
+      <p:sp>
+        <p:nvSpPr>
+          <p:cNvPr id="27650" name="Título 1"/>
+          <p:cNvSpPr>
+            <a:spLocks noGrp="1"/>
+          </p:cNvSpPr>
+          <p:nvPr>
+            <p:ph type="title"/>
+          </p:nvPr>
+        </p:nvSpPr>
+        <p:spPr/>
+        <p:txBody>
+          <a:bodyPr/>
+          <a:lstStyle/>
+          <a:p>
+            <a:pPr eaLnBrk="1" hangingPunct="1"/>
+            <a:r>
+              <a:rPr lang="pt-BR" dirty="0" smtClean="0"/>
+              <a:t>Interação entre threads</a:t>
+            </a:r>
+          </a:p>
+        </p:txBody>
+      </p:sp>
+      <p:sp>
+        <p:nvSpPr>
+          <p:cNvPr id="27651" name="Espaço Reservado para Conteúdo 2"/>
+          <p:cNvSpPr>
+            <a:spLocks noGrp="1"/>
+          </p:cNvSpPr>
+          <p:nvPr>
+            <p:ph idx="1"/>
+          </p:nvPr>
+        </p:nvSpPr>
+        <p:spPr/>
+        <p:txBody>
+          <a:bodyPr/>
+          <a:lstStyle/>
+          <a:p>
+            <a:endParaRPr lang="pt-BR" smtClean="0"/>
+          </a:p>
+        </p:txBody>
+      </p:sp>
+      <p:sp>
+        <p:nvSpPr>
+          <p:cNvPr id="4" name="Espaço Reservado para Número de Slide 3"/>
+          <p:cNvSpPr>
+            <a:spLocks noGrp="1"/>
+          </p:cNvSpPr>
+          <p:nvPr>
+            <p:ph type="sldNum" sz="quarter" idx="12"/>
+          </p:nvPr>
+        </p:nvSpPr>
+        <p:spPr/>
+        <p:txBody>
+          <a:bodyPr/>
+          <a:lstStyle/>
+          <a:p>
+            <a:pPr>
+              <a:defRPr/>
+            </a:pPr>
+            <a:fld id="{A3E49AD4-F76A-4E25-A0A5-9CD64D5A0A0D}" type="slidenum">
+              <a:rPr lang="pt-BR" smtClean="0"/>
+              <a:pPr>
+                <a:defRPr/>
+              </a:pPr>
+              <a:t>34</a:t>
             </a:fld>
             <a:endParaRPr lang="pt-BR"/>
           </a:p>

</xml_diff>

<commit_message>
Slides final do capítulo 8 - Threads.
</commit_message>
<xml_diff>
--- a/2-Java-Programmer-Modulo-II/14.Capitulo08.pptx
+++ b/2-Java-Programmer-Modulo-II/14.Capitulo08.pptx
@@ -5,7 +5,7 @@
     <p:sldMasterId id="2147483660" r:id="rId1"/>
   </p:sldMasterIdLst>
   <p:notesMasterIdLst>
-    <p:notesMasterId r:id="rId36"/>
+    <p:notesMasterId r:id="rId40"/>
   </p:notesMasterIdLst>
   <p:sldIdLst>
     <p:sldId id="256" r:id="rId2"/>
@@ -41,7 +41,11 @@
     <p:sldId id="346" r:id="rId32"/>
     <p:sldId id="347" r:id="rId33"/>
     <p:sldId id="317" r:id="rId34"/>
-    <p:sldId id="316" r:id="rId35"/>
+    <p:sldId id="348" r:id="rId35"/>
+    <p:sldId id="349" r:id="rId36"/>
+    <p:sldId id="316" r:id="rId37"/>
+    <p:sldId id="350" r:id="rId38"/>
+    <p:sldId id="351" r:id="rId39"/>
   </p:sldIdLst>
   <p:sldSz cx="9144000" cy="6858000" type="screen4x3"/>
   <p:notesSz cx="6858000" cy="9144000"/>
@@ -282,7 +286,7 @@
               <a:pPr>
                 <a:defRPr/>
               </a:pPr>
-              <a:t>24/04/2012</a:t>
+              <a:t>27/04/2012</a:t>
             </a:fld>
             <a:endParaRPr lang="pt-BR"/>
           </a:p>
@@ -470,7 +474,7 @@
               <a:pPr>
                 <a:defRPr/>
               </a:pPr>
-              <a:t>‹nº›</a:t>
+              <a:t>‹#›</a:t>
             </a:fld>
             <a:endParaRPr lang="pt-BR"/>
           </a:p>
@@ -3265,6 +3269,180 @@
       </p:grpSpPr>
       <p:sp>
         <p:nvSpPr>
+          <p:cNvPr id="2" name="Slide Image Placeholder 1"/>
+          <p:cNvSpPr>
+            <a:spLocks noGrp="1" noRot="1" noChangeAspect="1"/>
+          </p:cNvSpPr>
+          <p:nvPr>
+            <p:ph type="sldImg"/>
+          </p:nvPr>
+        </p:nvSpPr>
+        <p:spPr/>
+      </p:sp>
+      <p:sp>
+        <p:nvSpPr>
+          <p:cNvPr id="3" name="Notes Placeholder 2"/>
+          <p:cNvSpPr>
+            <a:spLocks noGrp="1"/>
+          </p:cNvSpPr>
+          <p:nvPr>
+            <p:ph type="body" idx="1"/>
+          </p:nvPr>
+        </p:nvSpPr>
+        <p:spPr/>
+        <p:txBody>
+          <a:bodyPr>
+            <a:normAutofit/>
+          </a:bodyPr>
+          <a:lstStyle/>
+          <a:p>
+            <a:endParaRPr lang="pt-BR"/>
+          </a:p>
+        </p:txBody>
+      </p:sp>
+      <p:sp>
+        <p:nvSpPr>
+          <p:cNvPr id="4" name="Slide Number Placeholder 3"/>
+          <p:cNvSpPr>
+            <a:spLocks noGrp="1"/>
+          </p:cNvSpPr>
+          <p:nvPr>
+            <p:ph type="sldNum" sz="quarter" idx="10"/>
+          </p:nvPr>
+        </p:nvSpPr>
+        <p:spPr/>
+        <p:txBody>
+          <a:bodyPr/>
+          <a:lstStyle/>
+          <a:p>
+            <a:pPr>
+              <a:defRPr/>
+            </a:pPr>
+            <a:fld id="{D45731A0-D324-45D2-92B5-75F23FA6F9F4}" type="slidenum">
+              <a:rPr lang="pt-BR" smtClean="0"/>
+              <a:pPr>
+                <a:defRPr/>
+              </a:pPr>
+              <a:t>34</a:t>
+            </a:fld>
+            <a:endParaRPr lang="pt-BR"/>
+          </a:p>
+        </p:txBody>
+      </p:sp>
+    </p:spTree>
+  </p:cSld>
+  <p:clrMapOvr>
+    <a:masterClrMapping/>
+  </p:clrMapOvr>
+</p:notes>
+</file>
+
+<file path=ppt/notesSlides/notesSlide35.xml><?xml version="1.0" encoding="utf-8"?>
+<p:notes xmlns:a="http://schemas.openxmlformats.org/drawingml/2006/main" xmlns:r="http://schemas.openxmlformats.org/officeDocument/2006/relationships" xmlns:p="http://schemas.openxmlformats.org/presentationml/2006/main">
+  <p:cSld>
+    <p:spTree>
+      <p:nvGrpSpPr>
+        <p:cNvPr id="1" name=""/>
+        <p:cNvGrpSpPr/>
+        <p:nvPr/>
+      </p:nvGrpSpPr>
+      <p:grpSpPr>
+        <a:xfrm>
+          <a:off x="0" y="0"/>
+          <a:ext cx="0" cy="0"/>
+          <a:chOff x="0" y="0"/>
+          <a:chExt cx="0" cy="0"/>
+        </a:xfrm>
+      </p:grpSpPr>
+      <p:sp>
+        <p:nvSpPr>
+          <p:cNvPr id="2" name="Slide Image Placeholder 1"/>
+          <p:cNvSpPr>
+            <a:spLocks noGrp="1" noRot="1" noChangeAspect="1"/>
+          </p:cNvSpPr>
+          <p:nvPr>
+            <p:ph type="sldImg"/>
+          </p:nvPr>
+        </p:nvSpPr>
+        <p:spPr/>
+      </p:sp>
+      <p:sp>
+        <p:nvSpPr>
+          <p:cNvPr id="3" name="Notes Placeholder 2"/>
+          <p:cNvSpPr>
+            <a:spLocks noGrp="1"/>
+          </p:cNvSpPr>
+          <p:nvPr>
+            <p:ph type="body" idx="1"/>
+          </p:nvPr>
+        </p:nvSpPr>
+        <p:spPr/>
+        <p:txBody>
+          <a:bodyPr>
+            <a:normAutofit/>
+          </a:bodyPr>
+          <a:lstStyle/>
+          <a:p>
+            <a:endParaRPr lang="pt-BR"/>
+          </a:p>
+        </p:txBody>
+      </p:sp>
+      <p:sp>
+        <p:nvSpPr>
+          <p:cNvPr id="4" name="Slide Number Placeholder 3"/>
+          <p:cNvSpPr>
+            <a:spLocks noGrp="1"/>
+          </p:cNvSpPr>
+          <p:nvPr>
+            <p:ph type="sldNum" sz="quarter" idx="10"/>
+          </p:nvPr>
+        </p:nvSpPr>
+        <p:spPr/>
+        <p:txBody>
+          <a:bodyPr/>
+          <a:lstStyle/>
+          <a:p>
+            <a:pPr>
+              <a:defRPr/>
+            </a:pPr>
+            <a:fld id="{D45731A0-D324-45D2-92B5-75F23FA6F9F4}" type="slidenum">
+              <a:rPr lang="pt-BR" smtClean="0"/>
+              <a:pPr>
+                <a:defRPr/>
+              </a:pPr>
+              <a:t>35</a:t>
+            </a:fld>
+            <a:endParaRPr lang="pt-BR"/>
+          </a:p>
+        </p:txBody>
+      </p:sp>
+    </p:spTree>
+  </p:cSld>
+  <p:clrMapOvr>
+    <a:masterClrMapping/>
+  </p:clrMapOvr>
+</p:notes>
+</file>
+
+<file path=ppt/notesSlides/notesSlide36.xml><?xml version="1.0" encoding="utf-8"?>
+<p:notes xmlns:a="http://schemas.openxmlformats.org/drawingml/2006/main" xmlns:r="http://schemas.openxmlformats.org/officeDocument/2006/relationships" xmlns:p="http://schemas.openxmlformats.org/presentationml/2006/main">
+  <p:cSld>
+    <p:spTree>
+      <p:nvGrpSpPr>
+        <p:cNvPr id="1" name=""/>
+        <p:cNvGrpSpPr/>
+        <p:nvPr/>
+      </p:nvGrpSpPr>
+      <p:grpSpPr>
+        <a:xfrm>
+          <a:off x="0" y="0"/>
+          <a:ext cx="0" cy="0"/>
+          <a:chOff x="0" y="0"/>
+          <a:chExt cx="0" cy="0"/>
+        </a:xfrm>
+      </p:grpSpPr>
+      <p:sp>
+        <p:nvSpPr>
           <p:cNvPr id="49154" name="Espaço Reservado para Imagem de Slide 1"/>
           <p:cNvSpPr>
             <a:spLocks noGrp="1" noRot="1" noChangeAspect="1" noTextEdit="1"/>
@@ -3333,7 +3511,181 @@
               <a:pPr>
                 <a:defRPr/>
               </a:pPr>
-              <a:t>34</a:t>
+              <a:t>36</a:t>
+            </a:fld>
+            <a:endParaRPr lang="pt-BR"/>
+          </a:p>
+        </p:txBody>
+      </p:sp>
+    </p:spTree>
+  </p:cSld>
+  <p:clrMapOvr>
+    <a:masterClrMapping/>
+  </p:clrMapOvr>
+</p:notes>
+</file>
+
+<file path=ppt/notesSlides/notesSlide37.xml><?xml version="1.0" encoding="utf-8"?>
+<p:notes xmlns:a="http://schemas.openxmlformats.org/drawingml/2006/main" xmlns:r="http://schemas.openxmlformats.org/officeDocument/2006/relationships" xmlns:p="http://schemas.openxmlformats.org/presentationml/2006/main">
+  <p:cSld>
+    <p:spTree>
+      <p:nvGrpSpPr>
+        <p:cNvPr id="1" name=""/>
+        <p:cNvGrpSpPr/>
+        <p:nvPr/>
+      </p:nvGrpSpPr>
+      <p:grpSpPr>
+        <a:xfrm>
+          <a:off x="0" y="0"/>
+          <a:ext cx="0" cy="0"/>
+          <a:chOff x="0" y="0"/>
+          <a:chExt cx="0" cy="0"/>
+        </a:xfrm>
+      </p:grpSpPr>
+      <p:sp>
+        <p:nvSpPr>
+          <p:cNvPr id="2" name="Slide Image Placeholder 1"/>
+          <p:cNvSpPr>
+            <a:spLocks noGrp="1" noRot="1" noChangeAspect="1"/>
+          </p:cNvSpPr>
+          <p:nvPr>
+            <p:ph type="sldImg"/>
+          </p:nvPr>
+        </p:nvSpPr>
+        <p:spPr/>
+      </p:sp>
+      <p:sp>
+        <p:nvSpPr>
+          <p:cNvPr id="3" name="Notes Placeholder 2"/>
+          <p:cNvSpPr>
+            <a:spLocks noGrp="1"/>
+          </p:cNvSpPr>
+          <p:nvPr>
+            <p:ph type="body" idx="1"/>
+          </p:nvPr>
+        </p:nvSpPr>
+        <p:spPr/>
+        <p:txBody>
+          <a:bodyPr>
+            <a:normAutofit/>
+          </a:bodyPr>
+          <a:lstStyle/>
+          <a:p>
+            <a:endParaRPr lang="pt-BR"/>
+          </a:p>
+        </p:txBody>
+      </p:sp>
+      <p:sp>
+        <p:nvSpPr>
+          <p:cNvPr id="4" name="Slide Number Placeholder 3"/>
+          <p:cNvSpPr>
+            <a:spLocks noGrp="1"/>
+          </p:cNvSpPr>
+          <p:nvPr>
+            <p:ph type="sldNum" sz="quarter" idx="10"/>
+          </p:nvPr>
+        </p:nvSpPr>
+        <p:spPr/>
+        <p:txBody>
+          <a:bodyPr/>
+          <a:lstStyle/>
+          <a:p>
+            <a:pPr>
+              <a:defRPr/>
+            </a:pPr>
+            <a:fld id="{D45731A0-D324-45D2-92B5-75F23FA6F9F4}" type="slidenum">
+              <a:rPr lang="pt-BR" smtClean="0"/>
+              <a:pPr>
+                <a:defRPr/>
+              </a:pPr>
+              <a:t>37</a:t>
+            </a:fld>
+            <a:endParaRPr lang="pt-BR"/>
+          </a:p>
+        </p:txBody>
+      </p:sp>
+    </p:spTree>
+  </p:cSld>
+  <p:clrMapOvr>
+    <a:masterClrMapping/>
+  </p:clrMapOvr>
+</p:notes>
+</file>
+
+<file path=ppt/notesSlides/notesSlide38.xml><?xml version="1.0" encoding="utf-8"?>
+<p:notes xmlns:a="http://schemas.openxmlformats.org/drawingml/2006/main" xmlns:r="http://schemas.openxmlformats.org/officeDocument/2006/relationships" xmlns:p="http://schemas.openxmlformats.org/presentationml/2006/main">
+  <p:cSld>
+    <p:spTree>
+      <p:nvGrpSpPr>
+        <p:cNvPr id="1" name=""/>
+        <p:cNvGrpSpPr/>
+        <p:nvPr/>
+      </p:nvGrpSpPr>
+      <p:grpSpPr>
+        <a:xfrm>
+          <a:off x="0" y="0"/>
+          <a:ext cx="0" cy="0"/>
+          <a:chOff x="0" y="0"/>
+          <a:chExt cx="0" cy="0"/>
+        </a:xfrm>
+      </p:grpSpPr>
+      <p:sp>
+        <p:nvSpPr>
+          <p:cNvPr id="2" name="Slide Image Placeholder 1"/>
+          <p:cNvSpPr>
+            <a:spLocks noGrp="1" noRot="1" noChangeAspect="1"/>
+          </p:cNvSpPr>
+          <p:nvPr>
+            <p:ph type="sldImg"/>
+          </p:nvPr>
+        </p:nvSpPr>
+        <p:spPr/>
+      </p:sp>
+      <p:sp>
+        <p:nvSpPr>
+          <p:cNvPr id="3" name="Notes Placeholder 2"/>
+          <p:cNvSpPr>
+            <a:spLocks noGrp="1"/>
+          </p:cNvSpPr>
+          <p:nvPr>
+            <p:ph type="body" idx="1"/>
+          </p:nvPr>
+        </p:nvSpPr>
+        <p:spPr/>
+        <p:txBody>
+          <a:bodyPr>
+            <a:normAutofit/>
+          </a:bodyPr>
+          <a:lstStyle/>
+          <a:p>
+            <a:endParaRPr lang="pt-BR"/>
+          </a:p>
+        </p:txBody>
+      </p:sp>
+      <p:sp>
+        <p:nvSpPr>
+          <p:cNvPr id="4" name="Slide Number Placeholder 3"/>
+          <p:cNvSpPr>
+            <a:spLocks noGrp="1"/>
+          </p:cNvSpPr>
+          <p:nvPr>
+            <p:ph type="sldNum" sz="quarter" idx="10"/>
+          </p:nvPr>
+        </p:nvSpPr>
+        <p:spPr/>
+        <p:txBody>
+          <a:bodyPr/>
+          <a:lstStyle/>
+          <a:p>
+            <a:pPr>
+              <a:defRPr/>
+            </a:pPr>
+            <a:fld id="{D45731A0-D324-45D2-92B5-75F23FA6F9F4}" type="slidenum">
+              <a:rPr lang="pt-BR" smtClean="0"/>
+              <a:pPr>
+                <a:defRPr/>
+              </a:pPr>
+              <a:t>38</a:t>
             </a:fld>
             <a:endParaRPr lang="pt-BR"/>
           </a:p>
@@ -4371,7 +4723,7 @@
               <a:pPr>
                 <a:defRPr/>
               </a:pPr>
-              <a:t>24/04/2012</a:t>
+              <a:t>27/04/2012</a:t>
             </a:fld>
             <a:endParaRPr lang="pt-BR"/>
           </a:p>
@@ -4430,7 +4782,7 @@
               <a:pPr>
                 <a:defRPr/>
               </a:pPr>
-              <a:t>‹nº›</a:t>
+              <a:t>‹#›</a:t>
             </a:fld>
             <a:endParaRPr lang="pt-BR"/>
           </a:p>
@@ -4570,7 +4922,7 @@
               <a:pPr>
                 <a:defRPr/>
               </a:pPr>
-              <a:t>24/04/2012</a:t>
+              <a:t>27/04/2012</a:t>
             </a:fld>
             <a:endParaRPr lang="pt-BR"/>
           </a:p>
@@ -4629,7 +4981,7 @@
               <a:pPr>
                 <a:defRPr/>
               </a:pPr>
-              <a:t>‹nº›</a:t>
+              <a:t>‹#›</a:t>
             </a:fld>
             <a:endParaRPr lang="pt-BR"/>
           </a:p>
@@ -4772,7 +5124,7 @@
               <a:pPr>
                 <a:defRPr/>
               </a:pPr>
-              <a:t>24/04/2012</a:t>
+              <a:t>27/04/2012</a:t>
             </a:fld>
             <a:endParaRPr lang="pt-BR"/>
           </a:p>
@@ -4831,7 +5183,7 @@
               <a:pPr>
                 <a:defRPr/>
               </a:pPr>
-              <a:t>‹nº›</a:t>
+              <a:t>‹#›</a:t>
             </a:fld>
             <a:endParaRPr lang="pt-BR"/>
           </a:p>
@@ -4968,7 +5320,7 @@
               <a:pPr>
                 <a:defRPr/>
               </a:pPr>
-              <a:t>24/04/2012</a:t>
+              <a:t>27/04/2012</a:t>
             </a:fld>
             <a:endParaRPr lang="pt-BR"/>
           </a:p>
@@ -5027,7 +5379,7 @@
               <a:pPr>
                 <a:defRPr/>
               </a:pPr>
-              <a:t>‹nº›</a:t>
+              <a:t>‹#›</a:t>
             </a:fld>
             <a:endParaRPr lang="pt-BR"/>
           </a:p>
@@ -5474,7 +5826,7 @@
               <a:pPr>
                 <a:defRPr/>
               </a:pPr>
-              <a:t>24/04/2012</a:t>
+              <a:t>27/04/2012</a:t>
             </a:fld>
             <a:endParaRPr lang="pt-BR"/>
           </a:p>
@@ -5533,7 +5885,7 @@
               <a:pPr>
                 <a:defRPr/>
               </a:pPr>
-              <a:t>‹nº›</a:t>
+              <a:t>‹#›</a:t>
             </a:fld>
             <a:endParaRPr lang="pt-BR"/>
           </a:p>
@@ -5765,7 +6117,7 @@
               <a:pPr>
                 <a:defRPr/>
               </a:pPr>
-              <a:t>24/04/2012</a:t>
+              <a:t>27/04/2012</a:t>
             </a:fld>
             <a:endParaRPr lang="pt-BR"/>
           </a:p>
@@ -5824,7 +6176,7 @@
               <a:pPr>
                 <a:defRPr/>
               </a:pPr>
-              <a:t>‹nº›</a:t>
+              <a:t>‹#›</a:t>
             </a:fld>
             <a:endParaRPr lang="pt-BR"/>
           </a:p>
@@ -6166,7 +6518,7 @@
               <a:pPr>
                 <a:defRPr/>
               </a:pPr>
-              <a:t>24/04/2012</a:t>
+              <a:t>27/04/2012</a:t>
             </a:fld>
             <a:endParaRPr lang="pt-BR"/>
           </a:p>
@@ -6225,7 +6577,7 @@
               <a:pPr>
                 <a:defRPr/>
               </a:pPr>
-              <a:t>‹nº›</a:t>
+              <a:t>‹#›</a:t>
             </a:fld>
             <a:endParaRPr lang="pt-BR"/>
           </a:p>
@@ -6315,7 +6667,7 @@
               <a:pPr>
                 <a:defRPr/>
               </a:pPr>
-              <a:t>24/04/2012</a:t>
+              <a:t>27/04/2012</a:t>
             </a:fld>
             <a:endParaRPr lang="pt-BR"/>
           </a:p>
@@ -6374,7 +6726,7 @@
               <a:pPr>
                 <a:defRPr/>
               </a:pPr>
-              <a:t>‹nº›</a:t>
+              <a:t>‹#›</a:t>
             </a:fld>
             <a:endParaRPr lang="pt-BR"/>
           </a:p>
@@ -6432,7 +6784,7 @@
               <a:pPr>
                 <a:defRPr/>
               </a:pPr>
-              <a:t>24/04/2012</a:t>
+              <a:t>27/04/2012</a:t>
             </a:fld>
             <a:endParaRPr lang="pt-BR"/>
           </a:p>
@@ -6491,7 +6843,7 @@
               <a:pPr>
                 <a:defRPr/>
               </a:pPr>
-              <a:t>‹nº›</a:t>
+              <a:t>‹#›</a:t>
             </a:fld>
             <a:endParaRPr lang="pt-BR"/>
           </a:p>
@@ -6708,7 +7060,7 @@
               <a:pPr>
                 <a:defRPr/>
               </a:pPr>
-              <a:t>24/04/2012</a:t>
+              <a:t>27/04/2012</a:t>
             </a:fld>
             <a:endParaRPr lang="pt-BR"/>
           </a:p>
@@ -6772,7 +7124,7 @@
               <a:pPr>
                 <a:defRPr/>
               </a:pPr>
-              <a:t>‹nº›</a:t>
+              <a:t>‹#›</a:t>
             </a:fld>
             <a:endParaRPr lang="pt-BR"/>
           </a:p>
@@ -6992,7 +7344,7 @@
               <a:pPr>
                 <a:defRPr/>
               </a:pPr>
-              <a:t>24/04/2012</a:t>
+              <a:t>27/04/2012</a:t>
             </a:fld>
             <a:endParaRPr lang="pt-BR"/>
           </a:p>
@@ -7051,7 +7403,7 @@
               <a:pPr>
                 <a:defRPr/>
               </a:pPr>
-              <a:t>‹nº›</a:t>
+              <a:t>‹#›</a:t>
             </a:fld>
             <a:endParaRPr lang="pt-BR"/>
           </a:p>
@@ -7470,7 +7822,7 @@
               <a:pPr>
                 <a:defRPr/>
               </a:pPr>
-              <a:t>24/04/2012</a:t>
+              <a:t>27/04/2012</a:t>
             </a:fld>
             <a:endParaRPr lang="pt-BR"/>
           </a:p>
@@ -7573,7 +7925,7 @@
               <a:pPr>
                 <a:defRPr/>
               </a:pPr>
-              <a:t>‹nº›</a:t>
+              <a:t>‹#›</a:t>
             </a:fld>
             <a:endParaRPr lang="pt-BR"/>
           </a:p>
@@ -27143,7 +27495,6 @@
               <a:rPr lang="pt-BR" dirty="0" smtClean="0"/>
               <a:t>Sincronização por método</a:t>
             </a:r>
-            <a:endParaRPr lang="pt-BR" dirty="0" smtClean="0"/>
           </a:p>
         </p:txBody>
       </p:sp>
@@ -27624,15 +27975,7 @@
             <a:pPr algn="ctr"/>
             <a:r>
               <a:rPr lang="pt-BR" dirty="0" smtClean="0"/>
-              <a:t>Classes que se preocupam com </a:t>
-            </a:r>
-            <a:r>
-              <a:rPr lang="pt-BR" dirty="0" smtClean="0"/>
-              <a:t>sincronização </a:t>
-            </a:r>
-            <a:r>
-              <a:rPr lang="pt-BR" dirty="0" smtClean="0"/>
-              <a:t>e acesso simultâneo de seus membros são chamadas “</a:t>
+              <a:t>Classes que se preocupam com sincronização e acesso simultâneo de seus membros são chamadas “</a:t>
             </a:r>
             <a:r>
               <a:rPr lang="pt-BR" b="1" i="1" dirty="0" smtClean="0"/>
@@ -27703,7 +28046,6 @@
               <a:rPr lang="pt-BR" dirty="0" smtClean="0"/>
               <a:t>Sincronização por bloco</a:t>
             </a:r>
-            <a:endParaRPr lang="pt-BR" dirty="0" smtClean="0"/>
           </a:p>
         </p:txBody>
       </p:sp>
@@ -28113,7 +28455,6 @@
               <a:rPr lang="pt-BR" dirty="0" smtClean="0"/>
               <a:t>Sincronização por bloco</a:t>
             </a:r>
-            <a:endParaRPr lang="pt-BR" dirty="0" smtClean="0"/>
           </a:p>
         </p:txBody>
       </p:sp>
@@ -28533,12 +28874,314 @@
             <p:ph idx="1"/>
           </p:nvPr>
         </p:nvSpPr>
-        <p:spPr/>
+        <p:spPr>
+          <a:xfrm>
+            <a:off x="952480" y="1600200"/>
+            <a:ext cx="6477040" cy="4525963"/>
+          </a:xfrm>
+        </p:spPr>
         <p:txBody>
           <a:bodyPr/>
           <a:lstStyle/>
           <a:p>
-            <a:endParaRPr lang="pt-BR" smtClean="0"/>
+            <a:pPr marL="0" indent="0">
+              <a:spcBef>
+                <a:spcPts val="0"/>
+              </a:spcBef>
+              <a:buNone/>
+              <a:tabLst>
+                <a:tab pos="533400" algn="l"/>
+                <a:tab pos="990600" algn="l"/>
+                <a:tab pos="1436688" algn="l"/>
+              </a:tabLst>
+            </a:pPr>
+            <a:r>
+              <a:rPr lang="pt-BR" sz="2000" dirty="0" smtClean="0"/>
+              <a:t>public class Conta {</a:t>
+            </a:r>
+          </a:p>
+          <a:p>
+            <a:pPr marL="0" indent="0">
+              <a:spcBef>
+                <a:spcPts val="0"/>
+              </a:spcBef>
+              <a:buNone/>
+              <a:tabLst>
+                <a:tab pos="533400" algn="l"/>
+                <a:tab pos="990600" algn="l"/>
+                <a:tab pos="1436688" algn="l"/>
+              </a:tabLst>
+            </a:pPr>
+            <a:r>
+              <a:rPr lang="pt-BR" sz="2000" dirty="0" smtClean="0"/>
+              <a:t>	...</a:t>
+            </a:r>
+          </a:p>
+          <a:p>
+            <a:pPr marL="0" indent="0">
+              <a:spcBef>
+                <a:spcPts val="0"/>
+              </a:spcBef>
+              <a:buNone/>
+              <a:tabLst>
+                <a:tab pos="533400" algn="l"/>
+                <a:tab pos="990600" algn="l"/>
+                <a:tab pos="1436688" algn="l"/>
+              </a:tabLst>
+            </a:pPr>
+            <a:r>
+              <a:rPr lang="pt-BR" sz="2000" dirty="0" smtClean="0"/>
+              <a:t>	public </a:t>
+            </a:r>
+            <a:r>
+              <a:rPr lang="pt-BR" sz="2000" b="1" dirty="0" smtClean="0">
+                <a:solidFill>
+                  <a:srgbClr val="FFC000"/>
+                </a:solidFill>
+              </a:rPr>
+              <a:t>synchronized</a:t>
+            </a:r>
+            <a:r>
+              <a:rPr lang="pt-BR" sz="2000" dirty="0" smtClean="0"/>
+              <a:t> void retirar(double valor) {</a:t>
+            </a:r>
+          </a:p>
+          <a:p>
+            <a:pPr marL="0" indent="0">
+              <a:spcBef>
+                <a:spcPts val="0"/>
+              </a:spcBef>
+              <a:buNone/>
+              <a:tabLst>
+                <a:tab pos="533400" algn="l"/>
+                <a:tab pos="990600" algn="l"/>
+                <a:tab pos="1436688" algn="l"/>
+              </a:tabLst>
+            </a:pPr>
+            <a:r>
+              <a:rPr lang="pt-BR" sz="2000" dirty="0" smtClean="0"/>
+              <a:t>		while (this.saldo &lt; valor) {</a:t>
+            </a:r>
+          </a:p>
+          <a:p>
+            <a:pPr marL="0" indent="0">
+              <a:spcBef>
+                <a:spcPts val="0"/>
+              </a:spcBef>
+              <a:buNone/>
+              <a:tabLst>
+                <a:tab pos="533400" algn="l"/>
+                <a:tab pos="990600" algn="l"/>
+                <a:tab pos="1436688" algn="l"/>
+              </a:tabLst>
+            </a:pPr>
+            <a:r>
+              <a:rPr lang="pt-BR" sz="2000" dirty="0" smtClean="0"/>
+              <a:t>			</a:t>
+            </a:r>
+            <a:r>
+              <a:rPr lang="pt-BR" sz="2000" b="1" dirty="0" smtClean="0">
+                <a:solidFill>
+                  <a:srgbClr val="FFC000"/>
+                </a:solidFill>
+              </a:rPr>
+              <a:t>wait()</a:t>
+            </a:r>
+            <a:r>
+              <a:rPr lang="pt-BR" sz="2000" dirty="0" smtClean="0"/>
+              <a:t>;</a:t>
+            </a:r>
+          </a:p>
+          <a:p>
+            <a:pPr marL="0" indent="0">
+              <a:spcBef>
+                <a:spcPts val="0"/>
+              </a:spcBef>
+              <a:buNone/>
+              <a:tabLst>
+                <a:tab pos="533400" algn="l"/>
+                <a:tab pos="990600" algn="l"/>
+                <a:tab pos="1436688" algn="l"/>
+              </a:tabLst>
+            </a:pPr>
+            <a:r>
+              <a:rPr lang="pt-BR" sz="2000" dirty="0" smtClean="0"/>
+              <a:t>		}</a:t>
+            </a:r>
+          </a:p>
+          <a:p>
+            <a:pPr marL="0" indent="0">
+              <a:spcBef>
+                <a:spcPts val="0"/>
+              </a:spcBef>
+              <a:buNone/>
+              <a:tabLst>
+                <a:tab pos="533400" algn="l"/>
+                <a:tab pos="990600" algn="l"/>
+                <a:tab pos="1436688" algn="l"/>
+              </a:tabLst>
+            </a:pPr>
+            <a:r>
+              <a:rPr lang="pt-BR" sz="2000" dirty="0" smtClean="0"/>
+              <a:t>		this.saldo -= valor;</a:t>
+            </a:r>
+          </a:p>
+          <a:p>
+            <a:pPr marL="0" indent="0">
+              <a:spcBef>
+                <a:spcPts val="0"/>
+              </a:spcBef>
+              <a:buNone/>
+              <a:tabLst>
+                <a:tab pos="533400" algn="l"/>
+                <a:tab pos="990600" algn="l"/>
+                <a:tab pos="1436688" algn="l"/>
+              </a:tabLst>
+            </a:pPr>
+            <a:r>
+              <a:rPr lang="pt-BR" sz="2000" dirty="0" smtClean="0"/>
+              <a:t>	}</a:t>
+            </a:r>
+          </a:p>
+          <a:p>
+            <a:pPr marL="0" indent="0">
+              <a:spcBef>
+                <a:spcPts val="0"/>
+              </a:spcBef>
+              <a:buNone/>
+              <a:tabLst>
+                <a:tab pos="533400" algn="l"/>
+                <a:tab pos="990600" algn="l"/>
+                <a:tab pos="1436688" algn="l"/>
+              </a:tabLst>
+            </a:pPr>
+            <a:endParaRPr lang="pt-BR" sz="2000" dirty="0" smtClean="0"/>
+          </a:p>
+          <a:p>
+            <a:pPr marL="0" indent="0">
+              <a:spcBef>
+                <a:spcPts val="0"/>
+              </a:spcBef>
+              <a:buNone/>
+              <a:tabLst>
+                <a:tab pos="533400" algn="l"/>
+                <a:tab pos="990600" algn="l"/>
+                <a:tab pos="1436688" algn="l"/>
+              </a:tabLst>
+            </a:pPr>
+            <a:r>
+              <a:rPr lang="pt-BR" sz="2000" dirty="0" smtClean="0"/>
+              <a:t>	public </a:t>
+            </a:r>
+            <a:r>
+              <a:rPr lang="pt-BR" sz="2000" b="1" dirty="0" smtClean="0">
+                <a:solidFill>
+                  <a:srgbClr val="FFC000"/>
+                </a:solidFill>
+              </a:rPr>
+              <a:t>synchronized</a:t>
+            </a:r>
+            <a:r>
+              <a:rPr lang="pt-BR" sz="2000" dirty="0" smtClean="0"/>
+              <a:t> void depositar(double valor) {</a:t>
+            </a:r>
+          </a:p>
+          <a:p>
+            <a:pPr marL="0" indent="0">
+              <a:spcBef>
+                <a:spcPts val="0"/>
+              </a:spcBef>
+              <a:buNone/>
+              <a:tabLst>
+                <a:tab pos="533400" algn="l"/>
+                <a:tab pos="990600" algn="l"/>
+                <a:tab pos="1436688" algn="l"/>
+              </a:tabLst>
+            </a:pPr>
+            <a:r>
+              <a:rPr lang="pt-BR" sz="2000" dirty="0" smtClean="0"/>
+              <a:t>		this.saldo += valor;</a:t>
+            </a:r>
+          </a:p>
+          <a:p>
+            <a:pPr marL="0" indent="0">
+              <a:spcBef>
+                <a:spcPts val="0"/>
+              </a:spcBef>
+              <a:buNone/>
+              <a:tabLst>
+                <a:tab pos="533400" algn="l"/>
+                <a:tab pos="990600" algn="l"/>
+                <a:tab pos="1436688" algn="l"/>
+              </a:tabLst>
+            </a:pPr>
+            <a:r>
+              <a:rPr lang="pt-BR" sz="2000" dirty="0" smtClean="0"/>
+              <a:t>		</a:t>
+            </a:r>
+            <a:r>
+              <a:rPr lang="pt-BR" sz="2000" b="1" dirty="0" smtClean="0">
+                <a:solidFill>
+                  <a:srgbClr val="FFC000"/>
+                </a:solidFill>
+              </a:rPr>
+              <a:t>notify()</a:t>
+            </a:r>
+            <a:r>
+              <a:rPr lang="pt-BR" sz="2000" dirty="0" smtClean="0"/>
+              <a:t>;</a:t>
+            </a:r>
+          </a:p>
+          <a:p>
+            <a:pPr marL="0" indent="0">
+              <a:spcBef>
+                <a:spcPts val="0"/>
+              </a:spcBef>
+              <a:buNone/>
+              <a:tabLst>
+                <a:tab pos="533400" algn="l"/>
+                <a:tab pos="990600" algn="l"/>
+                <a:tab pos="1436688" algn="l"/>
+              </a:tabLst>
+            </a:pPr>
+            <a:r>
+              <a:rPr lang="pt-BR" sz="2000" dirty="0" smtClean="0"/>
+              <a:t>	}</a:t>
+            </a:r>
+          </a:p>
+          <a:p>
+            <a:pPr marL="0" indent="0">
+              <a:spcBef>
+                <a:spcPts val="0"/>
+              </a:spcBef>
+              <a:buNone/>
+              <a:tabLst>
+                <a:tab pos="533400" algn="l"/>
+                <a:tab pos="990600" algn="l"/>
+                <a:tab pos="1436688" algn="l"/>
+              </a:tabLst>
+            </a:pPr>
+            <a:r>
+              <a:rPr lang="pt-BR" sz="2000" dirty="0" smtClean="0"/>
+              <a:t>	...</a:t>
+            </a:r>
+          </a:p>
+          <a:p>
+            <a:pPr marL="0" indent="0">
+              <a:spcBef>
+                <a:spcPts val="0"/>
+              </a:spcBef>
+              <a:buNone/>
+              <a:tabLst>
+                <a:tab pos="533400" algn="l"/>
+                <a:tab pos="990600" algn="l"/>
+                <a:tab pos="1436688" algn="l"/>
+              </a:tabLst>
+            </a:pPr>
+            <a:r>
+              <a:rPr lang="pt-BR" sz="2000" dirty="0" smtClean="0"/>
+              <a:t>}</a:t>
+            </a:r>
           </a:p>
         </p:txBody>
       </p:sp>
@@ -28571,6 +29214,292 @@
           </a:p>
         </p:txBody>
       </p:sp>
+      <p:sp>
+        <p:nvSpPr>
+          <p:cNvPr id="5" name="CaixaDeTexto 8"/>
+          <p:cNvSpPr txBox="1"/>
+          <p:nvPr/>
+        </p:nvSpPr>
+        <p:spPr>
+          <a:xfrm>
+            <a:off x="5429256" y="3429000"/>
+            <a:ext cx="2662908" cy="738664"/>
+          </a:xfrm>
+          <a:prstGeom prst="rect">
+            <a:avLst/>
+          </a:prstGeom>
+          <a:noFill/>
+          <a:ln>
+            <a:solidFill>
+              <a:schemeClr val="tx1"/>
+            </a:solidFill>
+          </a:ln>
+        </p:spPr>
+        <p:txBody>
+          <a:bodyPr wrap="none" rtlCol="0">
+            <a:spAutoFit/>
+          </a:bodyPr>
+          <a:lstStyle/>
+          <a:p>
+            <a:pPr algn="ctr"/>
+            <a:r>
+              <a:rPr lang="pt-BR" sz="1400" dirty="0" smtClean="0"/>
+              <a:t>Bloqueia a thread corrente</a:t>
+            </a:r>
+          </a:p>
+          <a:p>
+            <a:pPr algn="ctr"/>
+            <a:r>
+              <a:rPr lang="pt-BR" sz="1400" dirty="0" smtClean="0"/>
+              <a:t>permitindo que outras threads</a:t>
+            </a:r>
+          </a:p>
+          <a:p>
+            <a:pPr algn="ctr"/>
+            <a:r>
+              <a:rPr lang="pt-BR" sz="1400" dirty="0" smtClean="0"/>
+              <a:t>acessem blocos sincronizados.</a:t>
+            </a:r>
+            <a:endParaRPr lang="pt-BR" sz="1400" dirty="0"/>
+          </a:p>
+        </p:txBody>
+      </p:sp>
+      <p:grpSp>
+        <p:nvGrpSpPr>
+          <p:cNvPr id="6" name="Grupo 43"/>
+          <p:cNvGrpSpPr/>
+          <p:nvPr/>
+        </p:nvGrpSpPr>
+        <p:grpSpPr>
+          <a:xfrm>
+            <a:off x="3428992" y="3071810"/>
+            <a:ext cx="3366540" cy="361750"/>
+            <a:chOff x="3851920" y="1916832"/>
+            <a:chExt cx="1440160" cy="864096"/>
+          </a:xfrm>
+        </p:grpSpPr>
+        <p:cxnSp>
+          <p:nvCxnSpPr>
+            <p:cNvPr id="7" name="Conector reto 104"/>
+            <p:cNvCxnSpPr/>
+            <p:nvPr/>
+          </p:nvCxnSpPr>
+          <p:spPr>
+            <a:xfrm>
+              <a:off x="3851920" y="1916832"/>
+              <a:ext cx="1440160" cy="0"/>
+            </a:xfrm>
+            <a:prstGeom prst="line">
+              <a:avLst/>
+            </a:prstGeom>
+            <a:ln>
+              <a:solidFill>
+                <a:schemeClr val="tx1"/>
+              </a:solidFill>
+              <a:headEnd type="arrow"/>
+            </a:ln>
+          </p:spPr>
+          <p:style>
+            <a:lnRef idx="1">
+              <a:schemeClr val="accent1"/>
+            </a:lnRef>
+            <a:fillRef idx="0">
+              <a:schemeClr val="accent1"/>
+            </a:fillRef>
+            <a:effectRef idx="0">
+              <a:schemeClr val="accent1"/>
+            </a:effectRef>
+            <a:fontRef idx="minor">
+              <a:schemeClr val="tx1"/>
+            </a:fontRef>
+          </p:style>
+        </p:cxnSp>
+        <p:cxnSp>
+          <p:nvCxnSpPr>
+            <p:cNvPr id="8" name="Conector de seta reta 105"/>
+            <p:cNvCxnSpPr/>
+            <p:nvPr/>
+          </p:nvCxnSpPr>
+          <p:spPr>
+            <a:xfrm>
+              <a:off x="5292080" y="1916832"/>
+              <a:ext cx="0" cy="864096"/>
+            </a:xfrm>
+            <a:prstGeom prst="straightConnector1">
+              <a:avLst/>
+            </a:prstGeom>
+            <a:ln>
+              <a:solidFill>
+                <a:schemeClr val="tx1"/>
+              </a:solidFill>
+              <a:tailEnd type="none"/>
+            </a:ln>
+          </p:spPr>
+          <p:style>
+            <a:lnRef idx="1">
+              <a:schemeClr val="accent1"/>
+            </a:lnRef>
+            <a:fillRef idx="0">
+              <a:schemeClr val="accent1"/>
+            </a:fillRef>
+            <a:effectRef idx="0">
+              <a:schemeClr val="accent1"/>
+            </a:effectRef>
+            <a:fontRef idx="minor">
+              <a:schemeClr val="tx1"/>
+            </a:fontRef>
+          </p:style>
+        </p:cxnSp>
+      </p:grpSp>
+      <p:sp>
+        <p:nvSpPr>
+          <p:cNvPr id="9" name="CaixaDeTexto 8"/>
+          <p:cNvSpPr txBox="1"/>
+          <p:nvPr/>
+        </p:nvSpPr>
+        <p:spPr>
+          <a:xfrm>
+            <a:off x="5286380" y="5572140"/>
+            <a:ext cx="2927404" cy="738664"/>
+          </a:xfrm>
+          <a:prstGeom prst="rect">
+            <a:avLst/>
+          </a:prstGeom>
+          <a:noFill/>
+          <a:ln>
+            <a:solidFill>
+              <a:schemeClr val="tx1"/>
+            </a:solidFill>
+          </a:ln>
+        </p:spPr>
+        <p:txBody>
+          <a:bodyPr wrap="none" rtlCol="0">
+            <a:spAutoFit/>
+          </a:bodyPr>
+          <a:lstStyle/>
+          <a:p>
+            <a:pPr algn="ctr"/>
+            <a:r>
+              <a:rPr lang="pt-BR" sz="1400" dirty="0" smtClean="0"/>
+              <a:t>Desbloqueia outras threads que</a:t>
+            </a:r>
+          </a:p>
+          <a:p>
+            <a:pPr algn="ctr"/>
+            <a:r>
+              <a:rPr lang="pt-BR" sz="1400" dirty="0" smtClean="0"/>
+              <a:t>executaram o método </a:t>
+            </a:r>
+            <a:r>
+              <a:rPr lang="pt-BR" sz="1400" b="1" dirty="0" smtClean="0">
+                <a:solidFill>
+                  <a:srgbClr val="FFC000"/>
+                </a:solidFill>
+              </a:rPr>
+              <a:t>wait()</a:t>
+            </a:r>
+            <a:r>
+              <a:rPr lang="pt-BR" sz="1400" dirty="0" smtClean="0"/>
+              <a:t> sobre</a:t>
+            </a:r>
+          </a:p>
+          <a:p>
+            <a:pPr algn="ctr"/>
+            <a:r>
+              <a:rPr lang="pt-BR" sz="1400" dirty="0" smtClean="0"/>
+              <a:t>esta instância (this).</a:t>
+            </a:r>
+            <a:endParaRPr lang="pt-BR" sz="1400" dirty="0"/>
+          </a:p>
+        </p:txBody>
+      </p:sp>
+      <p:grpSp>
+        <p:nvGrpSpPr>
+          <p:cNvPr id="10" name="Grupo 43"/>
+          <p:cNvGrpSpPr/>
+          <p:nvPr/>
+        </p:nvGrpSpPr>
+        <p:grpSpPr>
+          <a:xfrm>
+            <a:off x="3143240" y="5143512"/>
+            <a:ext cx="3652292" cy="428628"/>
+            <a:chOff x="3851920" y="1916832"/>
+            <a:chExt cx="1440160" cy="864096"/>
+          </a:xfrm>
+        </p:grpSpPr>
+        <p:cxnSp>
+          <p:nvCxnSpPr>
+            <p:cNvPr id="11" name="Conector reto 104"/>
+            <p:cNvCxnSpPr/>
+            <p:nvPr/>
+          </p:nvCxnSpPr>
+          <p:spPr>
+            <a:xfrm>
+              <a:off x="3851920" y="1916832"/>
+              <a:ext cx="1440160" cy="0"/>
+            </a:xfrm>
+            <a:prstGeom prst="line">
+              <a:avLst/>
+            </a:prstGeom>
+            <a:ln>
+              <a:solidFill>
+                <a:schemeClr val="tx1"/>
+              </a:solidFill>
+              <a:headEnd type="arrow"/>
+            </a:ln>
+          </p:spPr>
+          <p:style>
+            <a:lnRef idx="1">
+              <a:schemeClr val="accent1"/>
+            </a:lnRef>
+            <a:fillRef idx="0">
+              <a:schemeClr val="accent1"/>
+            </a:fillRef>
+            <a:effectRef idx="0">
+              <a:schemeClr val="accent1"/>
+            </a:effectRef>
+            <a:fontRef idx="minor">
+              <a:schemeClr val="tx1"/>
+            </a:fontRef>
+          </p:style>
+        </p:cxnSp>
+        <p:cxnSp>
+          <p:nvCxnSpPr>
+            <p:cNvPr id="12" name="Conector de seta reta 105"/>
+            <p:cNvCxnSpPr/>
+            <p:nvPr/>
+          </p:nvCxnSpPr>
+          <p:spPr>
+            <a:xfrm>
+              <a:off x="5292080" y="1916832"/>
+              <a:ext cx="0" cy="864096"/>
+            </a:xfrm>
+            <a:prstGeom prst="straightConnector1">
+              <a:avLst/>
+            </a:prstGeom>
+            <a:ln>
+              <a:solidFill>
+                <a:schemeClr val="tx1"/>
+              </a:solidFill>
+              <a:tailEnd type="none"/>
+            </a:ln>
+          </p:spPr>
+          <p:style>
+            <a:lnRef idx="1">
+              <a:schemeClr val="accent1"/>
+            </a:lnRef>
+            <a:fillRef idx="0">
+              <a:schemeClr val="accent1"/>
+            </a:fillRef>
+            <a:effectRef idx="0">
+              <a:schemeClr val="accent1"/>
+            </a:effectRef>
+            <a:fontRef idx="minor">
+              <a:schemeClr val="tx1"/>
+            </a:fontRef>
+          </p:style>
+        </p:cxnSp>
+      </p:grpSp>
     </p:spTree>
   </p:cSld>
   <p:clrMapOvr>
@@ -28579,9 +29508,212 @@
   <p:timing>
     <p:tnLst>
       <p:par>
-        <p:cTn id="1" dur="indefinite" restart="never" nodeType="tmRoot"/>
+        <p:cTn id="1" dur="indefinite" restart="never" nodeType="tmRoot">
+          <p:childTnLst>
+            <p:seq concurrent="1" nextAc="seek">
+              <p:cTn id="2" dur="indefinite" nodeType="mainSeq">
+                <p:childTnLst>
+                  <p:par>
+                    <p:cTn id="3" fill="hold">
+                      <p:stCondLst>
+                        <p:cond delay="indefinite"/>
+                      </p:stCondLst>
+                      <p:childTnLst>
+                        <p:par>
+                          <p:cTn id="4" fill="hold">
+                            <p:stCondLst>
+                              <p:cond delay="0"/>
+                            </p:stCondLst>
+                            <p:childTnLst>
+                              <p:par>
+                                <p:cTn id="5" presetID="3" presetClass="entr" presetSubtype="10" fill="hold" nodeType="clickEffect">
+                                  <p:stCondLst>
+                                    <p:cond delay="0"/>
+                                  </p:stCondLst>
+                                  <p:childTnLst>
+                                    <p:set>
+                                      <p:cBhvr>
+                                        <p:cTn id="6" dur="1" fill="hold">
+                                          <p:stCondLst>
+                                            <p:cond delay="0"/>
+                                          </p:stCondLst>
+                                        </p:cTn>
+                                        <p:tgtEl>
+                                          <p:spTgt spid="6"/>
+                                        </p:tgtEl>
+                                        <p:attrNameLst>
+                                          <p:attrName>style.visibility</p:attrName>
+                                        </p:attrNameLst>
+                                      </p:cBhvr>
+                                      <p:to>
+                                        <p:strVal val="visible"/>
+                                      </p:to>
+                                    </p:set>
+                                    <p:animEffect transition="in" filter="blinds(horizontal)">
+                                      <p:cBhvr>
+                                        <p:cTn id="7" dur="500"/>
+                                        <p:tgtEl>
+                                          <p:spTgt spid="6"/>
+                                        </p:tgtEl>
+                                      </p:cBhvr>
+                                    </p:animEffect>
+                                  </p:childTnLst>
+                                </p:cTn>
+                              </p:par>
+                              <p:par>
+                                <p:cTn id="8" presetID="3" presetClass="entr" presetSubtype="10" fill="hold" grpId="0" nodeType="withEffect">
+                                  <p:stCondLst>
+                                    <p:cond delay="0"/>
+                                  </p:stCondLst>
+                                  <p:childTnLst>
+                                    <p:set>
+                                      <p:cBhvr>
+                                        <p:cTn id="9" dur="1" fill="hold">
+                                          <p:stCondLst>
+                                            <p:cond delay="0"/>
+                                          </p:stCondLst>
+                                        </p:cTn>
+                                        <p:tgtEl>
+                                          <p:spTgt spid="5"/>
+                                        </p:tgtEl>
+                                        <p:attrNameLst>
+                                          <p:attrName>style.visibility</p:attrName>
+                                        </p:attrNameLst>
+                                      </p:cBhvr>
+                                      <p:to>
+                                        <p:strVal val="visible"/>
+                                      </p:to>
+                                    </p:set>
+                                    <p:animEffect transition="in" filter="blinds(horizontal)">
+                                      <p:cBhvr>
+                                        <p:cTn id="10" dur="500"/>
+                                        <p:tgtEl>
+                                          <p:spTgt spid="5"/>
+                                        </p:tgtEl>
+                                      </p:cBhvr>
+                                    </p:animEffect>
+                                  </p:childTnLst>
+                                </p:cTn>
+                              </p:par>
+                            </p:childTnLst>
+                          </p:cTn>
+                        </p:par>
+                      </p:childTnLst>
+                    </p:cTn>
+                  </p:par>
+                  <p:par>
+                    <p:cTn id="11" fill="hold">
+                      <p:stCondLst>
+                        <p:cond delay="indefinite"/>
+                      </p:stCondLst>
+                      <p:childTnLst>
+                        <p:par>
+                          <p:cTn id="12" fill="hold">
+                            <p:stCondLst>
+                              <p:cond delay="0"/>
+                            </p:stCondLst>
+                            <p:childTnLst>
+                              <p:par>
+                                <p:cTn id="13" presetID="3" presetClass="entr" presetSubtype="10" fill="hold" nodeType="clickEffect">
+                                  <p:stCondLst>
+                                    <p:cond delay="0"/>
+                                  </p:stCondLst>
+                                  <p:childTnLst>
+                                    <p:set>
+                                      <p:cBhvr>
+                                        <p:cTn id="14" dur="1" fill="hold">
+                                          <p:stCondLst>
+                                            <p:cond delay="0"/>
+                                          </p:stCondLst>
+                                        </p:cTn>
+                                        <p:tgtEl>
+                                          <p:spTgt spid="10"/>
+                                        </p:tgtEl>
+                                        <p:attrNameLst>
+                                          <p:attrName>style.visibility</p:attrName>
+                                        </p:attrNameLst>
+                                      </p:cBhvr>
+                                      <p:to>
+                                        <p:strVal val="visible"/>
+                                      </p:to>
+                                    </p:set>
+                                    <p:animEffect transition="in" filter="blinds(horizontal)">
+                                      <p:cBhvr>
+                                        <p:cTn id="15" dur="500"/>
+                                        <p:tgtEl>
+                                          <p:spTgt spid="10"/>
+                                        </p:tgtEl>
+                                      </p:cBhvr>
+                                    </p:animEffect>
+                                  </p:childTnLst>
+                                </p:cTn>
+                              </p:par>
+                              <p:par>
+                                <p:cTn id="16" presetID="3" presetClass="entr" presetSubtype="10" fill="hold" grpId="0" nodeType="withEffect">
+                                  <p:stCondLst>
+                                    <p:cond delay="0"/>
+                                  </p:stCondLst>
+                                  <p:childTnLst>
+                                    <p:set>
+                                      <p:cBhvr>
+                                        <p:cTn id="17" dur="1" fill="hold">
+                                          <p:stCondLst>
+                                            <p:cond delay="0"/>
+                                          </p:stCondLst>
+                                        </p:cTn>
+                                        <p:tgtEl>
+                                          <p:spTgt spid="9"/>
+                                        </p:tgtEl>
+                                        <p:attrNameLst>
+                                          <p:attrName>style.visibility</p:attrName>
+                                        </p:attrNameLst>
+                                      </p:cBhvr>
+                                      <p:to>
+                                        <p:strVal val="visible"/>
+                                      </p:to>
+                                    </p:set>
+                                    <p:animEffect transition="in" filter="blinds(horizontal)">
+                                      <p:cBhvr>
+                                        <p:cTn id="18" dur="500"/>
+                                        <p:tgtEl>
+                                          <p:spTgt spid="9"/>
+                                        </p:tgtEl>
+                                      </p:cBhvr>
+                                    </p:animEffect>
+                                  </p:childTnLst>
+                                </p:cTn>
+                              </p:par>
+                            </p:childTnLst>
+                          </p:cTn>
+                        </p:par>
+                      </p:childTnLst>
+                    </p:cTn>
+                  </p:par>
+                </p:childTnLst>
+              </p:cTn>
+              <p:prevCondLst>
+                <p:cond evt="onPrev" delay="0">
+                  <p:tgtEl>
+                    <p:sldTgt/>
+                  </p:tgtEl>
+                </p:cond>
+              </p:prevCondLst>
+              <p:nextCondLst>
+                <p:cond evt="onNext" delay="0">
+                  <p:tgtEl>
+                    <p:sldTgt/>
+                  </p:tgtEl>
+                </p:cond>
+              </p:nextCondLst>
+            </p:seq>
+          </p:childTnLst>
+        </p:cTn>
       </p:par>
     </p:tnLst>
+    <p:bldLst>
+      <p:bldP spid="5" grpId="0" animBg="1"/>
+      <p:bldP spid="9" grpId="0" animBg="1"/>
+    </p:bldLst>
   </p:timing>
 </p:sld>
 </file>
@@ -28605,7 +29737,7 @@
       </p:grpSpPr>
       <p:sp>
         <p:nvSpPr>
-          <p:cNvPr id="26626" name="Título 1"/>
+          <p:cNvPr id="2" name="Title 1"/>
           <p:cNvSpPr>
             <a:spLocks noGrp="1"/>
           </p:cNvSpPr>
@@ -28618,18 +29750,968 @@
           <a:bodyPr/>
           <a:lstStyle/>
           <a:p>
-            <a:pPr eaLnBrk="1" hangingPunct="1"/>
-            <a:r>
-              <a:rPr lang="pt-BR" dirty="0" err="1" smtClean="0"/>
-              <a:t>Deadlock</a:t>
-            </a:r>
-            <a:endParaRPr lang="pt-BR" dirty="0" smtClean="0"/>
+            <a:r>
+              <a:rPr lang="pt-BR" dirty="0" smtClean="0"/>
+              <a:t>Interação entre threads</a:t>
+            </a:r>
+            <a:endParaRPr lang="pt-BR" dirty="0"/>
           </a:p>
         </p:txBody>
       </p:sp>
       <p:sp>
         <p:nvSpPr>
-          <p:cNvPr id="26627" name="Espaço Reservado para Conteúdo 2"/>
+          <p:cNvPr id="3" name="Content Placeholder 2"/>
+          <p:cNvSpPr>
+            <a:spLocks noGrp="1"/>
+          </p:cNvSpPr>
+          <p:nvPr>
+            <p:ph sz="half" idx="1"/>
+          </p:nvPr>
+        </p:nvSpPr>
+        <p:spPr>
+          <a:xfrm>
+            <a:off x="457200" y="1600200"/>
+            <a:ext cx="4114800" cy="4525963"/>
+          </a:xfrm>
+        </p:spPr>
+        <p:txBody>
+          <a:bodyPr/>
+          <a:lstStyle/>
+          <a:p>
+            <a:pPr marL="271463" indent="-234950"/>
+            <a:r>
+              <a:rPr lang="pt-BR" sz="2000" dirty="0" smtClean="0"/>
+              <a:t>Sincronização por método</a:t>
+            </a:r>
+          </a:p>
+          <a:p>
+            <a:pPr marL="271463" indent="0">
+              <a:spcBef>
+                <a:spcPts val="0"/>
+              </a:spcBef>
+              <a:buNone/>
+              <a:tabLst>
+                <a:tab pos="804863" algn="l"/>
+                <a:tab pos="1252538" algn="l"/>
+              </a:tabLst>
+            </a:pPr>
+            <a:endParaRPr lang="pt-BR" sz="1600" dirty="0" smtClean="0"/>
+          </a:p>
+          <a:p>
+            <a:pPr marL="271463" indent="0">
+              <a:spcBef>
+                <a:spcPts val="0"/>
+              </a:spcBef>
+              <a:buNone/>
+              <a:tabLst>
+                <a:tab pos="804863" algn="l"/>
+                <a:tab pos="1252538" algn="l"/>
+              </a:tabLst>
+            </a:pPr>
+            <a:endParaRPr lang="pt-BR" sz="1600" dirty="0" smtClean="0"/>
+          </a:p>
+          <a:p>
+            <a:pPr marL="271463" indent="0">
+              <a:spcBef>
+                <a:spcPts val="0"/>
+              </a:spcBef>
+              <a:buNone/>
+              <a:tabLst>
+                <a:tab pos="804863" algn="l"/>
+                <a:tab pos="1252538" algn="l"/>
+              </a:tabLst>
+            </a:pPr>
+            <a:r>
+              <a:rPr lang="pt-BR" sz="1600" dirty="0" smtClean="0"/>
+              <a:t>public </a:t>
+            </a:r>
+            <a:r>
+              <a:rPr lang="pt-BR" sz="1600" b="1" dirty="0" smtClean="0">
+                <a:solidFill>
+                  <a:srgbClr val="FFC000"/>
+                </a:solidFill>
+              </a:rPr>
+              <a:t>synchronized</a:t>
+            </a:r>
+            <a:r>
+              <a:rPr lang="pt-BR" sz="1600" dirty="0" smtClean="0"/>
+              <a:t> ... </a:t>
+            </a:r>
+            <a:r>
+              <a:rPr lang="pt-BR" sz="1600" u="sng" dirty="0" smtClean="0"/>
+              <a:t>metodo1</a:t>
+            </a:r>
+            <a:r>
+              <a:rPr lang="pt-BR" sz="1600" dirty="0" smtClean="0"/>
+              <a:t>(...) {</a:t>
+            </a:r>
+          </a:p>
+          <a:p>
+            <a:pPr marL="271463" indent="0">
+              <a:spcBef>
+                <a:spcPts val="0"/>
+              </a:spcBef>
+              <a:buNone/>
+              <a:tabLst>
+                <a:tab pos="804863" algn="l"/>
+                <a:tab pos="1252538" algn="l"/>
+              </a:tabLst>
+            </a:pPr>
+            <a:r>
+              <a:rPr lang="pt-BR" sz="1600" dirty="0" smtClean="0"/>
+              <a:t>	...</a:t>
+            </a:r>
+          </a:p>
+          <a:p>
+            <a:pPr marL="271463" indent="0">
+              <a:spcBef>
+                <a:spcPts val="0"/>
+              </a:spcBef>
+              <a:buNone/>
+              <a:tabLst>
+                <a:tab pos="804863" algn="l"/>
+                <a:tab pos="1252538" algn="l"/>
+              </a:tabLst>
+            </a:pPr>
+            <a:r>
+              <a:rPr lang="pt-BR" sz="1600" dirty="0" smtClean="0"/>
+              <a:t>	</a:t>
+            </a:r>
+            <a:r>
+              <a:rPr lang="pt-BR" sz="1600" b="1" dirty="0" smtClean="0">
+                <a:solidFill>
+                  <a:srgbClr val="FFC000"/>
+                </a:solidFill>
+              </a:rPr>
+              <a:t>wait()</a:t>
+            </a:r>
+            <a:r>
+              <a:rPr lang="pt-BR" sz="1600" dirty="0" smtClean="0"/>
+              <a:t>;</a:t>
+            </a:r>
+          </a:p>
+          <a:p>
+            <a:pPr marL="271463" indent="0">
+              <a:spcBef>
+                <a:spcPts val="0"/>
+              </a:spcBef>
+              <a:buNone/>
+              <a:tabLst>
+                <a:tab pos="804863" algn="l"/>
+                <a:tab pos="1252538" algn="l"/>
+              </a:tabLst>
+            </a:pPr>
+            <a:r>
+              <a:rPr lang="pt-BR" sz="1600" dirty="0" smtClean="0"/>
+              <a:t>	...</a:t>
+            </a:r>
+          </a:p>
+          <a:p>
+            <a:pPr marL="271463" indent="0">
+              <a:spcBef>
+                <a:spcPts val="0"/>
+              </a:spcBef>
+              <a:buNone/>
+              <a:tabLst>
+                <a:tab pos="804863" algn="l"/>
+                <a:tab pos="1252538" algn="l"/>
+              </a:tabLst>
+            </a:pPr>
+            <a:r>
+              <a:rPr lang="pt-BR" sz="1600" dirty="0" smtClean="0"/>
+              <a:t>}</a:t>
+            </a:r>
+          </a:p>
+          <a:p>
+            <a:pPr marL="271463" indent="0">
+              <a:spcBef>
+                <a:spcPts val="0"/>
+              </a:spcBef>
+              <a:buNone/>
+              <a:tabLst>
+                <a:tab pos="804863" algn="l"/>
+                <a:tab pos="1252538" algn="l"/>
+              </a:tabLst>
+            </a:pPr>
+            <a:endParaRPr lang="pt-BR" sz="1600" dirty="0" smtClean="0"/>
+          </a:p>
+          <a:p>
+            <a:pPr marL="271463" indent="0">
+              <a:spcBef>
+                <a:spcPts val="0"/>
+              </a:spcBef>
+              <a:buNone/>
+              <a:tabLst>
+                <a:tab pos="804863" algn="l"/>
+                <a:tab pos="1252538" algn="l"/>
+              </a:tabLst>
+            </a:pPr>
+            <a:r>
+              <a:rPr lang="pt-BR" sz="1600" dirty="0" smtClean="0"/>
+              <a:t>public </a:t>
+            </a:r>
+            <a:r>
+              <a:rPr lang="pt-BR" sz="1600" b="1" dirty="0" smtClean="0">
+                <a:solidFill>
+                  <a:srgbClr val="FFC000"/>
+                </a:solidFill>
+              </a:rPr>
+              <a:t>synchronized</a:t>
+            </a:r>
+            <a:r>
+              <a:rPr lang="pt-BR" sz="1600" dirty="0" smtClean="0"/>
+              <a:t> ... </a:t>
+            </a:r>
+            <a:r>
+              <a:rPr lang="pt-BR" sz="1600" u="sng" dirty="0" smtClean="0"/>
+              <a:t>metodo2</a:t>
+            </a:r>
+            <a:r>
+              <a:rPr lang="pt-BR" sz="1600" dirty="0" smtClean="0"/>
+              <a:t>(...) {</a:t>
+            </a:r>
+          </a:p>
+          <a:p>
+            <a:pPr marL="271463" indent="0">
+              <a:spcBef>
+                <a:spcPts val="0"/>
+              </a:spcBef>
+              <a:buNone/>
+              <a:tabLst>
+                <a:tab pos="804863" algn="l"/>
+                <a:tab pos="1252538" algn="l"/>
+              </a:tabLst>
+            </a:pPr>
+            <a:r>
+              <a:rPr lang="pt-BR" sz="1600" dirty="0" smtClean="0"/>
+              <a:t>	...</a:t>
+            </a:r>
+          </a:p>
+          <a:p>
+            <a:pPr marL="271463" indent="0">
+              <a:spcBef>
+                <a:spcPts val="0"/>
+              </a:spcBef>
+              <a:buNone/>
+              <a:tabLst>
+                <a:tab pos="804863" algn="l"/>
+                <a:tab pos="1252538" algn="l"/>
+              </a:tabLst>
+            </a:pPr>
+            <a:r>
+              <a:rPr lang="pt-BR" sz="1600" dirty="0" smtClean="0"/>
+              <a:t>	</a:t>
+            </a:r>
+            <a:r>
+              <a:rPr lang="pt-BR" sz="1600" b="1" dirty="0" smtClean="0">
+                <a:solidFill>
+                  <a:srgbClr val="FFC000"/>
+                </a:solidFill>
+              </a:rPr>
+              <a:t>notify()</a:t>
+            </a:r>
+            <a:r>
+              <a:rPr lang="pt-BR" sz="1600" dirty="0" smtClean="0"/>
+              <a:t>;</a:t>
+            </a:r>
+          </a:p>
+          <a:p>
+            <a:pPr marL="271463" indent="0">
+              <a:spcBef>
+                <a:spcPts val="0"/>
+              </a:spcBef>
+              <a:buNone/>
+              <a:tabLst>
+                <a:tab pos="804863" algn="l"/>
+                <a:tab pos="1252538" algn="l"/>
+              </a:tabLst>
+            </a:pPr>
+            <a:r>
+              <a:rPr lang="pt-BR" sz="1600" dirty="0" smtClean="0"/>
+              <a:t>	...</a:t>
+            </a:r>
+          </a:p>
+          <a:p>
+            <a:pPr marL="271463" indent="0">
+              <a:spcBef>
+                <a:spcPts val="0"/>
+              </a:spcBef>
+              <a:buNone/>
+              <a:tabLst>
+                <a:tab pos="804863" algn="l"/>
+                <a:tab pos="1252538" algn="l"/>
+              </a:tabLst>
+            </a:pPr>
+            <a:r>
+              <a:rPr lang="pt-BR" sz="1600" dirty="0" smtClean="0"/>
+              <a:t>}</a:t>
+            </a:r>
+          </a:p>
+          <a:p>
+            <a:pPr marL="271463" indent="0">
+              <a:spcBef>
+                <a:spcPts val="0"/>
+              </a:spcBef>
+              <a:buNone/>
+              <a:tabLst>
+                <a:tab pos="804863" algn="l"/>
+                <a:tab pos="1252538" algn="l"/>
+              </a:tabLst>
+            </a:pPr>
+            <a:endParaRPr lang="pt-BR" sz="1600" dirty="0" smtClean="0"/>
+          </a:p>
+        </p:txBody>
+      </p:sp>
+      <p:sp>
+        <p:nvSpPr>
+          <p:cNvPr id="4" name="Content Placeholder 3"/>
+          <p:cNvSpPr>
+            <a:spLocks noGrp="1"/>
+          </p:cNvSpPr>
+          <p:nvPr>
+            <p:ph sz="half" idx="2"/>
+          </p:nvPr>
+        </p:nvSpPr>
+        <p:spPr>
+          <a:xfrm>
+            <a:off x="4772052" y="1600200"/>
+            <a:ext cx="3657600" cy="4525963"/>
+          </a:xfrm>
+          <a:noFill/>
+          <a:ln w="9525">
+            <a:noFill/>
+            <a:miter lim="800000"/>
+            <a:headEnd/>
+            <a:tailEnd/>
+          </a:ln>
+        </p:spPr>
+        <p:txBody>
+          <a:bodyPr vert="horz" wrap="square" lIns="91440" tIns="45720" rIns="91440" bIns="45720" numCol="1" anchor="t" anchorCtr="0" compatLnSpc="1">
+            <a:prstTxWarp prst="textNoShape">
+              <a:avLst/>
+            </a:prstTxWarp>
+          </a:bodyPr>
+          <a:lstStyle/>
+          <a:p>
+            <a:pPr marL="271463" indent="-234950"/>
+            <a:r>
+              <a:rPr lang="pt-BR" sz="2000" dirty="0" smtClean="0"/>
+              <a:t>Sincronização por bloco</a:t>
+            </a:r>
+          </a:p>
+          <a:p>
+            <a:pPr marL="271463" indent="0">
+              <a:spcBef>
+                <a:spcPts val="0"/>
+              </a:spcBef>
+              <a:buNone/>
+              <a:tabLst>
+                <a:tab pos="804863" algn="l"/>
+              </a:tabLst>
+            </a:pPr>
+            <a:endParaRPr lang="pt-BR" sz="1600" b="1" dirty="0" smtClean="0">
+              <a:solidFill>
+                <a:srgbClr val="FFC000"/>
+              </a:solidFill>
+            </a:endParaRPr>
+          </a:p>
+          <a:p>
+            <a:pPr marL="271463" indent="0">
+              <a:spcBef>
+                <a:spcPts val="0"/>
+              </a:spcBef>
+              <a:buNone/>
+              <a:tabLst>
+                <a:tab pos="804863" algn="l"/>
+              </a:tabLst>
+            </a:pPr>
+            <a:endParaRPr lang="pt-BR" sz="1600" b="1" dirty="0" smtClean="0">
+              <a:solidFill>
+                <a:srgbClr val="FFC000"/>
+              </a:solidFill>
+            </a:endParaRPr>
+          </a:p>
+          <a:p>
+            <a:pPr marL="271463" indent="0">
+              <a:spcBef>
+                <a:spcPts val="0"/>
+              </a:spcBef>
+              <a:buNone/>
+              <a:tabLst>
+                <a:tab pos="804863" algn="l"/>
+              </a:tabLst>
+            </a:pPr>
+            <a:r>
+              <a:rPr lang="pt-BR" sz="1600" b="1" dirty="0" smtClean="0">
+                <a:solidFill>
+                  <a:srgbClr val="FFC000"/>
+                </a:solidFill>
+              </a:rPr>
+              <a:t>synchronized</a:t>
+            </a:r>
+            <a:r>
+              <a:rPr lang="pt-BR" sz="1600" dirty="0" smtClean="0"/>
+              <a:t> (</a:t>
+            </a:r>
+            <a:r>
+              <a:rPr lang="pt-BR" sz="1600" u="sng" dirty="0" smtClean="0"/>
+              <a:t>obj</a:t>
+            </a:r>
+            <a:r>
+              <a:rPr lang="pt-BR" sz="1600" dirty="0" smtClean="0"/>
+              <a:t>) {</a:t>
+            </a:r>
+          </a:p>
+          <a:p>
+            <a:pPr marL="271463" indent="0">
+              <a:spcBef>
+                <a:spcPts val="0"/>
+              </a:spcBef>
+              <a:buNone/>
+              <a:tabLst>
+                <a:tab pos="804863" algn="l"/>
+              </a:tabLst>
+            </a:pPr>
+            <a:r>
+              <a:rPr lang="pt-BR" sz="1600" dirty="0" smtClean="0"/>
+              <a:t>	...</a:t>
+            </a:r>
+          </a:p>
+          <a:p>
+            <a:pPr marL="271463" indent="0">
+              <a:spcBef>
+                <a:spcPts val="0"/>
+              </a:spcBef>
+              <a:buNone/>
+              <a:tabLst>
+                <a:tab pos="804863" algn="l"/>
+              </a:tabLst>
+            </a:pPr>
+            <a:r>
+              <a:rPr lang="pt-BR" sz="1600" dirty="0" smtClean="0"/>
+              <a:t>	</a:t>
+            </a:r>
+            <a:r>
+              <a:rPr lang="pt-BR" sz="1600" u="sng" dirty="0" smtClean="0"/>
+              <a:t>obj</a:t>
+            </a:r>
+            <a:r>
+              <a:rPr lang="pt-BR" sz="1600" dirty="0" smtClean="0"/>
+              <a:t>.</a:t>
+            </a:r>
+            <a:r>
+              <a:rPr lang="pt-BR" sz="1600" b="1" dirty="0" smtClean="0">
+                <a:solidFill>
+                  <a:srgbClr val="FFC000"/>
+                </a:solidFill>
+              </a:rPr>
+              <a:t>wait()</a:t>
+            </a:r>
+            <a:r>
+              <a:rPr lang="pt-BR" sz="1600" dirty="0" smtClean="0"/>
+              <a:t>;</a:t>
+            </a:r>
+          </a:p>
+          <a:p>
+            <a:pPr marL="271463" indent="0">
+              <a:spcBef>
+                <a:spcPts val="0"/>
+              </a:spcBef>
+              <a:buNone/>
+              <a:tabLst>
+                <a:tab pos="804863" algn="l"/>
+              </a:tabLst>
+            </a:pPr>
+            <a:r>
+              <a:rPr lang="pt-BR" sz="1600" dirty="0" smtClean="0"/>
+              <a:t>	...</a:t>
+            </a:r>
+          </a:p>
+          <a:p>
+            <a:pPr marL="271463" indent="0">
+              <a:spcBef>
+                <a:spcPts val="0"/>
+              </a:spcBef>
+              <a:buNone/>
+              <a:tabLst>
+                <a:tab pos="804863" algn="l"/>
+              </a:tabLst>
+            </a:pPr>
+            <a:r>
+              <a:rPr lang="pt-BR" sz="1600" dirty="0" smtClean="0"/>
+              <a:t>}</a:t>
+            </a:r>
+          </a:p>
+          <a:p>
+            <a:pPr marL="271463" indent="0">
+              <a:spcBef>
+                <a:spcPts val="0"/>
+              </a:spcBef>
+              <a:buNone/>
+              <a:tabLst>
+                <a:tab pos="804863" algn="l"/>
+              </a:tabLst>
+            </a:pPr>
+            <a:endParaRPr lang="pt-BR" sz="1600" dirty="0" smtClean="0"/>
+          </a:p>
+          <a:p>
+            <a:pPr marL="271463" indent="0">
+              <a:spcBef>
+                <a:spcPts val="0"/>
+              </a:spcBef>
+              <a:buNone/>
+              <a:tabLst>
+                <a:tab pos="804863" algn="l"/>
+              </a:tabLst>
+            </a:pPr>
+            <a:r>
+              <a:rPr lang="pt-BR" sz="1600" b="1" dirty="0" smtClean="0">
+                <a:solidFill>
+                  <a:srgbClr val="FFC000"/>
+                </a:solidFill>
+              </a:rPr>
+              <a:t>synchronized</a:t>
+            </a:r>
+            <a:r>
+              <a:rPr lang="pt-BR" sz="1600" dirty="0" smtClean="0"/>
+              <a:t> (</a:t>
+            </a:r>
+            <a:r>
+              <a:rPr lang="pt-BR" sz="1600" u="sng" dirty="0" smtClean="0"/>
+              <a:t>obj</a:t>
+            </a:r>
+            <a:r>
+              <a:rPr lang="pt-BR" sz="1600" dirty="0" smtClean="0"/>
+              <a:t>) {</a:t>
+            </a:r>
+          </a:p>
+          <a:p>
+            <a:pPr marL="271463" indent="0">
+              <a:spcBef>
+                <a:spcPts val="0"/>
+              </a:spcBef>
+              <a:buNone/>
+              <a:tabLst>
+                <a:tab pos="804863" algn="l"/>
+              </a:tabLst>
+            </a:pPr>
+            <a:r>
+              <a:rPr lang="pt-BR" sz="1600" dirty="0" smtClean="0"/>
+              <a:t>	...</a:t>
+            </a:r>
+          </a:p>
+          <a:p>
+            <a:pPr marL="271463" indent="0">
+              <a:spcBef>
+                <a:spcPts val="0"/>
+              </a:spcBef>
+              <a:buNone/>
+              <a:tabLst>
+                <a:tab pos="804863" algn="l"/>
+              </a:tabLst>
+            </a:pPr>
+            <a:r>
+              <a:rPr lang="pt-BR" sz="1600" dirty="0" smtClean="0"/>
+              <a:t>	</a:t>
+            </a:r>
+            <a:r>
+              <a:rPr lang="pt-BR" sz="1600" u="sng" dirty="0" smtClean="0"/>
+              <a:t>obj</a:t>
+            </a:r>
+            <a:r>
+              <a:rPr lang="pt-BR" sz="1600" dirty="0" smtClean="0"/>
+              <a:t>.</a:t>
+            </a:r>
+            <a:r>
+              <a:rPr lang="pt-BR" sz="1600" b="1" dirty="0" smtClean="0">
+                <a:solidFill>
+                  <a:srgbClr val="FFC000"/>
+                </a:solidFill>
+              </a:rPr>
+              <a:t>notify()</a:t>
+            </a:r>
+            <a:r>
+              <a:rPr lang="pt-BR" sz="1600" dirty="0" smtClean="0"/>
+              <a:t>;</a:t>
+            </a:r>
+          </a:p>
+          <a:p>
+            <a:pPr marL="271463" indent="0">
+              <a:spcBef>
+                <a:spcPts val="0"/>
+              </a:spcBef>
+              <a:buNone/>
+              <a:tabLst>
+                <a:tab pos="804863" algn="l"/>
+              </a:tabLst>
+            </a:pPr>
+            <a:r>
+              <a:rPr lang="pt-BR" sz="1600" dirty="0" smtClean="0"/>
+              <a:t>	...</a:t>
+            </a:r>
+          </a:p>
+          <a:p>
+            <a:pPr marL="271463" indent="0">
+              <a:spcBef>
+                <a:spcPts val="0"/>
+              </a:spcBef>
+              <a:buNone/>
+              <a:tabLst>
+                <a:tab pos="804863" algn="l"/>
+              </a:tabLst>
+            </a:pPr>
+            <a:r>
+              <a:rPr lang="pt-BR" sz="1600" dirty="0" smtClean="0"/>
+              <a:t>}</a:t>
+            </a:r>
+          </a:p>
+          <a:p>
+            <a:pPr marL="0" indent="0">
+              <a:spcBef>
+                <a:spcPts val="0"/>
+              </a:spcBef>
+              <a:buNone/>
+              <a:tabLst>
+                <a:tab pos="533400" algn="l"/>
+                <a:tab pos="990600" algn="l"/>
+                <a:tab pos="1436688" algn="l"/>
+              </a:tabLst>
+            </a:pPr>
+            <a:endParaRPr lang="pt-BR" sz="1600" dirty="0" smtClean="0"/>
+          </a:p>
+        </p:txBody>
+      </p:sp>
+      <p:sp>
+        <p:nvSpPr>
+          <p:cNvPr id="5" name="Slide Number Placeholder 4"/>
+          <p:cNvSpPr>
+            <a:spLocks noGrp="1"/>
+          </p:cNvSpPr>
+          <p:nvPr>
+            <p:ph type="sldNum" sz="quarter" idx="12"/>
+          </p:nvPr>
+        </p:nvSpPr>
+        <p:spPr/>
+        <p:txBody>
+          <a:bodyPr/>
+          <a:lstStyle/>
+          <a:p>
+            <a:pPr>
+              <a:defRPr/>
+            </a:pPr>
+            <a:fld id="{B1183DDF-9761-4F34-AA94-91BFB04DDE72}" type="slidenum">
+              <a:rPr lang="pt-BR" smtClean="0"/>
+              <a:pPr>
+                <a:defRPr/>
+              </a:pPr>
+              <a:t>34</a:t>
+            </a:fld>
+            <a:endParaRPr lang="pt-BR"/>
+          </a:p>
+        </p:txBody>
+      </p:sp>
+      <p:cxnSp>
+        <p:nvCxnSpPr>
+          <p:cNvPr id="11" name="Straight Connector 10"/>
+          <p:cNvCxnSpPr/>
+          <p:nvPr/>
+        </p:nvCxnSpPr>
+        <p:spPr>
+          <a:xfrm rot="5400000">
+            <a:off x="2356628" y="3785396"/>
+            <a:ext cx="4572032" cy="1588"/>
+          </a:xfrm>
+          <a:prstGeom prst="line">
+            <a:avLst/>
+          </a:prstGeom>
+          <a:ln w="38100">
+            <a:solidFill>
+              <a:schemeClr val="tx1"/>
+            </a:solidFill>
+          </a:ln>
+        </p:spPr>
+        <p:style>
+          <a:lnRef idx="1">
+            <a:schemeClr val="accent1"/>
+          </a:lnRef>
+          <a:fillRef idx="0">
+            <a:schemeClr val="accent1"/>
+          </a:fillRef>
+          <a:effectRef idx="0">
+            <a:schemeClr val="accent1"/>
+          </a:effectRef>
+          <a:fontRef idx="minor">
+            <a:schemeClr val="tx1"/>
+          </a:fontRef>
+        </p:style>
+      </p:cxnSp>
+      <p:sp>
+        <p:nvSpPr>
+          <p:cNvPr id="13" name="CaixaDeTexto 8"/>
+          <p:cNvSpPr txBox="1"/>
+          <p:nvPr/>
+        </p:nvSpPr>
+        <p:spPr>
+          <a:xfrm>
+            <a:off x="7429520" y="3143248"/>
+            <a:ext cx="1308371" cy="307777"/>
+          </a:xfrm>
+          <a:prstGeom prst="rect">
+            <a:avLst/>
+          </a:prstGeom>
+          <a:noFill/>
+          <a:ln>
+            <a:solidFill>
+              <a:schemeClr val="tx1"/>
+            </a:solidFill>
+          </a:ln>
+        </p:spPr>
+        <p:txBody>
+          <a:bodyPr wrap="none" rtlCol="0">
+            <a:spAutoFit/>
+          </a:bodyPr>
+          <a:lstStyle/>
+          <a:p>
+            <a:r>
+              <a:rPr lang="pt-BR" sz="1400" dirty="0" smtClean="0"/>
+              <a:t>mesmo objeto</a:t>
+            </a:r>
+            <a:endParaRPr lang="pt-BR" sz="1400" dirty="0"/>
+          </a:p>
+        </p:txBody>
+      </p:sp>
+      <p:grpSp>
+        <p:nvGrpSpPr>
+          <p:cNvPr id="14" name="Grupo 43"/>
+          <p:cNvGrpSpPr/>
+          <p:nvPr/>
+        </p:nvGrpSpPr>
+        <p:grpSpPr>
+          <a:xfrm rot="16200000">
+            <a:off x="6821200" y="3251503"/>
+            <a:ext cx="500066" cy="712183"/>
+            <a:chOff x="3851920" y="1916832"/>
+            <a:chExt cx="1440160" cy="864096"/>
+          </a:xfrm>
+        </p:grpSpPr>
+        <p:cxnSp>
+          <p:nvCxnSpPr>
+            <p:cNvPr id="15" name="Conector reto 104"/>
+            <p:cNvCxnSpPr/>
+            <p:nvPr/>
+          </p:nvCxnSpPr>
+          <p:spPr>
+            <a:xfrm>
+              <a:off x="3851920" y="1916832"/>
+              <a:ext cx="1440160" cy="0"/>
+            </a:xfrm>
+            <a:prstGeom prst="line">
+              <a:avLst/>
+            </a:prstGeom>
+            <a:ln>
+              <a:solidFill>
+                <a:schemeClr val="tx1"/>
+              </a:solidFill>
+              <a:headEnd type="arrow"/>
+            </a:ln>
+          </p:spPr>
+          <p:style>
+            <a:lnRef idx="1">
+              <a:schemeClr val="accent1"/>
+            </a:lnRef>
+            <a:fillRef idx="0">
+              <a:schemeClr val="accent1"/>
+            </a:fillRef>
+            <a:effectRef idx="0">
+              <a:schemeClr val="accent1"/>
+            </a:effectRef>
+            <a:fontRef idx="minor">
+              <a:schemeClr val="tx1"/>
+            </a:fontRef>
+          </p:style>
+        </p:cxnSp>
+        <p:cxnSp>
+          <p:nvCxnSpPr>
+            <p:cNvPr id="16" name="Conector de seta reta 105"/>
+            <p:cNvCxnSpPr/>
+            <p:nvPr/>
+          </p:nvCxnSpPr>
+          <p:spPr>
+            <a:xfrm>
+              <a:off x="5292080" y="1916832"/>
+              <a:ext cx="0" cy="864096"/>
+            </a:xfrm>
+            <a:prstGeom prst="straightConnector1">
+              <a:avLst/>
+            </a:prstGeom>
+            <a:ln>
+              <a:solidFill>
+                <a:schemeClr val="tx1"/>
+              </a:solidFill>
+              <a:tailEnd type="none"/>
+            </a:ln>
+          </p:spPr>
+          <p:style>
+            <a:lnRef idx="1">
+              <a:schemeClr val="accent1"/>
+            </a:lnRef>
+            <a:fillRef idx="0">
+              <a:schemeClr val="accent1"/>
+            </a:fillRef>
+            <a:effectRef idx="0">
+              <a:schemeClr val="accent1"/>
+            </a:effectRef>
+            <a:fontRef idx="minor">
+              <a:schemeClr val="tx1"/>
+            </a:fontRef>
+          </p:style>
+        </p:cxnSp>
+      </p:grpSp>
+      <p:grpSp>
+        <p:nvGrpSpPr>
+          <p:cNvPr id="17" name="Grupo 43"/>
+          <p:cNvGrpSpPr/>
+          <p:nvPr/>
+        </p:nvGrpSpPr>
+        <p:grpSpPr>
+          <a:xfrm rot="16200000" flipH="1">
+            <a:off x="6823395" y="2679999"/>
+            <a:ext cx="500067" cy="712183"/>
+            <a:chOff x="3851920" y="1916832"/>
+            <a:chExt cx="1440160" cy="864096"/>
+          </a:xfrm>
+        </p:grpSpPr>
+        <p:cxnSp>
+          <p:nvCxnSpPr>
+            <p:cNvPr id="18" name="Conector reto 104"/>
+            <p:cNvCxnSpPr/>
+            <p:nvPr/>
+          </p:nvCxnSpPr>
+          <p:spPr>
+            <a:xfrm>
+              <a:off x="3851920" y="1916832"/>
+              <a:ext cx="1440160" cy="0"/>
+            </a:xfrm>
+            <a:prstGeom prst="line">
+              <a:avLst/>
+            </a:prstGeom>
+            <a:ln>
+              <a:solidFill>
+                <a:schemeClr val="tx1"/>
+              </a:solidFill>
+              <a:headEnd type="arrow"/>
+            </a:ln>
+          </p:spPr>
+          <p:style>
+            <a:lnRef idx="1">
+              <a:schemeClr val="accent1"/>
+            </a:lnRef>
+            <a:fillRef idx="0">
+              <a:schemeClr val="accent1"/>
+            </a:fillRef>
+            <a:effectRef idx="0">
+              <a:schemeClr val="accent1"/>
+            </a:effectRef>
+            <a:fontRef idx="minor">
+              <a:schemeClr val="tx1"/>
+            </a:fontRef>
+          </p:style>
+        </p:cxnSp>
+        <p:cxnSp>
+          <p:nvCxnSpPr>
+            <p:cNvPr id="19" name="Conector de seta reta 105"/>
+            <p:cNvCxnSpPr/>
+            <p:nvPr/>
+          </p:nvCxnSpPr>
+          <p:spPr>
+            <a:xfrm>
+              <a:off x="5292080" y="1916832"/>
+              <a:ext cx="0" cy="864096"/>
+            </a:xfrm>
+            <a:prstGeom prst="straightConnector1">
+              <a:avLst/>
+            </a:prstGeom>
+            <a:ln>
+              <a:solidFill>
+                <a:schemeClr val="tx1"/>
+              </a:solidFill>
+              <a:tailEnd type="none"/>
+            </a:ln>
+          </p:spPr>
+          <p:style>
+            <a:lnRef idx="1">
+              <a:schemeClr val="accent1"/>
+            </a:lnRef>
+            <a:fillRef idx="0">
+              <a:schemeClr val="accent1"/>
+            </a:fillRef>
+            <a:effectRef idx="0">
+              <a:schemeClr val="accent1"/>
+            </a:effectRef>
+            <a:fontRef idx="minor">
+              <a:schemeClr val="tx1"/>
+            </a:fontRef>
+          </p:style>
+        </p:cxnSp>
+      </p:grpSp>
+    </p:spTree>
+  </p:cSld>
+  <p:clrMapOvr>
+    <a:masterClrMapping/>
+  </p:clrMapOvr>
+  <p:timing>
+    <p:tnLst>
+      <p:par>
+        <p:cTn id="1" dur="indefinite" restart="never" nodeType="tmRoot"/>
+      </p:par>
+    </p:tnLst>
+  </p:timing>
+</p:sld>
+</file>
+
+<file path=ppt/slides/slide35.xml><?xml version="1.0" encoding="utf-8"?>
+<p:sld xmlns:a="http://schemas.openxmlformats.org/drawingml/2006/main" xmlns:r="http://schemas.openxmlformats.org/officeDocument/2006/relationships" xmlns:p="http://schemas.openxmlformats.org/presentationml/2006/main">
+  <p:cSld>
+    <p:spTree>
+      <p:nvGrpSpPr>
+        <p:cNvPr id="1" name=""/>
+        <p:cNvGrpSpPr/>
+        <p:nvPr/>
+      </p:nvGrpSpPr>
+      <p:grpSpPr>
+        <a:xfrm>
+          <a:off x="0" y="0"/>
+          <a:ext cx="0" cy="0"/>
+          <a:chOff x="0" y="0"/>
+          <a:chExt cx="0" cy="0"/>
+        </a:xfrm>
+      </p:grpSpPr>
+      <p:sp>
+        <p:nvSpPr>
+          <p:cNvPr id="2" name="Title 1"/>
+          <p:cNvSpPr>
+            <a:spLocks noGrp="1"/>
+          </p:cNvSpPr>
+          <p:nvPr>
+            <p:ph type="title"/>
+          </p:nvPr>
+        </p:nvSpPr>
+        <p:spPr/>
+        <p:txBody>
+          <a:bodyPr/>
+          <a:lstStyle/>
+          <a:p>
+            <a:r>
+              <a:rPr lang="pt-BR" dirty="0" smtClean="0"/>
+              <a:t>Interação entre threads</a:t>
+            </a:r>
+            <a:endParaRPr lang="pt-BR" dirty="0"/>
+          </a:p>
+        </p:txBody>
+      </p:sp>
+      <p:sp>
+        <p:nvSpPr>
+          <p:cNvPr id="3" name="Content Placeholder 2"/>
           <p:cNvSpPr>
             <a:spLocks noGrp="1"/>
           </p:cNvSpPr>
@@ -28642,13 +30724,194 @@
           <a:bodyPr/>
           <a:lstStyle/>
           <a:p>
-            <a:endParaRPr lang="pt-BR" smtClean="0"/>
+            <a:r>
+              <a:rPr lang="pt-BR" sz="1600" b="1" dirty="0" smtClean="0">
+                <a:solidFill>
+                  <a:srgbClr val="FFC000"/>
+                </a:solidFill>
+              </a:rPr>
+              <a:t>wait()</a:t>
+            </a:r>
+            <a:r>
+              <a:rPr lang="pt-BR" sz="1600" dirty="0" smtClean="0"/>
+              <a:t/>
+            </a:r>
+            <a:br>
+              <a:rPr lang="pt-BR" sz="1600" dirty="0" smtClean="0"/>
+            </a:br>
+            <a:r>
+              <a:rPr lang="pt-BR" sz="1600" dirty="0" smtClean="0"/>
+              <a:t>Bloqueia a thread atual até que o objeto de lock seja notificado.</a:t>
+            </a:r>
+          </a:p>
+          <a:p>
+            <a:endParaRPr lang="pt-BR" sz="1600" dirty="0" smtClean="0"/>
+          </a:p>
+          <a:p>
+            <a:r>
+              <a:rPr lang="pt-BR" sz="1600" b="1" dirty="0" smtClean="0">
+                <a:solidFill>
+                  <a:srgbClr val="FFC000"/>
+                </a:solidFill>
+              </a:rPr>
+              <a:t>wait(long millis)</a:t>
+            </a:r>
+            <a:r>
+              <a:rPr lang="pt-BR" sz="1600" dirty="0" smtClean="0"/>
+              <a:t/>
+            </a:r>
+            <a:br>
+              <a:rPr lang="pt-BR" sz="1600" dirty="0" smtClean="0"/>
+            </a:br>
+            <a:r>
+              <a:rPr lang="pt-BR" sz="1600" dirty="0" smtClean="0"/>
+              <a:t>Bloqueia a thread atual por, no máximo, </a:t>
+            </a:r>
+            <a:r>
+              <a:rPr lang="pt-BR" sz="1600" b="1" dirty="0" smtClean="0">
+                <a:solidFill>
+                  <a:srgbClr val="FFC000"/>
+                </a:solidFill>
+              </a:rPr>
+              <a:t>millis</a:t>
+            </a:r>
+            <a:r>
+              <a:rPr lang="pt-BR" sz="1600" dirty="0" smtClean="0"/>
+              <a:t> milissegundos até que o objeto de lock seja notificado.</a:t>
+            </a:r>
+          </a:p>
+          <a:p>
+            <a:endParaRPr lang="pt-BR" sz="1600" dirty="0" smtClean="0"/>
+          </a:p>
+          <a:p>
+            <a:r>
+              <a:rPr lang="pt-BR" sz="1600" b="1" dirty="0" smtClean="0">
+                <a:solidFill>
+                  <a:srgbClr val="FFC000"/>
+                </a:solidFill>
+              </a:rPr>
+              <a:t>wait(long millis, int nanos)</a:t>
+            </a:r>
+            <a:r>
+              <a:rPr lang="pt-BR" sz="1600" dirty="0" smtClean="0"/>
+              <a:t/>
+            </a:r>
+            <a:br>
+              <a:rPr lang="pt-BR" sz="1600" dirty="0" smtClean="0"/>
+            </a:br>
+            <a:r>
+              <a:rPr lang="pt-BR" sz="1600" dirty="0" smtClean="0"/>
+              <a:t>Bloqueia a thread atual por, no máximo, </a:t>
+            </a:r>
+            <a:r>
+              <a:rPr lang="pt-BR" sz="1600" b="1" dirty="0" smtClean="0">
+                <a:solidFill>
+                  <a:srgbClr val="FFC000"/>
+                </a:solidFill>
+              </a:rPr>
+              <a:t>millis</a:t>
+            </a:r>
+            <a:r>
+              <a:rPr lang="pt-BR" sz="1600" dirty="0" smtClean="0"/>
+              <a:t> milissegundos e </a:t>
+            </a:r>
+            <a:r>
+              <a:rPr lang="pt-BR" sz="1600" b="1" smtClean="0">
+                <a:solidFill>
+                  <a:srgbClr val="FFC000"/>
+                </a:solidFill>
+              </a:rPr>
+              <a:t>nanos</a:t>
+            </a:r>
+            <a:r>
+              <a:rPr lang="pt-BR" sz="1600" smtClean="0"/>
+              <a:t> nanossegundos </a:t>
+            </a:r>
+            <a:r>
+              <a:rPr lang="pt-BR" sz="1600" dirty="0" smtClean="0"/>
+              <a:t>até que o objeto de lock seja notificado.</a:t>
+            </a:r>
+          </a:p>
+          <a:p>
+            <a:endParaRPr lang="pt-BR" sz="1600" dirty="0" smtClean="0"/>
+          </a:p>
+          <a:p>
+            <a:r>
+              <a:rPr lang="pt-BR" sz="1600" b="1" dirty="0" smtClean="0">
+                <a:solidFill>
+                  <a:srgbClr val="FFC000"/>
+                </a:solidFill>
+              </a:rPr>
+              <a:t>notify()</a:t>
+            </a:r>
+            <a:r>
+              <a:rPr lang="pt-BR" sz="1600" dirty="0" smtClean="0"/>
+              <a:t/>
+            </a:r>
+            <a:br>
+              <a:rPr lang="pt-BR" sz="1600" dirty="0" smtClean="0"/>
+            </a:br>
+            <a:r>
+              <a:rPr lang="pt-BR" sz="1600" dirty="0" smtClean="0"/>
+              <a:t>Notifica uma das threads bloqueadas pelo </a:t>
+            </a:r>
+            <a:r>
+              <a:rPr lang="pt-BR" sz="1600" b="1" dirty="0" smtClean="0">
+                <a:solidFill>
+                  <a:srgbClr val="FFC000"/>
+                </a:solidFill>
+              </a:rPr>
+              <a:t>wait()</a:t>
+            </a:r>
+            <a:r>
+              <a:rPr lang="pt-BR" sz="1600" dirty="0" smtClean="0"/>
+              <a:t> sobre o objeto de lock liberando-a para prosseguir sua execução.</a:t>
+            </a:r>
+          </a:p>
+          <a:p>
+            <a:endParaRPr lang="pt-BR" sz="1600" dirty="0" smtClean="0"/>
+          </a:p>
+          <a:p>
+            <a:r>
+              <a:rPr lang="pt-BR" sz="1600" b="1" dirty="0" smtClean="0">
+                <a:solidFill>
+                  <a:srgbClr val="FFC000"/>
+                </a:solidFill>
+              </a:rPr>
+              <a:t>notifyAll()</a:t>
+            </a:r>
+            <a:r>
+              <a:rPr lang="pt-BR" sz="1600" dirty="0" smtClean="0"/>
+              <a:t/>
+            </a:r>
+            <a:br>
+              <a:rPr lang="pt-BR" sz="1600" dirty="0" smtClean="0"/>
+            </a:br>
+            <a:r>
+              <a:rPr lang="pt-BR" sz="1600" dirty="0" smtClean="0"/>
+              <a:t>Notifica todas as threads bloqueadas pelo </a:t>
+            </a:r>
+            <a:r>
+              <a:rPr lang="pt-BR" sz="1600" b="1" dirty="0" smtClean="0">
+                <a:solidFill>
+                  <a:srgbClr val="FFC000"/>
+                </a:solidFill>
+              </a:rPr>
+              <a:t>wait()</a:t>
+            </a:r>
+            <a:r>
+              <a:rPr lang="pt-BR" sz="1600" dirty="0" smtClean="0"/>
+              <a:t> sobre o objeto de lock liberando-as para prosseguir em suas respectivas execuções.</a:t>
+            </a:r>
+          </a:p>
+          <a:p>
+            <a:endParaRPr lang="pt-BR" sz="1600" dirty="0"/>
           </a:p>
         </p:txBody>
       </p:sp>
       <p:sp>
         <p:nvSpPr>
-          <p:cNvPr id="4" name="Espaço Reservado para Número de Slide 3"/>
+          <p:cNvPr id="4" name="Slide Number Placeholder 3"/>
           <p:cNvSpPr>
             <a:spLocks noGrp="1"/>
           </p:cNvSpPr>
@@ -28669,7 +30932,759 @@
               <a:pPr>
                 <a:defRPr/>
               </a:pPr>
-              <a:t>34</a:t>
+              <a:t>35</a:t>
+            </a:fld>
+            <a:endParaRPr lang="pt-BR"/>
+          </a:p>
+        </p:txBody>
+      </p:sp>
+    </p:spTree>
+  </p:cSld>
+  <p:clrMapOvr>
+    <a:masterClrMapping/>
+  </p:clrMapOvr>
+  <p:timing>
+    <p:tnLst>
+      <p:par>
+        <p:cTn id="1" dur="indefinite" restart="never" nodeType="tmRoot"/>
+      </p:par>
+    </p:tnLst>
+  </p:timing>
+</p:sld>
+</file>
+
+<file path=ppt/slides/slide36.xml><?xml version="1.0" encoding="utf-8"?>
+<p:sld xmlns:a="http://schemas.openxmlformats.org/drawingml/2006/main" xmlns:r="http://schemas.openxmlformats.org/officeDocument/2006/relationships" xmlns:p="http://schemas.openxmlformats.org/presentationml/2006/main">
+  <p:cSld>
+    <p:spTree>
+      <p:nvGrpSpPr>
+        <p:cNvPr id="1" name=""/>
+        <p:cNvGrpSpPr/>
+        <p:nvPr/>
+      </p:nvGrpSpPr>
+      <p:grpSpPr>
+        <a:xfrm>
+          <a:off x="0" y="0"/>
+          <a:ext cx="0" cy="0"/>
+          <a:chOff x="0" y="0"/>
+          <a:chExt cx="0" cy="0"/>
+        </a:xfrm>
+      </p:grpSpPr>
+      <p:sp>
+        <p:nvSpPr>
+          <p:cNvPr id="26626" name="Título 1"/>
+          <p:cNvSpPr>
+            <a:spLocks noGrp="1"/>
+          </p:cNvSpPr>
+          <p:nvPr>
+            <p:ph type="title"/>
+          </p:nvPr>
+        </p:nvSpPr>
+        <p:spPr/>
+        <p:txBody>
+          <a:bodyPr/>
+          <a:lstStyle/>
+          <a:p>
+            <a:pPr eaLnBrk="1" hangingPunct="1"/>
+            <a:r>
+              <a:rPr lang="pt-BR" dirty="0" err="1" smtClean="0"/>
+              <a:t>Deadlock</a:t>
+            </a:r>
+            <a:endParaRPr lang="pt-BR" dirty="0" smtClean="0"/>
+          </a:p>
+        </p:txBody>
+      </p:sp>
+      <p:sp>
+        <p:nvSpPr>
+          <p:cNvPr id="26627" name="Espaço Reservado para Conteúdo 2"/>
+          <p:cNvSpPr>
+            <a:spLocks noGrp="1"/>
+          </p:cNvSpPr>
+          <p:nvPr>
+            <p:ph idx="1"/>
+          </p:nvPr>
+        </p:nvSpPr>
+        <p:spPr/>
+        <p:txBody>
+          <a:bodyPr/>
+          <a:lstStyle/>
+          <a:p>
+            <a:r>
+              <a:rPr lang="pt-BR" sz="2400" dirty="0" smtClean="0"/>
+              <a:t>Chamamos de </a:t>
+            </a:r>
+            <a:r>
+              <a:rPr lang="pt-BR" sz="2400" i="1" dirty="0" smtClean="0"/>
+              <a:t>deadlock</a:t>
+            </a:r>
+            <a:r>
+              <a:rPr lang="pt-BR" sz="2400" dirty="0" smtClean="0"/>
+              <a:t> a um tipo específico de bug na aplicação onde duas threads são mutuamente dependentes e ficam uma aguardando a outra.</a:t>
+            </a:r>
+          </a:p>
+          <a:p>
+            <a:endParaRPr lang="pt-BR" sz="2400" dirty="0" smtClean="0"/>
+          </a:p>
+          <a:p>
+            <a:r>
+              <a:rPr lang="pt-BR" sz="2400" dirty="0" smtClean="0"/>
+              <a:t>Esta situação pode ocorrer mediante o uso dos métodos </a:t>
+            </a:r>
+            <a:r>
+              <a:rPr lang="pt-BR" sz="2400" dirty="0" smtClean="0">
+                <a:solidFill>
+                  <a:srgbClr val="FFC000"/>
+                </a:solidFill>
+              </a:rPr>
+              <a:t>Thread.join()</a:t>
+            </a:r>
+            <a:r>
+              <a:rPr lang="pt-BR" sz="2400" dirty="0" smtClean="0"/>
+              <a:t> ou </a:t>
+            </a:r>
+            <a:r>
+              <a:rPr lang="pt-BR" sz="2400" dirty="0" smtClean="0">
+                <a:solidFill>
+                  <a:srgbClr val="FFC000"/>
+                </a:solidFill>
+              </a:rPr>
+              <a:t>Object.wait()</a:t>
+            </a:r>
+            <a:endParaRPr lang="pt-BR" sz="2400" dirty="0" smtClean="0">
+              <a:solidFill>
+                <a:srgbClr val="FFC000"/>
+              </a:solidFill>
+            </a:endParaRPr>
+          </a:p>
+        </p:txBody>
+      </p:sp>
+      <p:sp>
+        <p:nvSpPr>
+          <p:cNvPr id="4" name="Espaço Reservado para Número de Slide 3"/>
+          <p:cNvSpPr>
+            <a:spLocks noGrp="1"/>
+          </p:cNvSpPr>
+          <p:nvPr>
+            <p:ph type="sldNum" sz="quarter" idx="12"/>
+          </p:nvPr>
+        </p:nvSpPr>
+        <p:spPr/>
+        <p:txBody>
+          <a:bodyPr/>
+          <a:lstStyle/>
+          <a:p>
+            <a:pPr>
+              <a:defRPr/>
+            </a:pPr>
+            <a:fld id="{A3E49AD4-F76A-4E25-A0A5-9CD64D5A0A0D}" type="slidenum">
+              <a:rPr lang="pt-BR" smtClean="0"/>
+              <a:pPr>
+                <a:defRPr/>
+              </a:pPr>
+              <a:t>36</a:t>
+            </a:fld>
+            <a:endParaRPr lang="pt-BR"/>
+          </a:p>
+        </p:txBody>
+      </p:sp>
+    </p:spTree>
+  </p:cSld>
+  <p:clrMapOvr>
+    <a:masterClrMapping/>
+  </p:clrMapOvr>
+  <p:timing>
+    <p:tnLst>
+      <p:par>
+        <p:cTn id="1" dur="indefinite" restart="never" nodeType="tmRoot"/>
+      </p:par>
+    </p:tnLst>
+  </p:timing>
+</p:sld>
+</file>
+
+<file path=ppt/slides/slide37.xml><?xml version="1.0" encoding="utf-8"?>
+<p:sld xmlns:a="http://schemas.openxmlformats.org/drawingml/2006/main" xmlns:r="http://schemas.openxmlformats.org/officeDocument/2006/relationships" xmlns:p="http://schemas.openxmlformats.org/presentationml/2006/main">
+  <p:cSld>
+    <p:spTree>
+      <p:nvGrpSpPr>
+        <p:cNvPr id="1" name=""/>
+        <p:cNvGrpSpPr/>
+        <p:nvPr/>
+      </p:nvGrpSpPr>
+      <p:grpSpPr>
+        <a:xfrm>
+          <a:off x="0" y="0"/>
+          <a:ext cx="0" cy="0"/>
+          <a:chOff x="0" y="0"/>
+          <a:chExt cx="0" cy="0"/>
+        </a:xfrm>
+      </p:grpSpPr>
+      <p:sp>
+        <p:nvSpPr>
+          <p:cNvPr id="2" name="Title 1"/>
+          <p:cNvSpPr>
+            <a:spLocks noGrp="1"/>
+          </p:cNvSpPr>
+          <p:nvPr>
+            <p:ph type="title"/>
+          </p:nvPr>
+        </p:nvSpPr>
+        <p:spPr/>
+        <p:txBody>
+          <a:bodyPr/>
+          <a:lstStyle/>
+          <a:p>
+            <a:r>
+              <a:rPr lang="pt-BR" dirty="0" smtClean="0"/>
+              <a:t>Deadlock</a:t>
+            </a:r>
+            <a:endParaRPr lang="pt-BR" dirty="0"/>
+          </a:p>
+        </p:txBody>
+      </p:sp>
+      <p:sp>
+        <p:nvSpPr>
+          <p:cNvPr id="3" name="Content Placeholder 2"/>
+          <p:cNvSpPr>
+            <a:spLocks noGrp="1"/>
+          </p:cNvSpPr>
+          <p:nvPr>
+            <p:ph idx="1"/>
+          </p:nvPr>
+        </p:nvSpPr>
+        <p:spPr>
+          <a:xfrm>
+            <a:off x="1309670" y="1600200"/>
+            <a:ext cx="5762660" cy="4525963"/>
+          </a:xfrm>
+        </p:spPr>
+        <p:txBody>
+          <a:bodyPr/>
+          <a:lstStyle/>
+          <a:p>
+            <a:pPr marL="0" indent="0">
+              <a:spcBef>
+                <a:spcPts val="0"/>
+              </a:spcBef>
+              <a:buNone/>
+              <a:tabLst>
+                <a:tab pos="533400" algn="l"/>
+                <a:tab pos="990600" algn="l"/>
+              </a:tabLst>
+            </a:pPr>
+            <a:r>
+              <a:rPr lang="pt-BR" sz="1600" dirty="0" smtClean="0"/>
+              <a:t>Thread </a:t>
+            </a:r>
+            <a:r>
+              <a:rPr lang="pt-BR" sz="1600" dirty="0" smtClean="0">
+                <a:solidFill>
+                  <a:srgbClr val="FFC000"/>
+                </a:solidFill>
+              </a:rPr>
+              <a:t>thread1</a:t>
+            </a:r>
+            <a:r>
+              <a:rPr lang="pt-BR" sz="1600" dirty="0" smtClean="0"/>
+              <a:t> = new Thread() {</a:t>
+            </a:r>
+          </a:p>
+          <a:p>
+            <a:pPr marL="0" indent="0">
+              <a:spcBef>
+                <a:spcPts val="0"/>
+              </a:spcBef>
+              <a:buNone/>
+              <a:tabLst>
+                <a:tab pos="533400" algn="l"/>
+                <a:tab pos="990600" algn="l"/>
+              </a:tabLst>
+            </a:pPr>
+            <a:r>
+              <a:rPr lang="pt-BR" sz="1600" dirty="0" smtClean="0"/>
+              <a:t>	public void run() {</a:t>
+            </a:r>
+          </a:p>
+          <a:p>
+            <a:pPr marL="0" indent="0">
+              <a:spcBef>
+                <a:spcPts val="0"/>
+              </a:spcBef>
+              <a:buNone/>
+              <a:tabLst>
+                <a:tab pos="533400" algn="l"/>
+                <a:tab pos="990600" algn="l"/>
+              </a:tabLst>
+            </a:pPr>
+            <a:r>
+              <a:rPr lang="pt-BR" sz="1600" dirty="0" smtClean="0"/>
+              <a:t>	</a:t>
+            </a:r>
+            <a:r>
+              <a:rPr lang="pt-BR" sz="1600" dirty="0" smtClean="0"/>
+              <a:t>	System.out.println(“Aguardando thread 2...”);</a:t>
+            </a:r>
+          </a:p>
+          <a:p>
+            <a:pPr marL="0" indent="0">
+              <a:spcBef>
+                <a:spcPts val="0"/>
+              </a:spcBef>
+              <a:buNone/>
+              <a:tabLst>
+                <a:tab pos="533400" algn="l"/>
+                <a:tab pos="990600" algn="l"/>
+              </a:tabLst>
+            </a:pPr>
+            <a:r>
+              <a:rPr lang="pt-BR" sz="1600" dirty="0" smtClean="0"/>
+              <a:t>	</a:t>
+            </a:r>
+            <a:r>
+              <a:rPr lang="pt-BR" sz="1600" dirty="0" smtClean="0"/>
+              <a:t>	</a:t>
+            </a:r>
+            <a:r>
+              <a:rPr lang="pt-BR" sz="1600" dirty="0" smtClean="0">
+                <a:solidFill>
+                  <a:srgbClr val="FFC000"/>
+                </a:solidFill>
+              </a:rPr>
+              <a:t>thread2</a:t>
+            </a:r>
+            <a:r>
+              <a:rPr lang="pt-BR" sz="1600" dirty="0" smtClean="0"/>
+              <a:t>.join();</a:t>
+            </a:r>
+          </a:p>
+          <a:p>
+            <a:pPr marL="0" indent="0">
+              <a:spcBef>
+                <a:spcPts val="0"/>
+              </a:spcBef>
+              <a:buNone/>
+              <a:tabLst>
+                <a:tab pos="533400" algn="l"/>
+                <a:tab pos="990600" algn="l"/>
+              </a:tabLst>
+            </a:pPr>
+            <a:r>
+              <a:rPr lang="pt-BR" sz="1600" dirty="0" smtClean="0"/>
+              <a:t>		System.out.println(“Thread </a:t>
+            </a:r>
+            <a:r>
+              <a:rPr lang="pt-BR" sz="1600" dirty="0" smtClean="0"/>
+              <a:t>1 </a:t>
+            </a:r>
+            <a:r>
+              <a:rPr lang="pt-BR" sz="1600" dirty="0" smtClean="0"/>
+              <a:t>encerrada.”);</a:t>
+            </a:r>
+          </a:p>
+          <a:p>
+            <a:pPr marL="0" indent="0">
+              <a:spcBef>
+                <a:spcPts val="0"/>
+              </a:spcBef>
+              <a:buNone/>
+              <a:tabLst>
+                <a:tab pos="533400" algn="l"/>
+                <a:tab pos="990600" algn="l"/>
+              </a:tabLst>
+            </a:pPr>
+            <a:r>
+              <a:rPr lang="pt-BR" sz="1600" dirty="0" smtClean="0"/>
+              <a:t>	</a:t>
+            </a:r>
+            <a:r>
+              <a:rPr lang="pt-BR" sz="1600" dirty="0" smtClean="0"/>
+              <a:t>}</a:t>
+            </a:r>
+          </a:p>
+          <a:p>
+            <a:pPr marL="0" indent="0">
+              <a:spcBef>
+                <a:spcPts val="0"/>
+              </a:spcBef>
+              <a:buNone/>
+              <a:tabLst>
+                <a:tab pos="533400" algn="l"/>
+                <a:tab pos="990600" algn="l"/>
+              </a:tabLst>
+            </a:pPr>
+            <a:r>
+              <a:rPr lang="pt-BR" sz="1600" dirty="0" smtClean="0"/>
+              <a:t>};</a:t>
+            </a:r>
+          </a:p>
+          <a:p>
+            <a:pPr marL="0" indent="0">
+              <a:spcBef>
+                <a:spcPts val="0"/>
+              </a:spcBef>
+              <a:buNone/>
+              <a:tabLst>
+                <a:tab pos="533400" algn="l"/>
+                <a:tab pos="990600" algn="l"/>
+              </a:tabLst>
+            </a:pPr>
+            <a:endParaRPr lang="pt-BR" sz="1600" dirty="0" smtClean="0"/>
+          </a:p>
+          <a:p>
+            <a:pPr marL="0" indent="0">
+              <a:spcBef>
+                <a:spcPts val="0"/>
+              </a:spcBef>
+              <a:buNone/>
+              <a:tabLst>
+                <a:tab pos="533400" algn="l"/>
+                <a:tab pos="990600" algn="l"/>
+              </a:tabLst>
+            </a:pPr>
+            <a:r>
+              <a:rPr lang="pt-BR" sz="1600" dirty="0" smtClean="0"/>
+              <a:t>Thread </a:t>
+            </a:r>
+            <a:r>
+              <a:rPr lang="pt-BR" sz="1600" dirty="0" smtClean="0">
+                <a:solidFill>
+                  <a:srgbClr val="FFC000"/>
+                </a:solidFill>
+              </a:rPr>
+              <a:t>thread2</a:t>
+            </a:r>
+            <a:r>
+              <a:rPr lang="pt-BR" sz="1600" dirty="0" smtClean="0"/>
+              <a:t> = new Thread() {</a:t>
+            </a:r>
+          </a:p>
+          <a:p>
+            <a:pPr marL="0" indent="0">
+              <a:spcBef>
+                <a:spcPts val="0"/>
+              </a:spcBef>
+              <a:buNone/>
+              <a:tabLst>
+                <a:tab pos="533400" algn="l"/>
+                <a:tab pos="990600" algn="l"/>
+              </a:tabLst>
+            </a:pPr>
+            <a:r>
+              <a:rPr lang="pt-BR" sz="1600" dirty="0" smtClean="0"/>
+              <a:t>	public void run() {</a:t>
+            </a:r>
+          </a:p>
+          <a:p>
+            <a:pPr marL="0" indent="0">
+              <a:spcBef>
+                <a:spcPts val="0"/>
+              </a:spcBef>
+              <a:buNone/>
+              <a:tabLst>
+                <a:tab pos="533400" algn="l"/>
+                <a:tab pos="990600" algn="l"/>
+              </a:tabLst>
+            </a:pPr>
+            <a:r>
+              <a:rPr lang="pt-BR" sz="1600" dirty="0" smtClean="0"/>
+              <a:t>		System.out.println(“Aguardando thread </a:t>
+            </a:r>
+            <a:r>
+              <a:rPr lang="pt-BR" sz="1600" dirty="0" smtClean="0"/>
+              <a:t>1...”);</a:t>
+            </a:r>
+            <a:endParaRPr lang="pt-BR" sz="1600" dirty="0" smtClean="0"/>
+          </a:p>
+          <a:p>
+            <a:pPr marL="0" indent="0">
+              <a:spcBef>
+                <a:spcPts val="0"/>
+              </a:spcBef>
+              <a:buNone/>
+              <a:tabLst>
+                <a:tab pos="533400" algn="l"/>
+                <a:tab pos="990600" algn="l"/>
+              </a:tabLst>
+            </a:pPr>
+            <a:r>
+              <a:rPr lang="pt-BR" sz="1600" dirty="0" smtClean="0"/>
+              <a:t>		</a:t>
+            </a:r>
+            <a:r>
+              <a:rPr lang="pt-BR" sz="1600" dirty="0" smtClean="0">
+                <a:solidFill>
+                  <a:srgbClr val="FFC000"/>
+                </a:solidFill>
+              </a:rPr>
+              <a:t>thread1</a:t>
+            </a:r>
+            <a:r>
+              <a:rPr lang="pt-BR" sz="1600" dirty="0" smtClean="0"/>
+              <a:t>.join();</a:t>
+            </a:r>
+          </a:p>
+          <a:p>
+            <a:pPr marL="0" indent="0">
+              <a:spcBef>
+                <a:spcPts val="0"/>
+              </a:spcBef>
+              <a:buNone/>
+              <a:tabLst>
+                <a:tab pos="533400" algn="l"/>
+                <a:tab pos="990600" algn="l"/>
+              </a:tabLst>
+            </a:pPr>
+            <a:r>
+              <a:rPr lang="pt-BR" sz="1600" dirty="0" smtClean="0"/>
+              <a:t>	</a:t>
+            </a:r>
+            <a:r>
+              <a:rPr lang="pt-BR" sz="1600" dirty="0" smtClean="0"/>
+              <a:t>	System.out.println(“Thread 2 encerrada.”);</a:t>
+            </a:r>
+            <a:endParaRPr lang="pt-BR" sz="1600" dirty="0" smtClean="0"/>
+          </a:p>
+          <a:p>
+            <a:pPr marL="0" indent="0">
+              <a:spcBef>
+                <a:spcPts val="0"/>
+              </a:spcBef>
+              <a:buNone/>
+              <a:tabLst>
+                <a:tab pos="533400" algn="l"/>
+                <a:tab pos="990600" algn="l"/>
+              </a:tabLst>
+            </a:pPr>
+            <a:r>
+              <a:rPr lang="pt-BR" sz="1600" dirty="0" smtClean="0"/>
+              <a:t>	}</a:t>
+            </a:r>
+          </a:p>
+          <a:p>
+            <a:pPr marL="0" indent="0">
+              <a:spcBef>
+                <a:spcPts val="0"/>
+              </a:spcBef>
+              <a:buNone/>
+              <a:tabLst>
+                <a:tab pos="533400" algn="l"/>
+                <a:tab pos="990600" algn="l"/>
+              </a:tabLst>
+            </a:pPr>
+            <a:r>
+              <a:rPr lang="pt-BR" sz="1600" dirty="0" smtClean="0"/>
+              <a:t>};</a:t>
+            </a:r>
+          </a:p>
+          <a:p>
+            <a:pPr marL="0" indent="0">
+              <a:spcBef>
+                <a:spcPts val="0"/>
+              </a:spcBef>
+              <a:buNone/>
+              <a:tabLst>
+                <a:tab pos="533400" algn="l"/>
+                <a:tab pos="990600" algn="l"/>
+              </a:tabLst>
+            </a:pPr>
+            <a:endParaRPr lang="pt-BR" sz="1600" dirty="0" smtClean="0"/>
+          </a:p>
+          <a:p>
+            <a:pPr marL="0" indent="0">
+              <a:spcBef>
+                <a:spcPts val="0"/>
+              </a:spcBef>
+              <a:buNone/>
+              <a:tabLst>
+                <a:tab pos="533400" algn="l"/>
+                <a:tab pos="990600" algn="l"/>
+              </a:tabLst>
+            </a:pPr>
+            <a:r>
+              <a:rPr lang="pt-BR" sz="1600" dirty="0" smtClean="0"/>
+              <a:t>....</a:t>
+            </a:r>
+            <a:endParaRPr lang="pt-BR" sz="1600" dirty="0" smtClean="0"/>
+          </a:p>
+          <a:p>
+            <a:pPr marL="0" indent="0">
+              <a:spcBef>
+                <a:spcPts val="0"/>
+              </a:spcBef>
+              <a:buNone/>
+              <a:tabLst>
+                <a:tab pos="533400" algn="l"/>
+                <a:tab pos="990600" algn="l"/>
+              </a:tabLst>
+            </a:pPr>
+            <a:r>
+              <a:rPr lang="pt-BR" sz="1600" dirty="0" smtClean="0"/>
+              <a:t>thread1.start();</a:t>
+            </a:r>
+          </a:p>
+          <a:p>
+            <a:pPr marL="0" indent="0">
+              <a:spcBef>
+                <a:spcPts val="0"/>
+              </a:spcBef>
+              <a:buNone/>
+              <a:tabLst>
+                <a:tab pos="533400" algn="l"/>
+                <a:tab pos="990600" algn="l"/>
+              </a:tabLst>
+            </a:pPr>
+            <a:r>
+              <a:rPr lang="pt-BR" sz="1600" dirty="0" smtClean="0"/>
+              <a:t>thread2.start();</a:t>
+            </a:r>
+            <a:endParaRPr lang="pt-BR" sz="1600" dirty="0"/>
+          </a:p>
+        </p:txBody>
+      </p:sp>
+      <p:sp>
+        <p:nvSpPr>
+          <p:cNvPr id="4" name="Slide Number Placeholder 3"/>
+          <p:cNvSpPr>
+            <a:spLocks noGrp="1"/>
+          </p:cNvSpPr>
+          <p:nvPr>
+            <p:ph type="sldNum" sz="quarter" idx="12"/>
+          </p:nvPr>
+        </p:nvSpPr>
+        <p:spPr/>
+        <p:txBody>
+          <a:bodyPr/>
+          <a:lstStyle/>
+          <a:p>
+            <a:pPr>
+              <a:defRPr/>
+            </a:pPr>
+            <a:fld id="{A3E49AD4-F76A-4E25-A0A5-9CD64D5A0A0D}" type="slidenum">
+              <a:rPr lang="pt-BR" smtClean="0"/>
+              <a:pPr>
+                <a:defRPr/>
+              </a:pPr>
+              <a:t>37</a:t>
+            </a:fld>
+            <a:endParaRPr lang="pt-BR"/>
+          </a:p>
+        </p:txBody>
+      </p:sp>
+    </p:spTree>
+  </p:cSld>
+  <p:clrMapOvr>
+    <a:masterClrMapping/>
+  </p:clrMapOvr>
+  <p:timing>
+    <p:tnLst>
+      <p:par>
+        <p:cTn id="1" dur="indefinite" restart="never" nodeType="tmRoot"/>
+      </p:par>
+    </p:tnLst>
+  </p:timing>
+</p:sld>
+</file>
+
+<file path=ppt/slides/slide38.xml><?xml version="1.0" encoding="utf-8"?>
+<p:sld xmlns:a="http://schemas.openxmlformats.org/drawingml/2006/main" xmlns:r="http://schemas.openxmlformats.org/officeDocument/2006/relationships" xmlns:p="http://schemas.openxmlformats.org/presentationml/2006/main">
+  <p:cSld>
+    <p:spTree>
+      <p:nvGrpSpPr>
+        <p:cNvPr id="1" name=""/>
+        <p:cNvGrpSpPr/>
+        <p:nvPr/>
+      </p:nvGrpSpPr>
+      <p:grpSpPr>
+        <a:xfrm>
+          <a:off x="0" y="0"/>
+          <a:ext cx="0" cy="0"/>
+          <a:chOff x="0" y="0"/>
+          <a:chExt cx="0" cy="0"/>
+        </a:xfrm>
+      </p:grpSpPr>
+      <p:sp>
+        <p:nvSpPr>
+          <p:cNvPr id="2" name="Title 1"/>
+          <p:cNvSpPr>
+            <a:spLocks noGrp="1"/>
+          </p:cNvSpPr>
+          <p:nvPr>
+            <p:ph type="title"/>
+          </p:nvPr>
+        </p:nvSpPr>
+        <p:spPr/>
+        <p:txBody>
+          <a:bodyPr/>
+          <a:lstStyle/>
+          <a:p>
+            <a:r>
+              <a:rPr lang="pt-BR" dirty="0" smtClean="0"/>
+              <a:t>Deadlock</a:t>
+            </a:r>
+            <a:endParaRPr lang="pt-BR" dirty="0"/>
+          </a:p>
+        </p:txBody>
+      </p:sp>
+      <p:sp>
+        <p:nvSpPr>
+          <p:cNvPr id="3" name="Content Placeholder 2"/>
+          <p:cNvSpPr>
+            <a:spLocks noGrp="1"/>
+          </p:cNvSpPr>
+          <p:nvPr>
+            <p:ph idx="1"/>
+          </p:nvPr>
+        </p:nvSpPr>
+        <p:spPr/>
+        <p:txBody>
+          <a:bodyPr/>
+          <a:lstStyle/>
+          <a:p>
+            <a:r>
+              <a:rPr lang="pt-BR" sz="2400" dirty="0" smtClean="0"/>
+              <a:t>Situações de deadlock podem ser difíceis de ser encontradas na aplicação.</a:t>
+            </a:r>
+          </a:p>
+          <a:p>
+            <a:endParaRPr lang="pt-BR" sz="2400" smtClean="0"/>
+          </a:p>
+          <a:p>
+            <a:r>
+              <a:rPr lang="pt-BR" sz="2400" smtClean="0"/>
+              <a:t>Ao </a:t>
+            </a:r>
+            <a:r>
+              <a:rPr lang="pt-BR" sz="2400" dirty="0" smtClean="0"/>
+              <a:t>utilizar interação entre threads em sua aplicação, é necessária uma análise detalhada para evitar este tipo de problema.</a:t>
+            </a:r>
+            <a:endParaRPr lang="pt-BR" sz="2400" dirty="0"/>
+          </a:p>
+        </p:txBody>
+      </p:sp>
+      <p:sp>
+        <p:nvSpPr>
+          <p:cNvPr id="4" name="Slide Number Placeholder 3"/>
+          <p:cNvSpPr>
+            <a:spLocks noGrp="1"/>
+          </p:cNvSpPr>
+          <p:nvPr>
+            <p:ph type="sldNum" sz="quarter" idx="12"/>
+          </p:nvPr>
+        </p:nvSpPr>
+        <p:spPr/>
+        <p:txBody>
+          <a:bodyPr/>
+          <a:lstStyle/>
+          <a:p>
+            <a:pPr>
+              <a:defRPr/>
+            </a:pPr>
+            <a:fld id="{A3E49AD4-F76A-4E25-A0A5-9CD64D5A0A0D}" type="slidenum">
+              <a:rPr lang="pt-BR" smtClean="0"/>
+              <a:pPr>
+                <a:defRPr/>
+              </a:pPr>
+              <a:t>38</a:t>
             </a:fld>
             <a:endParaRPr lang="pt-BR"/>
           </a:p>

</xml_diff>